<commit_message>
ajout d'Annecy comme localisation cv
</commit_message>
<xml_diff>
--- a/CV_FFROMAGER.pptx
+++ b/CV_FFROMAGER.pptx
@@ -198,7 +198,7 @@
           <a:p>
             <a:fld id="{0B931C3E-6BFC-4638-BB9C-51D3F831E5AB}" type="datetimeFigureOut">
               <a:rPr lang="fr-FR" smtClean="0"/>
-              <a:t>07/11/2022</a:t>
+              <a:t>02/12/2022</a:t>
             </a:fld>
             <a:endParaRPr lang="fr-FR"/>
           </a:p>
@@ -596,7 +596,7 @@
           <a:p>
             <a:fld id="{599F6D61-D8C0-4321-8F41-5FC8A4129D8A}" type="datetimeFigureOut">
               <a:rPr lang="fr-FR" smtClean="0"/>
-              <a:t>07/11/2022</a:t>
+              <a:t>02/12/2022</a:t>
             </a:fld>
             <a:endParaRPr lang="fr-FR"/>
           </a:p>
@@ -766,7 +766,7 @@
           <a:p>
             <a:fld id="{599F6D61-D8C0-4321-8F41-5FC8A4129D8A}" type="datetimeFigureOut">
               <a:rPr lang="fr-FR" smtClean="0"/>
-              <a:t>07/11/2022</a:t>
+              <a:t>02/12/2022</a:t>
             </a:fld>
             <a:endParaRPr lang="fr-FR"/>
           </a:p>
@@ -946,7 +946,7 @@
           <a:p>
             <a:fld id="{599F6D61-D8C0-4321-8F41-5FC8A4129D8A}" type="datetimeFigureOut">
               <a:rPr lang="fr-FR" smtClean="0"/>
-              <a:t>07/11/2022</a:t>
+              <a:t>02/12/2022</a:t>
             </a:fld>
             <a:endParaRPr lang="fr-FR"/>
           </a:p>
@@ -1116,7 +1116,7 @@
           <a:p>
             <a:fld id="{599F6D61-D8C0-4321-8F41-5FC8A4129D8A}" type="datetimeFigureOut">
               <a:rPr lang="fr-FR" smtClean="0"/>
-              <a:t>07/11/2022</a:t>
+              <a:t>02/12/2022</a:t>
             </a:fld>
             <a:endParaRPr lang="fr-FR"/>
           </a:p>
@@ -1360,7 +1360,7 @@
           <a:p>
             <a:fld id="{599F6D61-D8C0-4321-8F41-5FC8A4129D8A}" type="datetimeFigureOut">
               <a:rPr lang="fr-FR" smtClean="0"/>
-              <a:t>07/11/2022</a:t>
+              <a:t>02/12/2022</a:t>
             </a:fld>
             <a:endParaRPr lang="fr-FR"/>
           </a:p>
@@ -1592,7 +1592,7 @@
           <a:p>
             <a:fld id="{599F6D61-D8C0-4321-8F41-5FC8A4129D8A}" type="datetimeFigureOut">
               <a:rPr lang="fr-FR" smtClean="0"/>
-              <a:t>07/11/2022</a:t>
+              <a:t>02/12/2022</a:t>
             </a:fld>
             <a:endParaRPr lang="fr-FR"/>
           </a:p>
@@ -1959,7 +1959,7 @@
           <a:p>
             <a:fld id="{599F6D61-D8C0-4321-8F41-5FC8A4129D8A}" type="datetimeFigureOut">
               <a:rPr lang="fr-FR" smtClean="0"/>
-              <a:t>07/11/2022</a:t>
+              <a:t>02/12/2022</a:t>
             </a:fld>
             <a:endParaRPr lang="fr-FR"/>
           </a:p>
@@ -2077,7 +2077,7 @@
           <a:p>
             <a:fld id="{599F6D61-D8C0-4321-8F41-5FC8A4129D8A}" type="datetimeFigureOut">
               <a:rPr lang="fr-FR" smtClean="0"/>
-              <a:t>07/11/2022</a:t>
+              <a:t>02/12/2022</a:t>
             </a:fld>
             <a:endParaRPr lang="fr-FR"/>
           </a:p>
@@ -2172,7 +2172,7 @@
           <a:p>
             <a:fld id="{599F6D61-D8C0-4321-8F41-5FC8A4129D8A}" type="datetimeFigureOut">
               <a:rPr lang="fr-FR" smtClean="0"/>
-              <a:t>07/11/2022</a:t>
+              <a:t>02/12/2022</a:t>
             </a:fld>
             <a:endParaRPr lang="fr-FR"/>
           </a:p>
@@ -2449,7 +2449,7 @@
           <a:p>
             <a:fld id="{599F6D61-D8C0-4321-8F41-5FC8A4129D8A}" type="datetimeFigureOut">
               <a:rPr lang="fr-FR" smtClean="0"/>
-              <a:t>07/11/2022</a:t>
+              <a:t>02/12/2022</a:t>
             </a:fld>
             <a:endParaRPr lang="fr-FR"/>
           </a:p>
@@ -2706,7 +2706,7 @@
           <a:p>
             <a:fld id="{599F6D61-D8C0-4321-8F41-5FC8A4129D8A}" type="datetimeFigureOut">
               <a:rPr lang="fr-FR" smtClean="0"/>
-              <a:t>07/11/2022</a:t>
+              <a:t>02/12/2022</a:t>
             </a:fld>
             <a:endParaRPr lang="fr-FR"/>
           </a:p>
@@ -2919,7 +2919,7 @@
           <a:p>
             <a:fld id="{599F6D61-D8C0-4321-8F41-5FC8A4129D8A}" type="datetimeFigureOut">
               <a:rPr lang="fr-FR" smtClean="0"/>
-              <a:t>07/11/2022</a:t>
+              <a:t>02/12/2022</a:t>
             </a:fld>
             <a:endParaRPr lang="fr-FR"/>
           </a:p>
@@ -6953,19 +6953,22 @@
                 <a:latin typeface="Malgun Gothic" panose="020B0503020000020004" pitchFamily="34" charset="-127"/>
                 <a:ea typeface="Malgun Gothic" panose="020B0503020000020004" pitchFamily="34" charset="-127"/>
               </a:rPr>
-              <a:t>Zone de mobilité géographique : région grenobloise de préférence chez un </a:t>
+              <a:t>Zone de mobilité géographique : région grenobloise ou annécienne</a:t>
             </a:r>
             <a:r>
               <a:rPr lang="fr-FR" sz="1050">
                 <a:latin typeface="Malgun Gothic" panose="020B0503020000020004" pitchFamily="34" charset="-127"/>
                 <a:ea typeface="Malgun Gothic" panose="020B0503020000020004" pitchFamily="34" charset="-127"/>
               </a:rPr>
-              <a:t>client final.</a:t>
-            </a:r>
-            <a:endParaRPr lang="fr-FR" sz="1050" dirty="0">
-              <a:latin typeface="Malgun Gothic" panose="020B0503020000020004" pitchFamily="34" charset="-127"/>
-              <a:ea typeface="Malgun Gothic" panose="020B0503020000020004" pitchFamily="34" charset="-127"/>
-            </a:endParaRPr>
+              <a:t>, chez </a:t>
+            </a:r>
+            <a:r>
+              <a:rPr lang="fr-FR" sz="1050" dirty="0">
+                <a:latin typeface="Malgun Gothic" panose="020B0503020000020004" pitchFamily="34" charset="-127"/>
+                <a:ea typeface="Malgun Gothic" panose="020B0503020000020004" pitchFamily="34" charset="-127"/>
+              </a:rPr>
+              <a:t>un client final.</a:t>
+            </a:r>
           </a:p>
           <a:p>
             <a:r>

</xml_diff>

<commit_message>
suppression noms ESN dans CV + maj liste Contact
</commit_message>
<xml_diff>
--- a/CV_FFROMAGER.pptx
+++ b/CV_FFROMAGER.pptx
@@ -198,7 +198,7 @@
           <a:p>
             <a:fld id="{0B931C3E-6BFC-4638-BB9C-51D3F831E5AB}" type="datetimeFigureOut">
               <a:rPr lang="fr-FR" smtClean="0"/>
-              <a:t>02/12/2022</a:t>
+              <a:t>06/12/2022</a:t>
             </a:fld>
             <a:endParaRPr lang="fr-FR"/>
           </a:p>
@@ -596,7 +596,7 @@
           <a:p>
             <a:fld id="{599F6D61-D8C0-4321-8F41-5FC8A4129D8A}" type="datetimeFigureOut">
               <a:rPr lang="fr-FR" smtClean="0"/>
-              <a:t>02/12/2022</a:t>
+              <a:t>06/12/2022</a:t>
             </a:fld>
             <a:endParaRPr lang="fr-FR"/>
           </a:p>
@@ -766,7 +766,7 @@
           <a:p>
             <a:fld id="{599F6D61-D8C0-4321-8F41-5FC8A4129D8A}" type="datetimeFigureOut">
               <a:rPr lang="fr-FR" smtClean="0"/>
-              <a:t>02/12/2022</a:t>
+              <a:t>06/12/2022</a:t>
             </a:fld>
             <a:endParaRPr lang="fr-FR"/>
           </a:p>
@@ -946,7 +946,7 @@
           <a:p>
             <a:fld id="{599F6D61-D8C0-4321-8F41-5FC8A4129D8A}" type="datetimeFigureOut">
               <a:rPr lang="fr-FR" smtClean="0"/>
-              <a:t>02/12/2022</a:t>
+              <a:t>06/12/2022</a:t>
             </a:fld>
             <a:endParaRPr lang="fr-FR"/>
           </a:p>
@@ -1116,7 +1116,7 @@
           <a:p>
             <a:fld id="{599F6D61-D8C0-4321-8F41-5FC8A4129D8A}" type="datetimeFigureOut">
               <a:rPr lang="fr-FR" smtClean="0"/>
-              <a:t>02/12/2022</a:t>
+              <a:t>06/12/2022</a:t>
             </a:fld>
             <a:endParaRPr lang="fr-FR"/>
           </a:p>
@@ -1360,7 +1360,7 @@
           <a:p>
             <a:fld id="{599F6D61-D8C0-4321-8F41-5FC8A4129D8A}" type="datetimeFigureOut">
               <a:rPr lang="fr-FR" smtClean="0"/>
-              <a:t>02/12/2022</a:t>
+              <a:t>06/12/2022</a:t>
             </a:fld>
             <a:endParaRPr lang="fr-FR"/>
           </a:p>
@@ -1592,7 +1592,7 @@
           <a:p>
             <a:fld id="{599F6D61-D8C0-4321-8F41-5FC8A4129D8A}" type="datetimeFigureOut">
               <a:rPr lang="fr-FR" smtClean="0"/>
-              <a:t>02/12/2022</a:t>
+              <a:t>06/12/2022</a:t>
             </a:fld>
             <a:endParaRPr lang="fr-FR"/>
           </a:p>
@@ -1959,7 +1959,7 @@
           <a:p>
             <a:fld id="{599F6D61-D8C0-4321-8F41-5FC8A4129D8A}" type="datetimeFigureOut">
               <a:rPr lang="fr-FR" smtClean="0"/>
-              <a:t>02/12/2022</a:t>
+              <a:t>06/12/2022</a:t>
             </a:fld>
             <a:endParaRPr lang="fr-FR"/>
           </a:p>
@@ -2077,7 +2077,7 @@
           <a:p>
             <a:fld id="{599F6D61-D8C0-4321-8F41-5FC8A4129D8A}" type="datetimeFigureOut">
               <a:rPr lang="fr-FR" smtClean="0"/>
-              <a:t>02/12/2022</a:t>
+              <a:t>06/12/2022</a:t>
             </a:fld>
             <a:endParaRPr lang="fr-FR"/>
           </a:p>
@@ -2172,7 +2172,7 @@
           <a:p>
             <a:fld id="{599F6D61-D8C0-4321-8F41-5FC8A4129D8A}" type="datetimeFigureOut">
               <a:rPr lang="fr-FR" smtClean="0"/>
-              <a:t>02/12/2022</a:t>
+              <a:t>06/12/2022</a:t>
             </a:fld>
             <a:endParaRPr lang="fr-FR"/>
           </a:p>
@@ -2449,7 +2449,7 @@
           <a:p>
             <a:fld id="{599F6D61-D8C0-4321-8F41-5FC8A4129D8A}" type="datetimeFigureOut">
               <a:rPr lang="fr-FR" smtClean="0"/>
-              <a:t>02/12/2022</a:t>
+              <a:t>06/12/2022</a:t>
             </a:fld>
             <a:endParaRPr lang="fr-FR"/>
           </a:p>
@@ -2706,7 +2706,7 @@
           <a:p>
             <a:fld id="{599F6D61-D8C0-4321-8F41-5FC8A4129D8A}" type="datetimeFigureOut">
               <a:rPr lang="fr-FR" smtClean="0"/>
-              <a:t>02/12/2022</a:t>
+              <a:t>06/12/2022</a:t>
             </a:fld>
             <a:endParaRPr lang="fr-FR"/>
           </a:p>
@@ -2919,7 +2919,7 @@
           <a:p>
             <a:fld id="{599F6D61-D8C0-4321-8F41-5FC8A4129D8A}" type="datetimeFigureOut">
               <a:rPr lang="fr-FR" smtClean="0"/>
-              <a:t>02/12/2022</a:t>
+              <a:t>06/12/2022</a:t>
             </a:fld>
             <a:endParaRPr lang="fr-FR"/>
           </a:p>
@@ -3896,7 +3896,7 @@
                 <a:ea typeface="Malgun Gothic" panose="020B0503020000020004" pitchFamily="34" charset="-127"/>
                 <a:cs typeface="Angsana New" panose="02020603050405020304" pitchFamily="18" charset="-34"/>
               </a:rPr>
-              <a:t>pour MERITIS– depuis 2022-05</a:t>
+              <a:t>– depuis 2022-05</a:t>
             </a:r>
             <a:endParaRPr lang="fr-FR" sz="1050" dirty="0">
               <a:solidFill>
@@ -4019,7 +4019,64 @@
                 <a:ea typeface="Calibri" panose="020F0502020204030204" pitchFamily="34" charset="0"/>
                 <a:cs typeface="Cordia New" panose="020B0304020202020204" pitchFamily="34" charset="-34"/>
               </a:rPr>
-              <a:t> pour la Compagnie Des Alpes pour CAP GEMINI – 2021-05 à 2021-12</a:t>
+              <a:t> pour la Compagnie Des Alpes </a:t>
+            </a:r>
+            <a:r>
+              <a:rPr lang="fr-FR" sz="1050" dirty="0">
+                <a:solidFill>
+                  <a:srgbClr val="4F81BD"/>
+                </a:solidFill>
+                <a:effectLst>
+                  <a:outerShdw blurRad="38100" dist="25400" dir="5400000" algn="ctr">
+                    <a:srgbClr val="6E747A">
+                      <a:alpha val="43000"/>
+                    </a:srgbClr>
+                  </a:outerShdw>
+                </a:effectLst>
+                <a:latin typeface="Malgun Gothic" panose="020B0503020000020004" pitchFamily="34" charset="-127"/>
+                <a:ea typeface="Calibri" panose="020F0502020204030204" pitchFamily="34" charset="0"/>
+                <a:cs typeface="Cordia New" panose="020B0304020202020204" pitchFamily="34" charset="-34"/>
+              </a:rPr>
+              <a:t>à </a:t>
+            </a:r>
+            <a:r>
+              <a:rPr lang="fr-FR" sz="1050" dirty="0" err="1">
+                <a:solidFill>
+                  <a:srgbClr val="4F81BD"/>
+                </a:solidFill>
+                <a:effectLst>
+                  <a:outerShdw blurRad="38100" dist="25400" dir="5400000" algn="ctr">
+                    <a:srgbClr val="6E747A">
+                      <a:alpha val="43000"/>
+                    </a:srgbClr>
+                  </a:outerShdw>
+                </a:effectLst>
+                <a:latin typeface="Malgun Gothic" panose="020B0503020000020004" pitchFamily="34" charset="-127"/>
+                <a:ea typeface="Calibri" panose="020F0502020204030204" pitchFamily="34" charset="0"/>
+                <a:cs typeface="Cordia New" panose="020B0304020202020204" pitchFamily="34" charset="-34"/>
+              </a:rPr>
+              <a:t>Monbonnot-Saint-Martin</a:t>
+            </a:r>
+            <a:r>
+              <a:rPr lang="fr-FR" sz="1050" dirty="0">
+                <a:ln>
+                  <a:noFill/>
+                </a:ln>
+                <a:solidFill>
+                  <a:srgbClr val="4F81BD"/>
+                </a:solidFill>
+                <a:effectLst>
+                  <a:outerShdw blurRad="38100" dist="25400" dir="5400000" algn="ctr">
+                    <a:srgbClr val="6E747A">
+                      <a:alpha val="43000"/>
+                    </a:srgbClr>
+                  </a:outerShdw>
+                </a:effectLst>
+                <a:latin typeface="Malgun Gothic" panose="020B0503020000020004" pitchFamily="34" charset="-127"/>
+                <a:ea typeface="Calibri" panose="020F0502020204030204" pitchFamily="34" charset="0"/>
+                <a:cs typeface="Cordia New" panose="020B0304020202020204" pitchFamily="34" charset="-34"/>
+              </a:rPr>
+              <a:t> – 2021-05 à 2021-12</a:t>
             </a:r>
             <a:endParaRPr lang="fr-FR" sz="1050" dirty="0">
               <a:solidFill>
@@ -4070,7 +4127,29 @@
                 <a:ea typeface="Malgun Gothic" panose="020B0503020000020004" pitchFamily="34" charset="-127"/>
                 <a:cs typeface="Angsana New" panose="02020603050405020304" pitchFamily="18" charset="-34"/>
               </a:rPr>
-              <a:t>Consultant DevOps </a:t>
+              <a:t>Consultant DevOps pour Schneider à </a:t>
+            </a:r>
+            <a:r>
+              <a:rPr lang="fr-FR" sz="1050" b="1" cap="small" dirty="0" err="1">
+                <a:solidFill>
+                  <a:srgbClr val="4F81BD"/>
+                </a:solidFill>
+                <a:latin typeface="Malgun Gothic" panose="020B0503020000020004" pitchFamily="34" charset="-127"/>
+                <a:ea typeface="Malgun Gothic" panose="020B0503020000020004" pitchFamily="34" charset="-127"/>
+                <a:cs typeface="Angsana New" panose="02020603050405020304" pitchFamily="18" charset="-34"/>
+              </a:rPr>
+              <a:t>eybens</a:t>
+            </a:r>
+            <a:r>
+              <a:rPr lang="fr-FR" sz="1050" b="1" cap="small" dirty="0">
+                <a:solidFill>
+                  <a:srgbClr val="4F81BD"/>
+                </a:solidFill>
+                <a:latin typeface="Malgun Gothic" panose="020B0503020000020004" pitchFamily="34" charset="-127"/>
+                <a:ea typeface="Malgun Gothic" panose="020B0503020000020004" pitchFamily="34" charset="-127"/>
+                <a:cs typeface="Angsana New" panose="02020603050405020304" pitchFamily="18" charset="-34"/>
+              </a:rPr>
+              <a:t> </a:t>
             </a:r>
             <a:r>
               <a:rPr lang="fr-FR" sz="1050" cap="small" dirty="0">
@@ -4081,7 +4160,7 @@
                 <a:ea typeface="Malgun Gothic" panose="020B0503020000020004" pitchFamily="34" charset="-127"/>
                 <a:cs typeface="Angsana New" panose="02020603050405020304" pitchFamily="18" charset="-34"/>
               </a:rPr>
-              <a:t>CONAN JENKEN CONSULTING – 2019-03 à 2021-04</a:t>
+              <a:t>– 2019-03 à 2021-04</a:t>
             </a:r>
           </a:p>
           <a:p>
@@ -4172,7 +4251,7 @@
                 <a:ea typeface="Malgun Gothic" panose="020B0503020000020004" pitchFamily="34" charset="-127"/>
                 <a:cs typeface="Angsana New" panose="02020603050405020304" pitchFamily="18" charset="-34"/>
               </a:rPr>
-              <a:t>– 2019-03 à 2021-04</a:t>
+              <a:t>– 2018-2019</a:t>
             </a:r>
             <a:endParaRPr lang="fr-FR" sz="1050" dirty="0">
               <a:solidFill>
@@ -5121,7 +5200,7 @@
           <p:nvPr>
             <p:extLst>
               <p:ext uri="{D42A27DB-BD31-4B8C-83A1-F6EECF244321}">
-                <p14:modId xmlns:p14="http://schemas.microsoft.com/office/powerpoint/2010/main" val="2295271157"/>
+                <p14:modId xmlns:p14="http://schemas.microsoft.com/office/powerpoint/2010/main" val="2284430247"/>
               </p:ext>
             </p:extLst>
           </p:nvPr>

</xml_diff>

<commit_message>
réponse à mail de silkhome
</commit_message>
<xml_diff>
--- a/CV_FFROMAGER.pptx
+++ b/CV_FFROMAGER.pptx
@@ -198,7 +198,7 @@
           <a:p>
             <a:fld id="{0B931C3E-6BFC-4638-BB9C-51D3F831E5AB}" type="datetimeFigureOut">
               <a:rPr lang="fr-FR" smtClean="0"/>
-              <a:t>12/12/2022</a:t>
+              <a:t>14/12/2022</a:t>
             </a:fld>
             <a:endParaRPr lang="fr-FR"/>
           </a:p>
@@ -596,7 +596,7 @@
           <a:p>
             <a:fld id="{599F6D61-D8C0-4321-8F41-5FC8A4129D8A}" type="datetimeFigureOut">
               <a:rPr lang="fr-FR" smtClean="0"/>
-              <a:t>12/12/2022</a:t>
+              <a:t>14/12/2022</a:t>
             </a:fld>
             <a:endParaRPr lang="fr-FR"/>
           </a:p>
@@ -766,7 +766,7 @@
           <a:p>
             <a:fld id="{599F6D61-D8C0-4321-8F41-5FC8A4129D8A}" type="datetimeFigureOut">
               <a:rPr lang="fr-FR" smtClean="0"/>
-              <a:t>12/12/2022</a:t>
+              <a:t>14/12/2022</a:t>
             </a:fld>
             <a:endParaRPr lang="fr-FR"/>
           </a:p>
@@ -946,7 +946,7 @@
           <a:p>
             <a:fld id="{599F6D61-D8C0-4321-8F41-5FC8A4129D8A}" type="datetimeFigureOut">
               <a:rPr lang="fr-FR" smtClean="0"/>
-              <a:t>12/12/2022</a:t>
+              <a:t>14/12/2022</a:t>
             </a:fld>
             <a:endParaRPr lang="fr-FR"/>
           </a:p>
@@ -1116,7 +1116,7 @@
           <a:p>
             <a:fld id="{599F6D61-D8C0-4321-8F41-5FC8A4129D8A}" type="datetimeFigureOut">
               <a:rPr lang="fr-FR" smtClean="0"/>
-              <a:t>12/12/2022</a:t>
+              <a:t>14/12/2022</a:t>
             </a:fld>
             <a:endParaRPr lang="fr-FR"/>
           </a:p>
@@ -1360,7 +1360,7 @@
           <a:p>
             <a:fld id="{599F6D61-D8C0-4321-8F41-5FC8A4129D8A}" type="datetimeFigureOut">
               <a:rPr lang="fr-FR" smtClean="0"/>
-              <a:t>12/12/2022</a:t>
+              <a:t>14/12/2022</a:t>
             </a:fld>
             <a:endParaRPr lang="fr-FR"/>
           </a:p>
@@ -1592,7 +1592,7 @@
           <a:p>
             <a:fld id="{599F6D61-D8C0-4321-8F41-5FC8A4129D8A}" type="datetimeFigureOut">
               <a:rPr lang="fr-FR" smtClean="0"/>
-              <a:t>12/12/2022</a:t>
+              <a:t>14/12/2022</a:t>
             </a:fld>
             <a:endParaRPr lang="fr-FR"/>
           </a:p>
@@ -1959,7 +1959,7 @@
           <a:p>
             <a:fld id="{599F6D61-D8C0-4321-8F41-5FC8A4129D8A}" type="datetimeFigureOut">
               <a:rPr lang="fr-FR" smtClean="0"/>
-              <a:t>12/12/2022</a:t>
+              <a:t>14/12/2022</a:t>
             </a:fld>
             <a:endParaRPr lang="fr-FR"/>
           </a:p>
@@ -2077,7 +2077,7 @@
           <a:p>
             <a:fld id="{599F6D61-D8C0-4321-8F41-5FC8A4129D8A}" type="datetimeFigureOut">
               <a:rPr lang="fr-FR" smtClean="0"/>
-              <a:t>12/12/2022</a:t>
+              <a:t>14/12/2022</a:t>
             </a:fld>
             <a:endParaRPr lang="fr-FR"/>
           </a:p>
@@ -2172,7 +2172,7 @@
           <a:p>
             <a:fld id="{599F6D61-D8C0-4321-8F41-5FC8A4129D8A}" type="datetimeFigureOut">
               <a:rPr lang="fr-FR" smtClean="0"/>
-              <a:t>12/12/2022</a:t>
+              <a:t>14/12/2022</a:t>
             </a:fld>
             <a:endParaRPr lang="fr-FR"/>
           </a:p>
@@ -2449,7 +2449,7 @@
           <a:p>
             <a:fld id="{599F6D61-D8C0-4321-8F41-5FC8A4129D8A}" type="datetimeFigureOut">
               <a:rPr lang="fr-FR" smtClean="0"/>
-              <a:t>12/12/2022</a:t>
+              <a:t>14/12/2022</a:t>
             </a:fld>
             <a:endParaRPr lang="fr-FR"/>
           </a:p>
@@ -2706,7 +2706,7 @@
           <a:p>
             <a:fld id="{599F6D61-D8C0-4321-8F41-5FC8A4129D8A}" type="datetimeFigureOut">
               <a:rPr lang="fr-FR" smtClean="0"/>
-              <a:t>12/12/2022</a:t>
+              <a:t>14/12/2022</a:t>
             </a:fld>
             <a:endParaRPr lang="fr-FR"/>
           </a:p>
@@ -2919,7 +2919,7 @@
           <a:p>
             <a:fld id="{599F6D61-D8C0-4321-8F41-5FC8A4129D8A}" type="datetimeFigureOut">
               <a:rPr lang="fr-FR" smtClean="0"/>
-              <a:t>12/12/2022</a:t>
+              <a:t>14/12/2022</a:t>
             </a:fld>
             <a:endParaRPr lang="fr-FR"/>
           </a:p>
@@ -3380,8 +3380,8 @@
         </p:nvSpPr>
         <p:spPr>
           <a:xfrm>
-            <a:off x="2542263" y="192469"/>
-            <a:ext cx="4315738" cy="954107"/>
+            <a:off x="2743199" y="192469"/>
+            <a:ext cx="4114801" cy="954107"/>
           </a:xfrm>
           <a:prstGeom prst="rect">
             <a:avLst/>
@@ -3404,31 +3404,7 @@
                 <a:latin typeface="Malgun Gothic" panose="020B0503020000020004" pitchFamily="34" charset="-127"/>
                 <a:ea typeface="Malgun Gothic" panose="020B0503020000020004" pitchFamily="34" charset="-127"/>
               </a:rPr>
-              <a:t>Passionné de nouvelles technologies, je propose de partager mon </a:t>
-            </a:r>
-            <a:r>
-              <a:rPr lang="fr-FR" sz="1400">
-                <a:solidFill>
-                  <a:schemeClr val="bg2">
-                    <a:lumMod val="50000"/>
-                  </a:schemeClr>
-                </a:solidFill>
-                <a:latin typeface="Malgun Gothic" panose="020B0503020000020004" pitchFamily="34" charset="-127"/>
-                <a:ea typeface="Malgun Gothic" panose="020B0503020000020004" pitchFamily="34" charset="-127"/>
-              </a:rPr>
-              <a:t>expertise de plus de </a:t>
-            </a:r>
-            <a:r>
-              <a:rPr lang="fr-FR" sz="1400" dirty="0">
-                <a:solidFill>
-                  <a:schemeClr val="bg2">
-                    <a:lumMod val="50000"/>
-                  </a:schemeClr>
-                </a:solidFill>
-                <a:latin typeface="Malgun Gothic" panose="020B0503020000020004" pitchFamily="34" charset="-127"/>
-                <a:ea typeface="Malgun Gothic" panose="020B0503020000020004" pitchFamily="34" charset="-127"/>
-              </a:rPr>
-              <a:t>25 ans dans le développement informatique et le management de projets techniques</a:t>
+              <a:t>Passionné de nouvelles technologies, je propose de partager mon expertise de plus de 25 ans dans le développement informatique et le management de projets techniques</a:t>
             </a:r>
           </a:p>
         </p:txBody>
@@ -5080,7 +5056,7 @@
                 <a:latin typeface="Malgun Gothic" panose="020B0503020000020004" pitchFamily="34" charset="-127"/>
                 <a:ea typeface="Malgun Gothic" panose="020B0503020000020004" pitchFamily="34" charset="-127"/>
               </a:rPr>
-              <a:t>RESPONSABLE INFORMATIQUE</a:t>
+              <a:t>RESPONSABLE DEVELOPPEMENT</a:t>
             </a:r>
           </a:p>
           <a:p>

</xml_diff>

<commit_message>
modification titre CV : Responsable Développement
</commit_message>
<xml_diff>
--- a/CV_FFROMAGER.pptx
+++ b/CV_FFROMAGER.pptx
@@ -198,7 +198,7 @@
           <a:p>
             <a:fld id="{0B931C3E-6BFC-4638-BB9C-51D3F831E5AB}" type="datetimeFigureOut">
               <a:rPr lang="fr-FR" smtClean="0"/>
-              <a:t>06/12/2022</a:t>
+              <a:t>29/12/2022</a:t>
             </a:fld>
             <a:endParaRPr lang="fr-FR"/>
           </a:p>
@@ -596,7 +596,7 @@
           <a:p>
             <a:fld id="{599F6D61-D8C0-4321-8F41-5FC8A4129D8A}" type="datetimeFigureOut">
               <a:rPr lang="fr-FR" smtClean="0"/>
-              <a:t>06/12/2022</a:t>
+              <a:t>29/12/2022</a:t>
             </a:fld>
             <a:endParaRPr lang="fr-FR"/>
           </a:p>
@@ -766,7 +766,7 @@
           <a:p>
             <a:fld id="{599F6D61-D8C0-4321-8F41-5FC8A4129D8A}" type="datetimeFigureOut">
               <a:rPr lang="fr-FR" smtClean="0"/>
-              <a:t>06/12/2022</a:t>
+              <a:t>29/12/2022</a:t>
             </a:fld>
             <a:endParaRPr lang="fr-FR"/>
           </a:p>
@@ -946,7 +946,7 @@
           <a:p>
             <a:fld id="{599F6D61-D8C0-4321-8F41-5FC8A4129D8A}" type="datetimeFigureOut">
               <a:rPr lang="fr-FR" smtClean="0"/>
-              <a:t>06/12/2022</a:t>
+              <a:t>29/12/2022</a:t>
             </a:fld>
             <a:endParaRPr lang="fr-FR"/>
           </a:p>
@@ -1116,7 +1116,7 @@
           <a:p>
             <a:fld id="{599F6D61-D8C0-4321-8F41-5FC8A4129D8A}" type="datetimeFigureOut">
               <a:rPr lang="fr-FR" smtClean="0"/>
-              <a:t>06/12/2022</a:t>
+              <a:t>29/12/2022</a:t>
             </a:fld>
             <a:endParaRPr lang="fr-FR"/>
           </a:p>
@@ -1360,7 +1360,7 @@
           <a:p>
             <a:fld id="{599F6D61-D8C0-4321-8F41-5FC8A4129D8A}" type="datetimeFigureOut">
               <a:rPr lang="fr-FR" smtClean="0"/>
-              <a:t>06/12/2022</a:t>
+              <a:t>29/12/2022</a:t>
             </a:fld>
             <a:endParaRPr lang="fr-FR"/>
           </a:p>
@@ -1592,7 +1592,7 @@
           <a:p>
             <a:fld id="{599F6D61-D8C0-4321-8F41-5FC8A4129D8A}" type="datetimeFigureOut">
               <a:rPr lang="fr-FR" smtClean="0"/>
-              <a:t>06/12/2022</a:t>
+              <a:t>29/12/2022</a:t>
             </a:fld>
             <a:endParaRPr lang="fr-FR"/>
           </a:p>
@@ -1959,7 +1959,7 @@
           <a:p>
             <a:fld id="{599F6D61-D8C0-4321-8F41-5FC8A4129D8A}" type="datetimeFigureOut">
               <a:rPr lang="fr-FR" smtClean="0"/>
-              <a:t>06/12/2022</a:t>
+              <a:t>29/12/2022</a:t>
             </a:fld>
             <a:endParaRPr lang="fr-FR"/>
           </a:p>
@@ -2077,7 +2077,7 @@
           <a:p>
             <a:fld id="{599F6D61-D8C0-4321-8F41-5FC8A4129D8A}" type="datetimeFigureOut">
               <a:rPr lang="fr-FR" smtClean="0"/>
-              <a:t>06/12/2022</a:t>
+              <a:t>29/12/2022</a:t>
             </a:fld>
             <a:endParaRPr lang="fr-FR"/>
           </a:p>
@@ -2172,7 +2172,7 @@
           <a:p>
             <a:fld id="{599F6D61-D8C0-4321-8F41-5FC8A4129D8A}" type="datetimeFigureOut">
               <a:rPr lang="fr-FR" smtClean="0"/>
-              <a:t>06/12/2022</a:t>
+              <a:t>29/12/2022</a:t>
             </a:fld>
             <a:endParaRPr lang="fr-FR"/>
           </a:p>
@@ -2449,7 +2449,7 @@
           <a:p>
             <a:fld id="{599F6D61-D8C0-4321-8F41-5FC8A4129D8A}" type="datetimeFigureOut">
               <a:rPr lang="fr-FR" smtClean="0"/>
-              <a:t>06/12/2022</a:t>
+              <a:t>29/12/2022</a:t>
             </a:fld>
             <a:endParaRPr lang="fr-FR"/>
           </a:p>
@@ -2706,7 +2706,7 @@
           <a:p>
             <a:fld id="{599F6D61-D8C0-4321-8F41-5FC8A4129D8A}" type="datetimeFigureOut">
               <a:rPr lang="fr-FR" smtClean="0"/>
-              <a:t>06/12/2022</a:t>
+              <a:t>29/12/2022</a:t>
             </a:fld>
             <a:endParaRPr lang="fr-FR"/>
           </a:p>
@@ -2919,7 +2919,7 @@
           <a:p>
             <a:fld id="{599F6D61-D8C0-4321-8F41-5FC8A4129D8A}" type="datetimeFigureOut">
               <a:rPr lang="fr-FR" smtClean="0"/>
-              <a:t>06/12/2022</a:t>
+              <a:t>29/12/2022</a:t>
             </a:fld>
             <a:endParaRPr lang="fr-FR"/>
           </a:p>
@@ -3380,8 +3380,8 @@
         </p:nvSpPr>
         <p:spPr>
           <a:xfrm>
-            <a:off x="2542263" y="192469"/>
-            <a:ext cx="4315738" cy="954107"/>
+            <a:off x="2871787" y="192469"/>
+            <a:ext cx="3986213" cy="1169551"/>
           </a:xfrm>
           <a:prstGeom prst="rect">
             <a:avLst/>
@@ -3404,31 +3404,7 @@
                 <a:latin typeface="Malgun Gothic" panose="020B0503020000020004" pitchFamily="34" charset="-127"/>
                 <a:ea typeface="Malgun Gothic" panose="020B0503020000020004" pitchFamily="34" charset="-127"/>
               </a:rPr>
-              <a:t>Passionné de nouvelles technologies, je propose de partager mon </a:t>
-            </a:r>
-            <a:r>
-              <a:rPr lang="fr-FR" sz="1400">
-                <a:solidFill>
-                  <a:schemeClr val="bg2">
-                    <a:lumMod val="50000"/>
-                  </a:schemeClr>
-                </a:solidFill>
-                <a:latin typeface="Malgun Gothic" panose="020B0503020000020004" pitchFamily="34" charset="-127"/>
-                <a:ea typeface="Malgun Gothic" panose="020B0503020000020004" pitchFamily="34" charset="-127"/>
-              </a:rPr>
-              <a:t>expertise de plus de </a:t>
-            </a:r>
-            <a:r>
-              <a:rPr lang="fr-FR" sz="1400" dirty="0">
-                <a:solidFill>
-                  <a:schemeClr val="bg2">
-                    <a:lumMod val="50000"/>
-                  </a:schemeClr>
-                </a:solidFill>
-                <a:latin typeface="Malgun Gothic" panose="020B0503020000020004" pitchFamily="34" charset="-127"/>
-                <a:ea typeface="Malgun Gothic" panose="020B0503020000020004" pitchFamily="34" charset="-127"/>
-              </a:rPr>
-              <a:t>25 ans dans le développement informatique et le management de projets techniques</a:t>
+              <a:t>Passionné de nouvelles technologies, je propose de partager mon expertise de plus de 25 ans dans le développement informatique et le management de projets techniques</a:t>
             </a:r>
           </a:p>
         </p:txBody>
@@ -5080,7 +5056,7 @@
                 <a:latin typeface="Malgun Gothic" panose="020B0503020000020004" pitchFamily="34" charset="-127"/>
                 <a:ea typeface="Malgun Gothic" panose="020B0503020000020004" pitchFamily="34" charset="-127"/>
               </a:rPr>
-              <a:t>SCRUM MASTER / CHEF DE PROJETS INFORMATIQUES</a:t>
+              <a:t>RESPONSABLE DEVELOPPEMENT/ SCRUM MASTER</a:t>
             </a:r>
           </a:p>
           <a:p>

</xml_diff>

<commit_message>
changement date de fin Meritis
</commit_message>
<xml_diff>
--- a/CV_FFROMAGER.pptx
+++ b/CV_FFROMAGER.pptx
@@ -198,7 +198,7 @@
           <a:p>
             <a:fld id="{0B931C3E-6BFC-4638-BB9C-51D3F831E5AB}" type="datetimeFigureOut">
               <a:rPr lang="fr-FR" smtClean="0"/>
-              <a:t>05/01/2023</a:t>
+              <a:t>23/01/2023</a:t>
             </a:fld>
             <a:endParaRPr lang="fr-FR"/>
           </a:p>
@@ -596,7 +596,7 @@
           <a:p>
             <a:fld id="{599F6D61-D8C0-4321-8F41-5FC8A4129D8A}" type="datetimeFigureOut">
               <a:rPr lang="fr-FR" smtClean="0"/>
-              <a:t>05/01/2023</a:t>
+              <a:t>23/01/2023</a:t>
             </a:fld>
             <a:endParaRPr lang="fr-FR"/>
           </a:p>
@@ -766,7 +766,7 @@
           <a:p>
             <a:fld id="{599F6D61-D8C0-4321-8F41-5FC8A4129D8A}" type="datetimeFigureOut">
               <a:rPr lang="fr-FR" smtClean="0"/>
-              <a:t>05/01/2023</a:t>
+              <a:t>23/01/2023</a:t>
             </a:fld>
             <a:endParaRPr lang="fr-FR"/>
           </a:p>
@@ -946,7 +946,7 @@
           <a:p>
             <a:fld id="{599F6D61-D8C0-4321-8F41-5FC8A4129D8A}" type="datetimeFigureOut">
               <a:rPr lang="fr-FR" smtClean="0"/>
-              <a:t>05/01/2023</a:t>
+              <a:t>23/01/2023</a:t>
             </a:fld>
             <a:endParaRPr lang="fr-FR"/>
           </a:p>
@@ -1116,7 +1116,7 @@
           <a:p>
             <a:fld id="{599F6D61-D8C0-4321-8F41-5FC8A4129D8A}" type="datetimeFigureOut">
               <a:rPr lang="fr-FR" smtClean="0"/>
-              <a:t>05/01/2023</a:t>
+              <a:t>23/01/2023</a:t>
             </a:fld>
             <a:endParaRPr lang="fr-FR"/>
           </a:p>
@@ -1360,7 +1360,7 @@
           <a:p>
             <a:fld id="{599F6D61-D8C0-4321-8F41-5FC8A4129D8A}" type="datetimeFigureOut">
               <a:rPr lang="fr-FR" smtClean="0"/>
-              <a:t>05/01/2023</a:t>
+              <a:t>23/01/2023</a:t>
             </a:fld>
             <a:endParaRPr lang="fr-FR"/>
           </a:p>
@@ -1592,7 +1592,7 @@
           <a:p>
             <a:fld id="{599F6D61-D8C0-4321-8F41-5FC8A4129D8A}" type="datetimeFigureOut">
               <a:rPr lang="fr-FR" smtClean="0"/>
-              <a:t>05/01/2023</a:t>
+              <a:t>23/01/2023</a:t>
             </a:fld>
             <a:endParaRPr lang="fr-FR"/>
           </a:p>
@@ -1959,7 +1959,7 @@
           <a:p>
             <a:fld id="{599F6D61-D8C0-4321-8F41-5FC8A4129D8A}" type="datetimeFigureOut">
               <a:rPr lang="fr-FR" smtClean="0"/>
-              <a:t>05/01/2023</a:t>
+              <a:t>23/01/2023</a:t>
             </a:fld>
             <a:endParaRPr lang="fr-FR"/>
           </a:p>
@@ -2077,7 +2077,7 @@
           <a:p>
             <a:fld id="{599F6D61-D8C0-4321-8F41-5FC8A4129D8A}" type="datetimeFigureOut">
               <a:rPr lang="fr-FR" smtClean="0"/>
-              <a:t>05/01/2023</a:t>
+              <a:t>23/01/2023</a:t>
             </a:fld>
             <a:endParaRPr lang="fr-FR"/>
           </a:p>
@@ -2172,7 +2172,7 @@
           <a:p>
             <a:fld id="{599F6D61-D8C0-4321-8F41-5FC8A4129D8A}" type="datetimeFigureOut">
               <a:rPr lang="fr-FR" smtClean="0"/>
-              <a:t>05/01/2023</a:t>
+              <a:t>23/01/2023</a:t>
             </a:fld>
             <a:endParaRPr lang="fr-FR"/>
           </a:p>
@@ -2449,7 +2449,7 @@
           <a:p>
             <a:fld id="{599F6D61-D8C0-4321-8F41-5FC8A4129D8A}" type="datetimeFigureOut">
               <a:rPr lang="fr-FR" smtClean="0"/>
-              <a:t>05/01/2023</a:t>
+              <a:t>23/01/2023</a:t>
             </a:fld>
             <a:endParaRPr lang="fr-FR"/>
           </a:p>
@@ -2706,7 +2706,7 @@
           <a:p>
             <a:fld id="{599F6D61-D8C0-4321-8F41-5FC8A4129D8A}" type="datetimeFigureOut">
               <a:rPr lang="fr-FR" smtClean="0"/>
-              <a:t>05/01/2023</a:t>
+              <a:t>23/01/2023</a:t>
             </a:fld>
             <a:endParaRPr lang="fr-FR"/>
           </a:p>
@@ -2919,7 +2919,7 @@
           <a:p>
             <a:fld id="{599F6D61-D8C0-4321-8F41-5FC8A4129D8A}" type="datetimeFigureOut">
               <a:rPr lang="fr-FR" smtClean="0"/>
-              <a:t>05/01/2023</a:t>
+              <a:t>23/01/2023</a:t>
             </a:fld>
             <a:endParaRPr lang="fr-FR"/>
           </a:p>
@@ -3817,7 +3817,7 @@
         <p:spPr>
           <a:xfrm>
             <a:off x="2080347" y="4298084"/>
-            <a:ext cx="4843450" cy="4932119"/>
+            <a:ext cx="4843450" cy="5093702"/>
           </a:xfrm>
           <a:prstGeom prst="rect">
             <a:avLst/>
@@ -3872,7 +3872,19 @@
                 <a:ea typeface="Malgun Gothic" panose="020B0503020000020004" pitchFamily="34" charset="-127"/>
                 <a:cs typeface="Angsana New" panose="02020603050405020304" pitchFamily="18" charset="-34"/>
               </a:rPr>
-              <a:t>– depuis 2022-05</a:t>
+              <a:t>– 2022-05 </a:t>
+            </a:r>
+            <a:r>
+              <a:rPr lang="fr-FR" sz="1050" cap="small">
+                <a:solidFill>
+                  <a:srgbClr val="4F81BD"/>
+                </a:solidFill>
+                <a:effectLst/>
+                <a:latin typeface="Malgun Gothic" panose="020B0503020000020004" pitchFamily="34" charset="-127"/>
+                <a:ea typeface="Malgun Gothic" panose="020B0503020000020004" pitchFamily="34" charset="-127"/>
+                <a:cs typeface="Angsana New" panose="02020603050405020304" pitchFamily="18" charset="-34"/>
+              </a:rPr>
+              <a:t>au 2023-01</a:t>
             </a:r>
             <a:endParaRPr lang="fr-FR" sz="1050" dirty="0">
               <a:solidFill>

</xml_diff>

<commit_message>
update fin contrat Meritis
</commit_message>
<xml_diff>
--- a/CV_FFROMAGER.pptx
+++ b/CV_FFROMAGER.pptx
@@ -198,7 +198,7 @@
           <a:p>
             <a:fld id="{0B931C3E-6BFC-4638-BB9C-51D3F831E5AB}" type="datetimeFigureOut">
               <a:rPr lang="fr-FR" smtClean="0"/>
-              <a:t>06/12/2022</a:t>
+              <a:t>23/01/2023</a:t>
             </a:fld>
             <a:endParaRPr lang="fr-FR"/>
           </a:p>
@@ -596,7 +596,7 @@
           <a:p>
             <a:fld id="{599F6D61-D8C0-4321-8F41-5FC8A4129D8A}" type="datetimeFigureOut">
               <a:rPr lang="fr-FR" smtClean="0"/>
-              <a:t>06/12/2022</a:t>
+              <a:t>23/01/2023</a:t>
             </a:fld>
             <a:endParaRPr lang="fr-FR"/>
           </a:p>
@@ -766,7 +766,7 @@
           <a:p>
             <a:fld id="{599F6D61-D8C0-4321-8F41-5FC8A4129D8A}" type="datetimeFigureOut">
               <a:rPr lang="fr-FR" smtClean="0"/>
-              <a:t>06/12/2022</a:t>
+              <a:t>23/01/2023</a:t>
             </a:fld>
             <a:endParaRPr lang="fr-FR"/>
           </a:p>
@@ -946,7 +946,7 @@
           <a:p>
             <a:fld id="{599F6D61-D8C0-4321-8F41-5FC8A4129D8A}" type="datetimeFigureOut">
               <a:rPr lang="fr-FR" smtClean="0"/>
-              <a:t>06/12/2022</a:t>
+              <a:t>23/01/2023</a:t>
             </a:fld>
             <a:endParaRPr lang="fr-FR"/>
           </a:p>
@@ -1116,7 +1116,7 @@
           <a:p>
             <a:fld id="{599F6D61-D8C0-4321-8F41-5FC8A4129D8A}" type="datetimeFigureOut">
               <a:rPr lang="fr-FR" smtClean="0"/>
-              <a:t>06/12/2022</a:t>
+              <a:t>23/01/2023</a:t>
             </a:fld>
             <a:endParaRPr lang="fr-FR"/>
           </a:p>
@@ -1360,7 +1360,7 @@
           <a:p>
             <a:fld id="{599F6D61-D8C0-4321-8F41-5FC8A4129D8A}" type="datetimeFigureOut">
               <a:rPr lang="fr-FR" smtClean="0"/>
-              <a:t>06/12/2022</a:t>
+              <a:t>23/01/2023</a:t>
             </a:fld>
             <a:endParaRPr lang="fr-FR"/>
           </a:p>
@@ -1592,7 +1592,7 @@
           <a:p>
             <a:fld id="{599F6D61-D8C0-4321-8F41-5FC8A4129D8A}" type="datetimeFigureOut">
               <a:rPr lang="fr-FR" smtClean="0"/>
-              <a:t>06/12/2022</a:t>
+              <a:t>23/01/2023</a:t>
             </a:fld>
             <a:endParaRPr lang="fr-FR"/>
           </a:p>
@@ -1959,7 +1959,7 @@
           <a:p>
             <a:fld id="{599F6D61-D8C0-4321-8F41-5FC8A4129D8A}" type="datetimeFigureOut">
               <a:rPr lang="fr-FR" smtClean="0"/>
-              <a:t>06/12/2022</a:t>
+              <a:t>23/01/2023</a:t>
             </a:fld>
             <a:endParaRPr lang="fr-FR"/>
           </a:p>
@@ -2077,7 +2077,7 @@
           <a:p>
             <a:fld id="{599F6D61-D8C0-4321-8F41-5FC8A4129D8A}" type="datetimeFigureOut">
               <a:rPr lang="fr-FR" smtClean="0"/>
-              <a:t>06/12/2022</a:t>
+              <a:t>23/01/2023</a:t>
             </a:fld>
             <a:endParaRPr lang="fr-FR"/>
           </a:p>
@@ -2172,7 +2172,7 @@
           <a:p>
             <a:fld id="{599F6D61-D8C0-4321-8F41-5FC8A4129D8A}" type="datetimeFigureOut">
               <a:rPr lang="fr-FR" smtClean="0"/>
-              <a:t>06/12/2022</a:t>
+              <a:t>23/01/2023</a:t>
             </a:fld>
             <a:endParaRPr lang="fr-FR"/>
           </a:p>
@@ -2449,7 +2449,7 @@
           <a:p>
             <a:fld id="{599F6D61-D8C0-4321-8F41-5FC8A4129D8A}" type="datetimeFigureOut">
               <a:rPr lang="fr-FR" smtClean="0"/>
-              <a:t>06/12/2022</a:t>
+              <a:t>23/01/2023</a:t>
             </a:fld>
             <a:endParaRPr lang="fr-FR"/>
           </a:p>
@@ -2706,7 +2706,7 @@
           <a:p>
             <a:fld id="{599F6D61-D8C0-4321-8F41-5FC8A4129D8A}" type="datetimeFigureOut">
               <a:rPr lang="fr-FR" smtClean="0"/>
-              <a:t>06/12/2022</a:t>
+              <a:t>23/01/2023</a:t>
             </a:fld>
             <a:endParaRPr lang="fr-FR"/>
           </a:p>
@@ -2919,7 +2919,7 @@
           <a:p>
             <a:fld id="{599F6D61-D8C0-4321-8F41-5FC8A4129D8A}" type="datetimeFigureOut">
               <a:rPr lang="fr-FR" smtClean="0"/>
-              <a:t>06/12/2022</a:t>
+              <a:t>23/01/2023</a:t>
             </a:fld>
             <a:endParaRPr lang="fr-FR"/>
           </a:p>
@@ -3887,7 +3887,7 @@
               <a:t>Scrum Master de l’équipe EcoStruxure Data Model (EDM) de Schneider en mode Safe à Eybens (Electropole) </a:t>
             </a:r>
             <a:r>
-              <a:rPr lang="fr-FR" sz="1050" cap="small" dirty="0">
+              <a:rPr lang="fr-FR" sz="1050" cap="small">
                 <a:solidFill>
                   <a:srgbClr val="4F81BD"/>
                 </a:solidFill>
@@ -3896,7 +3896,7 @@
                 <a:ea typeface="Malgun Gothic" panose="020B0503020000020004" pitchFamily="34" charset="-127"/>
                 <a:cs typeface="Angsana New" panose="02020603050405020304" pitchFamily="18" charset="-34"/>
               </a:rPr>
-              <a:t>– depuis 2022-05</a:t>
+              <a:t>– 2022-05 au 2023-01</a:t>
             </a:r>
             <a:endParaRPr lang="fr-FR" sz="1050" dirty="0">
               <a:solidFill>

</xml_diff>

<commit_message>
update titre pour atos : Software Architect
</commit_message>
<xml_diff>
--- a/CV_FFROMAGER.pptx
+++ b/CV_FFROMAGER.pptx
@@ -198,7 +198,7 @@
           <a:p>
             <a:fld id="{0B931C3E-6BFC-4638-BB9C-51D3F831E5AB}" type="datetimeFigureOut">
               <a:rPr lang="fr-FR" smtClean="0"/>
-              <a:t>23/01/2023</a:t>
+              <a:t>02/02/2023</a:t>
             </a:fld>
             <a:endParaRPr lang="fr-FR"/>
           </a:p>
@@ -596,7 +596,7 @@
           <a:p>
             <a:fld id="{599F6D61-D8C0-4321-8F41-5FC8A4129D8A}" type="datetimeFigureOut">
               <a:rPr lang="fr-FR" smtClean="0"/>
-              <a:t>23/01/2023</a:t>
+              <a:t>02/02/2023</a:t>
             </a:fld>
             <a:endParaRPr lang="fr-FR"/>
           </a:p>
@@ -766,7 +766,7 @@
           <a:p>
             <a:fld id="{599F6D61-D8C0-4321-8F41-5FC8A4129D8A}" type="datetimeFigureOut">
               <a:rPr lang="fr-FR" smtClean="0"/>
-              <a:t>23/01/2023</a:t>
+              <a:t>02/02/2023</a:t>
             </a:fld>
             <a:endParaRPr lang="fr-FR"/>
           </a:p>
@@ -946,7 +946,7 @@
           <a:p>
             <a:fld id="{599F6D61-D8C0-4321-8F41-5FC8A4129D8A}" type="datetimeFigureOut">
               <a:rPr lang="fr-FR" smtClean="0"/>
-              <a:t>23/01/2023</a:t>
+              <a:t>02/02/2023</a:t>
             </a:fld>
             <a:endParaRPr lang="fr-FR"/>
           </a:p>
@@ -1116,7 +1116,7 @@
           <a:p>
             <a:fld id="{599F6D61-D8C0-4321-8F41-5FC8A4129D8A}" type="datetimeFigureOut">
               <a:rPr lang="fr-FR" smtClean="0"/>
-              <a:t>23/01/2023</a:t>
+              <a:t>02/02/2023</a:t>
             </a:fld>
             <a:endParaRPr lang="fr-FR"/>
           </a:p>
@@ -1360,7 +1360,7 @@
           <a:p>
             <a:fld id="{599F6D61-D8C0-4321-8F41-5FC8A4129D8A}" type="datetimeFigureOut">
               <a:rPr lang="fr-FR" smtClean="0"/>
-              <a:t>23/01/2023</a:t>
+              <a:t>02/02/2023</a:t>
             </a:fld>
             <a:endParaRPr lang="fr-FR"/>
           </a:p>
@@ -1592,7 +1592,7 @@
           <a:p>
             <a:fld id="{599F6D61-D8C0-4321-8F41-5FC8A4129D8A}" type="datetimeFigureOut">
               <a:rPr lang="fr-FR" smtClean="0"/>
-              <a:t>23/01/2023</a:t>
+              <a:t>02/02/2023</a:t>
             </a:fld>
             <a:endParaRPr lang="fr-FR"/>
           </a:p>
@@ -1959,7 +1959,7 @@
           <a:p>
             <a:fld id="{599F6D61-D8C0-4321-8F41-5FC8A4129D8A}" type="datetimeFigureOut">
               <a:rPr lang="fr-FR" smtClean="0"/>
-              <a:t>23/01/2023</a:t>
+              <a:t>02/02/2023</a:t>
             </a:fld>
             <a:endParaRPr lang="fr-FR"/>
           </a:p>
@@ -2077,7 +2077,7 @@
           <a:p>
             <a:fld id="{599F6D61-D8C0-4321-8F41-5FC8A4129D8A}" type="datetimeFigureOut">
               <a:rPr lang="fr-FR" smtClean="0"/>
-              <a:t>23/01/2023</a:t>
+              <a:t>02/02/2023</a:t>
             </a:fld>
             <a:endParaRPr lang="fr-FR"/>
           </a:p>
@@ -2172,7 +2172,7 @@
           <a:p>
             <a:fld id="{599F6D61-D8C0-4321-8F41-5FC8A4129D8A}" type="datetimeFigureOut">
               <a:rPr lang="fr-FR" smtClean="0"/>
-              <a:t>23/01/2023</a:t>
+              <a:t>02/02/2023</a:t>
             </a:fld>
             <a:endParaRPr lang="fr-FR"/>
           </a:p>
@@ -2449,7 +2449,7 @@
           <a:p>
             <a:fld id="{599F6D61-D8C0-4321-8F41-5FC8A4129D8A}" type="datetimeFigureOut">
               <a:rPr lang="fr-FR" smtClean="0"/>
-              <a:t>23/01/2023</a:t>
+              <a:t>02/02/2023</a:t>
             </a:fld>
             <a:endParaRPr lang="fr-FR"/>
           </a:p>
@@ -2706,7 +2706,7 @@
           <a:p>
             <a:fld id="{599F6D61-D8C0-4321-8F41-5FC8A4129D8A}" type="datetimeFigureOut">
               <a:rPr lang="fr-FR" smtClean="0"/>
-              <a:t>23/01/2023</a:t>
+              <a:t>02/02/2023</a:t>
             </a:fld>
             <a:endParaRPr lang="fr-FR"/>
           </a:p>
@@ -2919,7 +2919,7 @@
           <a:p>
             <a:fld id="{599F6D61-D8C0-4321-8F41-5FC8A4129D8A}" type="datetimeFigureOut">
               <a:rPr lang="fr-FR" smtClean="0"/>
-              <a:t>23/01/2023</a:t>
+              <a:t>02/02/2023</a:t>
             </a:fld>
             <a:endParaRPr lang="fr-FR"/>
           </a:p>
@@ -5068,7 +5068,7 @@
                 <a:latin typeface="Malgun Gothic" panose="020B0503020000020004" pitchFamily="34" charset="-127"/>
                 <a:ea typeface="Malgun Gothic" panose="020B0503020000020004" pitchFamily="34" charset="-127"/>
               </a:rPr>
-              <a:t>RESPONSABLE DEVELOPPEMENT/ SCRUM MASTER</a:t>
+              <a:t>SOFTWARE ARCHITECT / SCRUM MASTER</a:t>
             </a:r>
           </a:p>
           <a:p>

</xml_diff>

<commit_message>
update CV pour scrum master
</commit_message>
<xml_diff>
--- a/CV_FFROMAGER.pptx
+++ b/CV_FFROMAGER.pptx
@@ -198,7 +198,7 @@
           <a:p>
             <a:fld id="{0B931C3E-6BFC-4638-BB9C-51D3F831E5AB}" type="datetimeFigureOut">
               <a:rPr lang="fr-FR" smtClean="0"/>
-              <a:t>23/01/2023</a:t>
+              <a:t>20/02/2023</a:t>
             </a:fld>
             <a:endParaRPr lang="fr-FR"/>
           </a:p>
@@ -596,7 +596,7 @@
           <a:p>
             <a:fld id="{599F6D61-D8C0-4321-8F41-5FC8A4129D8A}" type="datetimeFigureOut">
               <a:rPr lang="fr-FR" smtClean="0"/>
-              <a:t>23/01/2023</a:t>
+              <a:t>20/02/2023</a:t>
             </a:fld>
             <a:endParaRPr lang="fr-FR"/>
           </a:p>
@@ -766,7 +766,7 @@
           <a:p>
             <a:fld id="{599F6D61-D8C0-4321-8F41-5FC8A4129D8A}" type="datetimeFigureOut">
               <a:rPr lang="fr-FR" smtClean="0"/>
-              <a:t>23/01/2023</a:t>
+              <a:t>20/02/2023</a:t>
             </a:fld>
             <a:endParaRPr lang="fr-FR"/>
           </a:p>
@@ -946,7 +946,7 @@
           <a:p>
             <a:fld id="{599F6D61-D8C0-4321-8F41-5FC8A4129D8A}" type="datetimeFigureOut">
               <a:rPr lang="fr-FR" smtClean="0"/>
-              <a:t>23/01/2023</a:t>
+              <a:t>20/02/2023</a:t>
             </a:fld>
             <a:endParaRPr lang="fr-FR"/>
           </a:p>
@@ -1116,7 +1116,7 @@
           <a:p>
             <a:fld id="{599F6D61-D8C0-4321-8F41-5FC8A4129D8A}" type="datetimeFigureOut">
               <a:rPr lang="fr-FR" smtClean="0"/>
-              <a:t>23/01/2023</a:t>
+              <a:t>20/02/2023</a:t>
             </a:fld>
             <a:endParaRPr lang="fr-FR"/>
           </a:p>
@@ -1360,7 +1360,7 @@
           <a:p>
             <a:fld id="{599F6D61-D8C0-4321-8F41-5FC8A4129D8A}" type="datetimeFigureOut">
               <a:rPr lang="fr-FR" smtClean="0"/>
-              <a:t>23/01/2023</a:t>
+              <a:t>20/02/2023</a:t>
             </a:fld>
             <a:endParaRPr lang="fr-FR"/>
           </a:p>
@@ -1592,7 +1592,7 @@
           <a:p>
             <a:fld id="{599F6D61-D8C0-4321-8F41-5FC8A4129D8A}" type="datetimeFigureOut">
               <a:rPr lang="fr-FR" smtClean="0"/>
-              <a:t>23/01/2023</a:t>
+              <a:t>20/02/2023</a:t>
             </a:fld>
             <a:endParaRPr lang="fr-FR"/>
           </a:p>
@@ -1959,7 +1959,7 @@
           <a:p>
             <a:fld id="{599F6D61-D8C0-4321-8F41-5FC8A4129D8A}" type="datetimeFigureOut">
               <a:rPr lang="fr-FR" smtClean="0"/>
-              <a:t>23/01/2023</a:t>
+              <a:t>20/02/2023</a:t>
             </a:fld>
             <a:endParaRPr lang="fr-FR"/>
           </a:p>
@@ -2077,7 +2077,7 @@
           <a:p>
             <a:fld id="{599F6D61-D8C0-4321-8F41-5FC8A4129D8A}" type="datetimeFigureOut">
               <a:rPr lang="fr-FR" smtClean="0"/>
-              <a:t>23/01/2023</a:t>
+              <a:t>20/02/2023</a:t>
             </a:fld>
             <a:endParaRPr lang="fr-FR"/>
           </a:p>
@@ -2172,7 +2172,7 @@
           <a:p>
             <a:fld id="{599F6D61-D8C0-4321-8F41-5FC8A4129D8A}" type="datetimeFigureOut">
               <a:rPr lang="fr-FR" smtClean="0"/>
-              <a:t>23/01/2023</a:t>
+              <a:t>20/02/2023</a:t>
             </a:fld>
             <a:endParaRPr lang="fr-FR"/>
           </a:p>
@@ -2449,7 +2449,7 @@
           <a:p>
             <a:fld id="{599F6D61-D8C0-4321-8F41-5FC8A4129D8A}" type="datetimeFigureOut">
               <a:rPr lang="fr-FR" smtClean="0"/>
-              <a:t>23/01/2023</a:t>
+              <a:t>20/02/2023</a:t>
             </a:fld>
             <a:endParaRPr lang="fr-FR"/>
           </a:p>
@@ -2706,7 +2706,7 @@
           <a:p>
             <a:fld id="{599F6D61-D8C0-4321-8F41-5FC8A4129D8A}" type="datetimeFigureOut">
               <a:rPr lang="fr-FR" smtClean="0"/>
-              <a:t>23/01/2023</a:t>
+              <a:t>20/02/2023</a:t>
             </a:fld>
             <a:endParaRPr lang="fr-FR"/>
           </a:p>
@@ -2919,7 +2919,7 @@
           <a:p>
             <a:fld id="{599F6D61-D8C0-4321-8F41-5FC8A4129D8A}" type="datetimeFigureOut">
               <a:rPr lang="fr-FR" smtClean="0"/>
-              <a:t>23/01/2023</a:t>
+              <a:t>20/02/2023</a:t>
             </a:fld>
             <a:endParaRPr lang="fr-FR"/>
           </a:p>
@@ -5016,7 +5016,7 @@
         <p:spPr>
           <a:xfrm>
             <a:off x="193175" y="104549"/>
-            <a:ext cx="2839915" cy="1400383"/>
+            <a:ext cx="2839915" cy="1215717"/>
           </a:xfrm>
           <a:prstGeom prst="rect">
             <a:avLst/>
@@ -5059,7 +5059,7 @@
           <a:p>
             <a:pPr marR="1905"/>
             <a:r>
-              <a:rPr lang="fr-FR" sz="1200" b="1" dirty="0">
+              <a:rPr lang="fr-FR" sz="1200" b="1">
                 <a:solidFill>
                   <a:schemeClr val="accent5">
                     <a:lumMod val="50000"/>
@@ -5068,7 +5068,19 @@
                 <a:latin typeface="Malgun Gothic" panose="020B0503020000020004" pitchFamily="34" charset="-127"/>
                 <a:ea typeface="Malgun Gothic" panose="020B0503020000020004" pitchFamily="34" charset="-127"/>
               </a:rPr>
-              <a:t>RESPONSABLE DEVELOPPEMENT/ SCRUM MASTER</a:t>
+              <a:t>SCRUM </a:t>
+            </a:r>
+            <a:r>
+              <a:rPr lang="fr-FR" sz="1200" b="1" dirty="0">
+                <a:solidFill>
+                  <a:schemeClr val="accent5">
+                    <a:lumMod val="50000"/>
+                  </a:schemeClr>
+                </a:solidFill>
+                <a:latin typeface="Malgun Gothic" panose="020B0503020000020004" pitchFamily="34" charset="-127"/>
+                <a:ea typeface="Malgun Gothic" panose="020B0503020000020004" pitchFamily="34" charset="-127"/>
+              </a:rPr>
+              <a:t>MASTER</a:t>
             </a:r>
           </a:p>
           <a:p>

</xml_diff>

<commit_message>
Modification pour poste de Product Owner
</commit_message>
<xml_diff>
--- a/CV_FFROMAGER.pptx
+++ b/CV_FFROMAGER.pptx
@@ -198,7 +198,7 @@
           <a:p>
             <a:fld id="{0B931C3E-6BFC-4638-BB9C-51D3F831E5AB}" type="datetimeFigureOut">
               <a:rPr lang="fr-FR" smtClean="0"/>
-              <a:t>20/02/2023</a:t>
+              <a:t>28/02/2023</a:t>
             </a:fld>
             <a:endParaRPr lang="fr-FR"/>
           </a:p>
@@ -596,7 +596,7 @@
           <a:p>
             <a:fld id="{599F6D61-D8C0-4321-8F41-5FC8A4129D8A}" type="datetimeFigureOut">
               <a:rPr lang="fr-FR" smtClean="0"/>
-              <a:t>20/02/2023</a:t>
+              <a:t>28/02/2023</a:t>
             </a:fld>
             <a:endParaRPr lang="fr-FR"/>
           </a:p>
@@ -766,7 +766,7 @@
           <a:p>
             <a:fld id="{599F6D61-D8C0-4321-8F41-5FC8A4129D8A}" type="datetimeFigureOut">
               <a:rPr lang="fr-FR" smtClean="0"/>
-              <a:t>20/02/2023</a:t>
+              <a:t>28/02/2023</a:t>
             </a:fld>
             <a:endParaRPr lang="fr-FR"/>
           </a:p>
@@ -946,7 +946,7 @@
           <a:p>
             <a:fld id="{599F6D61-D8C0-4321-8F41-5FC8A4129D8A}" type="datetimeFigureOut">
               <a:rPr lang="fr-FR" smtClean="0"/>
-              <a:t>20/02/2023</a:t>
+              <a:t>28/02/2023</a:t>
             </a:fld>
             <a:endParaRPr lang="fr-FR"/>
           </a:p>
@@ -1116,7 +1116,7 @@
           <a:p>
             <a:fld id="{599F6D61-D8C0-4321-8F41-5FC8A4129D8A}" type="datetimeFigureOut">
               <a:rPr lang="fr-FR" smtClean="0"/>
-              <a:t>20/02/2023</a:t>
+              <a:t>28/02/2023</a:t>
             </a:fld>
             <a:endParaRPr lang="fr-FR"/>
           </a:p>
@@ -1360,7 +1360,7 @@
           <a:p>
             <a:fld id="{599F6D61-D8C0-4321-8F41-5FC8A4129D8A}" type="datetimeFigureOut">
               <a:rPr lang="fr-FR" smtClean="0"/>
-              <a:t>20/02/2023</a:t>
+              <a:t>28/02/2023</a:t>
             </a:fld>
             <a:endParaRPr lang="fr-FR"/>
           </a:p>
@@ -1592,7 +1592,7 @@
           <a:p>
             <a:fld id="{599F6D61-D8C0-4321-8F41-5FC8A4129D8A}" type="datetimeFigureOut">
               <a:rPr lang="fr-FR" smtClean="0"/>
-              <a:t>20/02/2023</a:t>
+              <a:t>28/02/2023</a:t>
             </a:fld>
             <a:endParaRPr lang="fr-FR"/>
           </a:p>
@@ -1959,7 +1959,7 @@
           <a:p>
             <a:fld id="{599F6D61-D8C0-4321-8F41-5FC8A4129D8A}" type="datetimeFigureOut">
               <a:rPr lang="fr-FR" smtClean="0"/>
-              <a:t>20/02/2023</a:t>
+              <a:t>28/02/2023</a:t>
             </a:fld>
             <a:endParaRPr lang="fr-FR"/>
           </a:p>
@@ -2077,7 +2077,7 @@
           <a:p>
             <a:fld id="{599F6D61-D8C0-4321-8F41-5FC8A4129D8A}" type="datetimeFigureOut">
               <a:rPr lang="fr-FR" smtClean="0"/>
-              <a:t>20/02/2023</a:t>
+              <a:t>28/02/2023</a:t>
             </a:fld>
             <a:endParaRPr lang="fr-FR"/>
           </a:p>
@@ -2172,7 +2172,7 @@
           <a:p>
             <a:fld id="{599F6D61-D8C0-4321-8F41-5FC8A4129D8A}" type="datetimeFigureOut">
               <a:rPr lang="fr-FR" smtClean="0"/>
-              <a:t>20/02/2023</a:t>
+              <a:t>28/02/2023</a:t>
             </a:fld>
             <a:endParaRPr lang="fr-FR"/>
           </a:p>
@@ -2449,7 +2449,7 @@
           <a:p>
             <a:fld id="{599F6D61-D8C0-4321-8F41-5FC8A4129D8A}" type="datetimeFigureOut">
               <a:rPr lang="fr-FR" smtClean="0"/>
-              <a:t>20/02/2023</a:t>
+              <a:t>28/02/2023</a:t>
             </a:fld>
             <a:endParaRPr lang="fr-FR"/>
           </a:p>
@@ -2706,7 +2706,7 @@
           <a:p>
             <a:fld id="{599F6D61-D8C0-4321-8F41-5FC8A4129D8A}" type="datetimeFigureOut">
               <a:rPr lang="fr-FR" smtClean="0"/>
-              <a:t>20/02/2023</a:t>
+              <a:t>28/02/2023</a:t>
             </a:fld>
             <a:endParaRPr lang="fr-FR"/>
           </a:p>
@@ -2919,7 +2919,7 @@
           <a:p>
             <a:fld id="{599F6D61-D8C0-4321-8F41-5FC8A4129D8A}" type="datetimeFigureOut">
               <a:rPr lang="fr-FR" smtClean="0"/>
-              <a:t>20/02/2023</a:t>
+              <a:t>28/02/2023</a:t>
             </a:fld>
             <a:endParaRPr lang="fr-FR"/>
           </a:p>
@@ -5059,7 +5059,7 @@
           <a:p>
             <a:pPr marR="1905"/>
             <a:r>
-              <a:rPr lang="fr-FR" sz="1200" b="1">
+              <a:rPr lang="fr-FR" sz="1200" b="1" dirty="0">
                 <a:solidFill>
                   <a:schemeClr val="accent5">
                     <a:lumMod val="50000"/>
@@ -5068,10 +5068,12 @@
                 <a:latin typeface="Malgun Gothic" panose="020B0503020000020004" pitchFamily="34" charset="-127"/>
                 <a:ea typeface="Malgun Gothic" panose="020B0503020000020004" pitchFamily="34" charset="-127"/>
               </a:rPr>
-              <a:t>SCRUM </a:t>
-            </a:r>
-            <a:r>
-              <a:rPr lang="fr-FR" sz="1200" b="1" dirty="0">
+              <a:t>PRODUCT OWNER</a:t>
+            </a:r>
+          </a:p>
+          <a:p>
+            <a:r>
+              <a:rPr lang="fr-FR" sz="1050" b="1" dirty="0">
                 <a:solidFill>
                   <a:schemeClr val="accent5">
                     <a:lumMod val="50000"/>
@@ -5080,7 +5082,7 @@
                 <a:latin typeface="Malgun Gothic" panose="020B0503020000020004" pitchFamily="34" charset="-127"/>
                 <a:ea typeface="Malgun Gothic" panose="020B0503020000020004" pitchFamily="34" charset="-127"/>
               </a:rPr>
-              <a:t>MASTER</a:t>
+              <a:t>Conduite de projets R&amp;D,</a:t>
             </a:r>
           </a:p>
           <a:p>
@@ -5094,20 +5096,6 @@
                 <a:latin typeface="Malgun Gothic" panose="020B0503020000020004" pitchFamily="34" charset="-127"/>
                 <a:ea typeface="Malgun Gothic" panose="020B0503020000020004" pitchFamily="34" charset="-127"/>
               </a:rPr>
-              <a:t>Conduite de projets R&amp;D,</a:t>
-            </a:r>
-          </a:p>
-          <a:p>
-            <a:r>
-              <a:rPr lang="fr-FR" sz="1050" b="1" dirty="0">
-                <a:solidFill>
-                  <a:schemeClr val="accent5">
-                    <a:lumMod val="50000"/>
-                  </a:schemeClr>
-                </a:solidFill>
-                <a:latin typeface="Malgun Gothic" panose="020B0503020000020004" pitchFamily="34" charset="-127"/>
-                <a:ea typeface="Malgun Gothic" panose="020B0503020000020004" pitchFamily="34" charset="-127"/>
-              </a:rPr>
               <a:t>DevOps, Anglais courant</a:t>
             </a:r>
           </a:p>
@@ -5122,7 +5110,7 @@
         <p:spPr>
           <a:xfrm>
             <a:off x="0" y="3907990"/>
-            <a:ext cx="2298733" cy="1331134"/>
+            <a:ext cx="2298733" cy="1338828"/>
           </a:xfrm>
           <a:prstGeom prst="rect">
             <a:avLst/>
@@ -5140,15 +5128,12 @@
                 <a:latin typeface="Malgun Gothic" panose="020B0503020000020004" pitchFamily="34" charset="-127"/>
                 <a:ea typeface="Malgun Gothic" panose="020B0503020000020004" pitchFamily="34" charset="-127"/>
               </a:rPr>
-              <a:t>Adresse : </a:t>
-            </a:r>
-            <a:r>
-              <a:rPr lang="fr-FR" sz="1000" dirty="0">
-                <a:latin typeface="Malgun Gothic" panose="020B0503020000020004" pitchFamily="34" charset="-127"/>
-                <a:ea typeface="Malgun Gothic" panose="020B0503020000020004" pitchFamily="34" charset="-127"/>
-              </a:rPr>
-              <a:t>71 place de la Cluse, 38920 CROLLES</a:t>
-            </a:r>
+              <a:t>Secteurs géographiques : Annecy ou Grenoble</a:t>
+            </a:r>
+            <a:endParaRPr lang="fr-FR" sz="1000" dirty="0">
+              <a:latin typeface="Malgun Gothic" panose="020B0503020000020004" pitchFamily="34" charset="-127"/>
+              <a:ea typeface="Malgun Gothic" panose="020B0503020000020004" pitchFamily="34" charset="-127"/>
+            </a:endParaRPr>
           </a:p>
           <a:p>
             <a:r>

</xml_diff>

<commit_message>
traduction cv anglais partie 1
</commit_message>
<xml_diff>
--- a/CV_FFROMAGER.pptx
+++ b/CV_FFROMAGER.pptx
@@ -198,7 +198,7 @@
           <a:p>
             <a:fld id="{0B931C3E-6BFC-4638-BB9C-51D3F831E5AB}" type="datetimeFigureOut">
               <a:rPr lang="fr-FR" smtClean="0"/>
-              <a:t>28/02/2023</a:t>
+              <a:t>01/04/2023</a:t>
             </a:fld>
             <a:endParaRPr lang="fr-FR"/>
           </a:p>
@@ -596,7 +596,7 @@
           <a:p>
             <a:fld id="{599F6D61-D8C0-4321-8F41-5FC8A4129D8A}" type="datetimeFigureOut">
               <a:rPr lang="fr-FR" smtClean="0"/>
-              <a:t>28/02/2023</a:t>
+              <a:t>01/04/2023</a:t>
             </a:fld>
             <a:endParaRPr lang="fr-FR"/>
           </a:p>
@@ -766,7 +766,7 @@
           <a:p>
             <a:fld id="{599F6D61-D8C0-4321-8F41-5FC8A4129D8A}" type="datetimeFigureOut">
               <a:rPr lang="fr-FR" smtClean="0"/>
-              <a:t>28/02/2023</a:t>
+              <a:t>01/04/2023</a:t>
             </a:fld>
             <a:endParaRPr lang="fr-FR"/>
           </a:p>
@@ -946,7 +946,7 @@
           <a:p>
             <a:fld id="{599F6D61-D8C0-4321-8F41-5FC8A4129D8A}" type="datetimeFigureOut">
               <a:rPr lang="fr-FR" smtClean="0"/>
-              <a:t>28/02/2023</a:t>
+              <a:t>01/04/2023</a:t>
             </a:fld>
             <a:endParaRPr lang="fr-FR"/>
           </a:p>
@@ -1116,7 +1116,7 @@
           <a:p>
             <a:fld id="{599F6D61-D8C0-4321-8F41-5FC8A4129D8A}" type="datetimeFigureOut">
               <a:rPr lang="fr-FR" smtClean="0"/>
-              <a:t>28/02/2023</a:t>
+              <a:t>01/04/2023</a:t>
             </a:fld>
             <a:endParaRPr lang="fr-FR"/>
           </a:p>
@@ -1360,7 +1360,7 @@
           <a:p>
             <a:fld id="{599F6D61-D8C0-4321-8F41-5FC8A4129D8A}" type="datetimeFigureOut">
               <a:rPr lang="fr-FR" smtClean="0"/>
-              <a:t>28/02/2023</a:t>
+              <a:t>01/04/2023</a:t>
             </a:fld>
             <a:endParaRPr lang="fr-FR"/>
           </a:p>
@@ -1592,7 +1592,7 @@
           <a:p>
             <a:fld id="{599F6D61-D8C0-4321-8F41-5FC8A4129D8A}" type="datetimeFigureOut">
               <a:rPr lang="fr-FR" smtClean="0"/>
-              <a:t>28/02/2023</a:t>
+              <a:t>01/04/2023</a:t>
             </a:fld>
             <a:endParaRPr lang="fr-FR"/>
           </a:p>
@@ -1959,7 +1959,7 @@
           <a:p>
             <a:fld id="{599F6D61-D8C0-4321-8F41-5FC8A4129D8A}" type="datetimeFigureOut">
               <a:rPr lang="fr-FR" smtClean="0"/>
-              <a:t>28/02/2023</a:t>
+              <a:t>01/04/2023</a:t>
             </a:fld>
             <a:endParaRPr lang="fr-FR"/>
           </a:p>
@@ -2077,7 +2077,7 @@
           <a:p>
             <a:fld id="{599F6D61-D8C0-4321-8F41-5FC8A4129D8A}" type="datetimeFigureOut">
               <a:rPr lang="fr-FR" smtClean="0"/>
-              <a:t>28/02/2023</a:t>
+              <a:t>01/04/2023</a:t>
             </a:fld>
             <a:endParaRPr lang="fr-FR"/>
           </a:p>
@@ -2172,7 +2172,7 @@
           <a:p>
             <a:fld id="{599F6D61-D8C0-4321-8F41-5FC8A4129D8A}" type="datetimeFigureOut">
               <a:rPr lang="fr-FR" smtClean="0"/>
-              <a:t>28/02/2023</a:t>
+              <a:t>01/04/2023</a:t>
             </a:fld>
             <a:endParaRPr lang="fr-FR"/>
           </a:p>
@@ -2449,7 +2449,7 @@
           <a:p>
             <a:fld id="{599F6D61-D8C0-4321-8F41-5FC8A4129D8A}" type="datetimeFigureOut">
               <a:rPr lang="fr-FR" smtClean="0"/>
-              <a:t>28/02/2023</a:t>
+              <a:t>01/04/2023</a:t>
             </a:fld>
             <a:endParaRPr lang="fr-FR"/>
           </a:p>
@@ -2706,7 +2706,7 @@
           <a:p>
             <a:fld id="{599F6D61-D8C0-4321-8F41-5FC8A4129D8A}" type="datetimeFigureOut">
               <a:rPr lang="fr-FR" smtClean="0"/>
-              <a:t>28/02/2023</a:t>
+              <a:t>01/04/2023</a:t>
             </a:fld>
             <a:endParaRPr lang="fr-FR"/>
           </a:p>
@@ -2919,7 +2919,7 @@
           <a:p>
             <a:fld id="{599F6D61-D8C0-4321-8F41-5FC8A4129D8A}" type="datetimeFigureOut">
               <a:rPr lang="fr-FR" smtClean="0"/>
-              <a:t>28/02/2023</a:t>
+              <a:t>01/04/2023</a:t>
             </a:fld>
             <a:endParaRPr lang="fr-FR"/>
           </a:p>
@@ -3381,7 +3381,7 @@
         <p:spPr>
           <a:xfrm>
             <a:off x="2871787" y="192469"/>
-            <a:ext cx="3986213" cy="1169551"/>
+            <a:ext cx="3986213" cy="954107"/>
           </a:xfrm>
           <a:prstGeom prst="rect">
             <a:avLst/>
@@ -3395,7 +3395,7 @@
           <a:lstStyle/>
           <a:p>
             <a:r>
-              <a:rPr lang="fr-FR" sz="1400" dirty="0">
+              <a:rPr lang="en-US" sz="1400" dirty="0">
                 <a:solidFill>
                   <a:schemeClr val="bg2">
                     <a:lumMod val="50000"/>
@@ -3404,8 +3404,17 @@
                 <a:latin typeface="Malgun Gothic" panose="020B0503020000020004" pitchFamily="34" charset="-127"/>
                 <a:ea typeface="Malgun Gothic" panose="020B0503020000020004" pitchFamily="34" charset="-127"/>
               </a:rPr>
-              <a:t>Passionné de nouvelles technologies, je propose de partager mon expertise de plus de 25 ans dans le développement informatique et le management de projets techniques</a:t>
-            </a:r>
+              <a:t>Passionate about new technologies, I propose to share my expertise of more than 25 years in IT development and technical project management</a:t>
+            </a:r>
+            <a:endParaRPr lang="fr-FR" sz="1400" dirty="0">
+              <a:solidFill>
+                <a:schemeClr val="bg2">
+                  <a:lumMod val="50000"/>
+                </a:schemeClr>
+              </a:solidFill>
+              <a:latin typeface="Malgun Gothic" panose="020B0503020000020004" pitchFamily="34" charset="-127"/>
+              <a:ea typeface="Malgun Gothic" panose="020B0503020000020004" pitchFamily="34" charset="-127"/>
+            </a:endParaRPr>
           </a:p>
         </p:txBody>
       </p:sp>
@@ -3440,7 +3449,7 @@
         </p:nvSpPr>
         <p:spPr>
           <a:xfrm>
-            <a:off x="2276175" y="1426449"/>
+            <a:off x="2277283" y="1426540"/>
             <a:ext cx="3525715" cy="307777"/>
           </a:xfrm>
           <a:prstGeom prst="rect">
@@ -3464,8 +3473,29 @@
                 <a:latin typeface="Malgun Gothic" panose="020B0503020000020004" pitchFamily="34" charset="-127"/>
                 <a:ea typeface="Malgun Gothic" panose="020B0503020000020004" pitchFamily="34" charset="-127"/>
               </a:rPr>
-              <a:t>Compétences techniques</a:t>
-            </a:r>
+              <a:t>Technical </a:t>
+            </a:r>
+            <a:r>
+              <a:rPr lang="fr-FR" sz="1400" b="1" dirty="0" err="1">
+                <a:solidFill>
+                  <a:schemeClr val="accent1">
+                    <a:lumMod val="50000"/>
+                  </a:schemeClr>
+                </a:solidFill>
+                <a:latin typeface="Malgun Gothic" panose="020B0503020000020004" pitchFamily="34" charset="-127"/>
+                <a:ea typeface="Malgun Gothic" panose="020B0503020000020004" pitchFamily="34" charset="-127"/>
+              </a:rPr>
+              <a:t>skills</a:t>
+            </a:r>
+            <a:endParaRPr lang="fr-FR" sz="1400" b="1" dirty="0">
+              <a:solidFill>
+                <a:schemeClr val="accent1">
+                  <a:lumMod val="50000"/>
+                </a:schemeClr>
+              </a:solidFill>
+              <a:latin typeface="Malgun Gothic" panose="020B0503020000020004" pitchFamily="34" charset="-127"/>
+              <a:ea typeface="Malgun Gothic" panose="020B0503020000020004" pitchFamily="34" charset="-127"/>
+            </a:endParaRPr>
           </a:p>
         </p:txBody>
       </p:sp>
@@ -3817,7 +3847,7 @@
         <p:spPr>
           <a:xfrm>
             <a:off x="2080347" y="4298084"/>
-            <a:ext cx="4843450" cy="5093702"/>
+            <a:ext cx="4843450" cy="4932119"/>
           </a:xfrm>
           <a:prstGeom prst="rect">
             <a:avLst/>
@@ -3831,12 +3861,30 @@
           <a:lstStyle/>
           <a:p>
             <a:r>
+              <a:rPr lang="fr-FR" sz="1050" b="1" dirty="0" err="1">
+                <a:latin typeface="Malgun Gothic" panose="020B0503020000020004" pitchFamily="34" charset="-127"/>
+                <a:ea typeface="Malgun Gothic" panose="020B0503020000020004" pitchFamily="34" charset="-127"/>
+              </a:rPr>
+              <a:t>Since</a:t>
+            </a:r>
+            <a:r>
               <a:rPr lang="fr-FR" sz="1050" b="1" dirty="0">
                 <a:latin typeface="Malgun Gothic" panose="020B0503020000020004" pitchFamily="34" charset="-127"/>
                 <a:ea typeface="Malgun Gothic" panose="020B0503020000020004" pitchFamily="34" charset="-127"/>
               </a:rPr>
-              <a:t>Depuis 2018,04 – Missions de consulting </a:t>
-            </a:r>
+              <a:t> 2018,04 – Consulting </a:t>
+            </a:r>
+            <a:r>
+              <a:rPr lang="fr-FR" sz="1050" b="1" dirty="0" err="1">
+                <a:latin typeface="Malgun Gothic" panose="020B0503020000020004" pitchFamily="34" charset="-127"/>
+                <a:ea typeface="Malgun Gothic" panose="020B0503020000020004" pitchFamily="34" charset="-127"/>
+              </a:rPr>
+              <a:t>assignments</a:t>
+            </a:r>
+            <a:endParaRPr lang="fr-FR" sz="1050" b="1" dirty="0">
+              <a:latin typeface="Malgun Gothic" panose="020B0503020000020004" pitchFamily="34" charset="-127"/>
+              <a:ea typeface="Malgun Gothic" panose="020B0503020000020004" pitchFamily="34" charset="-127"/>
+            </a:endParaRPr>
           </a:p>
           <a:p>
             <a:endParaRPr lang="fr-FR" sz="1050" b="1" cap="small" dirty="0">
@@ -3860,7 +3908,79 @@
                 <a:ea typeface="Malgun Gothic" panose="020B0503020000020004" pitchFamily="34" charset="-127"/>
                 <a:cs typeface="Angsana New" panose="02020603050405020304" pitchFamily="18" charset="-34"/>
               </a:rPr>
-              <a:t>Scrum Master de l’équipe EcoStruxure Data Model (EDM) de Schneider en mode Safe à Eybens (Electropole) </a:t>
+              <a:t>Scrum Master of </a:t>
+            </a:r>
+            <a:r>
+              <a:rPr lang="fr-FR" sz="1050" b="1" cap="small" dirty="0" err="1">
+                <a:solidFill>
+                  <a:srgbClr val="4F81BD"/>
+                </a:solidFill>
+                <a:effectLst/>
+                <a:latin typeface="Malgun Gothic" panose="020B0503020000020004" pitchFamily="34" charset="-127"/>
+                <a:ea typeface="Malgun Gothic" panose="020B0503020000020004" pitchFamily="34" charset="-127"/>
+                <a:cs typeface="Angsana New" panose="02020603050405020304" pitchFamily="18" charset="-34"/>
+              </a:rPr>
+              <a:t>Schneider's</a:t>
+            </a:r>
+            <a:r>
+              <a:rPr lang="fr-FR" sz="1050" b="1" cap="small" dirty="0">
+                <a:solidFill>
+                  <a:srgbClr val="4F81BD"/>
+                </a:solidFill>
+                <a:effectLst/>
+                <a:latin typeface="Malgun Gothic" panose="020B0503020000020004" pitchFamily="34" charset="-127"/>
+                <a:ea typeface="Malgun Gothic" panose="020B0503020000020004" pitchFamily="34" charset="-127"/>
+                <a:cs typeface="Angsana New" panose="02020603050405020304" pitchFamily="18" charset="-34"/>
+              </a:rPr>
+              <a:t> </a:t>
+            </a:r>
+            <a:r>
+              <a:rPr lang="fr-FR" sz="1050" b="1" cap="small" dirty="0" err="1">
+                <a:solidFill>
+                  <a:srgbClr val="4F81BD"/>
+                </a:solidFill>
+                <a:effectLst/>
+                <a:latin typeface="Malgun Gothic" panose="020B0503020000020004" pitchFamily="34" charset="-127"/>
+                <a:ea typeface="Malgun Gothic" panose="020B0503020000020004" pitchFamily="34" charset="-127"/>
+                <a:cs typeface="Angsana New" panose="02020603050405020304" pitchFamily="18" charset="-34"/>
+              </a:rPr>
+              <a:t>EcoStruxure</a:t>
+            </a:r>
+            <a:r>
+              <a:rPr lang="fr-FR" sz="1050" b="1" cap="small" dirty="0">
+                <a:solidFill>
+                  <a:srgbClr val="4F81BD"/>
+                </a:solidFill>
+                <a:effectLst/>
+                <a:latin typeface="Malgun Gothic" panose="020B0503020000020004" pitchFamily="34" charset="-127"/>
+                <a:ea typeface="Malgun Gothic" panose="020B0503020000020004" pitchFamily="34" charset="-127"/>
+                <a:cs typeface="Angsana New" panose="02020603050405020304" pitchFamily="18" charset="-34"/>
+              </a:rPr>
+              <a:t> Data Model (EDM) team in Safe mode at Eybens (</a:t>
+            </a:r>
+            <a:r>
+              <a:rPr lang="fr-FR" sz="1050" b="1" cap="small" dirty="0" err="1">
+                <a:solidFill>
+                  <a:srgbClr val="4F81BD"/>
+                </a:solidFill>
+                <a:effectLst/>
+                <a:latin typeface="Malgun Gothic" panose="020B0503020000020004" pitchFamily="34" charset="-127"/>
+                <a:ea typeface="Malgun Gothic" panose="020B0503020000020004" pitchFamily="34" charset="-127"/>
+                <a:cs typeface="Angsana New" panose="02020603050405020304" pitchFamily="18" charset="-34"/>
+              </a:rPr>
+              <a:t>Electropole</a:t>
+            </a:r>
+            <a:r>
+              <a:rPr lang="fr-FR" sz="1050" b="1" cap="small" dirty="0">
+                <a:solidFill>
+                  <a:srgbClr val="4F81BD"/>
+                </a:solidFill>
+                <a:effectLst/>
+                <a:latin typeface="Malgun Gothic" panose="020B0503020000020004" pitchFamily="34" charset="-127"/>
+                <a:ea typeface="Malgun Gothic" panose="020B0503020000020004" pitchFamily="34" charset="-127"/>
+                <a:cs typeface="Angsana New" panose="02020603050405020304" pitchFamily="18" charset="-34"/>
+              </a:rPr>
+              <a:t>)</a:t>
             </a:r>
             <a:r>
               <a:rPr lang="fr-FR" sz="1050" cap="small" dirty="0">
@@ -3875,16 +3995,27 @@
               <a:t>– 2022-05 </a:t>
             </a:r>
             <a:r>
-              <a:rPr lang="fr-FR" sz="1050" cap="small">
+              <a:rPr lang="fr-FR" sz="1050" cap="small" dirty="0">
                 <a:solidFill>
                   <a:srgbClr val="4F81BD"/>
                 </a:solidFill>
-                <a:effectLst/>
                 <a:latin typeface="Malgun Gothic" panose="020B0503020000020004" pitchFamily="34" charset="-127"/>
                 <a:ea typeface="Malgun Gothic" panose="020B0503020000020004" pitchFamily="34" charset="-127"/>
                 <a:cs typeface="Angsana New" panose="02020603050405020304" pitchFamily="18" charset="-34"/>
               </a:rPr>
-              <a:t>au 2023-01</a:t>
+              <a:t>to</a:t>
+            </a:r>
+            <a:r>
+              <a:rPr lang="fr-FR" sz="1050" cap="small" dirty="0">
+                <a:solidFill>
+                  <a:srgbClr val="4F81BD"/>
+                </a:solidFill>
+                <a:effectLst/>
+                <a:latin typeface="Malgun Gothic" panose="020B0503020000020004" pitchFamily="34" charset="-127"/>
+                <a:ea typeface="Malgun Gothic" panose="020B0503020000020004" pitchFamily="34" charset="-127"/>
+                <a:cs typeface="Angsana New" panose="02020603050405020304" pitchFamily="18" charset="-34"/>
+              </a:rPr>
+              <a:t> 2023-01</a:t>
             </a:r>
             <a:endParaRPr lang="fr-FR" sz="1050" dirty="0">
               <a:solidFill>
@@ -3901,7 +4032,7 @@
               <a:buSzPts val="1050"/>
             </a:pPr>
             <a:r>
-              <a:rPr lang="fr-FR" sz="1050" dirty="0">
+              <a:rPr lang="en-US" sz="1050" dirty="0">
                 <a:solidFill>
                   <a:srgbClr val="595959"/>
                 </a:solidFill>
@@ -3910,54 +4041,7 @@
                 <a:ea typeface="Malgun Gothic" panose="020B0503020000020004" pitchFamily="34" charset="-127"/>
                 <a:cs typeface="Angsana New" panose="02020603050405020304" pitchFamily="18" charset="-34"/>
               </a:rPr>
-              <a:t>Encadrement et Mise en place du </a:t>
-            </a:r>
-            <a:r>
-              <a:rPr lang="fr-FR" sz="1050" dirty="0" err="1">
-                <a:solidFill>
-                  <a:srgbClr val="595959"/>
-                </a:solidFill>
-                <a:effectLst/>
-                <a:latin typeface="Malgun Gothic" panose="020B0503020000020004" pitchFamily="34" charset="-127"/>
-                <a:ea typeface="Malgun Gothic" panose="020B0503020000020004" pitchFamily="34" charset="-127"/>
-                <a:cs typeface="Angsana New" panose="02020603050405020304" pitchFamily="18" charset="-34"/>
-              </a:rPr>
-              <a:t>framework</a:t>
-            </a:r>
-            <a:r>
-              <a:rPr lang="fr-FR" sz="1050" dirty="0">
-                <a:solidFill>
-                  <a:srgbClr val="595959"/>
-                </a:solidFill>
-                <a:effectLst/>
-                <a:latin typeface="Malgun Gothic" panose="020B0503020000020004" pitchFamily="34" charset="-127"/>
-                <a:ea typeface="Malgun Gothic" panose="020B0503020000020004" pitchFamily="34" charset="-127"/>
-                <a:cs typeface="Angsana New" panose="02020603050405020304" pitchFamily="18" charset="-34"/>
-              </a:rPr>
-              <a:t> Scrum dans une équipe pluridisciplinaire en </a:t>
-            </a:r>
-            <a:r>
-              <a:rPr lang="fr-FR" sz="1050" dirty="0">
-                <a:solidFill>
-                  <a:srgbClr val="595959"/>
-                </a:solidFill>
-                <a:latin typeface="Malgun Gothic" panose="020B0503020000020004" pitchFamily="34" charset="-127"/>
-                <a:ea typeface="Malgun Gothic" panose="020B0503020000020004" pitchFamily="34" charset="-127"/>
-                <a:cs typeface="Angsana New" panose="02020603050405020304" pitchFamily="18" charset="-34"/>
-              </a:rPr>
-              <a:t>é</a:t>
-            </a:r>
-            <a:r>
-              <a:rPr lang="fr-FR" sz="1050" dirty="0">
-                <a:solidFill>
-                  <a:srgbClr val="595959"/>
-                </a:solidFill>
-                <a:effectLst/>
-                <a:latin typeface="Malgun Gothic" panose="020B0503020000020004" pitchFamily="34" charset="-127"/>
-                <a:ea typeface="Malgun Gothic" panose="020B0503020000020004" pitchFamily="34" charset="-127"/>
-                <a:cs typeface="Angsana New" panose="02020603050405020304" pitchFamily="18" charset="-34"/>
-              </a:rPr>
-              <a:t>lectricité</a:t>
+              <a:t>Supervision and Implementation of the Scrum framework in a multidisciplinary team in electricity</a:t>
             </a:r>
           </a:p>
           <a:p>
@@ -3986,7 +4070,19 @@
                 <a:ea typeface="Cambria" panose="02040503050406030204" pitchFamily="18" charset="0"/>
                 <a:cs typeface="Angsana New" panose="02020603050405020304" pitchFamily="18" charset="-34"/>
               </a:rPr>
-              <a:t>Architecte Solutions / Scrum Master DevOps</a:t>
+              <a:t>Solutions Architect / Scrum Master DevOps for Compagnie Des Alpes in </a:t>
+            </a:r>
+            <a:r>
+              <a:rPr lang="fr-FR" sz="1050" b="1" cap="small" dirty="0" err="1">
+                <a:solidFill>
+                  <a:srgbClr val="4F81BD"/>
+                </a:solidFill>
+                <a:effectLst/>
+                <a:latin typeface="Malgun Gothic" panose="020B0503020000020004" pitchFamily="34" charset="-127"/>
+                <a:ea typeface="Cambria" panose="02040503050406030204" pitchFamily="18" charset="0"/>
+                <a:cs typeface="Angsana New" panose="02020603050405020304" pitchFamily="18" charset="-34"/>
+              </a:rPr>
+              <a:t>Monbonnot-Saint-Martin</a:t>
             </a:r>
             <a:r>
               <a:rPr lang="fr-FR" sz="1050" dirty="0">
@@ -4007,64 +4103,7 @@
                 <a:ea typeface="Calibri" panose="020F0502020204030204" pitchFamily="34" charset="0"/>
                 <a:cs typeface="Cordia New" panose="020B0304020202020204" pitchFamily="34" charset="-34"/>
               </a:rPr>
-              <a:t> pour la Compagnie Des Alpes </a:t>
-            </a:r>
-            <a:r>
-              <a:rPr lang="fr-FR" sz="1050" dirty="0">
-                <a:solidFill>
-                  <a:srgbClr val="4F81BD"/>
-                </a:solidFill>
-                <a:effectLst>
-                  <a:outerShdw blurRad="38100" dist="25400" dir="5400000" algn="ctr">
-                    <a:srgbClr val="6E747A">
-                      <a:alpha val="43000"/>
-                    </a:srgbClr>
-                  </a:outerShdw>
-                </a:effectLst>
-                <a:latin typeface="Malgun Gothic" panose="020B0503020000020004" pitchFamily="34" charset="-127"/>
-                <a:ea typeface="Calibri" panose="020F0502020204030204" pitchFamily="34" charset="0"/>
-                <a:cs typeface="Cordia New" panose="020B0304020202020204" pitchFamily="34" charset="-34"/>
-              </a:rPr>
-              <a:t>à </a:t>
-            </a:r>
-            <a:r>
-              <a:rPr lang="fr-FR" sz="1050" dirty="0" err="1">
-                <a:solidFill>
-                  <a:srgbClr val="4F81BD"/>
-                </a:solidFill>
-                <a:effectLst>
-                  <a:outerShdw blurRad="38100" dist="25400" dir="5400000" algn="ctr">
-                    <a:srgbClr val="6E747A">
-                      <a:alpha val="43000"/>
-                    </a:srgbClr>
-                  </a:outerShdw>
-                </a:effectLst>
-                <a:latin typeface="Malgun Gothic" panose="020B0503020000020004" pitchFamily="34" charset="-127"/>
-                <a:ea typeface="Calibri" panose="020F0502020204030204" pitchFamily="34" charset="0"/>
-                <a:cs typeface="Cordia New" panose="020B0304020202020204" pitchFamily="34" charset="-34"/>
-              </a:rPr>
-              <a:t>Monbonnot-Saint-Martin</a:t>
-            </a:r>
-            <a:r>
-              <a:rPr lang="fr-FR" sz="1050" dirty="0">
-                <a:ln>
-                  <a:noFill/>
-                </a:ln>
-                <a:solidFill>
-                  <a:srgbClr val="4F81BD"/>
-                </a:solidFill>
-                <a:effectLst>
-                  <a:outerShdw blurRad="38100" dist="25400" dir="5400000" algn="ctr">
-                    <a:srgbClr val="6E747A">
-                      <a:alpha val="43000"/>
-                    </a:srgbClr>
-                  </a:outerShdw>
-                </a:effectLst>
-                <a:latin typeface="Malgun Gothic" panose="020B0503020000020004" pitchFamily="34" charset="-127"/>
-                <a:ea typeface="Calibri" panose="020F0502020204030204" pitchFamily="34" charset="0"/>
-                <a:cs typeface="Cordia New" panose="020B0304020202020204" pitchFamily="34" charset="-34"/>
-              </a:rPr>
-              <a:t> – 2021-05 à 2021-12</a:t>
+              <a:t> – 2021-05 to 2021-12</a:t>
             </a:r>
             <a:endParaRPr lang="fr-FR" sz="1050" dirty="0">
               <a:solidFill>
@@ -4081,7 +4120,7 @@
               <a:buSzPts val="1050"/>
             </a:pPr>
             <a:r>
-              <a:rPr lang="fr-FR" sz="1050" dirty="0">
+              <a:rPr lang="en-US" sz="1050" dirty="0">
                 <a:solidFill>
                   <a:srgbClr val="595959"/>
                 </a:solidFill>
@@ -4089,7 +4128,7 @@
                 <a:ea typeface="Malgun Gothic" panose="020B0503020000020004" pitchFamily="34" charset="-127"/>
                 <a:cs typeface="Angsana New" panose="02020603050405020304" pitchFamily="18" charset="-34"/>
               </a:rPr>
-              <a:t>Mise en place du nouvel SI basé sur les micro-services /Management de l’équipe DevOps en soutient des équipes de Dev des micro-services</a:t>
+              <a:t>Implementation of the new IS based on micro-services / Management of the DevOps team in support of the micro-services Dev teams</a:t>
             </a:r>
           </a:p>
           <a:p>
@@ -4115,7 +4154,7 @@
                 <a:ea typeface="Malgun Gothic" panose="020B0503020000020004" pitchFamily="34" charset="-127"/>
                 <a:cs typeface="Angsana New" panose="02020603050405020304" pitchFamily="18" charset="-34"/>
               </a:rPr>
-              <a:t>Consultant DevOps pour Schneider à </a:t>
+              <a:t>DevOps consultant for Schneider at </a:t>
             </a:r>
             <a:r>
               <a:rPr lang="fr-FR" sz="1050" b="1" cap="small" dirty="0" err="1">
@@ -4129,7 +4168,7 @@
               <a:t>eybens</a:t>
             </a:r>
             <a:r>
-              <a:rPr lang="fr-FR" sz="1050" b="1" cap="small" dirty="0">
+              <a:rPr lang="fr-FR" sz="1050" cap="small" dirty="0">
                 <a:solidFill>
                   <a:srgbClr val="4F81BD"/>
                 </a:solidFill>
@@ -4137,18 +4176,7 @@
                 <a:ea typeface="Malgun Gothic" panose="020B0503020000020004" pitchFamily="34" charset="-127"/>
                 <a:cs typeface="Angsana New" panose="02020603050405020304" pitchFamily="18" charset="-34"/>
               </a:rPr>
-              <a:t> </a:t>
-            </a:r>
-            <a:r>
-              <a:rPr lang="fr-FR" sz="1050" cap="small" dirty="0">
-                <a:solidFill>
-                  <a:srgbClr val="4F81BD"/>
-                </a:solidFill>
-                <a:latin typeface="Malgun Gothic" panose="020B0503020000020004" pitchFamily="34" charset="-127"/>
-                <a:ea typeface="Malgun Gothic" panose="020B0503020000020004" pitchFamily="34" charset="-127"/>
-                <a:cs typeface="Angsana New" panose="02020603050405020304" pitchFamily="18" charset="-34"/>
-              </a:rPr>
-              <a:t>– 2019-03 à 2021-04</a:t>
+              <a:t>– 2019-03 to 2021-04</a:t>
             </a:r>
           </a:p>
           <a:p>
@@ -4156,7 +4184,7 @@
               <a:buSzPts val="1050"/>
             </a:pPr>
             <a:r>
-              <a:rPr lang="fr-FR" sz="1050" dirty="0">
+              <a:rPr lang="en-US" sz="1050" dirty="0">
                 <a:solidFill>
                   <a:srgbClr val="595959"/>
                 </a:solidFill>
@@ -4165,7 +4193,7 @@
                 <a:ea typeface="Malgun Gothic" panose="020B0503020000020004" pitchFamily="34" charset="-127"/>
                 <a:cs typeface="Angsana New" panose="02020603050405020304" pitchFamily="18" charset="-34"/>
               </a:rPr>
-              <a:t>Amélioration des processus de livraison sous Azure DevOps / Intégration continue des composants dans la plateforme / Intervention dans les différents processus DevOps au cœur de l’équipe R&amp;D. </a:t>
+              <a:t>Improvement of delivery processes under Azure DevOps / Continuous integration of components into the platform / Intervention in the various DevOps processes at the heart of the R&amp;D team.</a:t>
             </a:r>
           </a:p>
           <a:p>
@@ -4173,7 +4201,7 @@
               <a:buSzPts val="1050"/>
             </a:pPr>
             <a:r>
-              <a:rPr lang="fr-FR" sz="1050" dirty="0">
+              <a:rPr lang="en-US" sz="1050" dirty="0">
                 <a:solidFill>
                   <a:srgbClr val="595959"/>
                 </a:solidFill>
@@ -4182,10 +4210,13 @@
                 <a:ea typeface="Malgun Gothic" panose="020B0503020000020004" pitchFamily="34" charset="-127"/>
                 <a:cs typeface="Angsana New" panose="02020603050405020304" pitchFamily="18" charset="-34"/>
               </a:rPr>
-              <a:t>Consultant DevOps pour plusieurs autres clients.</a:t>
-            </a:r>
-          </a:p>
-          <a:p>
+              <a:t>DevOps consultant for several other clients.</a:t>
+            </a:r>
+          </a:p>
+          <a:p>
+            <a:pPr lvl="0" algn="just">
+              <a:buSzPts val="1050"/>
+            </a:pPr>
             <a:endParaRPr lang="fr-FR" sz="1050" dirty="0">
               <a:solidFill>
                 <a:schemeClr val="bg2">
@@ -4206,29 +4237,7 @@
                 <a:ea typeface="Malgun Gothic" panose="020B0503020000020004" pitchFamily="34" charset="-127"/>
                 <a:cs typeface="Angsana New" panose="02020603050405020304" pitchFamily="18" charset="-34"/>
               </a:rPr>
-              <a:t>Consultant Architecte DevOps, Docker </a:t>
-            </a:r>
-            <a:r>
-              <a:rPr lang="fr-FR" sz="1050" cap="small" dirty="0">
-                <a:solidFill>
-                  <a:srgbClr val="4F81BD"/>
-                </a:solidFill>
-                <a:latin typeface="Malgun Gothic" panose="020B0503020000020004" pitchFamily="34" charset="-127"/>
-                <a:ea typeface="Malgun Gothic" panose="020B0503020000020004" pitchFamily="34" charset="-127"/>
-                <a:cs typeface="Angsana New" panose="02020603050405020304" pitchFamily="18" charset="-34"/>
-              </a:rPr>
-              <a:t>HARDIS</a:t>
-            </a:r>
-            <a:r>
-              <a:rPr lang="fr-FR" sz="1050" b="1" cap="small" dirty="0">
-                <a:solidFill>
-                  <a:srgbClr val="4F81BD"/>
-                </a:solidFill>
-                <a:latin typeface="Malgun Gothic" panose="020B0503020000020004" pitchFamily="34" charset="-127"/>
-                <a:ea typeface="Malgun Gothic" panose="020B0503020000020004" pitchFamily="34" charset="-127"/>
-                <a:cs typeface="Angsana New" panose="02020603050405020304" pitchFamily="18" charset="-34"/>
-              </a:rPr>
-              <a:t> </a:t>
+              <a:t>Consultant Architect DevOps, Docker HARDIS </a:t>
             </a:r>
             <a:r>
               <a:rPr lang="fr-FR" sz="1050" cap="small" dirty="0">
@@ -4285,10 +4294,10 @@
                 <a:ea typeface="Malgun Gothic" panose="020B0503020000020004" pitchFamily="34" charset="-127"/>
                 <a:cs typeface="Calibri" panose="020F0502020204030204" pitchFamily="34" charset="0"/>
               </a:rPr>
-              <a:t>DOCKERISATION ADELIA/REFLEX </a:t>
-            </a:r>
-            <a:r>
-              <a:rPr lang="fr-FR" sz="1050" dirty="0">
+              <a:t>ADELIA/REFLEX DOCKERIZATION </a:t>
+            </a:r>
+            <a:r>
+              <a:rPr lang="en-US" sz="1050" dirty="0">
                 <a:solidFill>
                   <a:srgbClr val="595959"/>
                 </a:solidFill>
@@ -4297,7 +4306,7 @@
                 <a:ea typeface="Malgun Gothic" panose="020B0503020000020004" pitchFamily="34" charset="-127"/>
                 <a:cs typeface="Calibri" panose="020F0502020204030204" pitchFamily="34" charset="0"/>
               </a:rPr>
-              <a:t>Participation à la transformation de l’application REFLEX sous forme de conteneurs Docker. Le but est d’utiliser l’application sur le Cloud Public et/ou privé.</a:t>
+              <a:t>Participation in the transformation of the REFLEX application in the form of Docker containers. The goal is to use the application on the Public and/or Private Cloud.</a:t>
             </a:r>
           </a:p>
           <a:p>
@@ -4325,6 +4334,18 @@
               </a:tabLst>
             </a:pPr>
             <a:r>
+              <a:rPr lang="en-US" sz="1050" b="1" i="1" dirty="0">
+                <a:solidFill>
+                  <a:srgbClr val="595959"/>
+                </a:solidFill>
+                <a:effectLst/>
+                <a:latin typeface="Malgun Gothic" panose="020B0503020000020004" pitchFamily="34" charset="-127"/>
+                <a:ea typeface="Malgun Gothic" panose="020B0503020000020004" pitchFamily="34" charset="-127"/>
+                <a:cs typeface="Calibri" panose="020F0502020204030204" pitchFamily="34" charset="0"/>
+              </a:rPr>
+              <a:t>PUBLIC CLOUD CONSULTANT FOR SEVERAL CUSTOMERS</a:t>
+            </a:r>
+            <a:r>
               <a:rPr lang="fr-FR" sz="1050" b="1" i="1" dirty="0">
                 <a:solidFill>
                   <a:srgbClr val="595959"/>
@@ -4334,7 +4355,19 @@
                 <a:ea typeface="Malgun Gothic" panose="020B0503020000020004" pitchFamily="34" charset="-127"/>
                 <a:cs typeface="Calibri" panose="020F0502020204030204" pitchFamily="34" charset="0"/>
               </a:rPr>
-              <a:t>CONSULTANT CLOUD PUBLIC POUR PLUSIEURS CLIENTS </a:t>
+              <a:t> </a:t>
+            </a:r>
+            <a:r>
+              <a:rPr lang="en-US" sz="1050" dirty="0">
+                <a:solidFill>
+                  <a:srgbClr val="595959"/>
+                </a:solidFill>
+                <a:effectLst/>
+                <a:latin typeface="Malgun Gothic" panose="020B0503020000020004" pitchFamily="34" charset="-127"/>
+                <a:ea typeface="Malgun Gothic" panose="020B0503020000020004" pitchFamily="34" charset="-127"/>
+                <a:cs typeface="Calibri" panose="020F0502020204030204" pitchFamily="34" charset="0"/>
+              </a:rPr>
+              <a:t>Participation in several customer projects around the Public Cloud AWS and Azure.</a:t>
             </a:r>
             <a:r>
               <a:rPr lang="fr-FR" sz="1050" dirty="0">
@@ -4346,7 +4379,7 @@
                 <a:ea typeface="Malgun Gothic" panose="020B0503020000020004" pitchFamily="34" charset="-127"/>
                 <a:cs typeface="Calibri" panose="020F0502020204030204" pitchFamily="34" charset="0"/>
               </a:rPr>
-              <a:t>Participation à plusieurs projets clients autour du Cloud Public AWS et Azure.</a:t>
+              <a:t>.</a:t>
             </a:r>
           </a:p>
           <a:p>
@@ -4383,10 +4416,10 @@
                 <a:ea typeface="Malgun Gothic" panose="020B0503020000020004" pitchFamily="34" charset="-127"/>
                 <a:cs typeface="Calibri" panose="020F0502020204030204" pitchFamily="34" charset="0"/>
               </a:rPr>
-              <a:t>DEVELOPPEMENT SCRIPTS PYTHON </a:t>
-            </a:r>
-            <a:r>
-              <a:rPr lang="fr-FR" sz="1050" dirty="0">
+              <a:t>DEVELOPMENT OF PYTHON SCRIPTS </a:t>
+            </a:r>
+            <a:r>
+              <a:rPr lang="en-US" sz="1050" dirty="0">
                 <a:solidFill>
                   <a:srgbClr val="595959"/>
                 </a:solidFill>
@@ -4395,8 +4428,17 @@
                 <a:ea typeface="Malgun Gothic" panose="020B0503020000020004" pitchFamily="34" charset="-127"/>
                 <a:cs typeface="Calibri" panose="020F0502020204030204" pitchFamily="34" charset="0"/>
               </a:rPr>
-              <a:t>Développement de scripts pour la supervision de serveurs et pour la gestion de tickets sous ITOP.</a:t>
-            </a:r>
+              <a:t>Development of scripts for server supervision and ticket management under ITOP.</a:t>
+            </a:r>
+            <a:endParaRPr lang="fr-FR" sz="1050" dirty="0">
+              <a:solidFill>
+                <a:srgbClr val="595959"/>
+              </a:solidFill>
+              <a:effectLst/>
+              <a:latin typeface="Malgun Gothic" panose="020B0503020000020004" pitchFamily="34" charset="-127"/>
+              <a:ea typeface="Malgun Gothic" panose="020B0503020000020004" pitchFamily="34" charset="-127"/>
+              <a:cs typeface="Calibri" panose="020F0502020204030204" pitchFamily="34" charset="0"/>
+            </a:endParaRPr>
           </a:p>
           <a:p>
             <a:endParaRPr lang="fr-FR" sz="1050" dirty="0">
@@ -4498,7 +4540,7 @@
           <a:lstStyle/>
           <a:p>
             <a:r>
-              <a:rPr lang="fr-FR" sz="1400" b="1" dirty="0">
+              <a:rPr lang="fr-FR" sz="1400" b="1" dirty="0" err="1">
                 <a:solidFill>
                   <a:schemeClr val="accent1">
                     <a:lumMod val="50000"/>
@@ -4507,8 +4549,41 @@
                 <a:latin typeface="Malgun Gothic" panose="020B0503020000020004" pitchFamily="34" charset="-127"/>
                 <a:ea typeface="Malgun Gothic" panose="020B0503020000020004" pitchFamily="34" charset="-127"/>
               </a:rPr>
-              <a:t>Parcours professionnel</a:t>
-            </a:r>
+              <a:t>Professionnal</a:t>
+            </a:r>
+            <a:r>
+              <a:rPr lang="fr-FR" sz="1400" b="1" dirty="0">
+                <a:solidFill>
+                  <a:schemeClr val="accent1">
+                    <a:lumMod val="50000"/>
+                  </a:schemeClr>
+                </a:solidFill>
+                <a:latin typeface="Malgun Gothic" panose="020B0503020000020004" pitchFamily="34" charset="-127"/>
+                <a:ea typeface="Malgun Gothic" panose="020B0503020000020004" pitchFamily="34" charset="-127"/>
+              </a:rPr>
+              <a:t> </a:t>
+            </a:r>
+            <a:r>
+              <a:rPr lang="fr-FR" sz="1400" b="1" dirty="0" err="1">
+                <a:solidFill>
+                  <a:schemeClr val="accent1">
+                    <a:lumMod val="50000"/>
+                  </a:schemeClr>
+                </a:solidFill>
+                <a:latin typeface="Malgun Gothic" panose="020B0503020000020004" pitchFamily="34" charset="-127"/>
+                <a:ea typeface="Malgun Gothic" panose="020B0503020000020004" pitchFamily="34" charset="-127"/>
+              </a:rPr>
+              <a:t>career</a:t>
+            </a:r>
+            <a:endParaRPr lang="fr-FR" sz="1400" b="1" dirty="0">
+              <a:solidFill>
+                <a:schemeClr val="accent1">
+                  <a:lumMod val="50000"/>
+                </a:schemeClr>
+              </a:solidFill>
+              <a:latin typeface="Malgun Gothic" panose="020B0503020000020004" pitchFamily="34" charset="-127"/>
+              <a:ea typeface="Malgun Gothic" panose="020B0503020000020004" pitchFamily="34" charset="-127"/>
+            </a:endParaRPr>
           </a:p>
         </p:txBody>
       </p:sp>
@@ -4570,7 +4645,7 @@
         <p:spPr>
           <a:xfrm>
             <a:off x="2064776" y="1723408"/>
-            <a:ext cx="4793223" cy="1908215"/>
+            <a:ext cx="4793223" cy="1746632"/>
           </a:xfrm>
           <a:prstGeom prst="rect">
             <a:avLst/>
@@ -4594,7 +4669,19 @@
                 <a:ea typeface="Malgun Gothic" panose="020B0503020000020004" pitchFamily="34" charset="-127"/>
                 <a:cs typeface="Angsana New" panose="02020603050405020304" pitchFamily="18" charset="-34"/>
               </a:rPr>
-              <a:t>Industrialisation de Process </a:t>
+              <a:t>Process </a:t>
+            </a:r>
+            <a:r>
+              <a:rPr lang="fr-FR" sz="1100" b="1" cap="small" dirty="0" err="1">
+                <a:solidFill>
+                  <a:srgbClr val="4F81BD"/>
+                </a:solidFill>
+                <a:effectLst/>
+                <a:latin typeface="Malgun Gothic" panose="020B0503020000020004" pitchFamily="34" charset="-127"/>
+                <a:ea typeface="Malgun Gothic" panose="020B0503020000020004" pitchFamily="34" charset="-127"/>
+                <a:cs typeface="Angsana New" panose="02020603050405020304" pitchFamily="18" charset="-34"/>
+              </a:rPr>
+              <a:t>Industrialization</a:t>
             </a:r>
             <a:r>
               <a:rPr lang="fr-FR" sz="1050" b="1" cap="small" dirty="0">
@@ -4621,7 +4708,7 @@
               <a:t> </a:t>
             </a:r>
             <a:r>
-              <a:rPr lang="fr-FR" sz="1050" dirty="0">
+              <a:rPr lang="en-US" sz="1050" dirty="0">
                 <a:solidFill>
                   <a:srgbClr val="595959"/>
                 </a:solidFill>
@@ -4630,7 +4717,7 @@
                 <a:ea typeface="Malgun Gothic" panose="020B0503020000020004" pitchFamily="34" charset="-127"/>
                 <a:cs typeface="Calibri" panose="020F0502020204030204" pitchFamily="34" charset="0"/>
               </a:rPr>
-              <a:t>automatisation du processus d’installation de logiciels. </a:t>
+              <a:t>Automation of the software installation process.</a:t>
             </a:r>
             <a:endParaRPr lang="fr-FR" sz="1050" dirty="0">
               <a:solidFill>
@@ -4666,7 +4753,144 @@
                 <a:ea typeface="Malgun Gothic" panose="020B0503020000020004" pitchFamily="34" charset="-127"/>
                 <a:cs typeface="Calibri" panose="020F0502020204030204" pitchFamily="34" charset="0"/>
               </a:rPr>
-              <a:t> : mise en production, intégration / livraison continue, tests.</a:t>
+              <a:t> : r</a:t>
+            </a:r>
+            <a:r>
+              <a:rPr lang="en-US" sz="1050" dirty="0" err="1">
+                <a:solidFill>
+                  <a:srgbClr val="595959"/>
+                </a:solidFill>
+                <a:effectLst/>
+                <a:latin typeface="Malgun Gothic" panose="020B0503020000020004" pitchFamily="34" charset="-127"/>
+                <a:ea typeface="Malgun Gothic" panose="020B0503020000020004" pitchFamily="34" charset="-127"/>
+                <a:cs typeface="Calibri" panose="020F0502020204030204" pitchFamily="34" charset="0"/>
+              </a:rPr>
+              <a:t>elease</a:t>
+            </a:r>
+            <a:r>
+              <a:rPr lang="en-US" sz="1050" dirty="0">
+                <a:solidFill>
+                  <a:srgbClr val="595959"/>
+                </a:solidFill>
+                <a:effectLst/>
+                <a:latin typeface="Malgun Gothic" panose="020B0503020000020004" pitchFamily="34" charset="-127"/>
+                <a:ea typeface="Malgun Gothic" panose="020B0503020000020004" pitchFamily="34" charset="-127"/>
+                <a:cs typeface="Calibri" panose="020F0502020204030204" pitchFamily="34" charset="0"/>
+              </a:rPr>
+              <a:t>, continuous integration/delivery, testing.</a:t>
+            </a:r>
+          </a:p>
+          <a:p>
+            <a:pPr algn="just"/>
+            <a:r>
+              <a:rPr lang="fr-FR" sz="1100" b="1" cap="small" dirty="0">
+                <a:solidFill>
+                  <a:srgbClr val="4F81BD"/>
+                </a:solidFill>
+                <a:effectLst/>
+                <a:latin typeface="Malgun Gothic" panose="020B0503020000020004" pitchFamily="34" charset="-127"/>
+                <a:ea typeface="Malgun Gothic" panose="020B0503020000020004" pitchFamily="34" charset="-127"/>
+                <a:cs typeface="Angsana New" panose="02020603050405020304" pitchFamily="18" charset="-34"/>
+              </a:rPr>
+              <a:t>Technical Management</a:t>
+            </a:r>
+            <a:r>
+              <a:rPr lang="fr-FR" sz="1050" dirty="0">
+                <a:solidFill>
+                  <a:srgbClr val="595959"/>
+                </a:solidFill>
+                <a:effectLst/>
+                <a:latin typeface="Malgun Gothic" panose="020B0503020000020004" pitchFamily="34" charset="-127"/>
+                <a:ea typeface="Malgun Gothic" panose="020B0503020000020004" pitchFamily="34" charset="-127"/>
+                <a:cs typeface="Angsana New" panose="02020603050405020304" pitchFamily="18" charset="-34"/>
+              </a:rPr>
+              <a:t>:   </a:t>
+            </a:r>
+            <a:r>
+              <a:rPr lang="fr-FR" sz="1050" dirty="0">
+                <a:solidFill>
+                  <a:srgbClr val="0070C0"/>
+                </a:solidFill>
+                <a:effectLst/>
+                <a:latin typeface="Malgun Gothic" panose="020B0503020000020004" pitchFamily="34" charset="-127"/>
+                <a:ea typeface="Malgun Gothic" panose="020B0503020000020004" pitchFamily="34" charset="-127"/>
+                <a:cs typeface="Calibri" panose="020F0502020204030204" pitchFamily="34" charset="0"/>
+              </a:rPr>
+              <a:t>R&amp;D </a:t>
+            </a:r>
+            <a:r>
+              <a:rPr lang="fr-FR" sz="1050" dirty="0" err="1">
+                <a:solidFill>
+                  <a:srgbClr val="0070C0"/>
+                </a:solidFill>
+                <a:effectLst/>
+                <a:latin typeface="Malgun Gothic" panose="020B0503020000020004" pitchFamily="34" charset="-127"/>
+                <a:ea typeface="Malgun Gothic" panose="020B0503020000020004" pitchFamily="34" charset="-127"/>
+                <a:cs typeface="Calibri" panose="020F0502020204030204" pitchFamily="34" charset="0"/>
+              </a:rPr>
+              <a:t>project</a:t>
+            </a:r>
+            <a:r>
+              <a:rPr lang="fr-FR" sz="1050" dirty="0">
+                <a:solidFill>
+                  <a:srgbClr val="0070C0"/>
+                </a:solidFill>
+                <a:effectLst/>
+                <a:latin typeface="Malgun Gothic" panose="020B0503020000020004" pitchFamily="34" charset="-127"/>
+                <a:ea typeface="Malgun Gothic" panose="020B0503020000020004" pitchFamily="34" charset="-127"/>
+                <a:cs typeface="Calibri" panose="020F0502020204030204" pitchFamily="34" charset="0"/>
+              </a:rPr>
+              <a:t> manager</a:t>
+            </a:r>
+            <a:r>
+              <a:rPr lang="fr-FR" sz="1050" dirty="0">
+                <a:solidFill>
+                  <a:srgbClr val="595959"/>
+                </a:solidFill>
+                <a:effectLst/>
+                <a:latin typeface="Malgun Gothic" panose="020B0503020000020004" pitchFamily="34" charset="-127"/>
+                <a:ea typeface="Malgun Gothic" panose="020B0503020000020004" pitchFamily="34" charset="-127"/>
+                <a:cs typeface="Calibri" panose="020F0502020204030204" pitchFamily="34" charset="0"/>
+              </a:rPr>
+              <a:t> </a:t>
+            </a:r>
+            <a:r>
+              <a:rPr lang="en-US" sz="1050" dirty="0">
+                <a:solidFill>
+                  <a:srgbClr val="595959"/>
+                </a:solidFill>
+                <a:effectLst/>
+                <a:latin typeface="Malgun Gothic" panose="020B0503020000020004" pitchFamily="34" charset="-127"/>
+                <a:ea typeface="Malgun Gothic" panose="020B0503020000020004" pitchFamily="34" charset="-127"/>
+                <a:cs typeface="Angsana New" panose="02020603050405020304" pitchFamily="18" charset="-34"/>
+              </a:rPr>
+              <a:t>organization, management of resources and monitoring of IT developments, optimization of the result; agile management</a:t>
+            </a:r>
+          </a:p>
+          <a:p>
+            <a:pPr algn="just"/>
+            <a:r>
+              <a:rPr lang="fr-FR" sz="1100" b="1" cap="small" dirty="0">
+                <a:solidFill>
+                  <a:srgbClr val="4F81BD"/>
+                </a:solidFill>
+                <a:effectLst/>
+                <a:latin typeface="Malgun Gothic" panose="020B0503020000020004" pitchFamily="34" charset="-127"/>
+                <a:ea typeface="Malgun Gothic" panose="020B0503020000020004" pitchFamily="34" charset="-127"/>
+                <a:cs typeface="Angsana New" panose="02020603050405020304" pitchFamily="18" charset="-34"/>
+              </a:rPr>
+              <a:t>Cloud : </a:t>
+            </a:r>
+            <a:r>
+              <a:rPr lang="fr-FR" sz="1050" cap="small" dirty="0">
+                <a:solidFill>
+                  <a:srgbClr val="595959"/>
+                </a:solidFill>
+                <a:latin typeface="Malgun Gothic" panose="020B0503020000020004" pitchFamily="34" charset="-127"/>
+                <a:ea typeface="Malgun Gothic" panose="020B0503020000020004" pitchFamily="34" charset="-127"/>
+                <a:cs typeface="Calibri" panose="020F0502020204030204" pitchFamily="34" charset="0"/>
+              </a:rPr>
+              <a:t>AWS, Azure</a:t>
             </a:r>
             <a:endParaRPr lang="fr-FR" sz="1050" dirty="0">
               <a:solidFill>
@@ -4690,10 +4914,10 @@
                 <a:ea typeface="Malgun Gothic" panose="020B0503020000020004" pitchFamily="34" charset="-127"/>
                 <a:cs typeface="Angsana New" panose="02020603050405020304" pitchFamily="18" charset="-34"/>
               </a:rPr>
-              <a:t>Management Technique</a:t>
-            </a:r>
-            <a:r>
-              <a:rPr lang="fr-FR" sz="1100" dirty="0">
+              <a:t>Computer </a:t>
+            </a:r>
+            <a:r>
+              <a:rPr lang="fr-FR" sz="1100" b="1" cap="small" dirty="0" err="1">
                 <a:solidFill>
                   <a:srgbClr val="4F81BD"/>
                 </a:solidFill>
@@ -4702,136 +4926,7 @@
                 <a:ea typeface="Malgun Gothic" panose="020B0503020000020004" pitchFamily="34" charset="-127"/>
                 <a:cs typeface="Angsana New" panose="02020603050405020304" pitchFamily="18" charset="-34"/>
               </a:rPr>
-              <a:t> </a:t>
-            </a:r>
-            <a:r>
-              <a:rPr lang="fr-FR" sz="1050" dirty="0">
-                <a:solidFill>
-                  <a:srgbClr val="595959"/>
-                </a:solidFill>
-                <a:effectLst/>
-                <a:latin typeface="Malgun Gothic" panose="020B0503020000020004" pitchFamily="34" charset="-127"/>
-                <a:ea typeface="Malgun Gothic" panose="020B0503020000020004" pitchFamily="34" charset="-127"/>
-                <a:cs typeface="Angsana New" panose="02020603050405020304" pitchFamily="18" charset="-34"/>
-              </a:rPr>
-              <a:t>:   </a:t>
-            </a:r>
-            <a:r>
-              <a:rPr lang="fr-FR" sz="1050" dirty="0">
-                <a:solidFill>
-                  <a:srgbClr val="0070C0"/>
-                </a:solidFill>
-                <a:effectLst/>
-                <a:latin typeface="Malgun Gothic" panose="020B0503020000020004" pitchFamily="34" charset="-127"/>
-                <a:ea typeface="Malgun Gothic" panose="020B0503020000020004" pitchFamily="34" charset="-127"/>
-                <a:cs typeface="Calibri" panose="020F0502020204030204" pitchFamily="34" charset="0"/>
-              </a:rPr>
-              <a:t>Chef de projets R&amp;D</a:t>
-            </a:r>
-            <a:r>
-              <a:rPr lang="fr-FR" sz="1050" dirty="0">
-                <a:solidFill>
-                  <a:srgbClr val="595959"/>
-                </a:solidFill>
-                <a:effectLst/>
-                <a:latin typeface="Malgun Gothic" panose="020B0503020000020004" pitchFamily="34" charset="-127"/>
-                <a:ea typeface="Malgun Gothic" panose="020B0503020000020004" pitchFamily="34" charset="-127"/>
-                <a:cs typeface="Calibri" panose="020F0502020204030204" pitchFamily="34" charset="0"/>
-              </a:rPr>
-              <a:t> </a:t>
-            </a:r>
-            <a:r>
-              <a:rPr lang="fr-FR" sz="1050" dirty="0">
-                <a:solidFill>
-                  <a:srgbClr val="595959"/>
-                </a:solidFill>
-                <a:effectLst/>
-                <a:latin typeface="Malgun Gothic" panose="020B0503020000020004" pitchFamily="34" charset="-127"/>
-                <a:ea typeface="Malgun Gothic" panose="020B0503020000020004" pitchFamily="34" charset="-127"/>
-                <a:cs typeface="Angsana New" panose="02020603050405020304" pitchFamily="18" charset="-34"/>
-              </a:rPr>
-              <a:t>organisation, gestion des moyens et suivi des développements informatiques, optimisation du résultat</a:t>
-            </a:r>
-            <a:r>
-              <a:rPr lang="fr-FR" sz="1050" dirty="0">
-                <a:solidFill>
-                  <a:srgbClr val="595959"/>
-                </a:solidFill>
-                <a:effectLst/>
-                <a:latin typeface="Malgun Gothic" panose="020B0503020000020004" pitchFamily="34" charset="-127"/>
-                <a:ea typeface="Malgun Gothic" panose="020B0503020000020004" pitchFamily="34" charset="-127"/>
-                <a:cs typeface="Calibri" panose="020F0502020204030204" pitchFamily="34" charset="0"/>
-              </a:rPr>
-              <a:t> ; </a:t>
-            </a:r>
-            <a:r>
-              <a:rPr lang="fr-FR" sz="1050" dirty="0">
-                <a:solidFill>
-                  <a:srgbClr val="595959"/>
-                </a:solidFill>
-                <a:latin typeface="Malgun Gothic" panose="020B0503020000020004" pitchFamily="34" charset="-127"/>
-                <a:ea typeface="Malgun Gothic" panose="020B0503020000020004" pitchFamily="34" charset="-127"/>
-                <a:cs typeface="Calibri" panose="020F0502020204030204" pitchFamily="34" charset="0"/>
-              </a:rPr>
-              <a:t>management agile</a:t>
-            </a:r>
-            <a:endParaRPr lang="fr-FR" sz="1050" dirty="0">
-              <a:solidFill>
-                <a:srgbClr val="595959"/>
-              </a:solidFill>
-              <a:latin typeface="Malgun Gothic" panose="020B0503020000020004" pitchFamily="34" charset="-127"/>
-              <a:ea typeface="Malgun Gothic" panose="020B0503020000020004" pitchFamily="34" charset="-127"/>
-              <a:cs typeface="Angsana New" panose="02020603050405020304" pitchFamily="18" charset="-34"/>
-            </a:endParaRPr>
-          </a:p>
-          <a:p>
-            <a:pPr algn="just"/>
-            <a:r>
-              <a:rPr lang="fr-FR" sz="1100" b="1" cap="small" dirty="0">
-                <a:solidFill>
-                  <a:srgbClr val="4F81BD"/>
-                </a:solidFill>
-                <a:effectLst/>
-                <a:latin typeface="Malgun Gothic" panose="020B0503020000020004" pitchFamily="34" charset="-127"/>
-                <a:ea typeface="Malgun Gothic" panose="020B0503020000020004" pitchFamily="34" charset="-127"/>
-                <a:cs typeface="Angsana New" panose="02020603050405020304" pitchFamily="18" charset="-34"/>
-              </a:rPr>
-              <a:t>Cloud : </a:t>
-            </a:r>
-            <a:r>
-              <a:rPr lang="fr-FR" sz="1050" cap="small" dirty="0">
-                <a:solidFill>
-                  <a:srgbClr val="595959"/>
-                </a:solidFill>
-                <a:latin typeface="Malgun Gothic" panose="020B0503020000020004" pitchFamily="34" charset="-127"/>
-                <a:ea typeface="Malgun Gothic" panose="020B0503020000020004" pitchFamily="34" charset="-127"/>
-                <a:cs typeface="Calibri" panose="020F0502020204030204" pitchFamily="34" charset="0"/>
-              </a:rPr>
-              <a:t>AWS, Azure</a:t>
-            </a:r>
-            <a:endParaRPr lang="fr-FR" sz="1050" dirty="0">
-              <a:solidFill>
-                <a:srgbClr val="595959"/>
-              </a:solidFill>
-              <a:effectLst/>
-              <a:latin typeface="Malgun Gothic" panose="020B0503020000020004" pitchFamily="34" charset="-127"/>
-              <a:ea typeface="Malgun Gothic" panose="020B0503020000020004" pitchFamily="34" charset="-127"/>
-              <a:cs typeface="Angsana New" panose="02020603050405020304" pitchFamily="18" charset="-34"/>
-            </a:endParaRPr>
-          </a:p>
-          <a:p>
-            <a:pPr algn="just"/>
-            <a:r>
-              <a:rPr lang="fr-FR" sz="1100" b="1" cap="small" dirty="0">
-                <a:solidFill>
-                  <a:srgbClr val="4F81BD"/>
-                </a:solidFill>
-                <a:effectLst/>
-                <a:latin typeface="Malgun Gothic" panose="020B0503020000020004" pitchFamily="34" charset="-127"/>
-                <a:ea typeface="Malgun Gothic" panose="020B0503020000020004" pitchFamily="34" charset="-127"/>
-                <a:cs typeface="Angsana New" panose="02020603050405020304" pitchFamily="18" charset="-34"/>
-              </a:rPr>
-              <a:t>Langages informatiques</a:t>
+              <a:t>languages</a:t>
             </a:r>
             <a:r>
               <a:rPr lang="fr-FR" sz="1050" b="1" cap="small" dirty="0">
@@ -4876,7 +4971,7 @@
                 <a:ea typeface="Malgun Gothic" panose="020B0503020000020004" pitchFamily="34" charset="-127"/>
                 <a:cs typeface="Angsana New" panose="02020603050405020304" pitchFamily="18" charset="-34"/>
               </a:rPr>
-              <a:t>Outils</a:t>
+              <a:t>Tools</a:t>
             </a:r>
             <a:r>
               <a:rPr lang="fr-FR" sz="1050" b="1" cap="small" dirty="0">
@@ -4952,7 +5047,7 @@
                 <a:ea typeface="Malgun Gothic" panose="020B0503020000020004" pitchFamily="34" charset="-127"/>
                 <a:cs typeface="Calibri" panose="020F0502020204030204" pitchFamily="34" charset="0"/>
               </a:rPr>
-              <a:t>, </a:t>
+              <a:t>, Kubernetes,  VirtualBox, Jenkins, </a:t>
             </a:r>
             <a:r>
               <a:rPr lang="fr-FR" sz="1050" dirty="0" err="1">
@@ -4963,7 +5058,7 @@
                 <a:ea typeface="Malgun Gothic" panose="020B0503020000020004" pitchFamily="34" charset="-127"/>
                 <a:cs typeface="Calibri" panose="020F0502020204030204" pitchFamily="34" charset="0"/>
               </a:rPr>
-              <a:t>Kubernetes</a:t>
+              <a:t>Cucumber</a:t>
             </a:r>
             <a:r>
               <a:rPr lang="fr-FR" sz="1050" dirty="0">
@@ -4974,29 +5069,7 @@
                 <a:ea typeface="Malgun Gothic" panose="020B0503020000020004" pitchFamily="34" charset="-127"/>
                 <a:cs typeface="Calibri" panose="020F0502020204030204" pitchFamily="34" charset="0"/>
               </a:rPr>
-              <a:t>,  VirtualBox, Jenkins, Cucumber, Ansible, </a:t>
-            </a:r>
-            <a:r>
-              <a:rPr lang="fr-FR" sz="1050" dirty="0" err="1">
-                <a:solidFill>
-                  <a:srgbClr val="595959"/>
-                </a:solidFill>
-                <a:latin typeface="Malgun Gothic" panose="020B0503020000020004" pitchFamily="34" charset="-127"/>
-                <a:ea typeface="Malgun Gothic" panose="020B0503020000020004" pitchFamily="34" charset="-127"/>
-                <a:cs typeface="Calibri" panose="020F0502020204030204" pitchFamily="34" charset="0"/>
-              </a:rPr>
-              <a:t>Terraform</a:t>
-            </a:r>
-            <a:r>
-              <a:rPr lang="fr-FR" sz="1050" dirty="0">
-                <a:solidFill>
-                  <a:srgbClr val="595959"/>
-                </a:solidFill>
-                <a:latin typeface="Malgun Gothic" panose="020B0503020000020004" pitchFamily="34" charset="-127"/>
-                <a:ea typeface="Malgun Gothic" panose="020B0503020000020004" pitchFamily="34" charset="-127"/>
-                <a:cs typeface="Calibri" panose="020F0502020204030204" pitchFamily="34" charset="0"/>
-              </a:rPr>
-              <a:t>, Jira.</a:t>
+              <a:t>, Ansible, Terraform, Jira.</a:t>
             </a:r>
           </a:p>
         </p:txBody>
@@ -5082,12 +5155,10 @@
                 <a:latin typeface="Malgun Gothic" panose="020B0503020000020004" pitchFamily="34" charset="-127"/>
                 <a:ea typeface="Malgun Gothic" panose="020B0503020000020004" pitchFamily="34" charset="-127"/>
               </a:rPr>
-              <a:t>Conduite de projets R&amp;D,</a:t>
-            </a:r>
-          </a:p>
-          <a:p>
-            <a:r>
-              <a:rPr lang="fr-FR" sz="1050" b="1" dirty="0">
+              <a:t>Project </a:t>
+            </a:r>
+            <a:r>
+              <a:rPr lang="fr-FR" sz="1050" b="1" dirty="0" err="1">
                 <a:solidFill>
                   <a:schemeClr val="accent5">
                     <a:lumMod val="50000"/>
@@ -5096,7 +5167,33 @@
                 <a:latin typeface="Malgun Gothic" panose="020B0503020000020004" pitchFamily="34" charset="-127"/>
                 <a:ea typeface="Malgun Gothic" panose="020B0503020000020004" pitchFamily="34" charset="-127"/>
               </a:rPr>
-              <a:t>DevOps, Anglais courant</a:t>
+              <a:t>Mannagmeent</a:t>
+            </a:r>
+            <a:r>
+              <a:rPr lang="fr-FR" sz="1050" b="1" dirty="0">
+                <a:solidFill>
+                  <a:schemeClr val="accent5">
+                    <a:lumMod val="50000"/>
+                  </a:schemeClr>
+                </a:solidFill>
+                <a:latin typeface="Malgun Gothic" panose="020B0503020000020004" pitchFamily="34" charset="-127"/>
+                <a:ea typeface="Malgun Gothic" panose="020B0503020000020004" pitchFamily="34" charset="-127"/>
+              </a:rPr>
+              <a:t> in R&amp;D,</a:t>
+            </a:r>
+          </a:p>
+          <a:p>
+            <a:r>
+              <a:rPr lang="fr-FR" sz="1050" b="1" dirty="0">
+                <a:solidFill>
+                  <a:schemeClr val="accent5">
+                    <a:lumMod val="50000"/>
+                  </a:schemeClr>
+                </a:solidFill>
+                <a:latin typeface="Malgun Gothic" panose="020B0503020000020004" pitchFamily="34" charset="-127"/>
+                <a:ea typeface="Malgun Gothic" panose="020B0503020000020004" pitchFamily="34" charset="-127"/>
+              </a:rPr>
+              <a:t>DevOps</a:t>
             </a:r>
           </a:p>
         </p:txBody>
@@ -5687,7 +5784,7 @@
         <p:spPr>
           <a:xfrm flipH="1">
             <a:off x="1591663" y="66514"/>
-            <a:ext cx="5266335" cy="7040389"/>
+            <a:ext cx="5266335" cy="6555641"/>
           </a:xfrm>
           <a:prstGeom prst="rect">
             <a:avLst/>
@@ -5746,7 +5843,31 @@
                 <a:ea typeface="Malgun Gothic" panose="020B0503020000020004" pitchFamily="34" charset="-127"/>
                 <a:cs typeface="Cordia New" panose="020B0304020202020204" pitchFamily="34" charset="-34"/>
               </a:rPr>
-              <a:t> FINANCIAL SERVICES (anciennement CSC Financial Services) </a:t>
+              <a:t> FINANCIAL SERVICES (</a:t>
+            </a:r>
+            <a:r>
+              <a:rPr lang="fr-FR" sz="1050" b="1" cap="all" dirty="0" err="1">
+                <a:solidFill>
+                  <a:srgbClr val="00000A"/>
+                </a:solidFill>
+                <a:effectLst/>
+                <a:latin typeface="Malgun Gothic" panose="020B0503020000020004" pitchFamily="34" charset="-127"/>
+                <a:ea typeface="Malgun Gothic" panose="020B0503020000020004" pitchFamily="34" charset="-127"/>
+                <a:cs typeface="Cordia New" panose="020B0304020202020204" pitchFamily="34" charset="-34"/>
+              </a:rPr>
+              <a:t>formerly</a:t>
+            </a:r>
+            <a:r>
+              <a:rPr lang="fr-FR" sz="1050" b="1" cap="all" dirty="0">
+                <a:solidFill>
+                  <a:srgbClr val="00000A"/>
+                </a:solidFill>
+                <a:effectLst/>
+                <a:latin typeface="Malgun Gothic" panose="020B0503020000020004" pitchFamily="34" charset="-127"/>
+                <a:ea typeface="Malgun Gothic" panose="020B0503020000020004" pitchFamily="34" charset="-127"/>
+                <a:cs typeface="Cordia New" panose="020B0304020202020204" pitchFamily="34" charset="-34"/>
+              </a:rPr>
+              <a:t> CSC Financial Services) </a:t>
             </a:r>
             <a:r>
               <a:rPr lang="fr-FR" sz="1050" cap="all" dirty="0">
@@ -5760,7 +5881,7 @@
               <a:t>- </a:t>
             </a:r>
             <a:r>
-              <a:rPr lang="fr-FR" sz="1050" b="0" cap="all" dirty="0">
+              <a:rPr lang="en-US" sz="1050" b="0" cap="all" dirty="0">
                 <a:solidFill>
                   <a:srgbClr val="404040"/>
                 </a:solidFill>
@@ -5769,8 +5890,17 @@
                 <a:ea typeface="Malgun Gothic" panose="020B0503020000020004" pitchFamily="34" charset="-127"/>
                 <a:cs typeface="Cordia New" panose="020B0304020202020204" pitchFamily="34" charset="-34"/>
               </a:rPr>
-              <a:t>secteur d’activité : DEVELOPPEMENT DE PRODUITS INFORMATIQUES DESTINES AUX ASSURANCES</a:t>
-            </a:r>
+              <a:t>sector of activity: DEVELOPMENT OF COMPUTER PRODUCTS FOR INSURANCE</a:t>
+            </a:r>
+            <a:endParaRPr lang="fr-FR" sz="1050" b="0" cap="all" dirty="0">
+              <a:solidFill>
+                <a:srgbClr val="404040"/>
+              </a:solidFill>
+              <a:effectLst/>
+              <a:latin typeface="Malgun Gothic" panose="020B0503020000020004" pitchFamily="34" charset="-127"/>
+              <a:ea typeface="Malgun Gothic" panose="020B0503020000020004" pitchFamily="34" charset="-127"/>
+              <a:cs typeface="Cordia New" panose="020B0304020202020204" pitchFamily="34" charset="-34"/>
+            </a:endParaRPr>
           </a:p>
           <a:p>
             <a:pPr algn="just"/>
@@ -5783,7 +5913,29 @@
                 <a:ea typeface="Malgun Gothic" panose="020B0503020000020004" pitchFamily="34" charset="-127"/>
                 <a:cs typeface="Cordia New" panose="020B0304020202020204" pitchFamily="34" charset="-34"/>
               </a:rPr>
-              <a:t>Dernier Poste occupé </a:t>
+              <a:t>last position </a:t>
+            </a:r>
+            <a:r>
+              <a:rPr lang="fr-FR" sz="1050" b="1" cap="small" dirty="0" err="1">
+                <a:solidFill>
+                  <a:srgbClr val="00000A"/>
+                </a:solidFill>
+                <a:latin typeface="Malgun Gothic" panose="020B0503020000020004" pitchFamily="34" charset="-127"/>
+                <a:ea typeface="Malgun Gothic" panose="020B0503020000020004" pitchFamily="34" charset="-127"/>
+                <a:cs typeface="Cordia New" panose="020B0304020202020204" pitchFamily="34" charset="-34"/>
+              </a:rPr>
+              <a:t>held</a:t>
+            </a:r>
+            <a:r>
+              <a:rPr lang="fr-FR" sz="1050" b="1" cap="small" dirty="0">
+                <a:solidFill>
+                  <a:srgbClr val="00000A"/>
+                </a:solidFill>
+                <a:latin typeface="Malgun Gothic" panose="020B0503020000020004" pitchFamily="34" charset="-127"/>
+                <a:ea typeface="Malgun Gothic" panose="020B0503020000020004" pitchFamily="34" charset="-127"/>
+                <a:cs typeface="Cordia New" panose="020B0304020202020204" pitchFamily="34" charset="-34"/>
+              </a:rPr>
+              <a:t> </a:t>
             </a:r>
             <a:r>
               <a:rPr lang="fr-FR" sz="1050" dirty="0">
@@ -5807,7 +5959,31 @@
                 <a:ea typeface="Malgun Gothic" panose="020B0503020000020004" pitchFamily="34" charset="-127"/>
                 <a:cs typeface="Angsana New" panose="02020603050405020304" pitchFamily="18" charset="-34"/>
               </a:rPr>
-              <a:t>Architecte DevOps, docker 2014-2018</a:t>
+              <a:t>DevOps </a:t>
+            </a:r>
+            <a:r>
+              <a:rPr lang="fr-FR" sz="1050" b="1" cap="small" dirty="0" err="1">
+                <a:solidFill>
+                  <a:srgbClr val="4F81BD"/>
+                </a:solidFill>
+                <a:effectLst/>
+                <a:latin typeface="Malgun Gothic" panose="020B0503020000020004" pitchFamily="34" charset="-127"/>
+                <a:ea typeface="Malgun Gothic" panose="020B0503020000020004" pitchFamily="34" charset="-127"/>
+                <a:cs typeface="Angsana New" panose="02020603050405020304" pitchFamily="18" charset="-34"/>
+              </a:rPr>
+              <a:t>architect</a:t>
+            </a:r>
+            <a:r>
+              <a:rPr lang="fr-FR" sz="1050" b="1" cap="small" dirty="0">
+                <a:solidFill>
+                  <a:srgbClr val="4F81BD"/>
+                </a:solidFill>
+                <a:effectLst/>
+                <a:latin typeface="Malgun Gothic" panose="020B0503020000020004" pitchFamily="34" charset="-127"/>
+                <a:ea typeface="Malgun Gothic" panose="020B0503020000020004" pitchFamily="34" charset="-127"/>
+                <a:cs typeface="Angsana New" panose="02020603050405020304" pitchFamily="18" charset="-34"/>
+              </a:rPr>
+              <a:t>, docker 2014-2018</a:t>
             </a:r>
             <a:endParaRPr lang="fr-FR" sz="1050" dirty="0">
               <a:solidFill>
@@ -5830,7 +6006,29 @@
                 <a:ea typeface="Malgun Gothic" panose="020B0503020000020004" pitchFamily="34" charset="-127"/>
                 <a:cs typeface="Cordia New" panose="020B0304020202020204" pitchFamily="34" charset="-34"/>
               </a:rPr>
-              <a:t>Postes précédents </a:t>
+              <a:t>Previous </a:t>
+            </a:r>
+            <a:r>
+              <a:rPr lang="fr-FR" sz="1050" b="1" cap="small" dirty="0" err="1">
+                <a:solidFill>
+                  <a:srgbClr val="00000A"/>
+                </a:solidFill>
+                <a:latin typeface="Malgun Gothic" panose="020B0503020000020004" pitchFamily="34" charset="-127"/>
+                <a:ea typeface="Malgun Gothic" panose="020B0503020000020004" pitchFamily="34" charset="-127"/>
+                <a:cs typeface="Cordia New" panose="020B0304020202020204" pitchFamily="34" charset="-34"/>
+              </a:rPr>
+              <a:t>posts</a:t>
+            </a:r>
+            <a:r>
+              <a:rPr lang="fr-FR" sz="1050" b="1" cap="small" dirty="0">
+                <a:solidFill>
+                  <a:srgbClr val="00000A"/>
+                </a:solidFill>
+                <a:latin typeface="Malgun Gothic" panose="020B0503020000020004" pitchFamily="34" charset="-127"/>
+                <a:ea typeface="Malgun Gothic" panose="020B0503020000020004" pitchFamily="34" charset="-127"/>
+                <a:cs typeface="Cordia New" panose="020B0304020202020204" pitchFamily="34" charset="-34"/>
+              </a:rPr>
+              <a:t>  </a:t>
             </a:r>
             <a:r>
               <a:rPr lang="fr-FR" sz="1050" dirty="0">
@@ -5854,7 +6052,31 @@
                 <a:ea typeface="Malgun Gothic" panose="020B0503020000020004" pitchFamily="34" charset="-127"/>
                 <a:cs typeface="Angsana New" panose="02020603050405020304" pitchFamily="18" charset="-34"/>
               </a:rPr>
-              <a:t>Chef de projets R&amp;D</a:t>
+              <a:t>R&amp;D </a:t>
+            </a:r>
+            <a:r>
+              <a:rPr lang="fr-FR" sz="1050" b="1" cap="small" dirty="0" err="1">
+                <a:solidFill>
+                  <a:srgbClr val="4F81BD"/>
+                </a:solidFill>
+                <a:effectLst/>
+                <a:latin typeface="Malgun Gothic" panose="020B0503020000020004" pitchFamily="34" charset="-127"/>
+                <a:ea typeface="Malgun Gothic" panose="020B0503020000020004" pitchFamily="34" charset="-127"/>
+                <a:cs typeface="Angsana New" panose="02020603050405020304" pitchFamily="18" charset="-34"/>
+              </a:rPr>
+              <a:t>project</a:t>
+            </a:r>
+            <a:r>
+              <a:rPr lang="fr-FR" sz="1050" b="1" cap="small" dirty="0">
+                <a:solidFill>
+                  <a:srgbClr val="4F81BD"/>
+                </a:solidFill>
+                <a:effectLst/>
+                <a:latin typeface="Malgun Gothic" panose="020B0503020000020004" pitchFamily="34" charset="-127"/>
+                <a:ea typeface="Malgun Gothic" panose="020B0503020000020004" pitchFamily="34" charset="-127"/>
+                <a:cs typeface="Angsana New" panose="02020603050405020304" pitchFamily="18" charset="-34"/>
+              </a:rPr>
+              <a:t> manager</a:t>
             </a:r>
             <a:r>
               <a:rPr lang="fr-FR" sz="1050" dirty="0">
@@ -5866,19 +6088,19 @@
                 <a:ea typeface="Malgun Gothic" panose="020B0503020000020004" pitchFamily="34" charset="-127"/>
                 <a:cs typeface="Angsana New" panose="02020603050405020304" pitchFamily="18" charset="-34"/>
               </a:rPr>
-              <a:t> autour de GRAPHTALK AIA, m</a:t>
-            </a:r>
-            <a:r>
-              <a:rPr lang="fr-FR" sz="1050" dirty="0">
+              <a:t> </a:t>
+            </a:r>
+            <a:r>
+              <a:rPr lang="en-US" sz="1050" dirty="0">
                 <a:solidFill>
                   <a:srgbClr val="595959"/>
                 </a:solidFill>
                 <a:effectLst/>
                 <a:latin typeface="Malgun Gothic" panose="020B0503020000020004" pitchFamily="34" charset="-127"/>
                 <a:ea typeface="Malgun Gothic" panose="020B0503020000020004" pitchFamily="34" charset="-127"/>
-                <a:cs typeface="Calibri" panose="020F0502020204030204" pitchFamily="34" charset="0"/>
-              </a:rPr>
-              <a:t>anagement de plusieurs équipes R&amp;D en France et en Bulgarie jusqu’à 8 personnes.</a:t>
+                <a:cs typeface="Angsana New" panose="02020603050405020304" pitchFamily="18" charset="-34"/>
+              </a:rPr>
+              <a:t>around GRAPHTALK AIA, management of several R&amp;D teams in France and Bulgaria up to 8 people.</a:t>
             </a:r>
             <a:endParaRPr lang="fr-FR" sz="1050" dirty="0">
               <a:solidFill>
@@ -5913,6 +6135,18 @@
               </a:tabLst>
             </a:pPr>
             <a:r>
+              <a:rPr lang="fr-FR" sz="1050" b="1" i="1" dirty="0" err="1">
+                <a:solidFill>
+                  <a:srgbClr val="595959"/>
+                </a:solidFill>
+                <a:effectLst/>
+                <a:latin typeface="Malgun Gothic" panose="020B0503020000020004" pitchFamily="34" charset="-127"/>
+                <a:ea typeface="Malgun Gothic" panose="020B0503020000020004" pitchFamily="34" charset="-127"/>
+                <a:cs typeface="Calibri" panose="020F0502020204030204" pitchFamily="34" charset="0"/>
+              </a:rPr>
+              <a:t>Examples</a:t>
+            </a:r>
+            <a:r>
               <a:rPr lang="fr-FR" sz="1050" b="1" i="1" dirty="0">
                 <a:solidFill>
                   <a:srgbClr val="595959"/>
@@ -5922,21 +6156,59 @@
                 <a:ea typeface="Malgun Gothic" panose="020B0503020000020004" pitchFamily="34" charset="-127"/>
                 <a:cs typeface="Calibri" panose="020F0502020204030204" pitchFamily="34" charset="0"/>
               </a:rPr>
-              <a:t>Exemples de projets réalisés :</a:t>
-            </a:r>
-            <a:endParaRPr lang="fr-FR" sz="1050" dirty="0">
-              <a:solidFill>
-                <a:srgbClr val="595959"/>
-              </a:solidFill>
-              <a:effectLst/>
-              <a:latin typeface="Malgun Gothic" panose="020B0503020000020004" pitchFamily="34" charset="-127"/>
-              <a:ea typeface="Malgun Gothic" panose="020B0503020000020004" pitchFamily="34" charset="-127"/>
-              <a:cs typeface="Angsana New" panose="02020603050405020304" pitchFamily="18" charset="-34"/>
-            </a:endParaRPr>
-          </a:p>
-          <a:p>
-            <a:pPr lvl="0" algn="just">
-              <a:buSzPts val="1050"/>
+              <a:t> of </a:t>
+            </a:r>
+            <a:r>
+              <a:rPr lang="fr-FR" sz="1050" b="1" i="1" dirty="0" err="1">
+                <a:solidFill>
+                  <a:srgbClr val="595959"/>
+                </a:solidFill>
+                <a:effectLst/>
+                <a:latin typeface="Malgun Gothic" panose="020B0503020000020004" pitchFamily="34" charset="-127"/>
+                <a:ea typeface="Malgun Gothic" panose="020B0503020000020004" pitchFamily="34" charset="-127"/>
+                <a:cs typeface="Calibri" panose="020F0502020204030204" pitchFamily="34" charset="0"/>
+              </a:rPr>
+              <a:t>completed</a:t>
+            </a:r>
+            <a:r>
+              <a:rPr lang="fr-FR" sz="1050" b="1" i="1" dirty="0">
+                <a:solidFill>
+                  <a:srgbClr val="595959"/>
+                </a:solidFill>
+                <a:effectLst/>
+                <a:latin typeface="Malgun Gothic" panose="020B0503020000020004" pitchFamily="34" charset="-127"/>
+                <a:ea typeface="Malgun Gothic" panose="020B0503020000020004" pitchFamily="34" charset="-127"/>
+                <a:cs typeface="Calibri" panose="020F0502020204030204" pitchFamily="34" charset="0"/>
+              </a:rPr>
+              <a:t> </a:t>
+            </a:r>
+            <a:r>
+              <a:rPr lang="fr-FR" sz="1050" b="1" i="1" dirty="0" err="1">
+                <a:solidFill>
+                  <a:srgbClr val="595959"/>
+                </a:solidFill>
+                <a:effectLst/>
+                <a:latin typeface="Malgun Gothic" panose="020B0503020000020004" pitchFamily="34" charset="-127"/>
+                <a:ea typeface="Malgun Gothic" panose="020B0503020000020004" pitchFamily="34" charset="-127"/>
+                <a:cs typeface="Calibri" panose="020F0502020204030204" pitchFamily="34" charset="0"/>
+              </a:rPr>
+              <a:t>projects</a:t>
+            </a:r>
+            <a:r>
+              <a:rPr lang="fr-FR" sz="1050" b="1" i="1" dirty="0">
+                <a:solidFill>
+                  <a:srgbClr val="595959"/>
+                </a:solidFill>
+                <a:effectLst/>
+                <a:latin typeface="Malgun Gothic" panose="020B0503020000020004" pitchFamily="34" charset="-127"/>
+                <a:ea typeface="Malgun Gothic" panose="020B0503020000020004" pitchFamily="34" charset="-127"/>
+                <a:cs typeface="Calibri" panose="020F0502020204030204" pitchFamily="34" charset="0"/>
+              </a:rPr>
+              <a:t>::</a:t>
+            </a:r>
+          </a:p>
+          <a:p>
+            <a:pPr algn="just">
               <a:tabLst>
                 <a:tab pos="323850" algn="l"/>
               </a:tabLst>
@@ -5951,10 +6223,10 @@
                 <a:ea typeface="Malgun Gothic" panose="020B0503020000020004" pitchFamily="34" charset="-127"/>
                 <a:cs typeface="Calibri" panose="020F0502020204030204" pitchFamily="34" charset="0"/>
               </a:rPr>
-              <a:t>DEVOPS SUR GRAPHTALK AIA </a:t>
-            </a:r>
-            <a:r>
-              <a:rPr lang="fr-FR" sz="1050" dirty="0">
+              <a:t>DEVOPS ON GRAPHTALK AIA </a:t>
+            </a:r>
+            <a:r>
+              <a:rPr lang="en-US" sz="1050" dirty="0">
                 <a:solidFill>
                   <a:srgbClr val="595959"/>
                 </a:solidFill>
@@ -5963,7 +6235,7 @@
                 <a:ea typeface="Malgun Gothic" panose="020B0503020000020004" pitchFamily="34" charset="-127"/>
                 <a:cs typeface="Calibri" panose="020F0502020204030204" pitchFamily="34" charset="0"/>
               </a:rPr>
-              <a:t>Développement d’une chaine d’intégration et de livraison continue sous Jenkins. Création d’une chaîne de validation continue du logiciel avec tests et lancement d’alertes.</a:t>
+              <a:t>Development of an integration chain and continuous delivery under Jenkins. Creation of a continuous validation chain for the software with tests and the launch of alerts.</a:t>
             </a:r>
             <a:endParaRPr lang="fr-FR" sz="1050" dirty="0">
               <a:solidFill>
@@ -5983,7 +6255,7 @@
               </a:tabLst>
             </a:pPr>
             <a:r>
-              <a:rPr lang="fr-FR" sz="1050" b="1" i="1" dirty="0">
+              <a:rPr lang="en-US" sz="1050" b="1" i="1" dirty="0">
                 <a:solidFill>
                   <a:srgbClr val="0070C0"/>
                 </a:solidFill>
@@ -5992,8 +6264,17 @@
                 <a:ea typeface="Malgun Gothic" panose="020B0503020000020004" pitchFamily="34" charset="-127"/>
                 <a:cs typeface="Calibri" panose="020F0502020204030204" pitchFamily="34" charset="0"/>
               </a:rPr>
-              <a:t>INDUSTRIALISATION DE L’INSTALLATION DU LOGICIEL GRAPHTALK </a:t>
-            </a:r>
+              <a:t>INDUSTRIALIZATION OF GRAPHTALK SOFTWARE INSTALLATION</a:t>
+            </a:r>
+            <a:endParaRPr lang="fr-FR" sz="1050" b="1" i="1" dirty="0">
+              <a:solidFill>
+                <a:srgbClr val="0070C0"/>
+              </a:solidFill>
+              <a:effectLst/>
+              <a:latin typeface="Malgun Gothic" panose="020B0503020000020004" pitchFamily="34" charset="-127"/>
+              <a:ea typeface="Malgun Gothic" panose="020B0503020000020004" pitchFamily="34" charset="-127"/>
+              <a:cs typeface="Calibri" panose="020F0502020204030204" pitchFamily="34" charset="0"/>
+            </a:endParaRPr>
           </a:p>
           <a:p>
             <a:pPr lvl="0" algn="just">
@@ -6003,6 +6284,18 @@
               </a:tabLst>
             </a:pPr>
             <a:r>
+              <a:rPr lang="en-US" sz="1050" b="1" i="1" dirty="0">
+                <a:solidFill>
+                  <a:srgbClr val="595959"/>
+                </a:solidFill>
+                <a:effectLst/>
+                <a:latin typeface="Malgun Gothic" panose="020B0503020000020004" pitchFamily="34" charset="-127"/>
+                <a:ea typeface="Malgun Gothic" panose="020B0503020000020004" pitchFamily="34" charset="-127"/>
+                <a:cs typeface="Calibri" panose="020F0502020204030204" pitchFamily="34" charset="0"/>
+              </a:rPr>
+              <a:t>Responsible for the Delivery Manager project 2007-2014: team of 8 people</a:t>
+            </a:r>
+            <a:r>
               <a:rPr lang="fr-FR" sz="1050" b="1" i="1" dirty="0">
                 <a:solidFill>
                   <a:srgbClr val="595959"/>
@@ -6012,10 +6305,10 @@
                 <a:ea typeface="Malgun Gothic" panose="020B0503020000020004" pitchFamily="34" charset="-127"/>
                 <a:cs typeface="Calibri" panose="020F0502020204030204" pitchFamily="34" charset="0"/>
               </a:rPr>
-              <a:t>Responsable du projet Delivery Manager 2007-2014 : équipe de 5 personnes : </a:t>
-            </a:r>
-            <a:r>
-              <a:rPr lang="fr-FR" sz="1050" dirty="0">
+              <a:t>: </a:t>
+            </a:r>
+            <a:r>
+              <a:rPr lang="en-US" sz="1050" dirty="0">
                 <a:solidFill>
                   <a:srgbClr val="595959"/>
                 </a:solidFill>
@@ -6024,10 +6317,10 @@
                 <a:ea typeface="Malgun Gothic" panose="020B0503020000020004" pitchFamily="34" charset="-127"/>
                 <a:cs typeface="Calibri" panose="020F0502020204030204" pitchFamily="34" charset="0"/>
               </a:rPr>
-              <a:t>Outil d’automatisation de l’installation de </a:t>
-            </a:r>
-            <a:r>
-              <a:rPr lang="fr-FR" sz="1050" dirty="0" err="1">
+              <a:t>Tool for automating the installation of </a:t>
+            </a:r>
+            <a:r>
+              <a:rPr lang="en-US" sz="1050" dirty="0" err="1">
                 <a:solidFill>
                   <a:srgbClr val="595959"/>
                 </a:solidFill>
@@ -6039,7 +6332,7 @@
               <a:t>Graphtalk</a:t>
             </a:r>
             <a:r>
-              <a:rPr lang="fr-FR" sz="1050" dirty="0">
+              <a:rPr lang="en-US" sz="1050" dirty="0">
                 <a:solidFill>
                   <a:srgbClr val="595959"/>
                 </a:solidFill>
@@ -6048,55 +6341,7 @@
                 <a:ea typeface="Malgun Gothic" panose="020B0503020000020004" pitchFamily="34" charset="-127"/>
                 <a:cs typeface="Calibri" panose="020F0502020204030204" pitchFamily="34" charset="0"/>
               </a:rPr>
-              <a:t> AIA sur sites de production ; </a:t>
-            </a:r>
-            <a:r>
-              <a:rPr lang="fr-FR" sz="1050" b="1" i="1" dirty="0">
-                <a:solidFill>
-                  <a:srgbClr val="595959"/>
-                </a:solidFill>
-                <a:effectLst/>
-                <a:latin typeface="Malgun Gothic" panose="020B0503020000020004" pitchFamily="34" charset="-127"/>
-                <a:ea typeface="Malgun Gothic" panose="020B0503020000020004" pitchFamily="34" charset="-127"/>
-                <a:cs typeface="Calibri" panose="020F0502020204030204" pitchFamily="34" charset="0"/>
-              </a:rPr>
-              <a:t>Product Owner: </a:t>
-            </a:r>
-            <a:r>
-              <a:rPr lang="fr-FR" sz="1050" dirty="0">
-                <a:solidFill>
-                  <a:srgbClr val="595959"/>
-                </a:solidFill>
-                <a:effectLst/>
-                <a:latin typeface="Malgun Gothic" panose="020B0503020000020004" pitchFamily="34" charset="-127"/>
-                <a:ea typeface="Malgun Gothic" panose="020B0503020000020004" pitchFamily="34" charset="-127"/>
-                <a:cs typeface="Calibri" panose="020F0502020204030204" pitchFamily="34" charset="0"/>
-              </a:rPr>
-              <a:t>Migration du logiciel </a:t>
-            </a:r>
-            <a:r>
-              <a:rPr lang="fr-FR" sz="1050" dirty="0" err="1">
-                <a:solidFill>
-                  <a:srgbClr val="595959"/>
-                </a:solidFill>
-                <a:effectLst/>
-                <a:latin typeface="Malgun Gothic" panose="020B0503020000020004" pitchFamily="34" charset="-127"/>
-                <a:ea typeface="Malgun Gothic" panose="020B0503020000020004" pitchFamily="34" charset="-127"/>
-                <a:cs typeface="Calibri" panose="020F0502020204030204" pitchFamily="34" charset="0"/>
-              </a:rPr>
-              <a:t>Graphtalk</a:t>
-            </a:r>
-            <a:r>
-              <a:rPr lang="fr-FR" sz="1050" dirty="0">
-                <a:solidFill>
-                  <a:srgbClr val="595959"/>
-                </a:solidFill>
-                <a:effectLst/>
-                <a:latin typeface="Malgun Gothic" panose="020B0503020000020004" pitchFamily="34" charset="-127"/>
-                <a:ea typeface="Malgun Gothic" panose="020B0503020000020004" pitchFamily="34" charset="-127"/>
-                <a:cs typeface="Calibri" panose="020F0502020204030204" pitchFamily="34" charset="0"/>
-              </a:rPr>
-              <a:t> AIA dans le Cloud AWS </a:t>
+              <a:t> AIA on production sites; </a:t>
             </a:r>
           </a:p>
           <a:p>
@@ -6107,17 +6352,62 @@
               </a:tabLst>
             </a:pPr>
             <a:r>
-              <a:rPr lang="fr-FR" sz="1050" b="1" i="1" dirty="0">
-                <a:solidFill>
-                  <a:srgbClr val="0070C0"/>
+              <a:rPr lang="en-US" sz="1050" b="1" dirty="0">
+                <a:solidFill>
+                  <a:srgbClr val="595959"/>
                 </a:solidFill>
                 <a:effectLst/>
                 <a:latin typeface="Malgun Gothic" panose="020B0503020000020004" pitchFamily="34" charset="-127"/>
                 <a:ea typeface="Malgun Gothic" panose="020B0503020000020004" pitchFamily="34" charset="-127"/>
                 <a:cs typeface="Calibri" panose="020F0502020204030204" pitchFamily="34" charset="0"/>
               </a:rPr>
-              <a:t>PROJETS JOB MANAGER et IPE SOUS GRAPHTALK AIA pour la gestion de production 2003-2007</a:t>
-            </a:r>
+              <a:t>Product Owner</a:t>
+            </a:r>
+            <a:r>
+              <a:rPr lang="en-US" sz="1050" dirty="0">
+                <a:solidFill>
+                  <a:srgbClr val="595959"/>
+                </a:solidFill>
+                <a:effectLst/>
+                <a:latin typeface="Malgun Gothic" panose="020B0503020000020004" pitchFamily="34" charset="-127"/>
+                <a:ea typeface="Malgun Gothic" panose="020B0503020000020004" pitchFamily="34" charset="-127"/>
+                <a:cs typeface="Calibri" panose="020F0502020204030204" pitchFamily="34" charset="0"/>
+              </a:rPr>
+              <a:t>: Migrating </a:t>
+            </a:r>
+            <a:r>
+              <a:rPr lang="en-US" sz="1050" dirty="0" err="1">
+                <a:solidFill>
+                  <a:srgbClr val="595959"/>
+                </a:solidFill>
+                <a:effectLst/>
+                <a:latin typeface="Malgun Gothic" panose="020B0503020000020004" pitchFamily="34" charset="-127"/>
+                <a:ea typeface="Malgun Gothic" panose="020B0503020000020004" pitchFamily="34" charset="-127"/>
+                <a:cs typeface="Calibri" panose="020F0502020204030204" pitchFamily="34" charset="0"/>
+              </a:rPr>
+              <a:t>Graphtalk</a:t>
+            </a:r>
+            <a:r>
+              <a:rPr lang="en-US" sz="1050" dirty="0">
+                <a:solidFill>
+                  <a:srgbClr val="595959"/>
+                </a:solidFill>
+                <a:effectLst/>
+                <a:latin typeface="Malgun Gothic" panose="020B0503020000020004" pitchFamily="34" charset="-127"/>
+                <a:ea typeface="Malgun Gothic" panose="020B0503020000020004" pitchFamily="34" charset="-127"/>
+                <a:cs typeface="Calibri" panose="020F0502020204030204" pitchFamily="34" charset="0"/>
+              </a:rPr>
+              <a:t> AIA software to the AWS Cloud</a:t>
+            </a:r>
+            <a:endParaRPr lang="fr-FR" sz="1050" dirty="0">
+              <a:solidFill>
+                <a:srgbClr val="595959"/>
+              </a:solidFill>
+              <a:effectLst/>
+              <a:latin typeface="Malgun Gothic" panose="020B0503020000020004" pitchFamily="34" charset="-127"/>
+              <a:ea typeface="Malgun Gothic" panose="020B0503020000020004" pitchFamily="34" charset="-127"/>
+              <a:cs typeface="Calibri" panose="020F0502020204030204" pitchFamily="34" charset="0"/>
+            </a:endParaRPr>
           </a:p>
           <a:p>
             <a:pPr lvl="0" algn="just">
@@ -6129,49 +6419,14 @@
             <a:r>
               <a:rPr lang="fr-FR" sz="1050" b="1" i="1" dirty="0">
                 <a:solidFill>
-                  <a:srgbClr val="595959"/>
-                </a:solidFill>
-                <a:effectLst/>
-                <a:latin typeface="Malgun Gothic" panose="020B0503020000020004" pitchFamily="34" charset="-127"/>
-                <a:ea typeface="Malgun Gothic" panose="020B0503020000020004" pitchFamily="34" charset="-127"/>
-                <a:cs typeface="Angsana New" panose="02020603050405020304" pitchFamily="18" charset="-34"/>
-              </a:rPr>
-              <a:t>Responsable des projets : équipe de 8 personnes en France et Bulgarie : </a:t>
-            </a:r>
-            <a:r>
-              <a:rPr lang="fr-FR" sz="1050" dirty="0">
-                <a:solidFill>
-                  <a:srgbClr val="595959"/>
+                  <a:srgbClr val="0070C0"/>
                 </a:solidFill>
                 <a:effectLst/>
                 <a:latin typeface="Malgun Gothic" panose="020B0503020000020004" pitchFamily="34" charset="-127"/>
                 <a:ea typeface="Malgun Gothic" panose="020B0503020000020004" pitchFamily="34" charset="-127"/>
                 <a:cs typeface="Calibri" panose="020F0502020204030204" pitchFamily="34" charset="0"/>
               </a:rPr>
-              <a:t>Job Manager : Logiciel de Lancement et d’organisation de processus asynchrones lors du traitement de contrats d’assurances </a:t>
-            </a:r>
-            <a:r>
-              <a:rPr lang="fr-FR" sz="1050" dirty="0">
-                <a:solidFill>
-                  <a:srgbClr val="595959"/>
-                </a:solidFill>
-                <a:latin typeface="Malgun Gothic" panose="020B0503020000020004" pitchFamily="34" charset="-127"/>
-                <a:ea typeface="Malgun Gothic" panose="020B0503020000020004" pitchFamily="34" charset="-127"/>
-                <a:cs typeface="Angsana New" panose="02020603050405020304" pitchFamily="18" charset="-34"/>
-              </a:rPr>
-              <a:t>/ </a:t>
-            </a:r>
-            <a:r>
-              <a:rPr lang="fr-FR" sz="1050" dirty="0">
-                <a:solidFill>
-                  <a:srgbClr val="595959"/>
-                </a:solidFill>
-                <a:effectLst/>
-                <a:latin typeface="Malgun Gothic" panose="020B0503020000020004" pitchFamily="34" charset="-127"/>
-                <a:ea typeface="Malgun Gothic" panose="020B0503020000020004" pitchFamily="34" charset="-127"/>
-                <a:cs typeface="Calibri" panose="020F0502020204030204" pitchFamily="34" charset="0"/>
-              </a:rPr>
-              <a:t>IPE : logiciel de gestion des environnements de production </a:t>
+              <a:t>PROJETS JOB MANAGER et IPE SOUS GRAPHTALK AIA pour la gestion de production 2003-2007</a:t>
             </a:r>
           </a:p>
           <a:p>
@@ -6182,16 +6437,52 @@
               </a:tabLst>
             </a:pPr>
             <a:r>
+              <a:rPr lang="en-US" sz="1050" b="1" i="1" dirty="0">
+                <a:solidFill>
+                  <a:srgbClr val="595959"/>
+                </a:solidFill>
+                <a:effectLst/>
+                <a:latin typeface="Malgun Gothic" panose="020B0503020000020004" pitchFamily="34" charset="-127"/>
+                <a:ea typeface="Malgun Gothic" panose="020B0503020000020004" pitchFamily="34" charset="-127"/>
+                <a:cs typeface="Angsana New" panose="02020603050405020304" pitchFamily="18" charset="-34"/>
+              </a:rPr>
+              <a:t>Project manager: team of 8 people in France and Bulgaria </a:t>
+            </a:r>
+            <a:r>
               <a:rPr lang="fr-FR" sz="1050" b="1" i="1" dirty="0">
                 <a:solidFill>
-                  <a:srgbClr val="0070C0"/>
+                  <a:srgbClr val="595959"/>
+                </a:solidFill>
+                <a:effectLst/>
+                <a:latin typeface="Malgun Gothic" panose="020B0503020000020004" pitchFamily="34" charset="-127"/>
+                <a:ea typeface="Malgun Gothic" panose="020B0503020000020004" pitchFamily="34" charset="-127"/>
+                <a:cs typeface="Angsana New" panose="02020603050405020304" pitchFamily="18" charset="-34"/>
+              </a:rPr>
+              <a:t>: </a:t>
+            </a:r>
+            <a:r>
+              <a:rPr lang="fr-FR" sz="1050" dirty="0">
+                <a:solidFill>
+                  <a:srgbClr val="595959"/>
                 </a:solidFill>
                 <a:effectLst/>
                 <a:latin typeface="Malgun Gothic" panose="020B0503020000020004" pitchFamily="34" charset="-127"/>
                 <a:ea typeface="Malgun Gothic" panose="020B0503020000020004" pitchFamily="34" charset="-127"/>
                 <a:cs typeface="Calibri" panose="020F0502020204030204" pitchFamily="34" charset="0"/>
               </a:rPr>
-              <a:t>PROJET INTERFACE GRAPHIQUE (GUI) DE GRAPHTALK AIA 2000-2003</a:t>
+              <a:t>Job Manager : </a:t>
+            </a:r>
+            <a:r>
+              <a:rPr lang="en-US" sz="1050" dirty="0">
+                <a:solidFill>
+                  <a:srgbClr val="595959"/>
+                </a:solidFill>
+                <a:effectLst/>
+                <a:latin typeface="Malgun Gothic" panose="020B0503020000020004" pitchFamily="34" charset="-127"/>
+                <a:ea typeface="Malgun Gothic" panose="020B0503020000020004" pitchFamily="34" charset="-127"/>
+                <a:cs typeface="Calibri" panose="020F0502020204030204" pitchFamily="34" charset="0"/>
+              </a:rPr>
+              <a:t>Software for launching and organizing asynchronous processes when processing insurance contracts / IPE: software for managing production environments</a:t>
             </a:r>
           </a:p>
           <a:p>
@@ -6201,9 +6492,45 @@
                 <a:tab pos="323850" algn="l"/>
               </a:tabLst>
             </a:pPr>
+            <a:endParaRPr lang="en-US" sz="1050" b="1" i="1" dirty="0">
+              <a:solidFill>
+                <a:srgbClr val="595959"/>
+              </a:solidFill>
+              <a:latin typeface="Malgun Gothic" panose="020B0503020000020004" pitchFamily="34" charset="-127"/>
+              <a:ea typeface="Malgun Gothic" panose="020B0503020000020004" pitchFamily="34" charset="-127"/>
+              <a:cs typeface="Calibri" panose="020F0502020204030204" pitchFamily="34" charset="0"/>
+            </a:endParaRPr>
+          </a:p>
+          <a:p>
+            <a:pPr lvl="0" algn="just">
+              <a:buSzPts val="1050"/>
+              <a:tabLst>
+                <a:tab pos="323850" algn="l"/>
+              </a:tabLst>
+            </a:pPr>
             <a:r>
               <a:rPr lang="fr-FR" sz="1050" b="1" i="1" dirty="0">
                 <a:solidFill>
+                  <a:srgbClr val="0070C0"/>
+                </a:solidFill>
+                <a:effectLst/>
+                <a:latin typeface="Malgun Gothic" panose="020B0503020000020004" pitchFamily="34" charset="-127"/>
+                <a:ea typeface="Malgun Gothic" panose="020B0503020000020004" pitchFamily="34" charset="-127"/>
+                <a:cs typeface="Calibri" panose="020F0502020204030204" pitchFamily="34" charset="0"/>
+              </a:rPr>
+              <a:t>GRAPHTALK AIA 2000-2003 GRAPHIC INTERFACE (GUI) PROJECT</a:t>
+            </a:r>
+          </a:p>
+          <a:p>
+            <a:pPr lvl="0" algn="just">
+              <a:buSzPts val="1050"/>
+              <a:tabLst>
+                <a:tab pos="323850" algn="l"/>
+              </a:tabLst>
+            </a:pPr>
+            <a:r>
+              <a:rPr lang="en-US" sz="1050" b="1" i="1" dirty="0">
+                <a:solidFill>
                   <a:srgbClr val="595959"/>
                 </a:solidFill>
                 <a:effectLst/>
@@ -6211,10 +6538,10 @@
                 <a:ea typeface="Malgun Gothic" panose="020B0503020000020004" pitchFamily="34" charset="-127"/>
                 <a:cs typeface="Angsana New" panose="02020603050405020304" pitchFamily="18" charset="-34"/>
               </a:rPr>
-              <a:t>Responsable du projet : équipe de 5 personnes en France : </a:t>
-            </a:r>
-            <a:r>
-              <a:rPr lang="fr-FR" sz="1050" dirty="0">
+              <a:t>Project manager: team of 5 people in France </a:t>
+            </a:r>
+            <a:r>
+              <a:rPr lang="fr-FR" sz="1050" b="1" i="1" dirty="0">
                 <a:solidFill>
                   <a:srgbClr val="595959"/>
                 </a:solidFill>
@@ -6223,19 +6550,19 @@
                 <a:ea typeface="Malgun Gothic" panose="020B0503020000020004" pitchFamily="34" charset="-127"/>
                 <a:cs typeface="Angsana New" panose="02020603050405020304" pitchFamily="18" charset="-34"/>
               </a:rPr>
-              <a:t>Organisation et participation au développement de l’interface Graphique (Windows et Web) du logiciel GRAPHTALK AIA</a:t>
-            </a:r>
-            <a:r>
-              <a:rPr lang="fr-FR" sz="1050" dirty="0">
+              <a:t>: </a:t>
+            </a:r>
+            <a:r>
+              <a:rPr lang="en-US" sz="1050" dirty="0">
                 <a:solidFill>
                   <a:srgbClr val="595959"/>
                 </a:solidFill>
                 <a:effectLst/>
                 <a:latin typeface="Malgun Gothic" panose="020B0503020000020004" pitchFamily="34" charset="-127"/>
                 <a:ea typeface="Malgun Gothic" panose="020B0503020000020004" pitchFamily="34" charset="-127"/>
-                <a:cs typeface="Calibri" panose="020F0502020204030204" pitchFamily="34" charset="0"/>
-              </a:rPr>
-              <a:t>.</a:t>
+                <a:cs typeface="Angsana New" panose="02020603050405020304" pitchFamily="18" charset="-34"/>
+              </a:rPr>
+              <a:t>Organization and participation in the development of the graphical interface (Windows and Web) of the GRAPHTALK AIA software.</a:t>
             </a:r>
             <a:endParaRPr lang="fr-FR" sz="1050" dirty="0">
               <a:solidFill>
@@ -6278,7 +6605,7 @@
               <a:t>TAGG informatique – </a:t>
             </a:r>
             <a:r>
-              <a:rPr lang="fr-FR" sz="1050" b="0" cap="all" dirty="0">
+              <a:rPr lang="en-US" sz="1050" b="0" cap="all" dirty="0">
                 <a:solidFill>
                   <a:srgbClr val="404040"/>
                 </a:solidFill>
@@ -6287,8 +6614,17 @@
                 <a:ea typeface="Malgun Gothic" panose="020B0503020000020004" pitchFamily="34" charset="-127"/>
                 <a:cs typeface="Cordia New" panose="020B0304020202020204" pitchFamily="34" charset="-34"/>
               </a:rPr>
-              <a:t>secteur d’activité : TRAITEMENTS DE DONNEES, IMPRESSIONS PERSONNALISEES DE DOCUMENTS, SOLUTION DE VOTE</a:t>
-            </a:r>
+              <a:t>sector of activity: DATA PROCESSING, PERSONALIZED PRINTING OF DOCUMENTS, VOTING SOLUTION</a:t>
+            </a:r>
+            <a:endParaRPr lang="fr-FR" sz="1050" b="0" cap="all" dirty="0">
+              <a:solidFill>
+                <a:srgbClr val="404040"/>
+              </a:solidFill>
+              <a:effectLst/>
+              <a:latin typeface="Malgun Gothic" panose="020B0503020000020004" pitchFamily="34" charset="-127"/>
+              <a:ea typeface="Malgun Gothic" panose="020B0503020000020004" pitchFamily="34" charset="-127"/>
+              <a:cs typeface="Cordia New" panose="020B0304020202020204" pitchFamily="34" charset="-34"/>
+            </a:endParaRPr>
           </a:p>
           <a:p>
             <a:pPr algn="just"/>
@@ -6301,7 +6637,29 @@
                 <a:ea typeface="Malgun Gothic" panose="020B0503020000020004" pitchFamily="34" charset="-127"/>
                 <a:cs typeface="Cordia New" panose="020B0304020202020204" pitchFamily="34" charset="-34"/>
               </a:rPr>
-              <a:t>Postes occupés </a:t>
+              <a:t>Positions </a:t>
+            </a:r>
+            <a:r>
+              <a:rPr lang="fr-FR" sz="1050" b="1" cap="small" dirty="0" err="1">
+                <a:solidFill>
+                  <a:srgbClr val="00000A"/>
+                </a:solidFill>
+                <a:latin typeface="Malgun Gothic" panose="020B0503020000020004" pitchFamily="34" charset="-127"/>
+                <a:ea typeface="Malgun Gothic" panose="020B0503020000020004" pitchFamily="34" charset="-127"/>
+                <a:cs typeface="Cordia New" panose="020B0304020202020204" pitchFamily="34" charset="-34"/>
+              </a:rPr>
+              <a:t>held</a:t>
+            </a:r>
+            <a:r>
+              <a:rPr lang="fr-FR" sz="1050" b="1" cap="small" dirty="0">
+                <a:solidFill>
+                  <a:srgbClr val="00000A"/>
+                </a:solidFill>
+                <a:latin typeface="Malgun Gothic" panose="020B0503020000020004" pitchFamily="34" charset="-127"/>
+                <a:ea typeface="Malgun Gothic" panose="020B0503020000020004" pitchFamily="34" charset="-127"/>
+                <a:cs typeface="Cordia New" panose="020B0304020202020204" pitchFamily="34" charset="-34"/>
+              </a:rPr>
+              <a:t> :</a:t>
             </a:r>
             <a:r>
               <a:rPr lang="fr-FR" sz="1050" dirty="0">
@@ -6313,7 +6671,7 @@
                 <a:ea typeface="Malgun Gothic" panose="020B0503020000020004" pitchFamily="34" charset="-127"/>
                 <a:cs typeface="Angsana New" panose="02020603050405020304" pitchFamily="18" charset="-34"/>
               </a:rPr>
-              <a:t>: </a:t>
+              <a:t> </a:t>
             </a:r>
             <a:r>
               <a:rPr lang="fr-FR" sz="1050" b="1" cap="small" dirty="0">
@@ -6325,7 +6683,7 @@
                 <a:ea typeface="Malgun Gothic" panose="020B0503020000020004" pitchFamily="34" charset="-127"/>
                 <a:cs typeface="Angsana New" panose="02020603050405020304" pitchFamily="18" charset="-34"/>
               </a:rPr>
-              <a:t>Développeur à Chef de projets</a:t>
+              <a:t>Developer to Project Manager</a:t>
             </a:r>
           </a:p>
           <a:p>
@@ -6352,7 +6710,7 @@
                 <a:ea typeface="Malgun Gothic" panose="020B0503020000020004" pitchFamily="34" charset="-127"/>
                 <a:cs typeface="Calibri" panose="020F0502020204030204" pitchFamily="34" charset="0"/>
               </a:rPr>
-              <a:t>Responsable de l'équipe de développement</a:t>
+              <a:t>Development team leader: </a:t>
             </a:r>
             <a:r>
               <a:rPr lang="fr-FR" sz="1050" dirty="0">
@@ -6364,8 +6722,29 @@
                 <a:ea typeface="Malgun Gothic" panose="020B0503020000020004" pitchFamily="34" charset="-127"/>
                 <a:cs typeface="Calibri" panose="020F0502020204030204" pitchFamily="34" charset="0"/>
               </a:rPr>
-              <a:t> : animation d’une équipe de 7 personnes.</a:t>
-            </a:r>
+              <a:t>:</a:t>
+            </a:r>
+            <a:r>
+              <a:rPr lang="en-US" sz="1050" dirty="0">
+                <a:solidFill>
+                  <a:srgbClr val="595959"/>
+                </a:solidFill>
+                <a:effectLst/>
+                <a:latin typeface="Malgun Gothic" panose="020B0503020000020004" pitchFamily="34" charset="-127"/>
+                <a:ea typeface="Malgun Gothic" panose="020B0503020000020004" pitchFamily="34" charset="-127"/>
+                <a:cs typeface="Calibri" panose="020F0502020204030204" pitchFamily="34" charset="0"/>
+              </a:rPr>
+              <a:t>leading a team of 7 people.</a:t>
+            </a:r>
+            <a:endParaRPr lang="fr-FR" sz="1050" dirty="0">
+              <a:solidFill>
+                <a:srgbClr val="595959"/>
+              </a:solidFill>
+              <a:effectLst/>
+              <a:latin typeface="Malgun Gothic" panose="020B0503020000020004" pitchFamily="34" charset="-127"/>
+              <a:ea typeface="Malgun Gothic" panose="020B0503020000020004" pitchFamily="34" charset="-127"/>
+              <a:cs typeface="Calibri" panose="020F0502020204030204" pitchFamily="34" charset="0"/>
+            </a:endParaRPr>
           </a:p>
           <a:p>
             <a:pPr lvl="0" algn="just">
@@ -6375,40 +6754,52 @@
               </a:tabLst>
             </a:pPr>
             <a:r>
+              <a:rPr lang="fr-FR" sz="1050" dirty="0" err="1">
+                <a:solidFill>
+                  <a:srgbClr val="0070C0"/>
+                </a:solidFill>
+                <a:effectLst/>
+                <a:latin typeface="Malgun Gothic" panose="020B0503020000020004" pitchFamily="34" charset="-127"/>
+                <a:ea typeface="Malgun Gothic" panose="020B0503020000020004" pitchFamily="34" charset="-127"/>
+                <a:cs typeface="Calibri" panose="020F0502020204030204" pitchFamily="34" charset="0"/>
+              </a:rPr>
+              <a:t>TaggImage</a:t>
+            </a:r>
+            <a:r>
+              <a:rPr lang="fr-FR" sz="1050">
+                <a:solidFill>
+                  <a:srgbClr val="0070C0"/>
+                </a:solidFill>
+                <a:effectLst/>
+                <a:latin typeface="Malgun Gothic" panose="020B0503020000020004" pitchFamily="34" charset="-127"/>
+                <a:ea typeface="Malgun Gothic" panose="020B0503020000020004" pitchFamily="34" charset="-127"/>
+                <a:cs typeface="Calibri" panose="020F0502020204030204" pitchFamily="34" charset="0"/>
+              </a:rPr>
+              <a:t> Project Manager:: </a:t>
+            </a:r>
+            <a:r>
+              <a:rPr lang="fr-FR" sz="1050">
+                <a:solidFill>
+                  <a:srgbClr val="595959"/>
+                </a:solidFill>
+                <a:effectLst/>
+                <a:latin typeface="Malgun Gothic" panose="020B0503020000020004" pitchFamily="34" charset="-127"/>
+                <a:ea typeface="Malgun Gothic" panose="020B0503020000020004" pitchFamily="34" charset="-127"/>
+                <a:cs typeface="Calibri" panose="020F0502020204030204" pitchFamily="34" charset="0"/>
+              </a:rPr>
+              <a:t> </a:t>
+            </a:r>
+            <a:r>
               <a:rPr lang="fr-FR" sz="1050" dirty="0">
                 <a:solidFill>
-                  <a:srgbClr val="0070C0"/>
+                  <a:srgbClr val="595959"/>
                 </a:solidFill>
                 <a:effectLst/>
                 <a:latin typeface="Malgun Gothic" panose="020B0503020000020004" pitchFamily="34" charset="-127"/>
                 <a:ea typeface="Malgun Gothic" panose="020B0503020000020004" pitchFamily="34" charset="-127"/>
                 <a:cs typeface="Calibri" panose="020F0502020204030204" pitchFamily="34" charset="0"/>
               </a:rPr>
-              <a:t>Responsable du projet </a:t>
-            </a:r>
-            <a:r>
-              <a:rPr lang="fr-FR" sz="1050" dirty="0" err="1">
-                <a:solidFill>
-                  <a:srgbClr val="0070C0"/>
-                </a:solidFill>
-                <a:effectLst/>
-                <a:latin typeface="Malgun Gothic" panose="020B0503020000020004" pitchFamily="34" charset="-127"/>
-                <a:ea typeface="Malgun Gothic" panose="020B0503020000020004" pitchFamily="34" charset="-127"/>
-                <a:cs typeface="Calibri" panose="020F0502020204030204" pitchFamily="34" charset="0"/>
-              </a:rPr>
-              <a:t>TaggImage</a:t>
-            </a:r>
-            <a:r>
-              <a:rPr lang="fr-FR" sz="1050" dirty="0">
-                <a:solidFill>
-                  <a:srgbClr val="595959"/>
-                </a:solidFill>
-                <a:effectLst/>
-                <a:latin typeface="Malgun Gothic" panose="020B0503020000020004" pitchFamily="34" charset="-127"/>
-                <a:ea typeface="Malgun Gothic" panose="020B0503020000020004" pitchFamily="34" charset="-127"/>
-                <a:cs typeface="Calibri" panose="020F0502020204030204" pitchFamily="34" charset="0"/>
-              </a:rPr>
-              <a:t> : Informatisation d'un contrôle caméra de documents imprimés par comparaison de modèles. Contrôle qualité sur des impressions en très grosses quantités (plusieurs dizaines de milliers) à très grande vitesse. </a:t>
+              <a:t>Informatisation d'un contrôle caméra de documents imprimés par comparaison de modèles. Contrôle qualité sur des impressions en très grosses quantités (plusieurs dizaines de milliers) à très grande vitesse. </a:t>
             </a:r>
           </a:p>
           <a:p>

</xml_diff>

<commit_message>
Fin de la traduction en anglais du CV avant revue
</commit_message>
<xml_diff>
--- a/CV_FFROMAGER.pptx
+++ b/CV_FFROMAGER.pptx
@@ -198,7 +198,7 @@
           <a:p>
             <a:fld id="{0B931C3E-6BFC-4638-BB9C-51D3F831E5AB}" type="datetimeFigureOut">
               <a:rPr lang="fr-FR" smtClean="0"/>
-              <a:t>01/04/2023</a:t>
+              <a:t>02/04/2023</a:t>
             </a:fld>
             <a:endParaRPr lang="fr-FR"/>
           </a:p>
@@ -596,7 +596,7 @@
           <a:p>
             <a:fld id="{599F6D61-D8C0-4321-8F41-5FC8A4129D8A}" type="datetimeFigureOut">
               <a:rPr lang="fr-FR" smtClean="0"/>
-              <a:t>01/04/2023</a:t>
+              <a:t>02/04/2023</a:t>
             </a:fld>
             <a:endParaRPr lang="fr-FR"/>
           </a:p>
@@ -766,7 +766,7 @@
           <a:p>
             <a:fld id="{599F6D61-D8C0-4321-8F41-5FC8A4129D8A}" type="datetimeFigureOut">
               <a:rPr lang="fr-FR" smtClean="0"/>
-              <a:t>01/04/2023</a:t>
+              <a:t>02/04/2023</a:t>
             </a:fld>
             <a:endParaRPr lang="fr-FR"/>
           </a:p>
@@ -946,7 +946,7 @@
           <a:p>
             <a:fld id="{599F6D61-D8C0-4321-8F41-5FC8A4129D8A}" type="datetimeFigureOut">
               <a:rPr lang="fr-FR" smtClean="0"/>
-              <a:t>01/04/2023</a:t>
+              <a:t>02/04/2023</a:t>
             </a:fld>
             <a:endParaRPr lang="fr-FR"/>
           </a:p>
@@ -1116,7 +1116,7 @@
           <a:p>
             <a:fld id="{599F6D61-D8C0-4321-8F41-5FC8A4129D8A}" type="datetimeFigureOut">
               <a:rPr lang="fr-FR" smtClean="0"/>
-              <a:t>01/04/2023</a:t>
+              <a:t>02/04/2023</a:t>
             </a:fld>
             <a:endParaRPr lang="fr-FR"/>
           </a:p>
@@ -1360,7 +1360,7 @@
           <a:p>
             <a:fld id="{599F6D61-D8C0-4321-8F41-5FC8A4129D8A}" type="datetimeFigureOut">
               <a:rPr lang="fr-FR" smtClean="0"/>
-              <a:t>01/04/2023</a:t>
+              <a:t>02/04/2023</a:t>
             </a:fld>
             <a:endParaRPr lang="fr-FR"/>
           </a:p>
@@ -1592,7 +1592,7 @@
           <a:p>
             <a:fld id="{599F6D61-D8C0-4321-8F41-5FC8A4129D8A}" type="datetimeFigureOut">
               <a:rPr lang="fr-FR" smtClean="0"/>
-              <a:t>01/04/2023</a:t>
+              <a:t>02/04/2023</a:t>
             </a:fld>
             <a:endParaRPr lang="fr-FR"/>
           </a:p>
@@ -1959,7 +1959,7 @@
           <a:p>
             <a:fld id="{599F6D61-D8C0-4321-8F41-5FC8A4129D8A}" type="datetimeFigureOut">
               <a:rPr lang="fr-FR" smtClean="0"/>
-              <a:t>01/04/2023</a:t>
+              <a:t>02/04/2023</a:t>
             </a:fld>
             <a:endParaRPr lang="fr-FR"/>
           </a:p>
@@ -2077,7 +2077,7 @@
           <a:p>
             <a:fld id="{599F6D61-D8C0-4321-8F41-5FC8A4129D8A}" type="datetimeFigureOut">
               <a:rPr lang="fr-FR" smtClean="0"/>
-              <a:t>01/04/2023</a:t>
+              <a:t>02/04/2023</a:t>
             </a:fld>
             <a:endParaRPr lang="fr-FR"/>
           </a:p>
@@ -2172,7 +2172,7 @@
           <a:p>
             <a:fld id="{599F6D61-D8C0-4321-8F41-5FC8A4129D8A}" type="datetimeFigureOut">
               <a:rPr lang="fr-FR" smtClean="0"/>
-              <a:t>01/04/2023</a:t>
+              <a:t>02/04/2023</a:t>
             </a:fld>
             <a:endParaRPr lang="fr-FR"/>
           </a:p>
@@ -2449,7 +2449,7 @@
           <a:p>
             <a:fld id="{599F6D61-D8C0-4321-8F41-5FC8A4129D8A}" type="datetimeFigureOut">
               <a:rPr lang="fr-FR" smtClean="0"/>
-              <a:t>01/04/2023</a:t>
+              <a:t>02/04/2023</a:t>
             </a:fld>
             <a:endParaRPr lang="fr-FR"/>
           </a:p>
@@ -2706,7 +2706,7 @@
           <a:p>
             <a:fld id="{599F6D61-D8C0-4321-8F41-5FC8A4129D8A}" type="datetimeFigureOut">
               <a:rPr lang="fr-FR" smtClean="0"/>
-              <a:t>01/04/2023</a:t>
+              <a:t>02/04/2023</a:t>
             </a:fld>
             <a:endParaRPr lang="fr-FR"/>
           </a:p>
@@ -2919,7 +2919,7 @@
           <a:p>
             <a:fld id="{599F6D61-D8C0-4321-8F41-5FC8A4129D8A}" type="datetimeFigureOut">
               <a:rPr lang="fr-FR" smtClean="0"/>
-              <a:t>01/04/2023</a:t>
+              <a:t>02/04/2023</a:t>
             </a:fld>
             <a:endParaRPr lang="fr-FR"/>
           </a:p>
@@ -3473,29 +3473,8 @@
                 <a:latin typeface="Malgun Gothic" panose="020B0503020000020004" pitchFamily="34" charset="-127"/>
                 <a:ea typeface="Malgun Gothic" panose="020B0503020000020004" pitchFamily="34" charset="-127"/>
               </a:rPr>
-              <a:t>Technical </a:t>
-            </a:r>
-            <a:r>
-              <a:rPr lang="fr-FR" sz="1400" b="1" dirty="0" err="1">
-                <a:solidFill>
-                  <a:schemeClr val="accent1">
-                    <a:lumMod val="50000"/>
-                  </a:schemeClr>
-                </a:solidFill>
-                <a:latin typeface="Malgun Gothic" panose="020B0503020000020004" pitchFamily="34" charset="-127"/>
-                <a:ea typeface="Malgun Gothic" panose="020B0503020000020004" pitchFamily="34" charset="-127"/>
-              </a:rPr>
-              <a:t>skills</a:t>
-            </a:r>
-            <a:endParaRPr lang="fr-FR" sz="1400" b="1" dirty="0">
-              <a:solidFill>
-                <a:schemeClr val="accent1">
-                  <a:lumMod val="50000"/>
-                </a:schemeClr>
-              </a:solidFill>
-              <a:latin typeface="Malgun Gothic" panose="020B0503020000020004" pitchFamily="34" charset="-127"/>
-              <a:ea typeface="Malgun Gothic" panose="020B0503020000020004" pitchFamily="34" charset="-127"/>
-            </a:endParaRPr>
+              <a:t>TECHNICAL SKILLS</a:t>
+            </a:r>
           </a:p>
         </p:txBody>
       </p:sp>
@@ -3584,7 +3563,7 @@
         </p:nvSpPr>
         <p:spPr>
           <a:xfrm>
-            <a:off x="201513" y="3610873"/>
+            <a:off x="136431" y="3610873"/>
             <a:ext cx="1971419" cy="307777"/>
           </a:xfrm>
           <a:prstGeom prst="rect">
@@ -3608,8 +3587,29 @@
                 <a:latin typeface="Malgun Gothic" panose="020B0503020000020004" pitchFamily="34" charset="-127"/>
                 <a:ea typeface="Malgun Gothic" panose="020B0503020000020004" pitchFamily="34" charset="-127"/>
               </a:rPr>
-              <a:t>Coordonnées</a:t>
-            </a:r>
+              <a:t>Contact </a:t>
+            </a:r>
+            <a:r>
+              <a:rPr lang="fr-FR" sz="1400" b="1" dirty="0" err="1">
+                <a:solidFill>
+                  <a:schemeClr val="accent1">
+                    <a:lumMod val="50000"/>
+                  </a:schemeClr>
+                </a:solidFill>
+                <a:latin typeface="Malgun Gothic" panose="020B0503020000020004" pitchFamily="34" charset="-127"/>
+                <a:ea typeface="Malgun Gothic" panose="020B0503020000020004" pitchFamily="34" charset="-127"/>
+              </a:rPr>
+              <a:t>details</a:t>
+            </a:r>
+            <a:endParaRPr lang="fr-FR" sz="1400" b="1" dirty="0">
+              <a:solidFill>
+                <a:schemeClr val="accent1">
+                  <a:lumMod val="50000"/>
+                </a:schemeClr>
+              </a:solidFill>
+              <a:latin typeface="Malgun Gothic" panose="020B0503020000020004" pitchFamily="34" charset="-127"/>
+              <a:ea typeface="Malgun Gothic" panose="020B0503020000020004" pitchFamily="34" charset="-127"/>
+            </a:endParaRPr>
           </a:p>
         </p:txBody>
       </p:sp>
@@ -3658,7 +3658,7 @@
         </p:nvSpPr>
         <p:spPr>
           <a:xfrm>
-            <a:off x="201513" y="6057248"/>
+            <a:off x="136431" y="5585639"/>
             <a:ext cx="1971419" cy="307777"/>
           </a:xfrm>
           <a:prstGeom prst="rect">
@@ -3682,7 +3682,7 @@
                 <a:latin typeface="Malgun Gothic" panose="020B0503020000020004" pitchFamily="34" charset="-127"/>
                 <a:ea typeface="Malgun Gothic" panose="020B0503020000020004" pitchFamily="34" charset="-127"/>
               </a:rPr>
-              <a:t>Savoir-être</a:t>
+              <a:t>SKILLS</a:t>
             </a:r>
           </a:p>
         </p:txBody>
@@ -3695,7 +3695,7 @@
         </p:nvCxnSpPr>
         <p:spPr>
           <a:xfrm flipV="1">
-            <a:off x="265220" y="6324198"/>
+            <a:off x="253412" y="5893416"/>
             <a:ext cx="1426844" cy="8792"/>
           </a:xfrm>
           <a:prstGeom prst="line">
@@ -3732,8 +3732,8 @@
         </p:nvSpPr>
         <p:spPr>
           <a:xfrm>
-            <a:off x="-85655" y="6340066"/>
-            <a:ext cx="2151825" cy="1446550"/>
+            <a:off x="-43975" y="5923178"/>
+            <a:ext cx="2151825" cy="1277273"/>
           </a:xfrm>
           <a:prstGeom prst="rect">
             <a:avLst/>
@@ -3746,12 +3746,12 @@
           </a:bodyPr>
           <a:lstStyle/>
           <a:p>
-            <a:pPr marL="171450" lvl="0" indent="-171450" algn="just">
+            <a:pPr marL="171450" lvl="0" indent="-171450">
               <a:buFontTx/>
               <a:buChar char="-"/>
             </a:pPr>
             <a:r>
-              <a:rPr lang="fr-FR" sz="1100" b="0" dirty="0">
+              <a:rPr lang="en-US" sz="1100" b="0" dirty="0">
                 <a:solidFill>
                   <a:srgbClr val="404040"/>
                 </a:solidFill>
@@ -3760,16 +3760,16 @@
                 <a:ea typeface="Malgun Gothic" panose="020B0503020000020004" pitchFamily="34" charset="-127"/>
                 <a:cs typeface="Angsana New" panose="02020603050405020304" pitchFamily="18" charset="-34"/>
               </a:rPr>
-              <a:t>Autonomie,</a:t>
-            </a:r>
-          </a:p>
-          <a:p>
-            <a:pPr marL="171450" lvl="0" indent="-171450" algn="just">
+              <a:t>Autonomy,</a:t>
+            </a:r>
+          </a:p>
+          <a:p>
+            <a:pPr marL="171450" lvl="0" indent="-171450">
               <a:buFontTx/>
               <a:buChar char="-"/>
             </a:pPr>
             <a:r>
-              <a:rPr lang="fr-FR" sz="1100" b="0" dirty="0">
+              <a:rPr lang="en-US" sz="1100" b="0" dirty="0">
                 <a:solidFill>
                   <a:srgbClr val="404040"/>
                 </a:solidFill>
@@ -3778,63 +3778,52 @@
                 <a:ea typeface="Malgun Gothic" panose="020B0503020000020004" pitchFamily="34" charset="-127"/>
                 <a:cs typeface="Angsana New" panose="02020603050405020304" pitchFamily="18" charset="-34"/>
               </a:rPr>
-              <a:t>Ténacité, Rigueur</a:t>
-            </a:r>
-            <a:endParaRPr lang="fr-FR" sz="1100" b="1" dirty="0">
+              <a:t>Tenacity, Rigor</a:t>
+            </a:r>
+          </a:p>
+          <a:p>
+            <a:pPr marL="171450" lvl="0" indent="-171450">
+              <a:buFontTx/>
+              <a:buChar char="-"/>
+            </a:pPr>
+            <a:r>
+              <a:rPr lang="en-US" sz="1100" b="0" dirty="0">
+                <a:solidFill>
+                  <a:srgbClr val="404040"/>
+                </a:solidFill>
+                <a:effectLst/>
+                <a:latin typeface="Malgun Gothic" panose="020B0503020000020004" pitchFamily="34" charset="-127"/>
+                <a:ea typeface="Malgun Gothic" panose="020B0503020000020004" pitchFamily="34" charset="-127"/>
+                <a:cs typeface="Angsana New" panose="02020603050405020304" pitchFamily="18" charset="-34"/>
+              </a:rPr>
+              <a:t>Relational ability: teamwork, listening</a:t>
+            </a:r>
+          </a:p>
+          <a:p>
+            <a:pPr marL="171450" lvl="0" indent="-171450">
+              <a:buFontTx/>
+              <a:buChar char="-"/>
+            </a:pPr>
+            <a:r>
+              <a:rPr lang="en-US" sz="1100" b="0" dirty="0">
+                <a:solidFill>
+                  <a:srgbClr val="404040"/>
+                </a:solidFill>
+                <a:effectLst/>
+                <a:latin typeface="Malgun Gothic" panose="020B0503020000020004" pitchFamily="34" charset="-127"/>
+                <a:ea typeface="Malgun Gothic" panose="020B0503020000020004" pitchFamily="34" charset="-127"/>
+                <a:cs typeface="Angsana New" panose="02020603050405020304" pitchFamily="18" charset="-34"/>
+              </a:rPr>
+              <a:t>Scientific and technical curiosity, adaptation to novelty</a:t>
+            </a:r>
+            <a:endParaRPr lang="fr-FR" sz="1100" dirty="0">
               <a:solidFill>
                 <a:srgbClr val="404040"/>
               </a:solidFill>
-              <a:effectLst/>
               <a:latin typeface="Malgun Gothic" panose="020B0503020000020004" pitchFamily="34" charset="-127"/>
               <a:ea typeface="Malgun Gothic" panose="020B0503020000020004" pitchFamily="34" charset="-127"/>
               <a:cs typeface="Angsana New" panose="02020603050405020304" pitchFamily="18" charset="-34"/>
             </a:endParaRPr>
-          </a:p>
-          <a:p>
-            <a:pPr marL="171450" lvl="0" indent="-171450" algn="just">
-              <a:buFontTx/>
-              <a:buChar char="-"/>
-            </a:pPr>
-            <a:r>
-              <a:rPr lang="fr-FR" sz="1100" b="0" dirty="0">
-                <a:solidFill>
-                  <a:srgbClr val="404040"/>
-                </a:solidFill>
-                <a:effectLst/>
-                <a:latin typeface="Malgun Gothic" panose="020B0503020000020004" pitchFamily="34" charset="-127"/>
-                <a:ea typeface="Malgun Gothic" panose="020B0503020000020004" pitchFamily="34" charset="-127"/>
-                <a:cs typeface="Angsana New" panose="02020603050405020304" pitchFamily="18" charset="-34"/>
-              </a:rPr>
-              <a:t>Capacité relationnelle : travail d’équipe, y </a:t>
-            </a:r>
-            <a:r>
-              <a:rPr lang="fr-FR" sz="1100" dirty="0">
-                <a:solidFill>
-                  <a:srgbClr val="404040"/>
-                </a:solidFill>
-                <a:latin typeface="Malgun Gothic" panose="020B0503020000020004" pitchFamily="34" charset="-127"/>
-                <a:ea typeface="Malgun Gothic" panose="020B0503020000020004" pitchFamily="34" charset="-127"/>
-                <a:cs typeface="Angsana New" panose="02020603050405020304" pitchFamily="18" charset="-34"/>
-              </a:rPr>
-              <a:t>compris à distance, écoute</a:t>
-            </a:r>
-          </a:p>
-          <a:p>
-            <a:pPr marL="171450" lvl="0" indent="-171450" algn="just">
-              <a:buFontTx/>
-              <a:buChar char="-"/>
-            </a:pPr>
-            <a:r>
-              <a:rPr lang="fr-FR" sz="1100" dirty="0">
-                <a:solidFill>
-                  <a:srgbClr val="404040"/>
-                </a:solidFill>
-                <a:latin typeface="Malgun Gothic" panose="020B0503020000020004" pitchFamily="34" charset="-127"/>
-                <a:ea typeface="Malgun Gothic" panose="020B0503020000020004" pitchFamily="34" charset="-127"/>
-                <a:cs typeface="Angsana New" panose="02020603050405020304" pitchFamily="18" charset="-34"/>
-              </a:rPr>
-              <a:t>Curiosité scientifique et technique, Adaptation à la nouveauté</a:t>
-            </a:r>
           </a:p>
         </p:txBody>
       </p:sp>
@@ -4525,7 +4514,7 @@
         </p:nvSpPr>
         <p:spPr>
           <a:xfrm>
-            <a:off x="2382948" y="3852608"/>
+            <a:off x="2277283" y="3852608"/>
             <a:ext cx="3525715" cy="307777"/>
           </a:xfrm>
           <a:prstGeom prst="rect">
@@ -4540,7 +4529,7 @@
           <a:lstStyle/>
           <a:p>
             <a:r>
-              <a:rPr lang="fr-FR" sz="1400" b="1" dirty="0" err="1">
+              <a:rPr lang="fr-FR" sz="1400" b="1" dirty="0">
                 <a:solidFill>
                   <a:schemeClr val="accent1">
                     <a:lumMod val="50000"/>
@@ -4549,41 +4538,8 @@
                 <a:latin typeface="Malgun Gothic" panose="020B0503020000020004" pitchFamily="34" charset="-127"/>
                 <a:ea typeface="Malgun Gothic" panose="020B0503020000020004" pitchFamily="34" charset="-127"/>
               </a:rPr>
-              <a:t>Professionnal</a:t>
-            </a:r>
-            <a:r>
-              <a:rPr lang="fr-FR" sz="1400" b="1" dirty="0">
-                <a:solidFill>
-                  <a:schemeClr val="accent1">
-                    <a:lumMod val="50000"/>
-                  </a:schemeClr>
-                </a:solidFill>
-                <a:latin typeface="Malgun Gothic" panose="020B0503020000020004" pitchFamily="34" charset="-127"/>
-                <a:ea typeface="Malgun Gothic" panose="020B0503020000020004" pitchFamily="34" charset="-127"/>
-              </a:rPr>
-              <a:t> </a:t>
-            </a:r>
-            <a:r>
-              <a:rPr lang="fr-FR" sz="1400" b="1" dirty="0" err="1">
-                <a:solidFill>
-                  <a:schemeClr val="accent1">
-                    <a:lumMod val="50000"/>
-                  </a:schemeClr>
-                </a:solidFill>
-                <a:latin typeface="Malgun Gothic" panose="020B0503020000020004" pitchFamily="34" charset="-127"/>
-                <a:ea typeface="Malgun Gothic" panose="020B0503020000020004" pitchFamily="34" charset="-127"/>
-              </a:rPr>
-              <a:t>career</a:t>
-            </a:r>
-            <a:endParaRPr lang="fr-FR" sz="1400" b="1" dirty="0">
-              <a:solidFill>
-                <a:schemeClr val="accent1">
-                  <a:lumMod val="50000"/>
-                </a:schemeClr>
-              </a:solidFill>
-              <a:latin typeface="Malgun Gothic" panose="020B0503020000020004" pitchFamily="34" charset="-127"/>
-              <a:ea typeface="Malgun Gothic" panose="020B0503020000020004" pitchFamily="34" charset="-127"/>
-            </a:endParaRPr>
+              <a:t>WORK EXPERIENCE</a:t>
+            </a:r>
           </a:p>
         </p:txBody>
       </p:sp>
@@ -5221,11 +5177,41 @@
           <a:lstStyle/>
           <a:p>
             <a:r>
+              <a:rPr lang="fr-FR" sz="1050" b="1" dirty="0" err="1">
+                <a:latin typeface="Malgun Gothic" panose="020B0503020000020004" pitchFamily="34" charset="-127"/>
+                <a:ea typeface="Malgun Gothic" panose="020B0503020000020004" pitchFamily="34" charset="-127"/>
+              </a:rPr>
+              <a:t>Geographical</a:t>
+            </a:r>
+            <a:r>
               <a:rPr lang="fr-FR" sz="1050" b="1" dirty="0">
                 <a:latin typeface="Malgun Gothic" panose="020B0503020000020004" pitchFamily="34" charset="-127"/>
                 <a:ea typeface="Malgun Gothic" panose="020B0503020000020004" pitchFamily="34" charset="-127"/>
               </a:rPr>
-              <a:t>Secteurs géographiques : Annecy ou Grenoble</a:t>
+              <a:t> </a:t>
+            </a:r>
+            <a:r>
+              <a:rPr lang="fr-FR" sz="1050" b="1" dirty="0" err="1">
+                <a:latin typeface="Malgun Gothic" panose="020B0503020000020004" pitchFamily="34" charset="-127"/>
+                <a:ea typeface="Malgun Gothic" panose="020B0503020000020004" pitchFamily="34" charset="-127"/>
+              </a:rPr>
+              <a:t>sectors</a:t>
+            </a:r>
+            <a:r>
+              <a:rPr lang="fr-FR" sz="1050" b="1" dirty="0">
+                <a:latin typeface="Malgun Gothic" panose="020B0503020000020004" pitchFamily="34" charset="-127"/>
+                <a:ea typeface="Malgun Gothic" panose="020B0503020000020004" pitchFamily="34" charset="-127"/>
+              </a:rPr>
+              <a:t> : </a:t>
+            </a:r>
+          </a:p>
+          <a:p>
+            <a:r>
+              <a:rPr lang="fr-FR" sz="1050" b="1" dirty="0">
+                <a:latin typeface="Malgun Gothic" panose="020B0503020000020004" pitchFamily="34" charset="-127"/>
+                <a:ea typeface="Malgun Gothic" panose="020B0503020000020004" pitchFamily="34" charset="-127"/>
+              </a:rPr>
+              <a:t>Annecy or Grenoble</a:t>
             </a:r>
             <a:endParaRPr lang="fr-FR" sz="1000" dirty="0">
               <a:latin typeface="Malgun Gothic" panose="020B0503020000020004" pitchFamily="34" charset="-127"/>
@@ -5238,8 +5224,33 @@
                 <a:latin typeface="Malgun Gothic" panose="020B0503020000020004" pitchFamily="34" charset="-127"/>
                 <a:ea typeface="Malgun Gothic" panose="020B0503020000020004" pitchFamily="34" charset="-127"/>
               </a:rPr>
-              <a:t>53 ans 1 enfant</a:t>
-            </a:r>
+              <a:t>53 </a:t>
+            </a:r>
+            <a:r>
+              <a:rPr lang="fr-FR" sz="1000" dirty="0" err="1">
+                <a:latin typeface="Malgun Gothic" panose="020B0503020000020004" pitchFamily="34" charset="-127"/>
+                <a:ea typeface="Malgun Gothic" panose="020B0503020000020004" pitchFamily="34" charset="-127"/>
+              </a:rPr>
+              <a:t>years</a:t>
+            </a:r>
+            <a:r>
+              <a:rPr lang="fr-FR" sz="1000" dirty="0">
+                <a:latin typeface="Malgun Gothic" panose="020B0503020000020004" pitchFamily="34" charset="-127"/>
+                <a:ea typeface="Malgun Gothic" panose="020B0503020000020004" pitchFamily="34" charset="-127"/>
+              </a:rPr>
+              <a:t> 1 </a:t>
+            </a:r>
+            <a:r>
+              <a:rPr lang="fr-FR" sz="1000" dirty="0" err="1">
+                <a:latin typeface="Malgun Gothic" panose="020B0503020000020004" pitchFamily="34" charset="-127"/>
+                <a:ea typeface="Malgun Gothic" panose="020B0503020000020004" pitchFamily="34" charset="-127"/>
+              </a:rPr>
+              <a:t>child</a:t>
+            </a:r>
+            <a:endParaRPr lang="fr-FR" sz="1000" dirty="0">
+              <a:latin typeface="Malgun Gothic" panose="020B0503020000020004" pitchFamily="34" charset="-127"/>
+              <a:ea typeface="Malgun Gothic" panose="020B0503020000020004" pitchFamily="34" charset="-127"/>
+            </a:endParaRPr>
           </a:p>
           <a:p>
             <a:endParaRPr lang="fr-FR" sz="1000" dirty="0">
@@ -5647,6 +5658,190 @@
           </a:extLst>
         </p:spPr>
       </p:pic>
+      <p:sp>
+        <p:nvSpPr>
+          <p:cNvPr id="2" name="ZoneTexte 1">
+            <a:extLst>
+              <a:ext uri="{FF2B5EF4-FFF2-40B4-BE49-F238E27FC236}">
+                <a16:creationId xmlns:a16="http://schemas.microsoft.com/office/drawing/2014/main" id="{A3406694-A2B7-44CC-B17F-016BB419FEC2}"/>
+              </a:ext>
+            </a:extLst>
+          </p:cNvPr>
+          <p:cNvSpPr txBox="1"/>
+          <p:nvPr/>
+        </p:nvSpPr>
+        <p:spPr>
+          <a:xfrm>
+            <a:off x="136431" y="7423700"/>
+            <a:ext cx="1971419" cy="307777"/>
+          </a:xfrm>
+          <a:prstGeom prst="rect">
+            <a:avLst/>
+          </a:prstGeom>
+          <a:noFill/>
+        </p:spPr>
+        <p:txBody>
+          <a:bodyPr wrap="square" rtlCol="0">
+            <a:spAutoFit/>
+          </a:bodyPr>
+          <a:lstStyle/>
+          <a:p>
+            <a:r>
+              <a:rPr lang="fr-FR" sz="1400" b="1" dirty="0" err="1">
+                <a:solidFill>
+                  <a:schemeClr val="accent1">
+                    <a:lumMod val="50000"/>
+                  </a:schemeClr>
+                </a:solidFill>
+                <a:latin typeface="Malgun Gothic" panose="020B0503020000020004" pitchFamily="34" charset="-127"/>
+                <a:ea typeface="Malgun Gothic" panose="020B0503020000020004" pitchFamily="34" charset="-127"/>
+              </a:rPr>
+              <a:t>Languages</a:t>
+            </a:r>
+            <a:endParaRPr lang="fr-FR" sz="1400" b="1" dirty="0">
+              <a:solidFill>
+                <a:schemeClr val="accent1">
+                  <a:lumMod val="50000"/>
+                </a:schemeClr>
+              </a:solidFill>
+              <a:latin typeface="Malgun Gothic" panose="020B0503020000020004" pitchFamily="34" charset="-127"/>
+              <a:ea typeface="Malgun Gothic" panose="020B0503020000020004" pitchFamily="34" charset="-127"/>
+            </a:endParaRPr>
+          </a:p>
+        </p:txBody>
+      </p:sp>
+      <p:sp>
+        <p:nvSpPr>
+          <p:cNvPr id="4" name="ZoneTexte 3">
+            <a:extLst>
+              <a:ext uri="{FF2B5EF4-FFF2-40B4-BE49-F238E27FC236}">
+                <a16:creationId xmlns:a16="http://schemas.microsoft.com/office/drawing/2014/main" id="{92CFC7FC-1D6B-40B4-1719-F6424934E448}"/>
+              </a:ext>
+            </a:extLst>
+          </p:cNvPr>
+          <p:cNvSpPr txBox="1"/>
+          <p:nvPr/>
+        </p:nvSpPr>
+        <p:spPr>
+          <a:xfrm>
+            <a:off x="-43975" y="7776443"/>
+            <a:ext cx="2151825" cy="600164"/>
+          </a:xfrm>
+          <a:prstGeom prst="rect">
+            <a:avLst/>
+          </a:prstGeom>
+          <a:noFill/>
+        </p:spPr>
+        <p:txBody>
+          <a:bodyPr wrap="square" rtlCol="0">
+            <a:spAutoFit/>
+          </a:bodyPr>
+          <a:lstStyle/>
+          <a:p>
+            <a:pPr marL="171450" lvl="0" indent="-171450">
+              <a:buFontTx/>
+              <a:buChar char="-"/>
+            </a:pPr>
+            <a:r>
+              <a:rPr lang="en-US" sz="1100" b="0" dirty="0">
+                <a:solidFill>
+                  <a:srgbClr val="404040"/>
+                </a:solidFill>
+                <a:effectLst/>
+                <a:latin typeface="Malgun Gothic" panose="020B0503020000020004" pitchFamily="34" charset="-127"/>
+                <a:ea typeface="Malgun Gothic" panose="020B0503020000020004" pitchFamily="34" charset="-127"/>
+                <a:cs typeface="Angsana New" panose="02020603050405020304" pitchFamily="18" charset="-34"/>
+              </a:rPr>
+              <a:t>French : native language</a:t>
+            </a:r>
+          </a:p>
+          <a:p>
+            <a:pPr marL="171450" lvl="0" indent="-171450">
+              <a:buFontTx/>
+              <a:buChar char="-"/>
+            </a:pPr>
+            <a:r>
+              <a:rPr lang="en-US" sz="1100" dirty="0">
+                <a:solidFill>
+                  <a:srgbClr val="404040"/>
+                </a:solidFill>
+                <a:latin typeface="Malgun Gothic" panose="020B0503020000020004" pitchFamily="34" charset="-127"/>
+                <a:ea typeface="Malgun Gothic" panose="020B0503020000020004" pitchFamily="34" charset="-127"/>
+                <a:cs typeface="Angsana New" panose="02020603050405020304" pitchFamily="18" charset="-34"/>
+              </a:rPr>
+              <a:t>English : fluent</a:t>
+            </a:r>
+          </a:p>
+          <a:p>
+            <a:pPr marL="171450" lvl="0" indent="-171450">
+              <a:buFontTx/>
+              <a:buChar char="-"/>
+            </a:pPr>
+            <a:r>
+              <a:rPr lang="en-US" sz="1100" dirty="0">
+                <a:solidFill>
+                  <a:srgbClr val="404040"/>
+                </a:solidFill>
+                <a:latin typeface="Malgun Gothic" panose="020B0503020000020004" pitchFamily="34" charset="-127"/>
+                <a:ea typeface="Malgun Gothic" panose="020B0503020000020004" pitchFamily="34" charset="-127"/>
+                <a:cs typeface="Angsana New" panose="02020603050405020304" pitchFamily="18" charset="-34"/>
+              </a:rPr>
+              <a:t>Italian: beginner level</a:t>
+            </a:r>
+            <a:endParaRPr lang="fr-FR" sz="1100" dirty="0">
+              <a:solidFill>
+                <a:srgbClr val="404040"/>
+              </a:solidFill>
+              <a:latin typeface="Malgun Gothic" panose="020B0503020000020004" pitchFamily="34" charset="-127"/>
+              <a:ea typeface="Malgun Gothic" panose="020B0503020000020004" pitchFamily="34" charset="-127"/>
+              <a:cs typeface="Angsana New" panose="02020603050405020304" pitchFamily="18" charset="-34"/>
+            </a:endParaRPr>
+          </a:p>
+        </p:txBody>
+      </p:sp>
+      <p:cxnSp>
+        <p:nvCxnSpPr>
+          <p:cNvPr id="9" name="Connecteur droit 8">
+            <a:extLst>
+              <a:ext uri="{FF2B5EF4-FFF2-40B4-BE49-F238E27FC236}">
+                <a16:creationId xmlns:a16="http://schemas.microsoft.com/office/drawing/2014/main" id="{FBF611B3-8DE8-F8A4-6259-E75CDEDCBB21}"/>
+              </a:ext>
+            </a:extLst>
+          </p:cNvPr>
+          <p:cNvCxnSpPr/>
+          <p:nvPr/>
+        </p:nvCxnSpPr>
+        <p:spPr>
+          <a:xfrm flipV="1">
+            <a:off x="219501" y="7718899"/>
+            <a:ext cx="1426844" cy="8792"/>
+          </a:xfrm>
+          <a:prstGeom prst="line">
+            <a:avLst/>
+          </a:prstGeom>
+          <a:ln w="3175">
+            <a:solidFill>
+              <a:schemeClr val="bg2">
+                <a:lumMod val="75000"/>
+              </a:schemeClr>
+            </a:solidFill>
+          </a:ln>
+        </p:spPr>
+        <p:style>
+          <a:lnRef idx="1">
+            <a:schemeClr val="accent1"/>
+          </a:lnRef>
+          <a:fillRef idx="0">
+            <a:schemeClr val="accent1"/>
+          </a:fillRef>
+          <a:effectRef idx="0">
+            <a:schemeClr val="accent1"/>
+          </a:effectRef>
+          <a:fontRef idx="minor">
+            <a:schemeClr val="tx1"/>
+          </a:fontRef>
+        </p:style>
+      </p:cxnSp>
     </p:spTree>
     <p:extLst>
       <p:ext uri="{BB962C8B-B14F-4D97-AF65-F5344CB8AC3E}">
@@ -6942,7 +7137,7 @@
         </p:nvSpPr>
         <p:spPr>
           <a:xfrm>
-            <a:off x="1278621" y="6823651"/>
+            <a:off x="1263968" y="6823650"/>
             <a:ext cx="1971419" cy="307777"/>
           </a:xfrm>
           <a:prstGeom prst="rect">
@@ -6957,7 +7152,7 @@
           <a:lstStyle/>
           <a:p>
             <a:r>
-              <a:rPr lang="fr-FR" sz="1400" b="1" dirty="0" err="1">
+              <a:rPr lang="fr-FR" sz="1400" b="1" dirty="0">
                 <a:solidFill>
                   <a:schemeClr val="accent1">
                     <a:lumMod val="50000"/>
@@ -6966,17 +7161,8 @@
                 <a:latin typeface="Malgun Gothic" panose="020B0503020000020004" pitchFamily="34" charset="-127"/>
                 <a:ea typeface="Malgun Gothic" panose="020B0503020000020004" pitchFamily="34" charset="-127"/>
               </a:rPr>
-              <a:t>Schooling</a:t>
-            </a:r>
-            <a:endParaRPr lang="fr-FR" sz="1400" b="1" dirty="0">
-              <a:solidFill>
-                <a:schemeClr val="accent1">
-                  <a:lumMod val="50000"/>
-                </a:schemeClr>
-              </a:solidFill>
-              <a:latin typeface="Malgun Gothic" panose="020B0503020000020004" pitchFamily="34" charset="-127"/>
-              <a:ea typeface="Malgun Gothic" panose="020B0503020000020004" pitchFamily="34" charset="-127"/>
-            </a:endParaRPr>
+              <a:t>EDUCATION</a:t>
+            </a:r>
           </a:p>
         </p:txBody>
       </p:sp>
@@ -7302,7 +7488,7 @@
           <a:lstStyle/>
           <a:p>
             <a:r>
-              <a:rPr lang="fr-FR" sz="1400" b="1" dirty="0" err="1">
+              <a:rPr lang="fr-FR" sz="1400" b="1" dirty="0">
                 <a:solidFill>
                   <a:schemeClr val="accent1">
                     <a:lumMod val="50000"/>
@@ -7311,17 +7497,8 @@
                 <a:latin typeface="Malgun Gothic" panose="020B0503020000020004" pitchFamily="34" charset="-127"/>
                 <a:ea typeface="Malgun Gothic" panose="020B0503020000020004" pitchFamily="34" charset="-127"/>
               </a:rPr>
-              <a:t>Various</a:t>
-            </a:r>
-            <a:endParaRPr lang="fr-FR" sz="1400" b="1" dirty="0">
-              <a:solidFill>
-                <a:schemeClr val="accent1">
-                  <a:lumMod val="50000"/>
-                </a:schemeClr>
-              </a:solidFill>
-              <a:latin typeface="Malgun Gothic" panose="020B0503020000020004" pitchFamily="34" charset="-127"/>
-              <a:ea typeface="Malgun Gothic" panose="020B0503020000020004" pitchFamily="34" charset="-127"/>
-            </a:endParaRPr>
+              <a:t>VARIOUS</a:t>
+            </a:r>
           </a:p>
         </p:txBody>
       </p:sp>
@@ -7467,6 +7644,35 @@
           </a:p>
         </p:txBody>
       </p:sp>
+      <p:pic>
+        <p:nvPicPr>
+          <p:cNvPr id="2" name="Image 1">
+            <a:extLst>
+              <a:ext uri="{FF2B5EF4-FFF2-40B4-BE49-F238E27FC236}">
+                <a16:creationId xmlns:a16="http://schemas.microsoft.com/office/drawing/2014/main" id="{15C81795-D026-8891-9C73-4B593C4D6959}"/>
+              </a:ext>
+            </a:extLst>
+          </p:cNvPr>
+          <p:cNvPicPr>
+            <a:picLocks noChangeAspect="1"/>
+          </p:cNvPicPr>
+          <p:nvPr/>
+        </p:nvPicPr>
+        <p:blipFill rotWithShape="1">
+          <a:blip r:embed="rId2"/>
+          <a:srcRect l="16838" t="30706" r="82036" b="65923"/>
+          <a:stretch/>
+        </p:blipFill>
+        <p:spPr>
+          <a:xfrm>
+            <a:off x="809626" y="6721753"/>
+            <a:ext cx="498315" cy="419477"/>
+          </a:xfrm>
+          <a:prstGeom prst="rect">
+            <a:avLst/>
+          </a:prstGeom>
+        </p:spPr>
+      </p:pic>
     </p:spTree>
     <p:extLst>
       <p:ext uri="{BB962C8B-B14F-4D97-AF65-F5344CB8AC3E}">

</xml_diff>

<commit_message>
correction CV avant envoie
</commit_message>
<xml_diff>
--- a/CV_FFROMAGER.pptx
+++ b/CV_FFROMAGER.pptx
@@ -198,7 +198,7 @@
           <a:p>
             <a:fld id="{0B931C3E-6BFC-4638-BB9C-51D3F831E5AB}" type="datetimeFigureOut">
               <a:rPr lang="fr-FR" smtClean="0"/>
-              <a:t>02/04/2023</a:t>
+              <a:t>03/04/2023</a:t>
             </a:fld>
             <a:endParaRPr lang="fr-FR"/>
           </a:p>
@@ -596,7 +596,7 @@
           <a:p>
             <a:fld id="{599F6D61-D8C0-4321-8F41-5FC8A4129D8A}" type="datetimeFigureOut">
               <a:rPr lang="fr-FR" smtClean="0"/>
-              <a:t>02/04/2023</a:t>
+              <a:t>03/04/2023</a:t>
             </a:fld>
             <a:endParaRPr lang="fr-FR"/>
           </a:p>
@@ -766,7 +766,7 @@
           <a:p>
             <a:fld id="{599F6D61-D8C0-4321-8F41-5FC8A4129D8A}" type="datetimeFigureOut">
               <a:rPr lang="fr-FR" smtClean="0"/>
-              <a:t>02/04/2023</a:t>
+              <a:t>03/04/2023</a:t>
             </a:fld>
             <a:endParaRPr lang="fr-FR"/>
           </a:p>
@@ -946,7 +946,7 @@
           <a:p>
             <a:fld id="{599F6D61-D8C0-4321-8F41-5FC8A4129D8A}" type="datetimeFigureOut">
               <a:rPr lang="fr-FR" smtClean="0"/>
-              <a:t>02/04/2023</a:t>
+              <a:t>03/04/2023</a:t>
             </a:fld>
             <a:endParaRPr lang="fr-FR"/>
           </a:p>
@@ -1116,7 +1116,7 @@
           <a:p>
             <a:fld id="{599F6D61-D8C0-4321-8F41-5FC8A4129D8A}" type="datetimeFigureOut">
               <a:rPr lang="fr-FR" smtClean="0"/>
-              <a:t>02/04/2023</a:t>
+              <a:t>03/04/2023</a:t>
             </a:fld>
             <a:endParaRPr lang="fr-FR"/>
           </a:p>
@@ -1360,7 +1360,7 @@
           <a:p>
             <a:fld id="{599F6D61-D8C0-4321-8F41-5FC8A4129D8A}" type="datetimeFigureOut">
               <a:rPr lang="fr-FR" smtClean="0"/>
-              <a:t>02/04/2023</a:t>
+              <a:t>03/04/2023</a:t>
             </a:fld>
             <a:endParaRPr lang="fr-FR"/>
           </a:p>
@@ -1592,7 +1592,7 @@
           <a:p>
             <a:fld id="{599F6D61-D8C0-4321-8F41-5FC8A4129D8A}" type="datetimeFigureOut">
               <a:rPr lang="fr-FR" smtClean="0"/>
-              <a:t>02/04/2023</a:t>
+              <a:t>03/04/2023</a:t>
             </a:fld>
             <a:endParaRPr lang="fr-FR"/>
           </a:p>
@@ -1959,7 +1959,7 @@
           <a:p>
             <a:fld id="{599F6D61-D8C0-4321-8F41-5FC8A4129D8A}" type="datetimeFigureOut">
               <a:rPr lang="fr-FR" smtClean="0"/>
-              <a:t>02/04/2023</a:t>
+              <a:t>03/04/2023</a:t>
             </a:fld>
             <a:endParaRPr lang="fr-FR"/>
           </a:p>
@@ -2077,7 +2077,7 @@
           <a:p>
             <a:fld id="{599F6D61-D8C0-4321-8F41-5FC8A4129D8A}" type="datetimeFigureOut">
               <a:rPr lang="fr-FR" smtClean="0"/>
-              <a:t>02/04/2023</a:t>
+              <a:t>03/04/2023</a:t>
             </a:fld>
             <a:endParaRPr lang="fr-FR"/>
           </a:p>
@@ -2172,7 +2172,7 @@
           <a:p>
             <a:fld id="{599F6D61-D8C0-4321-8F41-5FC8A4129D8A}" type="datetimeFigureOut">
               <a:rPr lang="fr-FR" smtClean="0"/>
-              <a:t>02/04/2023</a:t>
+              <a:t>03/04/2023</a:t>
             </a:fld>
             <a:endParaRPr lang="fr-FR"/>
           </a:p>
@@ -2449,7 +2449,7 @@
           <a:p>
             <a:fld id="{599F6D61-D8C0-4321-8F41-5FC8A4129D8A}" type="datetimeFigureOut">
               <a:rPr lang="fr-FR" smtClean="0"/>
-              <a:t>02/04/2023</a:t>
+              <a:t>03/04/2023</a:t>
             </a:fld>
             <a:endParaRPr lang="fr-FR"/>
           </a:p>
@@ -2706,7 +2706,7 @@
           <a:p>
             <a:fld id="{599F6D61-D8C0-4321-8F41-5FC8A4129D8A}" type="datetimeFigureOut">
               <a:rPr lang="fr-FR" smtClean="0"/>
-              <a:t>02/04/2023</a:t>
+              <a:t>03/04/2023</a:t>
             </a:fld>
             <a:endParaRPr lang="fr-FR"/>
           </a:p>
@@ -2919,7 +2919,7 @@
           <a:p>
             <a:fld id="{599F6D61-D8C0-4321-8F41-5FC8A4129D8A}" type="datetimeFigureOut">
               <a:rPr lang="fr-FR" smtClean="0"/>
-              <a:t>02/04/2023</a:t>
+              <a:t>03/04/2023</a:t>
             </a:fld>
             <a:endParaRPr lang="fr-FR"/>
           </a:p>
@@ -6568,7 +6568,7 @@
               </a:tabLst>
             </a:pPr>
             <a:r>
-              <a:rPr lang="fr-FR" sz="1050" b="1" i="1" dirty="0">
+              <a:rPr lang="en-US" sz="1050" b="1" i="1" dirty="0">
                 <a:solidFill>
                   <a:srgbClr val="0070C0"/>
                 </a:solidFill>
@@ -6577,7 +6577,7 @@
                 <a:ea typeface="Malgun Gothic" panose="020B0503020000020004" pitchFamily="34" charset="-127"/>
                 <a:cs typeface="Calibri" panose="020F0502020204030204" pitchFamily="34" charset="0"/>
               </a:rPr>
-              <a:t>PROJETS JOB MANAGER et IPE SOUS GRAPHTALK AIA pour la gestion de production 2003-2007</a:t>
+              <a:t>JOB MANAGER and IPE PROJECTS UNDER GRAPHTALK AIA for production management 2003-2007</a:t>
             </a:r>
           </a:p>
           <a:p>
@@ -7585,26 +7585,16 @@
               <a:t>requiring</a:t>
             </a:r>
             <a:r>
-              <a:rPr lang="fr-FR" sz="1050" dirty="0">
-                <a:latin typeface="Malgun Gothic" panose="020B0503020000020004" pitchFamily="34" charset="-127"/>
-                <a:ea typeface="Malgun Gothic" panose="020B0503020000020004" pitchFamily="34" charset="-127"/>
-              </a:rPr>
-              <a:t> </a:t>
-            </a:r>
-            <a:r>
-              <a:rPr lang="fr-FR" sz="1050" dirty="0" err="1">
-                <a:latin typeface="Malgun Gothic" panose="020B0503020000020004" pitchFamily="34" charset="-127"/>
-                <a:ea typeface="Malgun Gothic" panose="020B0503020000020004" pitchFamily="34" charset="-127"/>
-              </a:rPr>
-              <a:t>development</a:t>
-            </a:r>
-            <a:r>
-              <a:rPr lang="fr-FR" sz="1050" dirty="0">
-                <a:latin typeface="Malgun Gothic" panose="020B0503020000020004" pitchFamily="34" charset="-127"/>
-                <a:ea typeface="Malgun Gothic" panose="020B0503020000020004" pitchFamily="34" charset="-127"/>
-              </a:rPr>
-              <a:t>.</a:t>
-            </a:r>
+              <a:rPr lang="fr-FR" sz="1050">
+                <a:latin typeface="Malgun Gothic" panose="020B0503020000020004" pitchFamily="34" charset="-127"/>
+                <a:ea typeface="Malgun Gothic" panose="020B0503020000020004" pitchFamily="34" charset="-127"/>
+              </a:rPr>
+              <a:t> adaptation.</a:t>
+            </a:r>
+            <a:endParaRPr lang="fr-FR" sz="1050" dirty="0">
+              <a:latin typeface="Malgun Gothic" panose="020B0503020000020004" pitchFamily="34" charset="-127"/>
+              <a:ea typeface="Malgun Gothic" panose="020B0503020000020004" pitchFamily="34" charset="-127"/>
+            </a:endParaRPr>
           </a:p>
         </p:txBody>
       </p:sp>

</xml_diff>

<commit_message>
création du bloc langue
</commit_message>
<xml_diff>
--- a/CV_FFROMAGER.pptx
+++ b/CV_FFROMAGER.pptx
@@ -198,7 +198,7 @@
           <a:p>
             <a:fld id="{0B931C3E-6BFC-4638-BB9C-51D3F831E5AB}" type="datetimeFigureOut">
               <a:rPr lang="fr-FR" smtClean="0"/>
-              <a:t>16/03/2023</a:t>
+              <a:t>05/04/2023</a:t>
             </a:fld>
             <a:endParaRPr lang="fr-FR"/>
           </a:p>
@@ -596,7 +596,7 @@
           <a:p>
             <a:fld id="{599F6D61-D8C0-4321-8F41-5FC8A4129D8A}" type="datetimeFigureOut">
               <a:rPr lang="fr-FR" smtClean="0"/>
-              <a:t>16/03/2023</a:t>
+              <a:t>05/04/2023</a:t>
             </a:fld>
             <a:endParaRPr lang="fr-FR"/>
           </a:p>
@@ -766,7 +766,7 @@
           <a:p>
             <a:fld id="{599F6D61-D8C0-4321-8F41-5FC8A4129D8A}" type="datetimeFigureOut">
               <a:rPr lang="fr-FR" smtClean="0"/>
-              <a:t>16/03/2023</a:t>
+              <a:t>05/04/2023</a:t>
             </a:fld>
             <a:endParaRPr lang="fr-FR"/>
           </a:p>
@@ -946,7 +946,7 @@
           <a:p>
             <a:fld id="{599F6D61-D8C0-4321-8F41-5FC8A4129D8A}" type="datetimeFigureOut">
               <a:rPr lang="fr-FR" smtClean="0"/>
-              <a:t>16/03/2023</a:t>
+              <a:t>05/04/2023</a:t>
             </a:fld>
             <a:endParaRPr lang="fr-FR"/>
           </a:p>
@@ -1116,7 +1116,7 @@
           <a:p>
             <a:fld id="{599F6D61-D8C0-4321-8F41-5FC8A4129D8A}" type="datetimeFigureOut">
               <a:rPr lang="fr-FR" smtClean="0"/>
-              <a:t>16/03/2023</a:t>
+              <a:t>05/04/2023</a:t>
             </a:fld>
             <a:endParaRPr lang="fr-FR"/>
           </a:p>
@@ -1360,7 +1360,7 @@
           <a:p>
             <a:fld id="{599F6D61-D8C0-4321-8F41-5FC8A4129D8A}" type="datetimeFigureOut">
               <a:rPr lang="fr-FR" smtClean="0"/>
-              <a:t>16/03/2023</a:t>
+              <a:t>05/04/2023</a:t>
             </a:fld>
             <a:endParaRPr lang="fr-FR"/>
           </a:p>
@@ -1592,7 +1592,7 @@
           <a:p>
             <a:fld id="{599F6D61-D8C0-4321-8F41-5FC8A4129D8A}" type="datetimeFigureOut">
               <a:rPr lang="fr-FR" smtClean="0"/>
-              <a:t>16/03/2023</a:t>
+              <a:t>05/04/2023</a:t>
             </a:fld>
             <a:endParaRPr lang="fr-FR"/>
           </a:p>
@@ -1959,7 +1959,7 @@
           <a:p>
             <a:fld id="{599F6D61-D8C0-4321-8F41-5FC8A4129D8A}" type="datetimeFigureOut">
               <a:rPr lang="fr-FR" smtClean="0"/>
-              <a:t>16/03/2023</a:t>
+              <a:t>05/04/2023</a:t>
             </a:fld>
             <a:endParaRPr lang="fr-FR"/>
           </a:p>
@@ -2077,7 +2077,7 @@
           <a:p>
             <a:fld id="{599F6D61-D8C0-4321-8F41-5FC8A4129D8A}" type="datetimeFigureOut">
               <a:rPr lang="fr-FR" smtClean="0"/>
-              <a:t>16/03/2023</a:t>
+              <a:t>05/04/2023</a:t>
             </a:fld>
             <a:endParaRPr lang="fr-FR"/>
           </a:p>
@@ -2172,7 +2172,7 @@
           <a:p>
             <a:fld id="{599F6D61-D8C0-4321-8F41-5FC8A4129D8A}" type="datetimeFigureOut">
               <a:rPr lang="fr-FR" smtClean="0"/>
-              <a:t>16/03/2023</a:t>
+              <a:t>05/04/2023</a:t>
             </a:fld>
             <a:endParaRPr lang="fr-FR"/>
           </a:p>
@@ -2449,7 +2449,7 @@
           <a:p>
             <a:fld id="{599F6D61-D8C0-4321-8F41-5FC8A4129D8A}" type="datetimeFigureOut">
               <a:rPr lang="fr-FR" smtClean="0"/>
-              <a:t>16/03/2023</a:t>
+              <a:t>05/04/2023</a:t>
             </a:fld>
             <a:endParaRPr lang="fr-FR"/>
           </a:p>
@@ -2706,7 +2706,7 @@
           <a:p>
             <a:fld id="{599F6D61-D8C0-4321-8F41-5FC8A4129D8A}" type="datetimeFigureOut">
               <a:rPr lang="fr-FR" smtClean="0"/>
-              <a:t>16/03/2023</a:t>
+              <a:t>05/04/2023</a:t>
             </a:fld>
             <a:endParaRPr lang="fr-FR"/>
           </a:p>
@@ -2919,7 +2919,7 @@
           <a:p>
             <a:fld id="{599F6D61-D8C0-4321-8F41-5FC8A4129D8A}" type="datetimeFigureOut">
               <a:rPr lang="fr-FR" smtClean="0"/>
-              <a:t>16/03/2023</a:t>
+              <a:t>05/04/2023</a:t>
             </a:fld>
             <a:endParaRPr lang="fr-FR"/>
           </a:p>
@@ -3554,7 +3554,7 @@
         </p:nvSpPr>
         <p:spPr>
           <a:xfrm>
-            <a:off x="201513" y="3610873"/>
+            <a:off x="161028" y="3610873"/>
             <a:ext cx="1971419" cy="307777"/>
           </a:xfrm>
           <a:prstGeom prst="rect">
@@ -3591,7 +3591,7 @@
         </p:nvCxnSpPr>
         <p:spPr>
           <a:xfrm flipV="1">
-            <a:off x="265220" y="3881253"/>
+            <a:off x="252519" y="3881108"/>
             <a:ext cx="1426844" cy="8792"/>
           </a:xfrm>
           <a:prstGeom prst="line">
@@ -3628,7 +3628,7 @@
         </p:nvSpPr>
         <p:spPr>
           <a:xfrm>
-            <a:off x="201513" y="6057248"/>
+            <a:off x="161028" y="5325655"/>
             <a:ext cx="1971419" cy="307777"/>
           </a:xfrm>
           <a:prstGeom prst="rect">
@@ -3660,12 +3660,14 @@
       <p:cxnSp>
         <p:nvCxnSpPr>
           <p:cNvPr id="29" name="Connecteur droit 28"/>
-          <p:cNvCxnSpPr/>
+          <p:cNvCxnSpPr>
+            <a:cxnSpLocks/>
+          </p:cNvCxnSpPr>
           <p:nvPr/>
         </p:nvCxnSpPr>
         <p:spPr>
           <a:xfrm flipV="1">
-            <a:off x="265220" y="6324198"/>
+            <a:off x="233470" y="5620079"/>
             <a:ext cx="1426844" cy="8792"/>
           </a:xfrm>
           <a:prstGeom prst="line">
@@ -3702,7 +3704,7 @@
         </p:nvSpPr>
         <p:spPr>
           <a:xfrm>
-            <a:off x="-85655" y="6340066"/>
+            <a:off x="-98272" y="5673931"/>
             <a:ext cx="2151825" cy="1446550"/>
           </a:xfrm>
           <a:prstGeom prst="rect">
@@ -3872,19 +3874,7 @@
                 <a:ea typeface="Malgun Gothic" panose="020B0503020000020004" pitchFamily="34" charset="-127"/>
                 <a:cs typeface="Angsana New" panose="02020603050405020304" pitchFamily="18" charset="-34"/>
               </a:rPr>
-              <a:t>– 2022-05 </a:t>
-            </a:r>
-            <a:r>
-              <a:rPr lang="fr-FR" sz="1050" cap="small">
-                <a:solidFill>
-                  <a:srgbClr val="4F81BD"/>
-                </a:solidFill>
-                <a:effectLst/>
-                <a:latin typeface="Malgun Gothic" panose="020B0503020000020004" pitchFamily="34" charset="-127"/>
-                <a:ea typeface="Malgun Gothic" panose="020B0503020000020004" pitchFamily="34" charset="-127"/>
-                <a:cs typeface="Angsana New" panose="02020603050405020304" pitchFamily="18" charset="-34"/>
-              </a:rPr>
-              <a:t>au 2023-01</a:t>
+              <a:t>– 2022-05 au 2023-01</a:t>
             </a:r>
             <a:endParaRPr lang="fr-FR" sz="1050" dirty="0">
               <a:solidFill>
@@ -4483,7 +4473,7 @@
         </p:nvSpPr>
         <p:spPr>
           <a:xfrm>
-            <a:off x="2382948" y="3852608"/>
+            <a:off x="2276175" y="3852608"/>
             <a:ext cx="3525715" cy="307777"/>
           </a:xfrm>
           <a:prstGeom prst="rect">
@@ -5059,7 +5049,7 @@
           <a:p>
             <a:pPr marR="1905"/>
             <a:r>
-              <a:rPr lang="fr-FR" sz="1200" b="1">
+              <a:rPr lang="fr-FR" sz="1200" b="1" dirty="0">
                 <a:solidFill>
                   <a:schemeClr val="accent5">
                     <a:lumMod val="50000"/>
@@ -5068,10 +5058,12 @@
                 <a:latin typeface="Malgun Gothic" panose="020B0503020000020004" pitchFamily="34" charset="-127"/>
                 <a:ea typeface="Malgun Gothic" panose="020B0503020000020004" pitchFamily="34" charset="-127"/>
               </a:rPr>
-              <a:t>SCRUM </a:t>
-            </a:r>
-            <a:r>
-              <a:rPr lang="fr-FR" sz="1200" b="1" dirty="0">
+              <a:t>SCRUM MASTER</a:t>
+            </a:r>
+          </a:p>
+          <a:p>
+            <a:r>
+              <a:rPr lang="fr-FR" sz="1050" b="1" dirty="0">
                 <a:solidFill>
                   <a:schemeClr val="accent5">
                     <a:lumMod val="50000"/>
@@ -5080,12 +5072,12 @@
                 <a:latin typeface="Malgun Gothic" panose="020B0503020000020004" pitchFamily="34" charset="-127"/>
                 <a:ea typeface="Malgun Gothic" panose="020B0503020000020004" pitchFamily="34" charset="-127"/>
               </a:rPr>
-              <a:t>MASTER</a:t>
-            </a:r>
-          </a:p>
-          <a:p>
-            <a:r>
-              <a:rPr lang="fr-FR" sz="1050" b="1" dirty="0">
+              <a:t>Conduite de projets R&amp;D,</a:t>
+            </a:r>
+          </a:p>
+          <a:p>
+            <a:r>
+              <a:rPr lang="fr-FR" sz="1050" b="1">
                 <a:solidFill>
                   <a:schemeClr val="accent5">
                     <a:lumMod val="50000"/>
@@ -5094,22 +5086,17 @@
                 <a:latin typeface="Malgun Gothic" panose="020B0503020000020004" pitchFamily="34" charset="-127"/>
                 <a:ea typeface="Malgun Gothic" panose="020B0503020000020004" pitchFamily="34" charset="-127"/>
               </a:rPr>
-              <a:t>Conduite de projets R&amp;D,</a:t>
-            </a:r>
-          </a:p>
-          <a:p>
-            <a:r>
-              <a:rPr lang="fr-FR" sz="1050" b="1" dirty="0">
-                <a:solidFill>
-                  <a:schemeClr val="accent5">
-                    <a:lumMod val="50000"/>
-                  </a:schemeClr>
-                </a:solidFill>
-                <a:latin typeface="Malgun Gothic" panose="020B0503020000020004" pitchFamily="34" charset="-127"/>
-                <a:ea typeface="Malgun Gothic" panose="020B0503020000020004" pitchFamily="34" charset="-127"/>
-              </a:rPr>
-              <a:t>DevOps, Anglais courant</a:t>
-            </a:r>
+              <a:t>DevOps</a:t>
+            </a:r>
+            <a:endParaRPr lang="fr-FR" sz="1050" b="1" dirty="0">
+              <a:solidFill>
+                <a:schemeClr val="accent5">
+                  <a:lumMod val="50000"/>
+                </a:schemeClr>
+              </a:solidFill>
+              <a:latin typeface="Malgun Gothic" panose="020B0503020000020004" pitchFamily="34" charset="-127"/>
+              <a:ea typeface="Malgun Gothic" panose="020B0503020000020004" pitchFamily="34" charset="-127"/>
+            </a:endParaRPr>
           </a:p>
         </p:txBody>
       </p:sp>
@@ -5136,18 +5123,11 @@
           <a:lstStyle/>
           <a:p>
             <a:r>
-              <a:rPr lang="fr-FR" sz="1050" b="1">
-                <a:latin typeface="Malgun Gothic" panose="020B0503020000020004" pitchFamily="34" charset="-127"/>
-                <a:ea typeface="Malgun Gothic" panose="020B0503020000020004" pitchFamily="34" charset="-127"/>
-              </a:rPr>
-              <a:t>Secteurs géographiques </a:t>
-            </a:r>
-            <a:r>
               <a:rPr lang="fr-FR" sz="1050" b="1" dirty="0">
                 <a:latin typeface="Malgun Gothic" panose="020B0503020000020004" pitchFamily="34" charset="-127"/>
                 <a:ea typeface="Malgun Gothic" panose="020B0503020000020004" pitchFamily="34" charset="-127"/>
               </a:rPr>
-              <a:t>: </a:t>
+              <a:t>Localisations : </a:t>
             </a:r>
           </a:p>
           <a:p>
@@ -5213,7 +5193,7 @@
           <p:nvPr>
             <p:extLst>
               <p:ext uri="{D42A27DB-BD31-4B8C-83A1-F6EECF244321}">
-                <p14:modId xmlns:p14="http://schemas.microsoft.com/office/powerpoint/2010/main" val="2284430247"/>
+                <p14:modId xmlns:p14="http://schemas.microsoft.com/office/powerpoint/2010/main" val="3323690094"/>
               </p:ext>
             </p:extLst>
           </p:nvPr>
@@ -5578,6 +5558,176 @@
           </a:extLst>
         </p:spPr>
       </p:pic>
+      <p:sp>
+        <p:nvSpPr>
+          <p:cNvPr id="4" name="ZoneTexte 3">
+            <a:extLst>
+              <a:ext uri="{FF2B5EF4-FFF2-40B4-BE49-F238E27FC236}">
+                <a16:creationId xmlns:a16="http://schemas.microsoft.com/office/drawing/2014/main" id="{794DFACF-3073-067B-A360-0EADCBAE719C}"/>
+              </a:ext>
+            </a:extLst>
+          </p:cNvPr>
+          <p:cNvSpPr txBox="1"/>
+          <p:nvPr/>
+        </p:nvSpPr>
+        <p:spPr>
+          <a:xfrm>
+            <a:off x="161028" y="7329265"/>
+            <a:ext cx="1971419" cy="307777"/>
+          </a:xfrm>
+          <a:prstGeom prst="rect">
+            <a:avLst/>
+          </a:prstGeom>
+          <a:noFill/>
+        </p:spPr>
+        <p:txBody>
+          <a:bodyPr wrap="square" rtlCol="0">
+            <a:spAutoFit/>
+          </a:bodyPr>
+          <a:lstStyle/>
+          <a:p>
+            <a:r>
+              <a:rPr lang="fr-FR" sz="1400" b="1" dirty="0">
+                <a:solidFill>
+                  <a:schemeClr val="accent1">
+                    <a:lumMod val="50000"/>
+                  </a:schemeClr>
+                </a:solidFill>
+                <a:latin typeface="Malgun Gothic" panose="020B0503020000020004" pitchFamily="34" charset="-127"/>
+                <a:ea typeface="Malgun Gothic" panose="020B0503020000020004" pitchFamily="34" charset="-127"/>
+              </a:rPr>
+              <a:t>Langues</a:t>
+            </a:r>
+          </a:p>
+        </p:txBody>
+      </p:sp>
+      <p:sp>
+        <p:nvSpPr>
+          <p:cNvPr id="5" name="ZoneTexte 4">
+            <a:extLst>
+              <a:ext uri="{FF2B5EF4-FFF2-40B4-BE49-F238E27FC236}">
+                <a16:creationId xmlns:a16="http://schemas.microsoft.com/office/drawing/2014/main" id="{58A133AA-CD1B-0E27-E9BD-E636418C4C64}"/>
+              </a:ext>
+            </a:extLst>
+          </p:cNvPr>
+          <p:cNvSpPr txBox="1"/>
+          <p:nvPr/>
+        </p:nvSpPr>
+        <p:spPr>
+          <a:xfrm>
+            <a:off x="-93306" y="7642842"/>
+            <a:ext cx="2151825" cy="600164"/>
+          </a:xfrm>
+          <a:prstGeom prst="rect">
+            <a:avLst/>
+          </a:prstGeom>
+          <a:noFill/>
+        </p:spPr>
+        <p:txBody>
+          <a:bodyPr wrap="square" rtlCol="0">
+            <a:spAutoFit/>
+          </a:bodyPr>
+          <a:lstStyle/>
+          <a:p>
+            <a:pPr marL="171450" lvl="0" indent="-171450" algn="just">
+              <a:buFontTx/>
+              <a:buChar char="-"/>
+            </a:pPr>
+            <a:r>
+              <a:rPr lang="fr-FR" sz="1100" b="0" dirty="0">
+                <a:solidFill>
+                  <a:srgbClr val="404040"/>
+                </a:solidFill>
+                <a:effectLst/>
+                <a:latin typeface="Malgun Gothic" panose="020B0503020000020004" pitchFamily="34" charset="-127"/>
+                <a:ea typeface="Malgun Gothic" panose="020B0503020000020004" pitchFamily="34" charset="-127"/>
+                <a:cs typeface="Angsana New" panose="02020603050405020304" pitchFamily="18" charset="-34"/>
+              </a:rPr>
+              <a:t>Français : langue maternelle</a:t>
+            </a:r>
+          </a:p>
+          <a:p>
+            <a:pPr marL="171450" lvl="0" indent="-171450" algn="just">
+              <a:buFontTx/>
+              <a:buChar char="-"/>
+            </a:pPr>
+            <a:r>
+              <a:rPr lang="fr-FR" sz="1100" dirty="0">
+                <a:solidFill>
+                  <a:srgbClr val="404040"/>
+                </a:solidFill>
+                <a:latin typeface="Malgun Gothic" panose="020B0503020000020004" pitchFamily="34" charset="-127"/>
+                <a:ea typeface="Malgun Gothic" panose="020B0503020000020004" pitchFamily="34" charset="-127"/>
+                <a:cs typeface="Angsana New" panose="02020603050405020304" pitchFamily="18" charset="-34"/>
+              </a:rPr>
+              <a:t>Anglais : courant</a:t>
+            </a:r>
+          </a:p>
+          <a:p>
+            <a:pPr marL="171450" lvl="0" indent="-171450" algn="just">
+              <a:buFontTx/>
+              <a:buChar char="-"/>
+            </a:pPr>
+            <a:r>
+              <a:rPr lang="fr-FR" sz="1100" b="0" dirty="0">
+                <a:solidFill>
+                  <a:srgbClr val="404040"/>
+                </a:solidFill>
+                <a:effectLst/>
+                <a:latin typeface="Malgun Gothic" panose="020B0503020000020004" pitchFamily="34" charset="-127"/>
+                <a:ea typeface="Malgun Gothic" panose="020B0503020000020004" pitchFamily="34" charset="-127"/>
+                <a:cs typeface="Angsana New" panose="02020603050405020304" pitchFamily="18" charset="-34"/>
+              </a:rPr>
+              <a:t>Italien : débutant</a:t>
+            </a:r>
+          </a:p>
+        </p:txBody>
+      </p:sp>
+      <p:cxnSp>
+        <p:nvCxnSpPr>
+          <p:cNvPr id="14" name="Connecteur droit 13">
+            <a:extLst>
+              <a:ext uri="{FF2B5EF4-FFF2-40B4-BE49-F238E27FC236}">
+                <a16:creationId xmlns:a16="http://schemas.microsoft.com/office/drawing/2014/main" id="{6334378A-4995-45F3-AF9D-3451C413BD09}"/>
+              </a:ext>
+            </a:extLst>
+          </p:cNvPr>
+          <p:cNvCxnSpPr>
+            <a:cxnSpLocks/>
+          </p:cNvCxnSpPr>
+          <p:nvPr/>
+        </p:nvCxnSpPr>
+        <p:spPr>
+          <a:xfrm flipV="1">
+            <a:off x="233470" y="7626754"/>
+            <a:ext cx="1426844" cy="8792"/>
+          </a:xfrm>
+          <a:prstGeom prst="line">
+            <a:avLst/>
+          </a:prstGeom>
+          <a:ln w="3175">
+            <a:solidFill>
+              <a:schemeClr val="bg2">
+                <a:lumMod val="75000"/>
+              </a:schemeClr>
+            </a:solidFill>
+          </a:ln>
+        </p:spPr>
+        <p:style>
+          <a:lnRef idx="1">
+            <a:schemeClr val="accent1"/>
+          </a:lnRef>
+          <a:fillRef idx="0">
+            <a:schemeClr val="accent1"/>
+          </a:fillRef>
+          <a:effectRef idx="0">
+            <a:schemeClr val="accent1"/>
+          </a:effectRef>
+          <a:fontRef idx="minor">
+            <a:schemeClr val="tx1"/>
+          </a:fontRef>
+        </p:style>
+      </p:cxnSp>
     </p:spTree>
     <p:extLst>
       <p:ext uri="{BB962C8B-B14F-4D97-AF65-F5344CB8AC3E}">
@@ -6583,7 +6733,7 @@
         </p:nvSpPr>
         <p:spPr>
           <a:xfrm>
-            <a:off x="1278621" y="6823651"/>
+            <a:off x="1263968" y="6823651"/>
             <a:ext cx="1971419" cy="307777"/>
           </a:xfrm>
           <a:prstGeom prst="rect">

</xml_diff>

<commit_message>
suppression dans divers localisation
</commit_message>
<xml_diff>
--- a/CV_FFROMAGER.pptx
+++ b/CV_FFROMAGER.pptx
@@ -7167,7 +7167,7 @@
         <p:spPr>
           <a:xfrm>
             <a:off x="990796" y="8216822"/>
-            <a:ext cx="6025467" cy="900246"/>
+            <a:ext cx="6025467" cy="738664"/>
           </a:xfrm>
           <a:prstGeom prst="rect">
             <a:avLst/>
@@ -7186,29 +7186,6 @@
                 <a:ea typeface="Malgun Gothic" panose="020B0503020000020004" pitchFamily="34" charset="-127"/>
               </a:rPr>
               <a:t>Sport : ancien nageur de compétition (niveau national) ; pratique de la course à pied en compétition.</a:t>
-            </a:r>
-          </a:p>
-          <a:p>
-            <a:r>
-              <a:rPr lang="fr-FR" sz="1050" dirty="0">
-                <a:latin typeface="Malgun Gothic" panose="020B0503020000020004" pitchFamily="34" charset="-127"/>
-                <a:ea typeface="Malgun Gothic" panose="020B0503020000020004" pitchFamily="34" charset="-127"/>
-              </a:rPr>
-              <a:t>Zone de mobilité géographique : région grenobloise ou annécienne</a:t>
-            </a:r>
-            <a:r>
-              <a:rPr lang="fr-FR" sz="1050">
-                <a:latin typeface="Malgun Gothic" panose="020B0503020000020004" pitchFamily="34" charset="-127"/>
-                <a:ea typeface="Malgun Gothic" panose="020B0503020000020004" pitchFamily="34" charset="-127"/>
-              </a:rPr>
-              <a:t>, chez </a:t>
-            </a:r>
-            <a:r>
-              <a:rPr lang="fr-FR" sz="1050" dirty="0">
-                <a:latin typeface="Malgun Gothic" panose="020B0503020000020004" pitchFamily="34" charset="-127"/>
-                <a:ea typeface="Malgun Gothic" panose="020B0503020000020004" pitchFamily="34" charset="-127"/>
-              </a:rPr>
-              <a:t>un client final.</a:t>
             </a:r>
           </a:p>
           <a:p>

</xml_diff>

<commit_message>
petite correction date sur CV
</commit_message>
<xml_diff>
--- a/CV_FFROMAGER.pptx
+++ b/CV_FFROMAGER.pptx
@@ -198,7 +198,7 @@
           <a:p>
             <a:fld id="{0B931C3E-6BFC-4638-BB9C-51D3F831E5AB}" type="datetimeFigureOut">
               <a:rPr lang="fr-FR" smtClean="0"/>
-              <a:t>14/06/2023</a:t>
+              <a:t>26/06/2023</a:t>
             </a:fld>
             <a:endParaRPr lang="fr-FR"/>
           </a:p>
@@ -596,7 +596,7 @@
           <a:p>
             <a:fld id="{599F6D61-D8C0-4321-8F41-5FC8A4129D8A}" type="datetimeFigureOut">
               <a:rPr lang="fr-FR" smtClean="0"/>
-              <a:t>14/06/2023</a:t>
+              <a:t>26/06/2023</a:t>
             </a:fld>
             <a:endParaRPr lang="fr-FR"/>
           </a:p>
@@ -766,7 +766,7 @@
           <a:p>
             <a:fld id="{599F6D61-D8C0-4321-8F41-5FC8A4129D8A}" type="datetimeFigureOut">
               <a:rPr lang="fr-FR" smtClean="0"/>
-              <a:t>14/06/2023</a:t>
+              <a:t>26/06/2023</a:t>
             </a:fld>
             <a:endParaRPr lang="fr-FR"/>
           </a:p>
@@ -946,7 +946,7 @@
           <a:p>
             <a:fld id="{599F6D61-D8C0-4321-8F41-5FC8A4129D8A}" type="datetimeFigureOut">
               <a:rPr lang="fr-FR" smtClean="0"/>
-              <a:t>14/06/2023</a:t>
+              <a:t>26/06/2023</a:t>
             </a:fld>
             <a:endParaRPr lang="fr-FR"/>
           </a:p>
@@ -1116,7 +1116,7 @@
           <a:p>
             <a:fld id="{599F6D61-D8C0-4321-8F41-5FC8A4129D8A}" type="datetimeFigureOut">
               <a:rPr lang="fr-FR" smtClean="0"/>
-              <a:t>14/06/2023</a:t>
+              <a:t>26/06/2023</a:t>
             </a:fld>
             <a:endParaRPr lang="fr-FR"/>
           </a:p>
@@ -1360,7 +1360,7 @@
           <a:p>
             <a:fld id="{599F6D61-D8C0-4321-8F41-5FC8A4129D8A}" type="datetimeFigureOut">
               <a:rPr lang="fr-FR" smtClean="0"/>
-              <a:t>14/06/2023</a:t>
+              <a:t>26/06/2023</a:t>
             </a:fld>
             <a:endParaRPr lang="fr-FR"/>
           </a:p>
@@ -1592,7 +1592,7 @@
           <a:p>
             <a:fld id="{599F6D61-D8C0-4321-8F41-5FC8A4129D8A}" type="datetimeFigureOut">
               <a:rPr lang="fr-FR" smtClean="0"/>
-              <a:t>14/06/2023</a:t>
+              <a:t>26/06/2023</a:t>
             </a:fld>
             <a:endParaRPr lang="fr-FR"/>
           </a:p>
@@ -1959,7 +1959,7 @@
           <a:p>
             <a:fld id="{599F6D61-D8C0-4321-8F41-5FC8A4129D8A}" type="datetimeFigureOut">
               <a:rPr lang="fr-FR" smtClean="0"/>
-              <a:t>14/06/2023</a:t>
+              <a:t>26/06/2023</a:t>
             </a:fld>
             <a:endParaRPr lang="fr-FR"/>
           </a:p>
@@ -2077,7 +2077,7 @@
           <a:p>
             <a:fld id="{599F6D61-D8C0-4321-8F41-5FC8A4129D8A}" type="datetimeFigureOut">
               <a:rPr lang="fr-FR" smtClean="0"/>
-              <a:t>14/06/2023</a:t>
+              <a:t>26/06/2023</a:t>
             </a:fld>
             <a:endParaRPr lang="fr-FR"/>
           </a:p>
@@ -2172,7 +2172,7 @@
           <a:p>
             <a:fld id="{599F6D61-D8C0-4321-8F41-5FC8A4129D8A}" type="datetimeFigureOut">
               <a:rPr lang="fr-FR" smtClean="0"/>
-              <a:t>14/06/2023</a:t>
+              <a:t>26/06/2023</a:t>
             </a:fld>
             <a:endParaRPr lang="fr-FR"/>
           </a:p>
@@ -2449,7 +2449,7 @@
           <a:p>
             <a:fld id="{599F6D61-D8C0-4321-8F41-5FC8A4129D8A}" type="datetimeFigureOut">
               <a:rPr lang="fr-FR" smtClean="0"/>
-              <a:t>14/06/2023</a:t>
+              <a:t>26/06/2023</a:t>
             </a:fld>
             <a:endParaRPr lang="fr-FR"/>
           </a:p>
@@ -2706,7 +2706,7 @@
           <a:p>
             <a:fld id="{599F6D61-D8C0-4321-8F41-5FC8A4129D8A}" type="datetimeFigureOut">
               <a:rPr lang="fr-FR" smtClean="0"/>
-              <a:t>14/06/2023</a:t>
+              <a:t>26/06/2023</a:t>
             </a:fld>
             <a:endParaRPr lang="fr-FR"/>
           </a:p>
@@ -2919,7 +2919,7 @@
           <a:p>
             <a:fld id="{599F6D61-D8C0-4321-8F41-5FC8A4129D8A}" type="datetimeFigureOut">
               <a:rPr lang="fr-FR" smtClean="0"/>
-              <a:t>14/06/2023</a:t>
+              <a:t>26/06/2023</a:t>
             </a:fld>
             <a:endParaRPr lang="fr-FR"/>
           </a:p>
@@ -6757,11 +6757,18 @@
           <a:lstStyle/>
           <a:p>
             <a:r>
+              <a:rPr lang="fr-FR" sz="1000">
+                <a:latin typeface="Malgun Gothic" panose="020B0503020000020004" pitchFamily="34" charset="-127"/>
+                <a:ea typeface="Malgun Gothic" panose="020B0503020000020004" pitchFamily="34" charset="-127"/>
+              </a:rPr>
+              <a:t>1997,05 </a:t>
+            </a:r>
+            <a:r>
               <a:rPr lang="fr-FR" sz="1000" dirty="0">
                 <a:latin typeface="Malgun Gothic" panose="020B0503020000020004" pitchFamily="34" charset="-127"/>
                 <a:ea typeface="Malgun Gothic" panose="020B0503020000020004" pitchFamily="34" charset="-127"/>
               </a:rPr>
-              <a:t>1997,09 -</a:t>
+              <a:t>-</a:t>
             </a:r>
           </a:p>
           <a:p>

</xml_diff>

<commit_message>
changement date dans le cv
</commit_message>
<xml_diff>
--- a/CV_FFROMAGER.pptx
+++ b/CV_FFROMAGER.pptx
@@ -198,7 +198,7 @@
           <a:p>
             <a:fld id="{0B931C3E-6BFC-4638-BB9C-51D3F831E5AB}" type="datetimeFigureOut">
               <a:rPr lang="fr-FR" smtClean="0"/>
-              <a:t>14/12/2022</a:t>
+              <a:t>28/06/2023</a:t>
             </a:fld>
             <a:endParaRPr lang="fr-FR"/>
           </a:p>
@@ -596,7 +596,7 @@
           <a:p>
             <a:fld id="{599F6D61-D8C0-4321-8F41-5FC8A4129D8A}" type="datetimeFigureOut">
               <a:rPr lang="fr-FR" smtClean="0"/>
-              <a:t>14/12/2022</a:t>
+              <a:t>28/06/2023</a:t>
             </a:fld>
             <a:endParaRPr lang="fr-FR"/>
           </a:p>
@@ -766,7 +766,7 @@
           <a:p>
             <a:fld id="{599F6D61-D8C0-4321-8F41-5FC8A4129D8A}" type="datetimeFigureOut">
               <a:rPr lang="fr-FR" smtClean="0"/>
-              <a:t>14/12/2022</a:t>
+              <a:t>28/06/2023</a:t>
             </a:fld>
             <a:endParaRPr lang="fr-FR"/>
           </a:p>
@@ -946,7 +946,7 @@
           <a:p>
             <a:fld id="{599F6D61-D8C0-4321-8F41-5FC8A4129D8A}" type="datetimeFigureOut">
               <a:rPr lang="fr-FR" smtClean="0"/>
-              <a:t>14/12/2022</a:t>
+              <a:t>28/06/2023</a:t>
             </a:fld>
             <a:endParaRPr lang="fr-FR"/>
           </a:p>
@@ -1116,7 +1116,7 @@
           <a:p>
             <a:fld id="{599F6D61-D8C0-4321-8F41-5FC8A4129D8A}" type="datetimeFigureOut">
               <a:rPr lang="fr-FR" smtClean="0"/>
-              <a:t>14/12/2022</a:t>
+              <a:t>28/06/2023</a:t>
             </a:fld>
             <a:endParaRPr lang="fr-FR"/>
           </a:p>
@@ -1360,7 +1360,7 @@
           <a:p>
             <a:fld id="{599F6D61-D8C0-4321-8F41-5FC8A4129D8A}" type="datetimeFigureOut">
               <a:rPr lang="fr-FR" smtClean="0"/>
-              <a:t>14/12/2022</a:t>
+              <a:t>28/06/2023</a:t>
             </a:fld>
             <a:endParaRPr lang="fr-FR"/>
           </a:p>
@@ -1592,7 +1592,7 @@
           <a:p>
             <a:fld id="{599F6D61-D8C0-4321-8F41-5FC8A4129D8A}" type="datetimeFigureOut">
               <a:rPr lang="fr-FR" smtClean="0"/>
-              <a:t>14/12/2022</a:t>
+              <a:t>28/06/2023</a:t>
             </a:fld>
             <a:endParaRPr lang="fr-FR"/>
           </a:p>
@@ -1959,7 +1959,7 @@
           <a:p>
             <a:fld id="{599F6D61-D8C0-4321-8F41-5FC8A4129D8A}" type="datetimeFigureOut">
               <a:rPr lang="fr-FR" smtClean="0"/>
-              <a:t>14/12/2022</a:t>
+              <a:t>28/06/2023</a:t>
             </a:fld>
             <a:endParaRPr lang="fr-FR"/>
           </a:p>
@@ -2077,7 +2077,7 @@
           <a:p>
             <a:fld id="{599F6D61-D8C0-4321-8F41-5FC8A4129D8A}" type="datetimeFigureOut">
               <a:rPr lang="fr-FR" smtClean="0"/>
-              <a:t>14/12/2022</a:t>
+              <a:t>28/06/2023</a:t>
             </a:fld>
             <a:endParaRPr lang="fr-FR"/>
           </a:p>
@@ -2172,7 +2172,7 @@
           <a:p>
             <a:fld id="{599F6D61-D8C0-4321-8F41-5FC8A4129D8A}" type="datetimeFigureOut">
               <a:rPr lang="fr-FR" smtClean="0"/>
-              <a:t>14/12/2022</a:t>
+              <a:t>28/06/2023</a:t>
             </a:fld>
             <a:endParaRPr lang="fr-FR"/>
           </a:p>
@@ -2449,7 +2449,7 @@
           <a:p>
             <a:fld id="{599F6D61-D8C0-4321-8F41-5FC8A4129D8A}" type="datetimeFigureOut">
               <a:rPr lang="fr-FR" smtClean="0"/>
-              <a:t>14/12/2022</a:t>
+              <a:t>28/06/2023</a:t>
             </a:fld>
             <a:endParaRPr lang="fr-FR"/>
           </a:p>
@@ -2706,7 +2706,7 @@
           <a:p>
             <a:fld id="{599F6D61-D8C0-4321-8F41-5FC8A4129D8A}" type="datetimeFigureOut">
               <a:rPr lang="fr-FR" smtClean="0"/>
-              <a:t>14/12/2022</a:t>
+              <a:t>28/06/2023</a:t>
             </a:fld>
             <a:endParaRPr lang="fr-FR"/>
           </a:p>
@@ -2919,7 +2919,7 @@
           <a:p>
             <a:fld id="{599F6D61-D8C0-4321-8F41-5FC8A4129D8A}" type="datetimeFigureOut">
               <a:rPr lang="fr-FR" smtClean="0"/>
-              <a:t>14/12/2022</a:t>
+              <a:t>28/06/2023</a:t>
             </a:fld>
             <a:endParaRPr lang="fr-FR"/>
           </a:p>
@@ -6515,11 +6515,18 @@
           <a:lstStyle/>
           <a:p>
             <a:r>
+              <a:rPr lang="fr-FR" sz="1000">
+                <a:latin typeface="Malgun Gothic" panose="020B0503020000020004" pitchFamily="34" charset="-127"/>
+                <a:ea typeface="Malgun Gothic" panose="020B0503020000020004" pitchFamily="34" charset="-127"/>
+              </a:rPr>
+              <a:t>1997,05 </a:t>
+            </a:r>
+            <a:r>
               <a:rPr lang="fr-FR" sz="1000" dirty="0">
                 <a:latin typeface="Malgun Gothic" panose="020B0503020000020004" pitchFamily="34" charset="-127"/>
                 <a:ea typeface="Malgun Gothic" panose="020B0503020000020004" pitchFamily="34" charset="-127"/>
               </a:rPr>
-              <a:t>1997,09 -</a:t>
+              <a:t>-</a:t>
             </a:r>
           </a:p>
           <a:p>

</xml_diff>

<commit_message>
mise à jour cv
</commit_message>
<xml_diff>
--- a/CV_FFROMAGER.pptx
+++ b/CV_FFROMAGER.pptx
@@ -198,7 +198,7 @@
           <a:p>
             <a:fld id="{0B931C3E-6BFC-4638-BB9C-51D3F831E5AB}" type="datetimeFigureOut">
               <a:rPr lang="fr-FR" smtClean="0"/>
-              <a:t>26/06/2023</a:t>
+              <a:t>05/07/2023</a:t>
             </a:fld>
             <a:endParaRPr lang="fr-FR"/>
           </a:p>
@@ -596,7 +596,7 @@
           <a:p>
             <a:fld id="{599F6D61-D8C0-4321-8F41-5FC8A4129D8A}" type="datetimeFigureOut">
               <a:rPr lang="fr-FR" smtClean="0"/>
-              <a:t>26/06/2023</a:t>
+              <a:t>05/07/2023</a:t>
             </a:fld>
             <a:endParaRPr lang="fr-FR"/>
           </a:p>
@@ -766,7 +766,7 @@
           <a:p>
             <a:fld id="{599F6D61-D8C0-4321-8F41-5FC8A4129D8A}" type="datetimeFigureOut">
               <a:rPr lang="fr-FR" smtClean="0"/>
-              <a:t>26/06/2023</a:t>
+              <a:t>05/07/2023</a:t>
             </a:fld>
             <a:endParaRPr lang="fr-FR"/>
           </a:p>
@@ -946,7 +946,7 @@
           <a:p>
             <a:fld id="{599F6D61-D8C0-4321-8F41-5FC8A4129D8A}" type="datetimeFigureOut">
               <a:rPr lang="fr-FR" smtClean="0"/>
-              <a:t>26/06/2023</a:t>
+              <a:t>05/07/2023</a:t>
             </a:fld>
             <a:endParaRPr lang="fr-FR"/>
           </a:p>
@@ -1116,7 +1116,7 @@
           <a:p>
             <a:fld id="{599F6D61-D8C0-4321-8F41-5FC8A4129D8A}" type="datetimeFigureOut">
               <a:rPr lang="fr-FR" smtClean="0"/>
-              <a:t>26/06/2023</a:t>
+              <a:t>05/07/2023</a:t>
             </a:fld>
             <a:endParaRPr lang="fr-FR"/>
           </a:p>
@@ -1360,7 +1360,7 @@
           <a:p>
             <a:fld id="{599F6D61-D8C0-4321-8F41-5FC8A4129D8A}" type="datetimeFigureOut">
               <a:rPr lang="fr-FR" smtClean="0"/>
-              <a:t>26/06/2023</a:t>
+              <a:t>05/07/2023</a:t>
             </a:fld>
             <a:endParaRPr lang="fr-FR"/>
           </a:p>
@@ -1592,7 +1592,7 @@
           <a:p>
             <a:fld id="{599F6D61-D8C0-4321-8F41-5FC8A4129D8A}" type="datetimeFigureOut">
               <a:rPr lang="fr-FR" smtClean="0"/>
-              <a:t>26/06/2023</a:t>
+              <a:t>05/07/2023</a:t>
             </a:fld>
             <a:endParaRPr lang="fr-FR"/>
           </a:p>
@@ -1959,7 +1959,7 @@
           <a:p>
             <a:fld id="{599F6D61-D8C0-4321-8F41-5FC8A4129D8A}" type="datetimeFigureOut">
               <a:rPr lang="fr-FR" smtClean="0"/>
-              <a:t>26/06/2023</a:t>
+              <a:t>05/07/2023</a:t>
             </a:fld>
             <a:endParaRPr lang="fr-FR"/>
           </a:p>
@@ -2077,7 +2077,7 @@
           <a:p>
             <a:fld id="{599F6D61-D8C0-4321-8F41-5FC8A4129D8A}" type="datetimeFigureOut">
               <a:rPr lang="fr-FR" smtClean="0"/>
-              <a:t>26/06/2023</a:t>
+              <a:t>05/07/2023</a:t>
             </a:fld>
             <a:endParaRPr lang="fr-FR"/>
           </a:p>
@@ -2172,7 +2172,7 @@
           <a:p>
             <a:fld id="{599F6D61-D8C0-4321-8F41-5FC8A4129D8A}" type="datetimeFigureOut">
               <a:rPr lang="fr-FR" smtClean="0"/>
-              <a:t>26/06/2023</a:t>
+              <a:t>05/07/2023</a:t>
             </a:fld>
             <a:endParaRPr lang="fr-FR"/>
           </a:p>
@@ -2449,7 +2449,7 @@
           <a:p>
             <a:fld id="{599F6D61-D8C0-4321-8F41-5FC8A4129D8A}" type="datetimeFigureOut">
               <a:rPr lang="fr-FR" smtClean="0"/>
-              <a:t>26/06/2023</a:t>
+              <a:t>05/07/2023</a:t>
             </a:fld>
             <a:endParaRPr lang="fr-FR"/>
           </a:p>
@@ -2706,7 +2706,7 @@
           <a:p>
             <a:fld id="{599F6D61-D8C0-4321-8F41-5FC8A4129D8A}" type="datetimeFigureOut">
               <a:rPr lang="fr-FR" smtClean="0"/>
-              <a:t>26/06/2023</a:t>
+              <a:t>05/07/2023</a:t>
             </a:fld>
             <a:endParaRPr lang="fr-FR"/>
           </a:p>
@@ -2919,7 +2919,7 @@
           <a:p>
             <a:fld id="{599F6D61-D8C0-4321-8F41-5FC8A4129D8A}" type="datetimeFigureOut">
               <a:rPr lang="fr-FR" smtClean="0"/>
-              <a:t>26/06/2023</a:t>
+              <a:t>05/07/2023</a:t>
             </a:fld>
             <a:endParaRPr lang="fr-FR"/>
           </a:p>
@@ -3833,11 +3833,18 @@
           <a:lstStyle/>
           <a:p>
             <a:r>
+              <a:rPr lang="fr-FR" sz="1050" b="1">
+                <a:latin typeface="Malgun Gothic" panose="020B0503020000020004" pitchFamily="34" charset="-127"/>
+                <a:ea typeface="Malgun Gothic" panose="020B0503020000020004" pitchFamily="34" charset="-127"/>
+              </a:rPr>
+              <a:t>2018.04-2023.02 </a:t>
+            </a:r>
+            <a:r>
               <a:rPr lang="fr-FR" sz="1050" b="1" dirty="0">
                 <a:latin typeface="Malgun Gothic" panose="020B0503020000020004" pitchFamily="34" charset="-127"/>
                 <a:ea typeface="Malgun Gothic" panose="020B0503020000020004" pitchFamily="34" charset="-127"/>
               </a:rPr>
-              <a:t>Depuis 2018,04 – Missions de consulting </a:t>
+              <a:t>– Missions de consulting </a:t>
             </a:r>
           </a:p>
           <a:p>

</xml_diff>

<commit_message>
update repository chef de projet
</commit_message>
<xml_diff>
--- a/CV_FFROMAGER.pptx
+++ b/CV_FFROMAGER.pptx
@@ -198,7 +198,7 @@
           <a:p>
             <a:fld id="{0B931C3E-6BFC-4638-BB9C-51D3F831E5AB}" type="datetimeFigureOut">
               <a:rPr lang="fr-FR" smtClean="0"/>
-              <a:t>22/05/2023</a:t>
+              <a:t>08/09/2023</a:t>
             </a:fld>
             <a:endParaRPr lang="fr-FR"/>
           </a:p>
@@ -596,7 +596,7 @@
           <a:p>
             <a:fld id="{599F6D61-D8C0-4321-8F41-5FC8A4129D8A}" type="datetimeFigureOut">
               <a:rPr lang="fr-FR" smtClean="0"/>
-              <a:t>22/05/2023</a:t>
+              <a:t>08/09/2023</a:t>
             </a:fld>
             <a:endParaRPr lang="fr-FR"/>
           </a:p>
@@ -766,7 +766,7 @@
           <a:p>
             <a:fld id="{599F6D61-D8C0-4321-8F41-5FC8A4129D8A}" type="datetimeFigureOut">
               <a:rPr lang="fr-FR" smtClean="0"/>
-              <a:t>22/05/2023</a:t>
+              <a:t>08/09/2023</a:t>
             </a:fld>
             <a:endParaRPr lang="fr-FR"/>
           </a:p>
@@ -946,7 +946,7 @@
           <a:p>
             <a:fld id="{599F6D61-D8C0-4321-8F41-5FC8A4129D8A}" type="datetimeFigureOut">
               <a:rPr lang="fr-FR" smtClean="0"/>
-              <a:t>22/05/2023</a:t>
+              <a:t>08/09/2023</a:t>
             </a:fld>
             <a:endParaRPr lang="fr-FR"/>
           </a:p>
@@ -1116,7 +1116,7 @@
           <a:p>
             <a:fld id="{599F6D61-D8C0-4321-8F41-5FC8A4129D8A}" type="datetimeFigureOut">
               <a:rPr lang="fr-FR" smtClean="0"/>
-              <a:t>22/05/2023</a:t>
+              <a:t>08/09/2023</a:t>
             </a:fld>
             <a:endParaRPr lang="fr-FR"/>
           </a:p>
@@ -1360,7 +1360,7 @@
           <a:p>
             <a:fld id="{599F6D61-D8C0-4321-8F41-5FC8A4129D8A}" type="datetimeFigureOut">
               <a:rPr lang="fr-FR" smtClean="0"/>
-              <a:t>22/05/2023</a:t>
+              <a:t>08/09/2023</a:t>
             </a:fld>
             <a:endParaRPr lang="fr-FR"/>
           </a:p>
@@ -1592,7 +1592,7 @@
           <a:p>
             <a:fld id="{599F6D61-D8C0-4321-8F41-5FC8A4129D8A}" type="datetimeFigureOut">
               <a:rPr lang="fr-FR" smtClean="0"/>
-              <a:t>22/05/2023</a:t>
+              <a:t>08/09/2023</a:t>
             </a:fld>
             <a:endParaRPr lang="fr-FR"/>
           </a:p>
@@ -1959,7 +1959,7 @@
           <a:p>
             <a:fld id="{599F6D61-D8C0-4321-8F41-5FC8A4129D8A}" type="datetimeFigureOut">
               <a:rPr lang="fr-FR" smtClean="0"/>
-              <a:t>22/05/2023</a:t>
+              <a:t>08/09/2023</a:t>
             </a:fld>
             <a:endParaRPr lang="fr-FR"/>
           </a:p>
@@ -2077,7 +2077,7 @@
           <a:p>
             <a:fld id="{599F6D61-D8C0-4321-8F41-5FC8A4129D8A}" type="datetimeFigureOut">
               <a:rPr lang="fr-FR" smtClean="0"/>
-              <a:t>22/05/2023</a:t>
+              <a:t>08/09/2023</a:t>
             </a:fld>
             <a:endParaRPr lang="fr-FR"/>
           </a:p>
@@ -2172,7 +2172,7 @@
           <a:p>
             <a:fld id="{599F6D61-D8C0-4321-8F41-5FC8A4129D8A}" type="datetimeFigureOut">
               <a:rPr lang="fr-FR" smtClean="0"/>
-              <a:t>22/05/2023</a:t>
+              <a:t>08/09/2023</a:t>
             </a:fld>
             <a:endParaRPr lang="fr-FR"/>
           </a:p>
@@ -2449,7 +2449,7 @@
           <a:p>
             <a:fld id="{599F6D61-D8C0-4321-8F41-5FC8A4129D8A}" type="datetimeFigureOut">
               <a:rPr lang="fr-FR" smtClean="0"/>
-              <a:t>22/05/2023</a:t>
+              <a:t>08/09/2023</a:t>
             </a:fld>
             <a:endParaRPr lang="fr-FR"/>
           </a:p>
@@ -2706,7 +2706,7 @@
           <a:p>
             <a:fld id="{599F6D61-D8C0-4321-8F41-5FC8A4129D8A}" type="datetimeFigureOut">
               <a:rPr lang="fr-FR" smtClean="0"/>
-              <a:t>22/05/2023</a:t>
+              <a:t>08/09/2023</a:t>
             </a:fld>
             <a:endParaRPr lang="fr-FR"/>
           </a:p>
@@ -2919,7 +2919,7 @@
           <a:p>
             <a:fld id="{599F6D61-D8C0-4321-8F41-5FC8A4129D8A}" type="datetimeFigureOut">
               <a:rPr lang="fr-FR" smtClean="0"/>
-              <a:t>22/05/2023</a:t>
+              <a:t>08/09/2023</a:t>
             </a:fld>
             <a:endParaRPr lang="fr-FR"/>
           </a:p>
@@ -3380,8 +3380,8 @@
         </p:nvSpPr>
         <p:spPr>
           <a:xfrm>
-            <a:off x="2542263" y="192469"/>
-            <a:ext cx="4315738" cy="954107"/>
+            <a:off x="3157547" y="192469"/>
+            <a:ext cx="3986213" cy="1169551"/>
           </a:xfrm>
           <a:prstGeom prst="rect">
             <a:avLst/>
@@ -3404,31 +3404,7 @@
                 <a:latin typeface="Malgun Gothic" panose="020B0503020000020004" pitchFamily="34" charset="-127"/>
                 <a:ea typeface="Malgun Gothic" panose="020B0503020000020004" pitchFamily="34" charset="-127"/>
               </a:rPr>
-              <a:t>Passionné de nouvelles technologies, je propose de partager mon </a:t>
-            </a:r>
-            <a:r>
-              <a:rPr lang="fr-FR" sz="1400">
-                <a:solidFill>
-                  <a:schemeClr val="bg2">
-                    <a:lumMod val="50000"/>
-                  </a:schemeClr>
-                </a:solidFill>
-                <a:latin typeface="Malgun Gothic" panose="020B0503020000020004" pitchFamily="34" charset="-127"/>
-                <a:ea typeface="Malgun Gothic" panose="020B0503020000020004" pitchFamily="34" charset="-127"/>
-              </a:rPr>
-              <a:t>expertise de plus de </a:t>
-            </a:r>
-            <a:r>
-              <a:rPr lang="fr-FR" sz="1400" dirty="0">
-                <a:solidFill>
-                  <a:schemeClr val="bg2">
-                    <a:lumMod val="50000"/>
-                  </a:schemeClr>
-                </a:solidFill>
-                <a:latin typeface="Malgun Gothic" panose="020B0503020000020004" pitchFamily="34" charset="-127"/>
-                <a:ea typeface="Malgun Gothic" panose="020B0503020000020004" pitchFamily="34" charset="-127"/>
-              </a:rPr>
-              <a:t>25 ans dans le développement informatique et le management de projets techniques</a:t>
+              <a:t>Passionné de nouvelles technologies, je propose de partager mon expertise de plus de 25 ans dans le développement informatique et le management de projets techniques</a:t>
             </a:r>
           </a:p>
         </p:txBody>
@@ -3652,7 +3628,7 @@
         </p:nvSpPr>
         <p:spPr>
           <a:xfrm>
-            <a:off x="201513" y="6057248"/>
+            <a:off x="201513" y="5349583"/>
             <a:ext cx="1971419" cy="307777"/>
           </a:xfrm>
           <a:prstGeom prst="rect">
@@ -3689,7 +3665,7 @@
         </p:nvCxnSpPr>
         <p:spPr>
           <a:xfrm flipV="1">
-            <a:off x="265220" y="6324198"/>
+            <a:off x="265220" y="5616533"/>
             <a:ext cx="1426844" cy="8792"/>
           </a:xfrm>
           <a:prstGeom prst="line">
@@ -3726,7 +3702,7 @@
         </p:nvSpPr>
         <p:spPr>
           <a:xfrm>
-            <a:off x="-85655" y="6340066"/>
+            <a:off x="-85655" y="5632401"/>
             <a:ext cx="2151825" cy="1446550"/>
           </a:xfrm>
           <a:prstGeom prst="rect">
@@ -3841,7 +3817,7 @@
         <p:spPr>
           <a:xfrm>
             <a:off x="2080347" y="4298084"/>
-            <a:ext cx="4843450" cy="4932119"/>
+            <a:ext cx="4843450" cy="5093702"/>
           </a:xfrm>
           <a:prstGeom prst="rect">
             <a:avLst/>
@@ -3855,11 +3831,18 @@
           <a:lstStyle/>
           <a:p>
             <a:r>
+              <a:rPr lang="fr-FR" sz="1050" b="1">
+                <a:latin typeface="Malgun Gothic" panose="020B0503020000020004" pitchFamily="34" charset="-127"/>
+                <a:ea typeface="Malgun Gothic" panose="020B0503020000020004" pitchFamily="34" charset="-127"/>
+              </a:rPr>
+              <a:t>2018.04-2023.02  </a:t>
+            </a:r>
+            <a:r>
               <a:rPr lang="fr-FR" sz="1050" b="1" dirty="0">
                 <a:latin typeface="Malgun Gothic" panose="020B0503020000020004" pitchFamily="34" charset="-127"/>
                 <a:ea typeface="Malgun Gothic" panose="020B0503020000020004" pitchFamily="34" charset="-127"/>
               </a:rPr>
-              <a:t>Depuis 2018,04 – Missions de consulting </a:t>
+              <a:t>– Missions de consulting </a:t>
             </a:r>
           </a:p>
           <a:p>
@@ -3887,7 +3870,7 @@
               <a:t>Scrum Master de l’équipe EcoStruxure Data Model (EDM) de Schneider en mode Safe à Eybens (Electropole) </a:t>
             </a:r>
             <a:r>
-              <a:rPr lang="fr-FR" sz="1050" cap="small">
+              <a:rPr lang="fr-FR" sz="1050" cap="small" dirty="0">
                 <a:solidFill>
                   <a:srgbClr val="4F81BD"/>
                 </a:solidFill>
@@ -3896,7 +3879,7 @@
                 <a:ea typeface="Malgun Gothic" panose="020B0503020000020004" pitchFamily="34" charset="-127"/>
                 <a:cs typeface="Angsana New" panose="02020603050405020304" pitchFamily="18" charset="-34"/>
               </a:rPr>
-              <a:t>– 2022-05 au 2023-01</a:t>
+              <a:t>– 2022-05 au 2023-02</a:t>
             </a:r>
             <a:endParaRPr lang="fr-FR" sz="1050" dirty="0">
               <a:solidFill>
@@ -5028,7 +5011,7 @@
         <p:spPr>
           <a:xfrm>
             <a:off x="193175" y="104549"/>
-            <a:ext cx="2839915" cy="1400383"/>
+            <a:ext cx="3235825" cy="1054135"/>
           </a:xfrm>
           <a:prstGeom prst="rect">
             <a:avLst/>
@@ -5071,7 +5054,7 @@
           <a:p>
             <a:pPr marR="1905"/>
             <a:r>
-              <a:rPr lang="fr-FR" sz="1200" b="1" dirty="0">
+              <a:rPr lang="fr-FR" sz="1200" b="1">
                 <a:solidFill>
                   <a:schemeClr val="accent5">
                     <a:lumMod val="50000"/>
@@ -5080,12 +5063,10 @@
                 <a:latin typeface="Malgun Gothic" panose="020B0503020000020004" pitchFamily="34" charset="-127"/>
                 <a:ea typeface="Malgun Gothic" panose="020B0503020000020004" pitchFamily="34" charset="-127"/>
               </a:rPr>
-              <a:t>SCRUM MASTER / CHEF DE PROJETS INFORMATIQUES</a:t>
-            </a:r>
-          </a:p>
-          <a:p>
-            <a:r>
-              <a:rPr lang="fr-FR" sz="1050" b="1" dirty="0">
+              <a:t>CHEF DE PROJET, </a:t>
+            </a:r>
+            <a:r>
+              <a:rPr lang="fr-FR" sz="1200" b="1" dirty="0">
                 <a:solidFill>
                   <a:schemeClr val="accent5">
                     <a:lumMod val="50000"/>
@@ -5094,7 +5075,7 @@
                 <a:latin typeface="Malgun Gothic" panose="020B0503020000020004" pitchFamily="34" charset="-127"/>
                 <a:ea typeface="Malgun Gothic" panose="020B0503020000020004" pitchFamily="34" charset="-127"/>
               </a:rPr>
-              <a:t>Conduite de projets R&amp;D,</a:t>
+              <a:t>SCRUM MASTER</a:t>
             </a:r>
           </a:p>
           <a:p>
@@ -5108,7 +5089,7 @@
                 <a:latin typeface="Malgun Gothic" panose="020B0503020000020004" pitchFamily="34" charset="-127"/>
                 <a:ea typeface="Malgun Gothic" panose="020B0503020000020004" pitchFamily="34" charset="-127"/>
               </a:rPr>
-              <a:t>DevOps, Anglais courant</a:t>
+              <a:t>Conduite de projets R&amp;D, DevOps</a:t>
             </a:r>
           </a:p>
         </p:txBody>
@@ -5122,7 +5103,7 @@
         <p:spPr>
           <a:xfrm>
             <a:off x="0" y="3907990"/>
-            <a:ext cx="2298733" cy="1331134"/>
+            <a:ext cx="2298733" cy="1338828"/>
           </a:xfrm>
           <a:prstGeom prst="rect">
             <a:avLst/>
@@ -5140,17 +5121,12 @@
                 <a:latin typeface="Malgun Gothic" panose="020B0503020000020004" pitchFamily="34" charset="-127"/>
                 <a:ea typeface="Malgun Gothic" panose="020B0503020000020004" pitchFamily="34" charset="-127"/>
               </a:rPr>
-              <a:t>Secteurs géographiques :</a:t>
-            </a:r>
-          </a:p>
-          <a:p>
-            <a:r>
-              <a:rPr lang="fr-FR" sz="1050" b="1" dirty="0">
-                <a:latin typeface="Malgun Gothic" panose="020B0503020000020004" pitchFamily="34" charset="-127"/>
-                <a:ea typeface="Malgun Gothic" panose="020B0503020000020004" pitchFamily="34" charset="-127"/>
-              </a:rPr>
-              <a:t>Annecy ou Grenoble</a:t>
-            </a:r>
+              <a:t>Secteurs géographiques : Annecy ou Grenoble</a:t>
+            </a:r>
+            <a:endParaRPr lang="fr-FR" sz="1000" dirty="0">
+              <a:latin typeface="Malgun Gothic" panose="020B0503020000020004" pitchFamily="34" charset="-127"/>
+              <a:ea typeface="Malgun Gothic" panose="020B0503020000020004" pitchFamily="34" charset="-127"/>
+            </a:endParaRPr>
           </a:p>
           <a:p>
             <a:r>
@@ -5574,6 +5550,259 @@
           </a:extLst>
         </p:spPr>
       </p:pic>
+      <p:sp>
+        <p:nvSpPr>
+          <p:cNvPr id="4" name="ZoneTexte 3">
+            <a:extLst>
+              <a:ext uri="{FF2B5EF4-FFF2-40B4-BE49-F238E27FC236}">
+                <a16:creationId xmlns:a16="http://schemas.microsoft.com/office/drawing/2014/main" id="{B9DAEDEC-F867-0B63-64BB-BA2597C8028B}"/>
+              </a:ext>
+            </a:extLst>
+          </p:cNvPr>
+          <p:cNvSpPr txBox="1"/>
+          <p:nvPr/>
+        </p:nvSpPr>
+        <p:spPr>
+          <a:xfrm>
+            <a:off x="202274" y="7253310"/>
+            <a:ext cx="1971419" cy="307777"/>
+          </a:xfrm>
+          <a:prstGeom prst="rect">
+            <a:avLst/>
+          </a:prstGeom>
+          <a:noFill/>
+        </p:spPr>
+        <p:txBody>
+          <a:bodyPr wrap="square" rtlCol="0">
+            <a:spAutoFit/>
+          </a:bodyPr>
+          <a:lstStyle/>
+          <a:p>
+            <a:r>
+              <a:rPr lang="fr-FR" sz="1400" b="1" dirty="0">
+                <a:solidFill>
+                  <a:schemeClr val="accent1">
+                    <a:lumMod val="50000"/>
+                  </a:schemeClr>
+                </a:solidFill>
+                <a:latin typeface="Malgun Gothic" panose="020B0503020000020004" pitchFamily="34" charset="-127"/>
+                <a:ea typeface="Malgun Gothic" panose="020B0503020000020004" pitchFamily="34" charset="-127"/>
+              </a:rPr>
+              <a:t>Langues</a:t>
+            </a:r>
+          </a:p>
+        </p:txBody>
+      </p:sp>
+      <p:cxnSp>
+        <p:nvCxnSpPr>
+          <p:cNvPr id="5" name="Connecteur droit 4">
+            <a:extLst>
+              <a:ext uri="{FF2B5EF4-FFF2-40B4-BE49-F238E27FC236}">
+                <a16:creationId xmlns:a16="http://schemas.microsoft.com/office/drawing/2014/main" id="{3A86A0CF-0298-A182-6947-6BBE3EE09D89}"/>
+              </a:ext>
+            </a:extLst>
+          </p:cNvPr>
+          <p:cNvCxnSpPr/>
+          <p:nvPr/>
+        </p:nvCxnSpPr>
+        <p:spPr>
+          <a:xfrm flipV="1">
+            <a:off x="274500" y="7518214"/>
+            <a:ext cx="1426844" cy="8792"/>
+          </a:xfrm>
+          <a:prstGeom prst="line">
+            <a:avLst/>
+          </a:prstGeom>
+          <a:ln w="3175">
+            <a:solidFill>
+              <a:schemeClr val="bg2">
+                <a:lumMod val="75000"/>
+              </a:schemeClr>
+            </a:solidFill>
+          </a:ln>
+        </p:spPr>
+        <p:style>
+          <a:lnRef idx="1">
+            <a:schemeClr val="accent1"/>
+          </a:lnRef>
+          <a:fillRef idx="0">
+            <a:schemeClr val="accent1"/>
+          </a:fillRef>
+          <a:effectRef idx="0">
+            <a:schemeClr val="accent1"/>
+          </a:effectRef>
+          <a:fontRef idx="minor">
+            <a:schemeClr val="tx1"/>
+          </a:fontRef>
+        </p:style>
+      </p:cxnSp>
+      <p:sp>
+        <p:nvSpPr>
+          <p:cNvPr id="9" name="ZoneTexte 8">
+            <a:extLst>
+              <a:ext uri="{FF2B5EF4-FFF2-40B4-BE49-F238E27FC236}">
+                <a16:creationId xmlns:a16="http://schemas.microsoft.com/office/drawing/2014/main" id="{D8FD5A52-9D24-F983-1895-8D7D137D362B}"/>
+              </a:ext>
+            </a:extLst>
+          </p:cNvPr>
+          <p:cNvSpPr txBox="1"/>
+          <p:nvPr/>
+        </p:nvSpPr>
+        <p:spPr>
+          <a:xfrm>
+            <a:off x="-84326" y="7534082"/>
+            <a:ext cx="2151825" cy="600164"/>
+          </a:xfrm>
+          <a:prstGeom prst="rect">
+            <a:avLst/>
+          </a:prstGeom>
+          <a:noFill/>
+        </p:spPr>
+        <p:txBody>
+          <a:bodyPr wrap="square" rtlCol="0">
+            <a:spAutoFit/>
+          </a:bodyPr>
+          <a:lstStyle/>
+          <a:p>
+            <a:pPr marL="171450" lvl="0" indent="-171450" algn="just">
+              <a:buFontTx/>
+              <a:buChar char="-"/>
+            </a:pPr>
+            <a:r>
+              <a:rPr lang="fr-FR" sz="1100" b="0" dirty="0">
+                <a:solidFill>
+                  <a:srgbClr val="404040"/>
+                </a:solidFill>
+                <a:effectLst/>
+                <a:latin typeface="Malgun Gothic" panose="020B0503020000020004" pitchFamily="34" charset="-127"/>
+                <a:ea typeface="Malgun Gothic" panose="020B0503020000020004" pitchFamily="34" charset="-127"/>
+                <a:cs typeface="Angsana New" panose="02020603050405020304" pitchFamily="18" charset="-34"/>
+              </a:rPr>
+              <a:t>Français : langue maternelle</a:t>
+            </a:r>
+          </a:p>
+          <a:p>
+            <a:pPr marL="171450" lvl="0" indent="-171450" algn="just">
+              <a:buFontTx/>
+              <a:buChar char="-"/>
+            </a:pPr>
+            <a:r>
+              <a:rPr lang="fr-FR" sz="1100" dirty="0">
+                <a:solidFill>
+                  <a:srgbClr val="404040"/>
+                </a:solidFill>
+                <a:latin typeface="Malgun Gothic" panose="020B0503020000020004" pitchFamily="34" charset="-127"/>
+                <a:ea typeface="Malgun Gothic" panose="020B0503020000020004" pitchFamily="34" charset="-127"/>
+                <a:cs typeface="Angsana New" panose="02020603050405020304" pitchFamily="18" charset="-34"/>
+              </a:rPr>
+              <a:t>Anglais : courant</a:t>
+            </a:r>
+          </a:p>
+          <a:p>
+            <a:pPr marL="171450" lvl="0" indent="-171450" algn="just">
+              <a:buFontTx/>
+              <a:buChar char="-"/>
+            </a:pPr>
+            <a:r>
+              <a:rPr lang="fr-FR" sz="1100" dirty="0">
+                <a:solidFill>
+                  <a:srgbClr val="404040"/>
+                </a:solidFill>
+                <a:latin typeface="Malgun Gothic" panose="020B0503020000020004" pitchFamily="34" charset="-127"/>
+                <a:ea typeface="Malgun Gothic" panose="020B0503020000020004" pitchFamily="34" charset="-127"/>
+                <a:cs typeface="Angsana New" panose="02020603050405020304" pitchFamily="18" charset="-34"/>
+              </a:rPr>
+              <a:t>Italien débutant</a:t>
+            </a:r>
+          </a:p>
+        </p:txBody>
+      </p:sp>
+      <p:sp>
+        <p:nvSpPr>
+          <p:cNvPr id="12" name="ZoneTexte 11">
+            <a:extLst>
+              <a:ext uri="{FF2B5EF4-FFF2-40B4-BE49-F238E27FC236}">
+                <a16:creationId xmlns:a16="http://schemas.microsoft.com/office/drawing/2014/main" id="{D84A9E6E-6040-86AE-70C5-9931C4894AFF}"/>
+              </a:ext>
+            </a:extLst>
+          </p:cNvPr>
+          <p:cNvSpPr txBox="1"/>
+          <p:nvPr/>
+        </p:nvSpPr>
+        <p:spPr>
+          <a:xfrm>
+            <a:off x="202274" y="3613398"/>
+            <a:ext cx="1971419" cy="307777"/>
+          </a:xfrm>
+          <a:prstGeom prst="rect">
+            <a:avLst/>
+          </a:prstGeom>
+          <a:noFill/>
+        </p:spPr>
+        <p:txBody>
+          <a:bodyPr wrap="square" rtlCol="0">
+            <a:spAutoFit/>
+          </a:bodyPr>
+          <a:lstStyle/>
+          <a:p>
+            <a:r>
+              <a:rPr lang="fr-FR" sz="1400" b="1" dirty="0">
+                <a:solidFill>
+                  <a:schemeClr val="accent1">
+                    <a:lumMod val="50000"/>
+                  </a:schemeClr>
+                </a:solidFill>
+                <a:latin typeface="Malgun Gothic" panose="020B0503020000020004" pitchFamily="34" charset="-127"/>
+                <a:ea typeface="Malgun Gothic" panose="020B0503020000020004" pitchFamily="34" charset="-127"/>
+              </a:rPr>
+              <a:t>Coordonnées</a:t>
+            </a:r>
+          </a:p>
+        </p:txBody>
+      </p:sp>
+      <p:sp>
+        <p:nvSpPr>
+          <p:cNvPr id="14" name="ZoneTexte 13">
+            <a:extLst>
+              <a:ext uri="{FF2B5EF4-FFF2-40B4-BE49-F238E27FC236}">
+                <a16:creationId xmlns:a16="http://schemas.microsoft.com/office/drawing/2014/main" id="{E4CA72CE-E809-7B4D-F863-743F497711A8}"/>
+              </a:ext>
+            </a:extLst>
+          </p:cNvPr>
+          <p:cNvSpPr txBox="1"/>
+          <p:nvPr/>
+        </p:nvSpPr>
+        <p:spPr>
+          <a:xfrm>
+            <a:off x="202274" y="5352108"/>
+            <a:ext cx="1971419" cy="307777"/>
+          </a:xfrm>
+          <a:prstGeom prst="rect">
+            <a:avLst/>
+          </a:prstGeom>
+          <a:noFill/>
+        </p:spPr>
+        <p:txBody>
+          <a:bodyPr wrap="square" rtlCol="0">
+            <a:spAutoFit/>
+          </a:bodyPr>
+          <a:lstStyle/>
+          <a:p>
+            <a:r>
+              <a:rPr lang="fr-FR" sz="1400" b="1" dirty="0">
+                <a:solidFill>
+                  <a:schemeClr val="accent1">
+                    <a:lumMod val="50000"/>
+                  </a:schemeClr>
+                </a:solidFill>
+                <a:latin typeface="Malgun Gothic" panose="020B0503020000020004" pitchFamily="34" charset="-127"/>
+                <a:ea typeface="Malgun Gothic" panose="020B0503020000020004" pitchFamily="34" charset="-127"/>
+              </a:rPr>
+              <a:t>Savoir-être</a:t>
+            </a:r>
+          </a:p>
+        </p:txBody>
+      </p:sp>
     </p:spTree>
     <p:extLst>
       <p:ext uri="{BB962C8B-B14F-4D97-AF65-F5344CB8AC3E}">
@@ -5613,7 +5842,7 @@
         <p:spPr>
           <a:xfrm>
             <a:off x="1058784" y="239518"/>
-            <a:ext cx="747320" cy="553998"/>
+            <a:ext cx="734496" cy="553998"/>
           </a:xfrm>
           <a:prstGeom prst="rect">
             <a:avLst/>
@@ -5631,7 +5860,7 @@
                 <a:latin typeface="Malgun Gothic" panose="020B0503020000020004" pitchFamily="34" charset="-127"/>
                 <a:ea typeface="Malgun Gothic" panose="020B0503020000020004" pitchFamily="34" charset="-127"/>
               </a:rPr>
-              <a:t>2000.04 –</a:t>
+              <a:t>2000.04 -</a:t>
             </a:r>
           </a:p>
           <a:p>
@@ -5711,7 +5940,7 @@
         <p:spPr>
           <a:xfrm flipH="1">
             <a:off x="1591663" y="66514"/>
-            <a:ext cx="5266335" cy="7201972"/>
+            <a:ext cx="5266335" cy="7040389"/>
           </a:xfrm>
           <a:prstGeom prst="rect">
             <a:avLst/>
@@ -5729,7 +5958,6 @@
               <a:solidFill>
                 <a:srgbClr val="00000A"/>
               </a:solidFill>
-              <a:effectLst/>
               <a:latin typeface="Malgun Gothic" panose="020B0503020000020004" pitchFamily="34" charset="-127"/>
               <a:ea typeface="Malgun Gothic" panose="020B0503020000020004" pitchFamily="34" charset="-127"/>
               <a:cs typeface="Cordia New" panose="020B0304020202020204" pitchFamily="34" charset="-34"/>
@@ -5747,7 +5975,7 @@
                 <a:ea typeface="Malgun Gothic" panose="020B0503020000020004" pitchFamily="34" charset="-127"/>
                 <a:cs typeface="Cordia New" panose="020B0304020202020204" pitchFamily="34" charset="-34"/>
               </a:rPr>
-              <a:t>dxc </a:t>
+              <a:t> dxc </a:t>
             </a:r>
             <a:r>
               <a:rPr lang="fr-FR" sz="1050" b="1" cap="all" dirty="0" err="1">
@@ -6548,11 +6776,18 @@
           <a:lstStyle/>
           <a:p>
             <a:r>
+              <a:rPr lang="fr-FR" sz="1000">
+                <a:latin typeface="Malgun Gothic" panose="020B0503020000020004" pitchFamily="34" charset="-127"/>
+                <a:ea typeface="Malgun Gothic" panose="020B0503020000020004" pitchFamily="34" charset="-127"/>
+              </a:rPr>
+              <a:t>1997,05 </a:t>
+            </a:r>
+            <a:r>
               <a:rPr lang="fr-FR" sz="1000" dirty="0">
                 <a:latin typeface="Malgun Gothic" panose="020B0503020000020004" pitchFamily="34" charset="-127"/>
                 <a:ea typeface="Malgun Gothic" panose="020B0503020000020004" pitchFamily="34" charset="-127"/>
               </a:rPr>
-              <a:t>1997,09 -</a:t>
+              <a:t>-</a:t>
             </a:r>
           </a:p>
           <a:p>
@@ -7037,18 +7272,11 @@
           </a:p>
           <a:p>
             <a:r>
-              <a:rPr lang="fr-FR" sz="1050">
-                <a:latin typeface="Malgun Gothic" panose="020B0503020000020004" pitchFamily="34" charset="-127"/>
-                <a:ea typeface="Malgun Gothic" panose="020B0503020000020004" pitchFamily="34" charset="-127"/>
-              </a:rPr>
-              <a:t>Titulaire </a:t>
-            </a:r>
-            <a:r>
               <a:rPr lang="fr-FR" sz="1050" dirty="0">
                 <a:latin typeface="Malgun Gothic" panose="020B0503020000020004" pitchFamily="34" charset="-127"/>
                 <a:ea typeface="Malgun Gothic" panose="020B0503020000020004" pitchFamily="34" charset="-127"/>
               </a:rPr>
-              <a:t>d’une RQTH (Reconnaissance de Qualité de Travailleur Handicapé) ne nécessitant pas</a:t>
+              <a:t>Titulaire d’une RQTH (Reconnaissance de Qualité de Travailleur Handicapé) ne nécessitant pas</a:t>
             </a:r>
           </a:p>
           <a:p>

</xml_diff>

<commit_message>
update chef de projet
</commit_message>
<xml_diff>
--- a/CV_FFROMAGER.pptx
+++ b/CV_FFROMAGER.pptx
@@ -10,7 +10,7 @@
   <p:sldIdLst>
     <p:sldId id="256" r:id="rId2"/>
     <p:sldId id="257" r:id="rId3"/>
-    <p:sldId id="259" r:id="rId4"/>
+    <p:sldId id="258" r:id="rId4"/>
   </p:sldIdLst>
   <p:sldSz cx="6858000" cy="9144000" type="screen4x3"/>
   <p:notesSz cx="6797675" cy="9926638"/>
@@ -199,7 +199,7 @@
           <a:p>
             <a:fld id="{0B931C3E-6BFC-4638-BB9C-51D3F831E5AB}" type="datetimeFigureOut">
               <a:rPr lang="fr-FR" smtClean="0"/>
-              <a:t>21/01/2024</a:t>
+              <a:t>13/09/2024</a:t>
             </a:fld>
             <a:endParaRPr lang="fr-FR"/>
           </a:p>
@@ -597,7 +597,7 @@
           <a:p>
             <a:fld id="{599F6D61-D8C0-4321-8F41-5FC8A4129D8A}" type="datetimeFigureOut">
               <a:rPr lang="fr-FR" smtClean="0"/>
-              <a:t>21/01/2024</a:t>
+              <a:t>13/09/2024</a:t>
             </a:fld>
             <a:endParaRPr lang="fr-FR"/>
           </a:p>
@@ -767,7 +767,7 @@
           <a:p>
             <a:fld id="{599F6D61-D8C0-4321-8F41-5FC8A4129D8A}" type="datetimeFigureOut">
               <a:rPr lang="fr-FR" smtClean="0"/>
-              <a:t>21/01/2024</a:t>
+              <a:t>13/09/2024</a:t>
             </a:fld>
             <a:endParaRPr lang="fr-FR"/>
           </a:p>
@@ -947,7 +947,7 @@
           <a:p>
             <a:fld id="{599F6D61-D8C0-4321-8F41-5FC8A4129D8A}" type="datetimeFigureOut">
               <a:rPr lang="fr-FR" smtClean="0"/>
-              <a:t>21/01/2024</a:t>
+              <a:t>13/09/2024</a:t>
             </a:fld>
             <a:endParaRPr lang="fr-FR"/>
           </a:p>
@@ -1117,7 +1117,7 @@
           <a:p>
             <a:fld id="{599F6D61-D8C0-4321-8F41-5FC8A4129D8A}" type="datetimeFigureOut">
               <a:rPr lang="fr-FR" smtClean="0"/>
-              <a:t>21/01/2024</a:t>
+              <a:t>13/09/2024</a:t>
             </a:fld>
             <a:endParaRPr lang="fr-FR"/>
           </a:p>
@@ -1361,7 +1361,7 @@
           <a:p>
             <a:fld id="{599F6D61-D8C0-4321-8F41-5FC8A4129D8A}" type="datetimeFigureOut">
               <a:rPr lang="fr-FR" smtClean="0"/>
-              <a:t>21/01/2024</a:t>
+              <a:t>13/09/2024</a:t>
             </a:fld>
             <a:endParaRPr lang="fr-FR"/>
           </a:p>
@@ -1593,7 +1593,7 @@
           <a:p>
             <a:fld id="{599F6D61-D8C0-4321-8F41-5FC8A4129D8A}" type="datetimeFigureOut">
               <a:rPr lang="fr-FR" smtClean="0"/>
-              <a:t>21/01/2024</a:t>
+              <a:t>13/09/2024</a:t>
             </a:fld>
             <a:endParaRPr lang="fr-FR"/>
           </a:p>
@@ -1960,7 +1960,7 @@
           <a:p>
             <a:fld id="{599F6D61-D8C0-4321-8F41-5FC8A4129D8A}" type="datetimeFigureOut">
               <a:rPr lang="fr-FR" smtClean="0"/>
-              <a:t>21/01/2024</a:t>
+              <a:t>13/09/2024</a:t>
             </a:fld>
             <a:endParaRPr lang="fr-FR"/>
           </a:p>
@@ -2078,7 +2078,7 @@
           <a:p>
             <a:fld id="{599F6D61-D8C0-4321-8F41-5FC8A4129D8A}" type="datetimeFigureOut">
               <a:rPr lang="fr-FR" smtClean="0"/>
-              <a:t>21/01/2024</a:t>
+              <a:t>13/09/2024</a:t>
             </a:fld>
             <a:endParaRPr lang="fr-FR"/>
           </a:p>
@@ -2173,7 +2173,7 @@
           <a:p>
             <a:fld id="{599F6D61-D8C0-4321-8F41-5FC8A4129D8A}" type="datetimeFigureOut">
               <a:rPr lang="fr-FR" smtClean="0"/>
-              <a:t>21/01/2024</a:t>
+              <a:t>13/09/2024</a:t>
             </a:fld>
             <a:endParaRPr lang="fr-FR"/>
           </a:p>
@@ -2450,7 +2450,7 @@
           <a:p>
             <a:fld id="{599F6D61-D8C0-4321-8F41-5FC8A4129D8A}" type="datetimeFigureOut">
               <a:rPr lang="fr-FR" smtClean="0"/>
-              <a:t>21/01/2024</a:t>
+              <a:t>13/09/2024</a:t>
             </a:fld>
             <a:endParaRPr lang="fr-FR"/>
           </a:p>
@@ -2707,7 +2707,7 @@
           <a:p>
             <a:fld id="{599F6D61-D8C0-4321-8F41-5FC8A4129D8A}" type="datetimeFigureOut">
               <a:rPr lang="fr-FR" smtClean="0"/>
-              <a:t>21/01/2024</a:t>
+              <a:t>13/09/2024</a:t>
             </a:fld>
             <a:endParaRPr lang="fr-FR"/>
           </a:p>
@@ -2920,7 +2920,7 @@
           <a:p>
             <a:fld id="{599F6D61-D8C0-4321-8F41-5FC8A4129D8A}" type="datetimeFigureOut">
               <a:rPr lang="fr-FR" smtClean="0"/>
-              <a:t>21/01/2024</a:t>
+              <a:t>13/09/2024</a:t>
             </a:fld>
             <a:endParaRPr lang="fr-FR"/>
           </a:p>
@@ -3381,7 +3381,7 @@
         </p:nvSpPr>
         <p:spPr>
           <a:xfrm>
-            <a:off x="3157547" y="192469"/>
+            <a:off x="2937584" y="146405"/>
             <a:ext cx="3986213" cy="1169551"/>
           </a:xfrm>
           <a:prstGeom prst="rect">
@@ -3817,8 +3817,8 @@
         </p:nvSpPr>
         <p:spPr>
           <a:xfrm>
-            <a:off x="2080347" y="4298084"/>
-            <a:ext cx="4843450" cy="5093702"/>
+            <a:off x="2080347" y="4591598"/>
+            <a:ext cx="4843450" cy="4801314"/>
           </a:xfrm>
           <a:prstGeom prst="rect">
             <a:avLst/>
@@ -3836,7 +3836,7 @@
                 <a:latin typeface="Malgun Gothic" panose="020B0503020000020004" pitchFamily="34" charset="-127"/>
                 <a:ea typeface="Malgun Gothic" panose="020B0503020000020004" pitchFamily="34" charset="-127"/>
               </a:rPr>
-              <a:t>Depuis 2023.10 </a:t>
+              <a:t>Depuis 2023.10 Chef de Projet CAO Nucléaire chez </a:t>
             </a:r>
             <a:r>
               <a:rPr lang="fr-FR" sz="1050" b="1" dirty="0" err="1">
@@ -3850,31 +3850,15 @@
                 <a:latin typeface="Malgun Gothic" panose="020B0503020000020004" pitchFamily="34" charset="-127"/>
                 <a:ea typeface="Malgun Gothic" panose="020B0503020000020004" pitchFamily="34" charset="-127"/>
               </a:rPr>
-              <a:t> World </a:t>
+              <a:t>/</a:t>
             </a:r>
             <a:r>
               <a:rPr lang="fr-FR" sz="1050" b="1" dirty="0" err="1">
                 <a:latin typeface="Malgun Gothic" panose="020B0503020000020004" pitchFamily="34" charset="-127"/>
                 <a:ea typeface="Malgun Gothic" panose="020B0503020000020004" pitchFamily="34" charset="-127"/>
               </a:rPr>
-              <a:t>Grid</a:t>
-            </a:r>
-            <a:r>
-              <a:rPr lang="fr-FR" sz="1050" b="1" dirty="0">
-                <a:latin typeface="Malgun Gothic" panose="020B0503020000020004" pitchFamily="34" charset="-127"/>
-                <a:ea typeface="Malgun Gothic" panose="020B0503020000020004" pitchFamily="34" charset="-127"/>
-              </a:rPr>
-              <a:t> </a:t>
-            </a:r>
-            <a:r>
-              <a:rPr lang="fr-FR" sz="1050" dirty="0">
-                <a:latin typeface="Malgun Gothic" panose="020B0503020000020004" pitchFamily="34" charset="-127"/>
-                <a:ea typeface="Malgun Gothic" panose="020B0503020000020004" pitchFamily="34" charset="-127"/>
-              </a:rPr>
-              <a:t>SECTEUR D’ACTIVITE :ENERGIE</a:t>
-            </a:r>
-          </a:p>
-          <a:p>
+              <a:t>WorldGrid</a:t>
+            </a:r>
             <a:endParaRPr lang="fr-FR" sz="1050" b="1" dirty="0">
               <a:latin typeface="Malgun Gothic" panose="020B0503020000020004" pitchFamily="34" charset="-127"/>
               <a:ea typeface="Malgun Gothic" panose="020B0503020000020004" pitchFamily="34" charset="-127"/>
@@ -3882,49 +3866,11 @@
           </a:p>
           <a:p>
             <a:r>
-              <a:rPr lang="fr-FR" sz="1050" b="1" cap="small" dirty="0">
-                <a:solidFill>
-                  <a:srgbClr val="4F81BD"/>
-                </a:solidFill>
-                <a:latin typeface="Malgun Gothic" panose="020B0503020000020004" pitchFamily="34" charset="-127"/>
-                <a:ea typeface="Malgun Gothic" panose="020B0503020000020004" pitchFamily="34" charset="-127"/>
-                <a:cs typeface="Angsana New" panose="02020603050405020304" pitchFamily="18" charset="-34"/>
-              </a:rPr>
-              <a:t>Chef de Projet CAO / Nucléaire</a:t>
-            </a:r>
-          </a:p>
-          <a:p>
-            <a:endParaRPr lang="fr-FR" sz="1050" b="1" cap="small" dirty="0">
-              <a:solidFill>
-                <a:srgbClr val="4F81BD"/>
-              </a:solidFill>
-              <a:latin typeface="Malgun Gothic" panose="020B0503020000020004" pitchFamily="34" charset="-127"/>
-              <a:ea typeface="Malgun Gothic" panose="020B0503020000020004" pitchFamily="34" charset="-127"/>
-              <a:cs typeface="Angsana New" panose="02020603050405020304" pitchFamily="18" charset="-34"/>
-            </a:endParaRPr>
-          </a:p>
-          <a:p>
-            <a:r>
-              <a:rPr lang="fr-FR" sz="1050" dirty="0">
-                <a:latin typeface="Malgun Gothic" panose="020B0503020000020004" pitchFamily="34" charset="-127"/>
-                <a:ea typeface="Malgun Gothic" panose="020B0503020000020004" pitchFamily="34" charset="-127"/>
-              </a:rPr>
-              <a:t>Organisation des développements informatiques en milieu sécurisé</a:t>
-            </a:r>
-          </a:p>
-          <a:p>
-            <a:endParaRPr lang="fr-FR" sz="1050" b="1" dirty="0">
-              <a:latin typeface="Malgun Gothic" panose="020B0503020000020004" pitchFamily="34" charset="-127"/>
-              <a:ea typeface="Malgun Gothic" panose="020B0503020000020004" pitchFamily="34" charset="-127"/>
-            </a:endParaRPr>
-          </a:p>
-          <a:p>
-            <a:r>
               <a:rPr lang="fr-FR" sz="1050" b="1" dirty="0">
                 <a:latin typeface="Malgun Gothic" panose="020B0503020000020004" pitchFamily="34" charset="-127"/>
                 <a:ea typeface="Malgun Gothic" panose="020B0503020000020004" pitchFamily="34" charset="-127"/>
               </a:rPr>
-              <a:t>2018.04-2023.02  – Missions de consulting </a:t>
+              <a:t>Projet EPR2 en milieu sécurisé sur le site d’Echirolles</a:t>
             </a:r>
           </a:p>
           <a:p>
@@ -3940,19 +3886,134 @@
           </a:p>
           <a:p>
             <a:r>
-              <a:rPr lang="fr-FR" sz="1050" b="1" cap="small" dirty="0">
+              <a:rPr kumimoji="0" lang="fr-FR" sz="1100" b="1" i="0" u="none" strike="noStrike" kern="1200" cap="small" spc="0" normalizeH="0" baseline="0" noProof="0" dirty="0">
+                <a:ln>
+                  <a:noFill/>
+                </a:ln>
                 <a:solidFill>
                   <a:srgbClr val="4F81BD"/>
                 </a:solidFill>
                 <a:effectLst/>
+                <a:uLnTx/>
+                <a:uFillTx/>
                 <a:latin typeface="Malgun Gothic" panose="020B0503020000020004" pitchFamily="34" charset="-127"/>
                 <a:ea typeface="Malgun Gothic" panose="020B0503020000020004" pitchFamily="34" charset="-127"/>
                 <a:cs typeface="Angsana New" panose="02020603050405020304" pitchFamily="18" charset="-34"/>
               </a:rPr>
-              <a:t>Scrum Master de l’équipe EcoStruxure Data Model (EDM) de Schneider en mode Safe à Eybens (Electropole) </a:t>
-            </a:r>
-            <a:r>
-              <a:rPr lang="fr-FR" sz="1050" cap="small" dirty="0">
+              <a:t>Animation d’une équipe de développeurs en milieu sécurisé.</a:t>
+            </a:r>
+          </a:p>
+          <a:p>
+            <a:pPr marL="171450" indent="-171450">
+              <a:buFont typeface="Arial" panose="020B0604020202020204" pitchFamily="34" charset="0"/>
+              <a:buChar char="•"/>
+            </a:pPr>
+            <a:r>
+              <a:rPr lang="fr-FR" sz="1100" dirty="0">
+                <a:solidFill>
+                  <a:srgbClr val="595959"/>
+                </a:solidFill>
+                <a:latin typeface="Malgun Gothic" panose="020B0503020000020004" pitchFamily="34" charset="-127"/>
+                <a:ea typeface="Malgun Gothic" panose="020B0503020000020004" pitchFamily="34" charset="-127"/>
+                <a:cs typeface="Calibri" panose="020F0502020204030204" pitchFamily="34" charset="0"/>
+              </a:rPr>
+              <a:t>Organisation des phases de développements dans un cycle en V</a:t>
+            </a:r>
+          </a:p>
+          <a:p>
+            <a:pPr marL="171450" indent="-171450">
+              <a:buFont typeface="Arial" panose="020B0604020202020204" pitchFamily="34" charset="0"/>
+              <a:buChar char="•"/>
+            </a:pPr>
+            <a:r>
+              <a:rPr lang="fr-FR" sz="1100" dirty="0">
+                <a:solidFill>
+                  <a:srgbClr val="595959"/>
+                </a:solidFill>
+                <a:latin typeface="Malgun Gothic" panose="020B0503020000020004" pitchFamily="34" charset="-127"/>
+                <a:ea typeface="Malgun Gothic" panose="020B0503020000020004" pitchFamily="34" charset="-127"/>
+                <a:cs typeface="Calibri" panose="020F0502020204030204" pitchFamily="34" charset="0"/>
+              </a:rPr>
+              <a:t>Animation de l’équipe et des ateliers de suivi</a:t>
+            </a:r>
+          </a:p>
+          <a:p>
+            <a:pPr marL="171450" indent="-171450">
+              <a:buFont typeface="Arial" panose="020B0604020202020204" pitchFamily="34" charset="0"/>
+              <a:buChar char="•"/>
+            </a:pPr>
+            <a:r>
+              <a:rPr lang="fr-FR" sz="1100" dirty="0">
+                <a:solidFill>
+                  <a:srgbClr val="595959"/>
+                </a:solidFill>
+                <a:latin typeface="Malgun Gothic" panose="020B0503020000020004" pitchFamily="34" charset="-127"/>
+                <a:ea typeface="Malgun Gothic" panose="020B0503020000020004" pitchFamily="34" charset="-127"/>
+                <a:cs typeface="Calibri" panose="020F0502020204030204" pitchFamily="34" charset="0"/>
+              </a:rPr>
+              <a:t>Participation aux Comité technique et Comité opérationnel</a:t>
+            </a:r>
+          </a:p>
+          <a:p>
+            <a:pPr marL="171450" indent="-171450">
+              <a:buFont typeface="Arial" panose="020B0604020202020204" pitchFamily="34" charset="0"/>
+              <a:buChar char="•"/>
+            </a:pPr>
+            <a:r>
+              <a:rPr lang="fr-FR" sz="1100" dirty="0">
+                <a:solidFill>
+                  <a:srgbClr val="595959"/>
+                </a:solidFill>
+                <a:latin typeface="Malgun Gothic" panose="020B0503020000020004" pitchFamily="34" charset="-127"/>
+                <a:ea typeface="Malgun Gothic" panose="020B0503020000020004" pitchFamily="34" charset="-127"/>
+                <a:cs typeface="Calibri" panose="020F0502020204030204" pitchFamily="34" charset="0"/>
+              </a:rPr>
+              <a:t>Mise en place de l’infrastructure de développement</a:t>
+            </a:r>
+          </a:p>
+          <a:p>
+            <a:pPr marL="171450" indent="-171450">
+              <a:buFont typeface="Arial" panose="020B0604020202020204" pitchFamily="34" charset="0"/>
+              <a:buChar char="•"/>
+            </a:pPr>
+            <a:endParaRPr kumimoji="0" lang="fr-FR" sz="1100" i="0" u="none" strike="noStrike" kern="1200" cap="small" spc="0" normalizeH="0" baseline="0" noProof="0" dirty="0">
+              <a:ln>
+                <a:noFill/>
+              </a:ln>
+              <a:solidFill>
+                <a:srgbClr val="4F81BD"/>
+              </a:solidFill>
+              <a:effectLst/>
+              <a:uLnTx/>
+              <a:uFillTx/>
+              <a:latin typeface="Malgun Gothic" panose="020B0503020000020004" pitchFamily="34" charset="-127"/>
+              <a:ea typeface="Malgun Gothic" panose="020B0503020000020004" pitchFamily="34" charset="-127"/>
+              <a:cs typeface="Angsana New" panose="02020603050405020304" pitchFamily="18" charset="-34"/>
+            </a:endParaRPr>
+          </a:p>
+          <a:p>
+            <a:r>
+              <a:rPr lang="fr-FR" sz="1100" b="1" dirty="0">
+                <a:latin typeface="Malgun Gothic" panose="020B0503020000020004" pitchFamily="34" charset="-127"/>
+                <a:ea typeface="Malgun Gothic" panose="020B0503020000020004" pitchFamily="34" charset="-127"/>
+              </a:rPr>
+              <a:t>2018 – 2023 Missions de consulting </a:t>
+            </a:r>
+          </a:p>
+          <a:p>
+            <a:endParaRPr lang="fr-FR" sz="1100" b="1" cap="small" dirty="0">
+              <a:solidFill>
+                <a:srgbClr val="4F81BD"/>
+              </a:solidFill>
+              <a:effectLst/>
+              <a:latin typeface="Malgun Gothic" panose="020B0503020000020004" pitchFamily="34" charset="-127"/>
+              <a:ea typeface="Malgun Gothic" panose="020B0503020000020004" pitchFamily="34" charset="-127"/>
+              <a:cs typeface="Angsana New" panose="02020603050405020304" pitchFamily="18" charset="-34"/>
+            </a:endParaRPr>
+          </a:p>
+          <a:p>
+            <a:r>
+              <a:rPr lang="fr-FR" sz="1100" b="1" cap="small" dirty="0">
                 <a:solidFill>
                   <a:srgbClr val="4F81BD"/>
                 </a:solidFill>
@@ -3961,8 +4022,146 @@
                 <a:ea typeface="Malgun Gothic" panose="020B0503020000020004" pitchFamily="34" charset="-127"/>
                 <a:cs typeface="Angsana New" panose="02020603050405020304" pitchFamily="18" charset="-34"/>
               </a:rPr>
-              <a:t>– 2022-05 au 2023-02</a:t>
-            </a:r>
+              <a:t>Scrum Master de l’équipe </a:t>
+            </a:r>
+            <a:r>
+              <a:rPr lang="fr-FR" sz="1100" b="1" cap="small" dirty="0" err="1">
+                <a:solidFill>
+                  <a:srgbClr val="4F81BD"/>
+                </a:solidFill>
+                <a:effectLst/>
+                <a:latin typeface="Malgun Gothic" panose="020B0503020000020004" pitchFamily="34" charset="-127"/>
+                <a:ea typeface="Malgun Gothic" panose="020B0503020000020004" pitchFamily="34" charset="-127"/>
+                <a:cs typeface="Angsana New" panose="02020603050405020304" pitchFamily="18" charset="-34"/>
+              </a:rPr>
+              <a:t>EcoStruxure</a:t>
+            </a:r>
+            <a:r>
+              <a:rPr lang="fr-FR" sz="1100" b="1" cap="small" dirty="0">
+                <a:solidFill>
+                  <a:srgbClr val="4F81BD"/>
+                </a:solidFill>
+                <a:effectLst/>
+                <a:latin typeface="Malgun Gothic" panose="020B0503020000020004" pitchFamily="34" charset="-127"/>
+                <a:ea typeface="Malgun Gothic" panose="020B0503020000020004" pitchFamily="34" charset="-127"/>
+                <a:cs typeface="Angsana New" panose="02020603050405020304" pitchFamily="18" charset="-34"/>
+              </a:rPr>
+              <a:t> Data Model (EDM) de Schneider en mode Safe à Eybens (</a:t>
+            </a:r>
+            <a:r>
+              <a:rPr lang="fr-FR" sz="1100" b="1" cap="small" dirty="0" err="1">
+                <a:solidFill>
+                  <a:srgbClr val="4F81BD"/>
+                </a:solidFill>
+                <a:effectLst/>
+                <a:latin typeface="Malgun Gothic" panose="020B0503020000020004" pitchFamily="34" charset="-127"/>
+                <a:ea typeface="Malgun Gothic" panose="020B0503020000020004" pitchFamily="34" charset="-127"/>
+                <a:cs typeface="Angsana New" panose="02020603050405020304" pitchFamily="18" charset="-34"/>
+              </a:rPr>
+              <a:t>Electropole</a:t>
+            </a:r>
+            <a:r>
+              <a:rPr lang="fr-FR" sz="1100" b="1" cap="small" dirty="0">
+                <a:solidFill>
+                  <a:srgbClr val="4F81BD"/>
+                </a:solidFill>
+                <a:effectLst/>
+                <a:latin typeface="Malgun Gothic" panose="020B0503020000020004" pitchFamily="34" charset="-127"/>
+                <a:ea typeface="Malgun Gothic" panose="020B0503020000020004" pitchFamily="34" charset="-127"/>
+                <a:cs typeface="Angsana New" panose="02020603050405020304" pitchFamily="18" charset="-34"/>
+              </a:rPr>
+              <a:t>) </a:t>
+            </a:r>
+            <a:r>
+              <a:rPr lang="fr-FR" sz="1100" cap="small" dirty="0">
+                <a:solidFill>
+                  <a:srgbClr val="4F81BD"/>
+                </a:solidFill>
+                <a:effectLst/>
+                <a:latin typeface="Malgun Gothic" panose="020B0503020000020004" pitchFamily="34" charset="-127"/>
+                <a:ea typeface="Malgun Gothic" panose="020B0503020000020004" pitchFamily="34" charset="-127"/>
+                <a:cs typeface="Angsana New" panose="02020603050405020304" pitchFamily="18" charset="-34"/>
+              </a:rPr>
+              <a:t>– 2022-05 au 2023-03</a:t>
+            </a:r>
+            <a:endParaRPr lang="fr-FR" sz="1100" dirty="0">
+              <a:solidFill>
+                <a:srgbClr val="595959"/>
+              </a:solidFill>
+              <a:effectLst/>
+              <a:latin typeface="Malgun Gothic" panose="020B0503020000020004" pitchFamily="34" charset="-127"/>
+              <a:ea typeface="Malgun Gothic" panose="020B0503020000020004" pitchFamily="34" charset="-127"/>
+              <a:cs typeface="Angsana New" panose="02020603050405020304" pitchFamily="18" charset="-34"/>
+            </a:endParaRPr>
+          </a:p>
+          <a:p>
+            <a:pPr lvl="0" algn="just">
+              <a:buSzPts val="1050"/>
+            </a:pPr>
+            <a:r>
+              <a:rPr lang="fr-FR" sz="1100" dirty="0">
+                <a:solidFill>
+                  <a:srgbClr val="595959"/>
+                </a:solidFill>
+                <a:effectLst/>
+                <a:latin typeface="Malgun Gothic" panose="020B0503020000020004" pitchFamily="34" charset="-127"/>
+                <a:ea typeface="Malgun Gothic" panose="020B0503020000020004" pitchFamily="34" charset="-127"/>
+                <a:cs typeface="Angsana New" panose="02020603050405020304" pitchFamily="18" charset="-34"/>
+              </a:rPr>
+              <a:t>Encadrement et Mise en place du </a:t>
+            </a:r>
+            <a:r>
+              <a:rPr lang="fr-FR" sz="1100" dirty="0" err="1">
+                <a:solidFill>
+                  <a:srgbClr val="595959"/>
+                </a:solidFill>
+                <a:effectLst/>
+                <a:latin typeface="Malgun Gothic" panose="020B0503020000020004" pitchFamily="34" charset="-127"/>
+                <a:ea typeface="Malgun Gothic" panose="020B0503020000020004" pitchFamily="34" charset="-127"/>
+                <a:cs typeface="Angsana New" panose="02020603050405020304" pitchFamily="18" charset="-34"/>
+              </a:rPr>
+              <a:t>framework</a:t>
+            </a:r>
+            <a:r>
+              <a:rPr lang="fr-FR" sz="1100" dirty="0">
+                <a:solidFill>
+                  <a:srgbClr val="595959"/>
+                </a:solidFill>
+                <a:effectLst/>
+                <a:latin typeface="Malgun Gothic" panose="020B0503020000020004" pitchFamily="34" charset="-127"/>
+                <a:ea typeface="Malgun Gothic" panose="020B0503020000020004" pitchFamily="34" charset="-127"/>
+                <a:cs typeface="Angsana New" panose="02020603050405020304" pitchFamily="18" charset="-34"/>
+              </a:rPr>
+              <a:t> Scrum dans une équipe pluridisciplinaire en </a:t>
+            </a:r>
+            <a:r>
+              <a:rPr lang="fr-FR" sz="1100" dirty="0">
+                <a:solidFill>
+                  <a:srgbClr val="595959"/>
+                </a:solidFill>
+                <a:latin typeface="Malgun Gothic" panose="020B0503020000020004" pitchFamily="34" charset="-127"/>
+                <a:ea typeface="Malgun Gothic" panose="020B0503020000020004" pitchFamily="34" charset="-127"/>
+                <a:cs typeface="Angsana New" panose="02020603050405020304" pitchFamily="18" charset="-34"/>
+              </a:rPr>
+              <a:t>é</a:t>
+            </a:r>
+            <a:r>
+              <a:rPr lang="fr-FR" sz="1100" dirty="0">
+                <a:solidFill>
+                  <a:srgbClr val="595959"/>
+                </a:solidFill>
+                <a:effectLst/>
+                <a:latin typeface="Malgun Gothic" panose="020B0503020000020004" pitchFamily="34" charset="-127"/>
+                <a:ea typeface="Malgun Gothic" panose="020B0503020000020004" pitchFamily="34" charset="-127"/>
+                <a:cs typeface="Angsana New" panose="02020603050405020304" pitchFamily="18" charset="-34"/>
+              </a:rPr>
+              <a:t>lectricité</a:t>
+            </a:r>
+          </a:p>
+          <a:p>
+            <a:pPr lvl="0" algn="just">
+              <a:buSzPts val="1050"/>
+            </a:pPr>
             <a:endParaRPr lang="fr-FR" sz="1050" dirty="0">
               <a:solidFill>
                 <a:srgbClr val="595959"/>
@@ -3974,87 +4173,9 @@
             </a:endParaRPr>
           </a:p>
           <a:p>
-            <a:pPr lvl="0" algn="just">
-              <a:buSzPts val="1050"/>
-            </a:pPr>
-            <a:r>
-              <a:rPr lang="fr-FR" sz="1050" dirty="0">
-                <a:solidFill>
-                  <a:srgbClr val="595959"/>
-                </a:solidFill>
-                <a:effectLst/>
-                <a:latin typeface="Malgun Gothic" panose="020B0503020000020004" pitchFamily="34" charset="-127"/>
-                <a:ea typeface="Malgun Gothic" panose="020B0503020000020004" pitchFamily="34" charset="-127"/>
-                <a:cs typeface="Angsana New" panose="02020603050405020304" pitchFamily="18" charset="-34"/>
-              </a:rPr>
-              <a:t>Encadrement et Mise en place du </a:t>
-            </a:r>
-            <a:r>
-              <a:rPr lang="fr-FR" sz="1050" dirty="0" err="1">
-                <a:solidFill>
-                  <a:srgbClr val="595959"/>
-                </a:solidFill>
-                <a:effectLst/>
-                <a:latin typeface="Malgun Gothic" panose="020B0503020000020004" pitchFamily="34" charset="-127"/>
-                <a:ea typeface="Malgun Gothic" panose="020B0503020000020004" pitchFamily="34" charset="-127"/>
-                <a:cs typeface="Angsana New" panose="02020603050405020304" pitchFamily="18" charset="-34"/>
-              </a:rPr>
-              <a:t>framework</a:t>
-            </a:r>
-            <a:r>
-              <a:rPr lang="fr-FR" sz="1050" dirty="0">
-                <a:solidFill>
-                  <a:srgbClr val="595959"/>
-                </a:solidFill>
-                <a:effectLst/>
-                <a:latin typeface="Malgun Gothic" panose="020B0503020000020004" pitchFamily="34" charset="-127"/>
-                <a:ea typeface="Malgun Gothic" panose="020B0503020000020004" pitchFamily="34" charset="-127"/>
-                <a:cs typeface="Angsana New" panose="02020603050405020304" pitchFamily="18" charset="-34"/>
-              </a:rPr>
-              <a:t> Scrum dans une équipe pluridisciplinaire en </a:t>
-            </a:r>
-            <a:r>
-              <a:rPr lang="fr-FR" sz="1050" dirty="0">
-                <a:solidFill>
-                  <a:srgbClr val="595959"/>
-                </a:solidFill>
-                <a:latin typeface="Malgun Gothic" panose="020B0503020000020004" pitchFamily="34" charset="-127"/>
-                <a:ea typeface="Malgun Gothic" panose="020B0503020000020004" pitchFamily="34" charset="-127"/>
-                <a:cs typeface="Angsana New" panose="02020603050405020304" pitchFamily="18" charset="-34"/>
-              </a:rPr>
-              <a:t>é</a:t>
-            </a:r>
-            <a:r>
-              <a:rPr lang="fr-FR" sz="1050" dirty="0">
-                <a:solidFill>
-                  <a:srgbClr val="595959"/>
-                </a:solidFill>
-                <a:effectLst/>
-                <a:latin typeface="Malgun Gothic" panose="020B0503020000020004" pitchFamily="34" charset="-127"/>
-                <a:ea typeface="Malgun Gothic" panose="020B0503020000020004" pitchFamily="34" charset="-127"/>
-                <a:cs typeface="Angsana New" panose="02020603050405020304" pitchFamily="18" charset="-34"/>
-              </a:rPr>
-              <a:t>lectricité</a:t>
-            </a:r>
-          </a:p>
-          <a:p>
-            <a:pPr lvl="0" algn="just">
-              <a:buSzPts val="1050"/>
-            </a:pPr>
-            <a:endParaRPr lang="fr-FR" sz="1000" dirty="0">
-              <a:solidFill>
-                <a:srgbClr val="595959"/>
-              </a:solidFill>
-              <a:effectLst/>
-              <a:latin typeface="Malgun Gothic" panose="020B0503020000020004" pitchFamily="34" charset="-127"/>
-              <a:ea typeface="Malgun Gothic" panose="020B0503020000020004" pitchFamily="34" charset="-127"/>
-              <a:cs typeface="Angsana New" panose="02020603050405020304" pitchFamily="18" charset="-34"/>
-            </a:endParaRPr>
-          </a:p>
-          <a:p>
             <a:pPr algn="just"/>
             <a:r>
-              <a:rPr lang="fr-FR" sz="1050" b="1" cap="small" dirty="0">
+              <a:rPr lang="fr-FR" sz="1100" b="1" cap="small" dirty="0">
                 <a:solidFill>
                   <a:srgbClr val="4F81BD"/>
                 </a:solidFill>
@@ -4066,7 +4187,7 @@
               <a:t>Architecte Solutions / Scrum Master DevOps</a:t>
             </a:r>
             <a:r>
-              <a:rPr lang="fr-FR" sz="1050" dirty="0">
+              <a:rPr lang="fr-FR" sz="1100" dirty="0">
                 <a:ln>
                   <a:noFill/>
                 </a:ln>
@@ -4087,7 +4208,7 @@
               <a:t> pour la Compagnie Des Alpes </a:t>
             </a:r>
             <a:r>
-              <a:rPr lang="fr-FR" sz="1050" dirty="0">
+              <a:rPr lang="fr-FR" sz="1100" dirty="0">
                 <a:solidFill>
                   <a:srgbClr val="4F81BD"/>
                 </a:solidFill>
@@ -4105,7 +4226,7 @@
               <a:t>à </a:t>
             </a:r>
             <a:r>
-              <a:rPr lang="fr-FR" sz="1050" dirty="0" err="1">
+              <a:rPr lang="fr-FR" sz="1100" dirty="0" err="1">
                 <a:solidFill>
                   <a:srgbClr val="4F81BD"/>
                 </a:solidFill>
@@ -4123,7 +4244,7 @@
               <a:t>Monbonnot-Saint-Martin</a:t>
             </a:r>
             <a:r>
-              <a:rPr lang="fr-FR" sz="1050" dirty="0">
+              <a:rPr lang="fr-FR" sz="1100" dirty="0">
                 <a:ln>
                   <a:noFill/>
                 </a:ln>
@@ -4143,7 +4264,7 @@
               </a:rPr>
               <a:t> – 2021-05 à 2021-12</a:t>
             </a:r>
-            <a:endParaRPr lang="fr-FR" sz="1050" dirty="0">
+            <a:endParaRPr lang="fr-FR" sz="1100" dirty="0">
               <a:solidFill>
                 <a:srgbClr val="595959"/>
               </a:solidFill>
@@ -4158,7 +4279,7 @@
               <a:buSzPts val="1050"/>
             </a:pPr>
             <a:r>
-              <a:rPr lang="fr-FR" sz="1050" dirty="0">
+              <a:rPr lang="fr-FR" sz="1100" dirty="0">
                 <a:solidFill>
                   <a:srgbClr val="595959"/>
                 </a:solidFill>
@@ -4173,7 +4294,7 @@
             <a:pPr algn="just">
               <a:buSzPts val="1050"/>
             </a:pPr>
-            <a:endParaRPr lang="fr-FR" sz="1050" dirty="0">
+            <a:endParaRPr lang="fr-FR" sz="1100" dirty="0">
               <a:solidFill>
                 <a:srgbClr val="595959"/>
               </a:solidFill>
@@ -4184,7 +4305,7 @@
           </a:p>
           <a:p>
             <a:r>
-              <a:rPr lang="fr-FR" sz="1050" b="1" cap="small" dirty="0">
+              <a:rPr lang="fr-FR" sz="1100" b="1" cap="small" dirty="0">
                 <a:solidFill>
                   <a:srgbClr val="4F81BD"/>
                 </a:solidFill>
@@ -4195,7 +4316,7 @@
               <a:t>Consultant DevOps pour Schneider à </a:t>
             </a:r>
             <a:r>
-              <a:rPr lang="fr-FR" sz="1050" b="1" cap="small" dirty="0" err="1">
+              <a:rPr lang="fr-FR" sz="1100" b="1" cap="small" dirty="0" err="1">
                 <a:solidFill>
                   <a:srgbClr val="4F81BD"/>
                 </a:solidFill>
@@ -4206,7 +4327,7 @@
               <a:t>eybens</a:t>
             </a:r>
             <a:r>
-              <a:rPr lang="fr-FR" sz="1050" b="1" cap="small" dirty="0">
+              <a:rPr lang="fr-FR" sz="1100" b="1" cap="small" dirty="0">
                 <a:solidFill>
                   <a:srgbClr val="4F81BD"/>
                 </a:solidFill>
@@ -4217,7 +4338,7 @@
               <a:t> </a:t>
             </a:r>
             <a:r>
-              <a:rPr lang="fr-FR" sz="1050" cap="small" dirty="0">
+              <a:rPr lang="fr-FR" sz="1100" cap="small" dirty="0">
                 <a:solidFill>
                   <a:srgbClr val="4F81BD"/>
                 </a:solidFill>
@@ -4233,7 +4354,7 @@
               <a:buSzPts val="1050"/>
             </a:pPr>
             <a:r>
-              <a:rPr lang="fr-FR" sz="1050" dirty="0">
+              <a:rPr lang="fr-FR" sz="1100" dirty="0">
                 <a:solidFill>
                   <a:srgbClr val="595959"/>
                 </a:solidFill>
@@ -4250,7 +4371,7 @@
               <a:buSzPts val="1050"/>
             </a:pPr>
             <a:r>
-              <a:rPr lang="fr-FR" sz="1050" dirty="0">
+              <a:rPr lang="fr-FR" sz="1100" dirty="0">
                 <a:solidFill>
                   <a:srgbClr val="595959"/>
                 </a:solidFill>
@@ -4263,138 +4384,39 @@
             </a:r>
           </a:p>
           <a:p>
-            <a:endParaRPr lang="fr-FR" sz="1050" dirty="0">
+            <a:endParaRPr kumimoji="0" lang="fr-FR" sz="1100" i="0" u="none" strike="noStrike" kern="1200" cap="small" spc="0" normalizeH="0" baseline="0" noProof="0" dirty="0">
+              <a:ln>
+                <a:noFill/>
+              </a:ln>
               <a:solidFill>
-                <a:schemeClr val="bg2">
-                  <a:lumMod val="25000"/>
-                </a:schemeClr>
+                <a:srgbClr val="4F81BD"/>
               </a:solidFill>
+              <a:effectLst/>
+              <a:uLnTx/>
+              <a:uFillTx/>
               <a:latin typeface="Malgun Gothic" panose="020B0503020000020004" pitchFamily="34" charset="-127"/>
               <a:ea typeface="Malgun Gothic" panose="020B0503020000020004" pitchFamily="34" charset="-127"/>
+              <a:cs typeface="Angsana New" panose="02020603050405020304" pitchFamily="18" charset="-34"/>
             </a:endParaRPr>
           </a:p>
           <a:p>
             <a:r>
-              <a:rPr lang="fr-FR" sz="1050" b="1" cap="small" dirty="0">
+              <a:rPr kumimoji="0" lang="fr-FR" sz="1100" b="0" i="0" u="none" strike="noStrike" kern="1200" cap="none" spc="0" normalizeH="0" baseline="0" noProof="0" dirty="0">
+                <a:ln>
+                  <a:noFill/>
+                </a:ln>
                 <a:solidFill>
                   <a:srgbClr val="4F81BD"/>
                 </a:solidFill>
+                <a:effectLst/>
+                <a:uLnTx/>
+                <a:uFillTx/>
                 <a:latin typeface="Malgun Gothic" panose="020B0503020000020004" pitchFamily="34" charset="-127"/>
                 <a:ea typeface="Malgun Gothic" panose="020B0503020000020004" pitchFamily="34" charset="-127"/>
                 <a:cs typeface="Angsana New" panose="02020603050405020304" pitchFamily="18" charset="-34"/>
               </a:rPr>
-              <a:t>Consultant Architecte DevOps, Docker </a:t>
-            </a:r>
-            <a:r>
-              <a:rPr lang="fr-FR" sz="1050" cap="small" dirty="0">
-                <a:solidFill>
-                  <a:srgbClr val="4F81BD"/>
-                </a:solidFill>
-                <a:latin typeface="Malgun Gothic" panose="020B0503020000020004" pitchFamily="34" charset="-127"/>
-                <a:ea typeface="Malgun Gothic" panose="020B0503020000020004" pitchFamily="34" charset="-127"/>
-                <a:cs typeface="Angsana New" panose="02020603050405020304" pitchFamily="18" charset="-34"/>
-              </a:rPr>
-              <a:t>HARDIS</a:t>
-            </a:r>
-            <a:r>
-              <a:rPr lang="fr-FR" sz="1050" b="1" cap="small" dirty="0">
-                <a:solidFill>
-                  <a:srgbClr val="4F81BD"/>
-                </a:solidFill>
-                <a:latin typeface="Malgun Gothic" panose="020B0503020000020004" pitchFamily="34" charset="-127"/>
-                <a:ea typeface="Malgun Gothic" panose="020B0503020000020004" pitchFamily="34" charset="-127"/>
-                <a:cs typeface="Angsana New" panose="02020603050405020304" pitchFamily="18" charset="-34"/>
-              </a:rPr>
-              <a:t> </a:t>
-            </a:r>
-            <a:r>
-              <a:rPr lang="fr-FR" sz="1050" cap="small" dirty="0">
-                <a:solidFill>
-                  <a:srgbClr val="4F81BD"/>
-                </a:solidFill>
-                <a:latin typeface="Malgun Gothic" panose="020B0503020000020004" pitchFamily="34" charset="-127"/>
-                <a:ea typeface="Malgun Gothic" panose="020B0503020000020004" pitchFamily="34" charset="-127"/>
-                <a:cs typeface="Angsana New" panose="02020603050405020304" pitchFamily="18" charset="-34"/>
-              </a:rPr>
-              <a:t>– 2018-2019</a:t>
-            </a:r>
-            <a:endParaRPr lang="fr-FR" sz="1050" dirty="0">
-              <a:solidFill>
-                <a:schemeClr val="bg2">
-                  <a:lumMod val="25000"/>
-                </a:schemeClr>
-              </a:solidFill>
-              <a:latin typeface="Malgun Gothic" panose="020B0503020000020004" pitchFamily="34" charset="-127"/>
-              <a:ea typeface="Malgun Gothic" panose="020B0503020000020004" pitchFamily="34" charset="-127"/>
-            </a:endParaRPr>
-          </a:p>
-          <a:p>
-            <a:pPr lvl="0" algn="just">
-              <a:buSzPts val="1050"/>
-              <a:tabLst>
-                <a:tab pos="323850" algn="l"/>
-              </a:tabLst>
-            </a:pPr>
-            <a:endParaRPr lang="fr-FR" sz="1050" b="1" i="1" dirty="0">
-              <a:solidFill>
-                <a:srgbClr val="595959"/>
-              </a:solidFill>
-              <a:effectLst/>
-              <a:latin typeface="Malgun Gothic" panose="020B0503020000020004" pitchFamily="34" charset="-127"/>
-              <a:ea typeface="Malgun Gothic" panose="020B0503020000020004" pitchFamily="34" charset="-127"/>
-              <a:cs typeface="Calibri" panose="020F0502020204030204" pitchFamily="34" charset="0"/>
-            </a:endParaRPr>
-          </a:p>
-          <a:p>
-            <a:pPr lvl="0" algn="just">
-              <a:buSzPts val="1050"/>
-              <a:tabLst>
-                <a:tab pos="323850" algn="l"/>
-              </a:tabLst>
-            </a:pPr>
-            <a:r>
-              <a:rPr lang="fr-FR" sz="1050" b="1" i="1" dirty="0">
-                <a:solidFill>
-                  <a:srgbClr val="595959"/>
-                </a:solidFill>
-                <a:effectLst/>
-                <a:latin typeface="Malgun Gothic" panose="020B0503020000020004" pitchFamily="34" charset="-127"/>
-                <a:ea typeface="Malgun Gothic" panose="020B0503020000020004" pitchFamily="34" charset="-127"/>
-                <a:cs typeface="Calibri" panose="020F0502020204030204" pitchFamily="34" charset="0"/>
-              </a:rPr>
-              <a:t>DOCKERISATION ADELIA/REFLEX </a:t>
-            </a:r>
-            <a:r>
-              <a:rPr lang="fr-FR" sz="1050" dirty="0">
-                <a:solidFill>
-                  <a:srgbClr val="595959"/>
-                </a:solidFill>
-                <a:effectLst/>
-                <a:latin typeface="Malgun Gothic" panose="020B0503020000020004" pitchFamily="34" charset="-127"/>
-                <a:ea typeface="Malgun Gothic" panose="020B0503020000020004" pitchFamily="34" charset="-127"/>
-                <a:cs typeface="Calibri" panose="020F0502020204030204" pitchFamily="34" charset="0"/>
-              </a:rPr>
-              <a:t>Participation à la transformation de l’application REFLEX sous forme de conteneurs Docker. Le but est d’utiliser l’application sur le Cloud Public et/ou privé.</a:t>
-            </a:r>
-          </a:p>
-          <a:p>
-            <a:pPr lvl="0" algn="just">
-              <a:buSzPts val="1050"/>
-              <a:tabLst>
-                <a:tab pos="323850" algn="l"/>
-              </a:tabLst>
-            </a:pPr>
-            <a:endParaRPr lang="fr-FR" sz="1050" dirty="0">
-              <a:solidFill>
-                <a:srgbClr val="595959"/>
-              </a:solidFill>
-              <a:effectLst/>
-              <a:latin typeface="Malgun Gothic" panose="020B0503020000020004" pitchFamily="34" charset="-127"/>
-              <a:ea typeface="Malgun Gothic" panose="020B0503020000020004" pitchFamily="34" charset="-127"/>
-              <a:cs typeface="Wingdings" panose="05000000000000000000" pitchFamily="2" charset="2"/>
-            </a:endParaRPr>
-          </a:p>
-          <a:p>
+              <a:t> </a:t>
+            </a:r>
             <a:endParaRPr lang="fr-FR" sz="1050" dirty="0">
               <a:solidFill>
                 <a:schemeClr val="bg2">
@@ -4457,7 +4479,7 @@
         </p:blipFill>
         <p:spPr>
           <a:xfrm>
-            <a:off x="1829886" y="3774602"/>
+            <a:off x="1829886" y="4169714"/>
             <a:ext cx="498315" cy="419477"/>
           </a:xfrm>
           <a:prstGeom prst="rect">
@@ -4479,7 +4501,7 @@
         </p:nvSpPr>
         <p:spPr>
           <a:xfrm>
-            <a:off x="2382948" y="3852608"/>
+            <a:off x="2382187" y="4209843"/>
             <a:ext cx="3525715" cy="307777"/>
           </a:xfrm>
           <a:prstGeom prst="rect">
@@ -4522,7 +4544,7 @@
         </p:nvCxnSpPr>
         <p:spPr>
           <a:xfrm flipV="1">
-            <a:off x="2422692" y="4169786"/>
+            <a:off x="2422692" y="4531034"/>
             <a:ext cx="4158761" cy="8792"/>
           </a:xfrm>
           <a:prstGeom prst="line">
@@ -4566,7 +4588,7 @@
         <p:spPr>
           <a:xfrm>
             <a:off x="2064776" y="1723408"/>
-            <a:ext cx="4793223" cy="1908215"/>
+            <a:ext cx="4793224" cy="2408352"/>
           </a:xfrm>
           <a:prstGeom prst="rect">
             <a:avLst/>
@@ -4640,6 +4662,18 @@
           </a:p>
           <a:p>
             <a:pPr algn="just"/>
+            <a:endParaRPr lang="fr-FR" sz="1050" b="1" cap="small" dirty="0">
+              <a:solidFill>
+                <a:srgbClr val="4F81BD"/>
+              </a:solidFill>
+              <a:effectLst/>
+              <a:latin typeface="Malgun Gothic" panose="020B0503020000020004" pitchFamily="34" charset="-127"/>
+              <a:ea typeface="Malgun Gothic" panose="020B0503020000020004" pitchFamily="34" charset="-127"/>
+              <a:cs typeface="Angsana New" panose="02020603050405020304" pitchFamily="18" charset="-34"/>
+            </a:endParaRPr>
+          </a:p>
+          <a:p>
+            <a:pPr algn="just"/>
             <a:r>
               <a:rPr lang="fr-FR" sz="1050" b="1" cap="small" dirty="0">
                 <a:solidFill>
@@ -4676,6 +4710,18 @@
           </a:p>
           <a:p>
             <a:pPr algn="just"/>
+            <a:endParaRPr lang="fr-FR" sz="1100" b="1" cap="small" dirty="0">
+              <a:solidFill>
+                <a:srgbClr val="4F81BD"/>
+              </a:solidFill>
+              <a:effectLst/>
+              <a:latin typeface="Malgun Gothic" panose="020B0503020000020004" pitchFamily="34" charset="-127"/>
+              <a:ea typeface="Malgun Gothic" panose="020B0503020000020004" pitchFamily="34" charset="-127"/>
+              <a:cs typeface="Angsana New" panose="02020603050405020304" pitchFamily="18" charset="-34"/>
+            </a:endParaRPr>
+          </a:p>
+          <a:p>
+            <a:pPr algn="just"/>
             <a:r>
               <a:rPr lang="fr-FR" sz="1100" b="1" cap="small" dirty="0">
                 <a:solidFill>
@@ -4782,6 +4828,18 @@
           </a:p>
           <a:p>
             <a:pPr algn="just"/>
+            <a:endParaRPr lang="fr-FR" sz="1100" b="1" cap="small" dirty="0">
+              <a:solidFill>
+                <a:srgbClr val="4F81BD"/>
+              </a:solidFill>
+              <a:effectLst/>
+              <a:latin typeface="Malgun Gothic" panose="020B0503020000020004" pitchFamily="34" charset="-127"/>
+              <a:ea typeface="Malgun Gothic" panose="020B0503020000020004" pitchFamily="34" charset="-127"/>
+              <a:cs typeface="Angsana New" panose="02020603050405020304" pitchFamily="18" charset="-34"/>
+            </a:endParaRPr>
+          </a:p>
+          <a:p>
+            <a:pPr algn="just"/>
             <a:r>
               <a:rPr lang="fr-FR" sz="1100" b="1" cap="small" dirty="0">
                 <a:solidFill>
@@ -4805,6 +4863,9 @@
               </a:rPr>
               <a:t>AWS, Azure</a:t>
             </a:r>
+          </a:p>
+          <a:p>
+            <a:pPr algn="just"/>
             <a:endParaRPr lang="fr-FR" sz="1050" dirty="0">
               <a:solidFill>
                 <a:srgbClr val="595959"/>
@@ -4850,7 +4911,7 @@
                 <a:ea typeface="Malgun Gothic" panose="020B0503020000020004" pitchFamily="34" charset="-127"/>
                 <a:cs typeface="Calibri" panose="020F0502020204030204" pitchFamily="34" charset="0"/>
               </a:rPr>
-              <a:t>Python, Java/JEE, C/C++, Javascript, SQL, Ruby/Chef</a:t>
+              <a:t>Python, Java/JEE, C/C++, Django </a:t>
             </a:r>
             <a:endParaRPr lang="fr-FR" sz="1050" dirty="0">
               <a:solidFill>
@@ -5011,8 +5072,8 @@
         </p:nvSpPr>
         <p:spPr>
           <a:xfrm>
-            <a:off x="193175" y="104549"/>
-            <a:ext cx="3235825" cy="1238801"/>
+            <a:off x="201513" y="105024"/>
+            <a:ext cx="2806057" cy="1238801"/>
           </a:xfrm>
           <a:prstGeom prst="rect">
             <a:avLst/>
@@ -5079,10 +5140,12 @@
                 <a:latin typeface="Malgun Gothic" panose="020B0503020000020004" pitchFamily="34" charset="-127"/>
                 <a:ea typeface="Malgun Gothic" panose="020B0503020000020004" pitchFamily="34" charset="-127"/>
               </a:rPr>
-              <a:t>Responsable </a:t>
-            </a:r>
-            <a:r>
-              <a:rPr lang="fr-FR" sz="1200" b="1">
+              <a:t>Responsable de développement</a:t>
+            </a:r>
+          </a:p>
+          <a:p>
+            <a:r>
+              <a:rPr lang="fr-FR" sz="1050" b="1">
                 <a:solidFill>
                   <a:schemeClr val="accent5">
                     <a:lumMod val="50000"/>
@@ -5091,9 +5154,9 @@
                 <a:latin typeface="Malgun Gothic" panose="020B0503020000020004" pitchFamily="34" charset="-127"/>
                 <a:ea typeface="Malgun Gothic" panose="020B0503020000020004" pitchFamily="34" charset="-127"/>
               </a:rPr>
-              <a:t>de développement</a:t>
-            </a:r>
-            <a:endParaRPr lang="fr-FR" sz="1200" b="1" dirty="0">
+              <a:t>Conduite de projets R&amp;D, DevOps</a:t>
+            </a:r>
+            <a:endParaRPr lang="fr-FR" sz="1050" b="1" dirty="0">
               <a:solidFill>
                 <a:schemeClr val="accent5">
                   <a:lumMod val="50000"/>
@@ -5102,20 +5165,6 @@
               <a:latin typeface="Malgun Gothic" panose="020B0503020000020004" pitchFamily="34" charset="-127"/>
               <a:ea typeface="Malgun Gothic" panose="020B0503020000020004" pitchFamily="34" charset="-127"/>
             </a:endParaRPr>
-          </a:p>
-          <a:p>
-            <a:r>
-              <a:rPr lang="fr-FR" sz="1050" b="1" dirty="0">
-                <a:solidFill>
-                  <a:schemeClr val="accent5">
-                    <a:lumMod val="50000"/>
-                  </a:schemeClr>
-                </a:solidFill>
-                <a:latin typeface="Malgun Gothic" panose="020B0503020000020004" pitchFamily="34" charset="-127"/>
-                <a:ea typeface="Malgun Gothic" panose="020B0503020000020004" pitchFamily="34" charset="-127"/>
-              </a:rPr>
-              <a:t>Conduite de projets R&amp;D, DevOps</a:t>
-            </a:r>
           </a:p>
         </p:txBody>
       </p:sp>
@@ -5146,14 +5195,7 @@
                 <a:latin typeface="Malgun Gothic" panose="020B0503020000020004" pitchFamily="34" charset="-127"/>
                 <a:ea typeface="Malgun Gothic" panose="020B0503020000020004" pitchFamily="34" charset="-127"/>
               </a:rPr>
-              <a:t>Secteurs géographiques </a:t>
-            </a:r>
-            <a:r>
-              <a:rPr lang="fr-FR" sz="1050" b="1">
-                <a:latin typeface="Malgun Gothic" panose="020B0503020000020004" pitchFamily="34" charset="-127"/>
-                <a:ea typeface="Malgun Gothic" panose="020B0503020000020004" pitchFamily="34" charset="-127"/>
-              </a:rPr>
-              <a:t>: Grenoble</a:t>
+              <a:t>Secteurs géographiques : Annecy ou Grenoble</a:t>
             </a:r>
             <a:endParaRPr lang="fr-FR" sz="1000" dirty="0">
               <a:latin typeface="Malgun Gothic" panose="020B0503020000020004" pitchFamily="34" charset="-127"/>
@@ -5162,11 +5204,18 @@
           </a:p>
           <a:p>
             <a:r>
+              <a:rPr lang="fr-FR" sz="1000">
+                <a:latin typeface="Malgun Gothic" panose="020B0503020000020004" pitchFamily="34" charset="-127"/>
+                <a:ea typeface="Malgun Gothic" panose="020B0503020000020004" pitchFamily="34" charset="-127"/>
+              </a:rPr>
+              <a:t>55 </a:t>
+            </a:r>
+            <a:r>
               <a:rPr lang="fr-FR" sz="1000" dirty="0">
                 <a:latin typeface="Malgun Gothic" panose="020B0503020000020004" pitchFamily="34" charset="-127"/>
                 <a:ea typeface="Malgun Gothic" panose="020B0503020000020004" pitchFamily="34" charset="-127"/>
               </a:rPr>
-              <a:t>54 ans 1 enfant</a:t>
+              <a:t>ans 1 enfant</a:t>
             </a:r>
           </a:p>
           <a:p>
@@ -5210,7 +5259,7 @@
           <p:nvPr>
             <p:extLst>
               <p:ext uri="{D42A27DB-BD31-4B8C-83A1-F6EECF244321}">
-                <p14:modId xmlns:p14="http://schemas.microsoft.com/office/powerpoint/2010/main" val="2284430247"/>
+                <p14:modId xmlns:p14="http://schemas.microsoft.com/office/powerpoint/2010/main" val="3687166725"/>
               </p:ext>
             </p:extLst>
           </p:nvPr>
@@ -5858,53 +5907,6 @@
           <a:chExt cx="0" cy="0"/>
         </a:xfrm>
       </p:grpSpPr>
-      <p:sp>
-        <p:nvSpPr>
-          <p:cNvPr id="40" name="ZoneTexte 39"/>
-          <p:cNvSpPr txBox="1"/>
-          <p:nvPr/>
-        </p:nvSpPr>
-        <p:spPr>
-          <a:xfrm>
-            <a:off x="1050770" y="1175726"/>
-            <a:ext cx="734496" cy="553998"/>
-          </a:xfrm>
-          <a:prstGeom prst="rect">
-            <a:avLst/>
-          </a:prstGeom>
-          <a:noFill/>
-        </p:spPr>
-        <p:txBody>
-          <a:bodyPr wrap="none" rtlCol="0">
-            <a:spAutoFit/>
-          </a:bodyPr>
-          <a:lstStyle/>
-          <a:p>
-            <a:r>
-              <a:rPr lang="fr-FR" sz="1000" dirty="0">
-                <a:latin typeface="Malgun Gothic" panose="020B0503020000020004" pitchFamily="34" charset="-127"/>
-                <a:ea typeface="Malgun Gothic" panose="020B0503020000020004" pitchFamily="34" charset="-127"/>
-              </a:rPr>
-              <a:t>2000.04 -</a:t>
-            </a:r>
-          </a:p>
-          <a:p>
-            <a:r>
-              <a:rPr lang="fr-FR" sz="1000" dirty="0">
-                <a:latin typeface="Malgun Gothic" panose="020B0503020000020004" pitchFamily="34" charset="-127"/>
-                <a:ea typeface="Malgun Gothic" panose="020B0503020000020004" pitchFamily="34" charset="-127"/>
-              </a:rPr>
-              <a:t>2018.04</a:t>
-            </a:r>
-          </a:p>
-          <a:p>
-            <a:endParaRPr lang="fr-FR" sz="1000" dirty="0">
-              <a:latin typeface="Malgun Gothic" panose="020B0503020000020004" pitchFamily="34" charset="-127"/>
-              <a:ea typeface="Malgun Gothic" panose="020B0503020000020004" pitchFamily="34" charset="-127"/>
-            </a:endParaRPr>
-          </a:p>
-        </p:txBody>
-      </p:sp>
       <p:cxnSp>
         <p:nvCxnSpPr>
           <p:cNvPr id="18" name="Connecteur droit 17">
@@ -5921,7 +5923,7 @@
         </p:nvCxnSpPr>
         <p:spPr>
           <a:xfrm flipH="1">
-            <a:off x="1050770" y="266700"/>
+            <a:off x="1095925" y="266700"/>
             <a:ext cx="40596" cy="8705850"/>
           </a:xfrm>
           <a:prstGeom prst="line">
@@ -5952,10 +5954,10 @@
       </p:cxnSp>
       <p:sp>
         <p:nvSpPr>
-          <p:cNvPr id="5" name="ZoneTexte 4">
+          <p:cNvPr id="9" name="ZoneTexte 8">
             <a:extLst>
               <a:ext uri="{FF2B5EF4-FFF2-40B4-BE49-F238E27FC236}">
-                <a16:creationId xmlns:a16="http://schemas.microsoft.com/office/drawing/2014/main" id="{2DF5A6D0-3A65-7D22-69FE-28CCF1EBCD1E}"/>
+                <a16:creationId xmlns:a16="http://schemas.microsoft.com/office/drawing/2014/main" id="{DE728E87-807A-3C56-24EB-E369E36CC859}"/>
               </a:ext>
             </a:extLst>
           </p:cNvPr>
@@ -5963,9 +5965,9 @@
           <p:nvPr/>
         </p:nvSpPr>
         <p:spPr>
-          <a:xfrm flipH="1">
-            <a:off x="1591663" y="66514"/>
-            <a:ext cx="5266335" cy="8009885"/>
+          <a:xfrm>
+            <a:off x="1619439" y="266700"/>
+            <a:ext cx="4843450" cy="8656216"/>
           </a:xfrm>
           <a:prstGeom prst="rect">
             <a:avLst/>
@@ -5978,14 +5980,69 @@
           </a:bodyPr>
           <a:lstStyle/>
           <a:p>
-            <a:pPr algn="just"/>
-            <a:endParaRPr lang="fr-FR" sz="1050" b="1" cap="all" dirty="0">
+            <a:endParaRPr lang="fr-FR" sz="1050" dirty="0">
               <a:solidFill>
-                <a:srgbClr val="00000A"/>
+                <a:schemeClr val="bg2">
+                  <a:lumMod val="25000"/>
+                </a:schemeClr>
               </a:solidFill>
               <a:latin typeface="Malgun Gothic" panose="020B0503020000020004" pitchFamily="34" charset="-127"/>
               <a:ea typeface="Malgun Gothic" panose="020B0503020000020004" pitchFamily="34" charset="-127"/>
-              <a:cs typeface="Cordia New" panose="020B0304020202020204" pitchFamily="34" charset="-34"/>
+            </a:endParaRPr>
+          </a:p>
+          <a:p>
+            <a:r>
+              <a:rPr lang="fr-FR" sz="1050" b="1" cap="small" dirty="0">
+                <a:solidFill>
+                  <a:srgbClr val="4F81BD"/>
+                </a:solidFill>
+                <a:latin typeface="Malgun Gothic" panose="020B0503020000020004" pitchFamily="34" charset="-127"/>
+                <a:ea typeface="Malgun Gothic" panose="020B0503020000020004" pitchFamily="34" charset="-127"/>
+                <a:cs typeface="Angsana New" panose="02020603050405020304" pitchFamily="18" charset="-34"/>
+              </a:rPr>
+              <a:t>Consultant Architecte DevOps, Docker </a:t>
+            </a:r>
+            <a:r>
+              <a:rPr lang="fr-FR" sz="1050" cap="small" dirty="0">
+                <a:solidFill>
+                  <a:srgbClr val="4F81BD"/>
+                </a:solidFill>
+                <a:latin typeface="Malgun Gothic" panose="020B0503020000020004" pitchFamily="34" charset="-127"/>
+                <a:ea typeface="Malgun Gothic" panose="020B0503020000020004" pitchFamily="34" charset="-127"/>
+                <a:cs typeface="Angsana New" panose="02020603050405020304" pitchFamily="18" charset="-34"/>
+              </a:rPr>
+              <a:t>HARDIS</a:t>
+            </a:r>
+            <a:r>
+              <a:rPr lang="fr-FR" sz="1050" b="1" cap="small" dirty="0">
+                <a:solidFill>
+                  <a:srgbClr val="4F81BD"/>
+                </a:solidFill>
+                <a:latin typeface="Malgun Gothic" panose="020B0503020000020004" pitchFamily="34" charset="-127"/>
+                <a:ea typeface="Malgun Gothic" panose="020B0503020000020004" pitchFamily="34" charset="-127"/>
+                <a:cs typeface="Angsana New" panose="02020603050405020304" pitchFamily="18" charset="-34"/>
+              </a:rPr>
+              <a:t> </a:t>
+            </a:r>
+            <a:r>
+              <a:rPr lang="fr-FR" sz="1050" cap="small" dirty="0">
+                <a:solidFill>
+                  <a:srgbClr val="4F81BD"/>
+                </a:solidFill>
+                <a:latin typeface="Malgun Gothic" panose="020B0503020000020004" pitchFamily="34" charset="-127"/>
+                <a:ea typeface="Malgun Gothic" panose="020B0503020000020004" pitchFamily="34" charset="-127"/>
+                <a:cs typeface="Angsana New" panose="02020603050405020304" pitchFamily="18" charset="-34"/>
+              </a:rPr>
+              <a:t>– 2018-2019</a:t>
+            </a:r>
+            <a:endParaRPr lang="fr-FR" sz="1050" dirty="0">
+              <a:solidFill>
+                <a:schemeClr val="bg2">
+                  <a:lumMod val="25000"/>
+                </a:schemeClr>
+              </a:solidFill>
+              <a:latin typeface="Malgun Gothic" panose="020B0503020000020004" pitchFamily="34" charset="-127"/>
+              <a:ea typeface="Malgun Gothic" panose="020B0503020000020004" pitchFamily="34" charset="-127"/>
             </a:endParaRPr>
           </a:p>
           <a:p>
@@ -5995,6 +6052,23 @@
                 <a:tab pos="323850" algn="l"/>
               </a:tabLst>
             </a:pPr>
+            <a:endParaRPr lang="fr-FR" sz="1050" b="1" i="1" dirty="0">
+              <a:solidFill>
+                <a:srgbClr val="595959"/>
+              </a:solidFill>
+              <a:effectLst/>
+              <a:latin typeface="Malgun Gothic" panose="020B0503020000020004" pitchFamily="34" charset="-127"/>
+              <a:ea typeface="Malgun Gothic" panose="020B0503020000020004" pitchFamily="34" charset="-127"/>
+              <a:cs typeface="Calibri" panose="020F0502020204030204" pitchFamily="34" charset="0"/>
+            </a:endParaRPr>
+          </a:p>
+          <a:p>
+            <a:pPr lvl="0" algn="just">
+              <a:buSzPts val="1050"/>
+              <a:tabLst>
+                <a:tab pos="323850" algn="l"/>
+              </a:tabLst>
+            </a:pPr>
             <a:r>
               <a:rPr lang="fr-FR" sz="1050" b="1" i="1" dirty="0">
                 <a:solidFill>
@@ -6005,7 +6079,7 @@
                 <a:ea typeface="Malgun Gothic" panose="020B0503020000020004" pitchFamily="34" charset="-127"/>
                 <a:cs typeface="Calibri" panose="020F0502020204030204" pitchFamily="34" charset="0"/>
               </a:rPr>
-              <a:t>CONSULTANT CLOUD PUBLIC POUR PLUSIEURS CLIENTS </a:t>
+              <a:t>DOCKERISATION ADELIA/REFLEX </a:t>
             </a:r>
             <a:r>
               <a:rPr lang="fr-FR" sz="1050" dirty="0">
@@ -6017,7 +6091,7 @@
                 <a:ea typeface="Malgun Gothic" panose="020B0503020000020004" pitchFamily="34" charset="-127"/>
                 <a:cs typeface="Calibri" panose="020F0502020204030204" pitchFamily="34" charset="0"/>
               </a:rPr>
-              <a:t>Participation à plusieurs projets clients autour du Cloud Public AWS et Azure.</a:t>
+              <a:t>Participation à la transformation de l’application REFLEX sous forme de conteneurs Docker. Le but est d’utiliser l’application sur le Cloud Public et/ou privé.</a:t>
             </a:r>
           </a:p>
           <a:p>
@@ -6044,6 +6118,23 @@
                 <a:tab pos="323850" algn="l"/>
               </a:tabLst>
             </a:pPr>
+            <a:endParaRPr lang="fr-FR" sz="1050" b="1" i="1" dirty="0">
+              <a:solidFill>
+                <a:srgbClr val="595959"/>
+              </a:solidFill>
+              <a:effectLst/>
+              <a:latin typeface="Malgun Gothic" panose="020B0503020000020004" pitchFamily="34" charset="-127"/>
+              <a:ea typeface="Malgun Gothic" panose="020B0503020000020004" pitchFamily="34" charset="-127"/>
+              <a:cs typeface="Calibri" panose="020F0502020204030204" pitchFamily="34" charset="0"/>
+            </a:endParaRPr>
+          </a:p>
+          <a:p>
+            <a:pPr lvl="0" algn="just">
+              <a:buSzPts val="1050"/>
+              <a:tabLst>
+                <a:tab pos="323850" algn="l"/>
+              </a:tabLst>
+            </a:pPr>
             <a:r>
               <a:rPr lang="fr-FR" sz="1050" b="1" i="1" dirty="0">
                 <a:solidFill>
@@ -6054,6 +6145,72 @@
                 <a:ea typeface="Malgun Gothic" panose="020B0503020000020004" pitchFamily="34" charset="-127"/>
                 <a:cs typeface="Calibri" panose="020F0502020204030204" pitchFamily="34" charset="0"/>
               </a:rPr>
+              <a:t>CONSULTANT CLOUD PUBLIC POUR PLUSIEURS CLIENTS </a:t>
+            </a:r>
+            <a:r>
+              <a:rPr lang="fr-FR" sz="1050" dirty="0">
+                <a:solidFill>
+                  <a:srgbClr val="595959"/>
+                </a:solidFill>
+                <a:effectLst/>
+                <a:latin typeface="Malgun Gothic" panose="020B0503020000020004" pitchFamily="34" charset="-127"/>
+                <a:ea typeface="Malgun Gothic" panose="020B0503020000020004" pitchFamily="34" charset="-127"/>
+                <a:cs typeface="Calibri" panose="020F0502020204030204" pitchFamily="34" charset="0"/>
+              </a:rPr>
+              <a:t>Participation à plusieurs projets clients autour du Cloud Public AWS et Azure.</a:t>
+            </a:r>
+          </a:p>
+          <a:p>
+            <a:pPr lvl="0" algn="just">
+              <a:buSzPts val="1050"/>
+              <a:tabLst>
+                <a:tab pos="323850" algn="l"/>
+              </a:tabLst>
+            </a:pPr>
+            <a:endParaRPr lang="fr-FR" sz="1050" dirty="0">
+              <a:solidFill>
+                <a:srgbClr val="595959"/>
+              </a:solidFill>
+              <a:effectLst/>
+              <a:latin typeface="Malgun Gothic" panose="020B0503020000020004" pitchFamily="34" charset="-127"/>
+              <a:ea typeface="Malgun Gothic" panose="020B0503020000020004" pitchFamily="34" charset="-127"/>
+              <a:cs typeface="Wingdings" panose="05000000000000000000" pitchFamily="2" charset="2"/>
+            </a:endParaRPr>
+          </a:p>
+          <a:p>
+            <a:pPr lvl="0" algn="just">
+              <a:buSzPts val="1050"/>
+              <a:tabLst>
+                <a:tab pos="323850" algn="l"/>
+              </a:tabLst>
+            </a:pPr>
+            <a:endParaRPr lang="fr-FR" sz="1050" b="1" i="1" dirty="0">
+              <a:solidFill>
+                <a:srgbClr val="595959"/>
+              </a:solidFill>
+              <a:effectLst/>
+              <a:latin typeface="Malgun Gothic" panose="020B0503020000020004" pitchFamily="34" charset="-127"/>
+              <a:ea typeface="Malgun Gothic" panose="020B0503020000020004" pitchFamily="34" charset="-127"/>
+              <a:cs typeface="Calibri" panose="020F0502020204030204" pitchFamily="34" charset="0"/>
+            </a:endParaRPr>
+          </a:p>
+          <a:p>
+            <a:pPr lvl="0" algn="just">
+              <a:buSzPts val="1050"/>
+              <a:tabLst>
+                <a:tab pos="323850" algn="l"/>
+              </a:tabLst>
+            </a:pPr>
+            <a:r>
+              <a:rPr lang="fr-FR" sz="1050" b="1" i="1" dirty="0">
+                <a:solidFill>
+                  <a:srgbClr val="595959"/>
+                </a:solidFill>
+                <a:effectLst/>
+                <a:latin typeface="Malgun Gothic" panose="020B0503020000020004" pitchFamily="34" charset="-127"/>
+                <a:ea typeface="Malgun Gothic" panose="020B0503020000020004" pitchFamily="34" charset="-127"/>
+                <a:cs typeface="Calibri" panose="020F0502020204030204" pitchFamily="34" charset="0"/>
+              </a:rPr>
               <a:t>DEVELOPPEMENT SCRIPTS PYTHON </a:t>
             </a:r>
             <a:r>
@@ -6068,6 +6225,22 @@
               </a:rPr>
               <a:t>Développement de scripts pour la supervision de serveurs et pour la gestion de tickets sous ITOP.</a:t>
             </a:r>
+          </a:p>
+          <a:p>
+            <a:pPr lvl="0" algn="just">
+              <a:buSzPts val="1050"/>
+              <a:tabLst>
+                <a:tab pos="323850" algn="l"/>
+              </a:tabLst>
+            </a:pPr>
+            <a:endParaRPr lang="fr-FR" sz="1050" dirty="0">
+              <a:solidFill>
+                <a:srgbClr val="595959"/>
+              </a:solidFill>
+              <a:latin typeface="Malgun Gothic" panose="020B0503020000020004" pitchFamily="34" charset="-127"/>
+              <a:ea typeface="Malgun Gothic" panose="020B0503020000020004" pitchFamily="34" charset="-127"/>
+              <a:cs typeface="Calibri" panose="020F0502020204030204" pitchFamily="34" charset="0"/>
+            </a:endParaRPr>
           </a:p>
           <a:p>
             <a:pPr algn="just"/>
@@ -6093,7 +6266,7 @@
                 <a:ea typeface="Malgun Gothic" panose="020B0503020000020004" pitchFamily="34" charset="-127"/>
                 <a:cs typeface="Cordia New" panose="020B0304020202020204" pitchFamily="34" charset="-34"/>
               </a:rPr>
-              <a:t> dxc </a:t>
+              <a:t>dxc </a:t>
             </a:r>
             <a:r>
               <a:rPr lang="fr-FR" sz="1050" b="1" cap="all" dirty="0" err="1">
@@ -6142,6 +6315,18 @@
               </a:rPr>
               <a:t>secteur d’activité : DEVELOPPEMENT DE PRODUITS INFORMATIQUES DESTINES AUX ASSURANCES</a:t>
             </a:r>
+          </a:p>
+          <a:p>
+            <a:pPr algn="just"/>
+            <a:endParaRPr lang="fr-FR" sz="1050" b="0" cap="all" dirty="0">
+              <a:solidFill>
+                <a:srgbClr val="404040"/>
+              </a:solidFill>
+              <a:effectLst/>
+              <a:latin typeface="Malgun Gothic" panose="020B0503020000020004" pitchFamily="34" charset="-127"/>
+              <a:ea typeface="Malgun Gothic" panose="020B0503020000020004" pitchFamily="34" charset="-127"/>
+              <a:cs typeface="Cordia New" panose="020B0304020202020204" pitchFamily="34" charset="-34"/>
+            </a:endParaRPr>
           </a:p>
           <a:p>
             <a:pPr algn="just"/>
@@ -6353,18 +6538,15 @@
                 <a:tab pos="323850" algn="l"/>
               </a:tabLst>
             </a:pPr>
-            <a:r>
-              <a:rPr lang="fr-FR" sz="1050" b="1" i="1" dirty="0">
-                <a:solidFill>
-                  <a:srgbClr val="0070C0"/>
-                </a:solidFill>
-                <a:effectLst/>
-                <a:latin typeface="Malgun Gothic" panose="020B0503020000020004" pitchFamily="34" charset="-127"/>
-                <a:ea typeface="Malgun Gothic" panose="020B0503020000020004" pitchFamily="34" charset="-127"/>
-                <a:cs typeface="Calibri" panose="020F0502020204030204" pitchFamily="34" charset="0"/>
-              </a:rPr>
-              <a:t>INDUSTRIALISATION DE L’INSTALLATION DU LOGICIEL GRAPHTALK </a:t>
-            </a:r>
+            <a:endParaRPr lang="fr-FR" sz="1050" b="1" i="1" dirty="0">
+              <a:solidFill>
+                <a:srgbClr val="0070C0"/>
+              </a:solidFill>
+              <a:effectLst/>
+              <a:latin typeface="Malgun Gothic" panose="020B0503020000020004" pitchFamily="34" charset="-127"/>
+              <a:ea typeface="Malgun Gothic" panose="020B0503020000020004" pitchFamily="34" charset="-127"/>
+              <a:cs typeface="Calibri" panose="020F0502020204030204" pitchFamily="34" charset="0"/>
+            </a:endParaRPr>
           </a:p>
           <a:p>
             <a:pPr lvl="0" algn="just">
@@ -6373,102 +6555,15 @@
                 <a:tab pos="323850" algn="l"/>
               </a:tabLst>
             </a:pPr>
-            <a:r>
-              <a:rPr lang="fr-FR" sz="1050" b="1" i="1" dirty="0">
-                <a:solidFill>
-                  <a:srgbClr val="595959"/>
-                </a:solidFill>
-                <a:effectLst/>
-                <a:latin typeface="Malgun Gothic" panose="020B0503020000020004" pitchFamily="34" charset="-127"/>
-                <a:ea typeface="Malgun Gothic" panose="020B0503020000020004" pitchFamily="34" charset="-127"/>
-                <a:cs typeface="Calibri" panose="020F0502020204030204" pitchFamily="34" charset="0"/>
-              </a:rPr>
-              <a:t>Responsable du projet Delivery Manager 2007-2014 : équipe de 5 personnes : </a:t>
-            </a:r>
-            <a:r>
-              <a:rPr lang="fr-FR" sz="1050" dirty="0">
-                <a:solidFill>
-                  <a:srgbClr val="595959"/>
-                </a:solidFill>
-                <a:effectLst/>
-                <a:latin typeface="Malgun Gothic" panose="020B0503020000020004" pitchFamily="34" charset="-127"/>
-                <a:ea typeface="Malgun Gothic" panose="020B0503020000020004" pitchFamily="34" charset="-127"/>
-                <a:cs typeface="Calibri" panose="020F0502020204030204" pitchFamily="34" charset="0"/>
-              </a:rPr>
-              <a:t>Outil d’automatisation de l’installation de </a:t>
-            </a:r>
-            <a:r>
-              <a:rPr lang="fr-FR" sz="1050" dirty="0" err="1">
-                <a:solidFill>
-                  <a:srgbClr val="595959"/>
-                </a:solidFill>
-                <a:effectLst/>
-                <a:latin typeface="Malgun Gothic" panose="020B0503020000020004" pitchFamily="34" charset="-127"/>
-                <a:ea typeface="Malgun Gothic" panose="020B0503020000020004" pitchFamily="34" charset="-127"/>
-                <a:cs typeface="Calibri" panose="020F0502020204030204" pitchFamily="34" charset="0"/>
-              </a:rPr>
-              <a:t>Graphtalk</a:t>
-            </a:r>
-            <a:r>
-              <a:rPr lang="fr-FR" sz="1050" dirty="0">
-                <a:solidFill>
-                  <a:srgbClr val="595959"/>
-                </a:solidFill>
-                <a:effectLst/>
-                <a:latin typeface="Malgun Gothic" panose="020B0503020000020004" pitchFamily="34" charset="-127"/>
-                <a:ea typeface="Malgun Gothic" panose="020B0503020000020004" pitchFamily="34" charset="-127"/>
-                <a:cs typeface="Calibri" panose="020F0502020204030204" pitchFamily="34" charset="0"/>
-              </a:rPr>
-              <a:t> AIA sur sites de production ; </a:t>
-            </a:r>
-            <a:r>
-              <a:rPr lang="fr-FR" sz="1050" b="1" i="1" dirty="0">
-                <a:solidFill>
-                  <a:srgbClr val="595959"/>
-                </a:solidFill>
-                <a:effectLst/>
-                <a:latin typeface="Malgun Gothic" panose="020B0503020000020004" pitchFamily="34" charset="-127"/>
-                <a:ea typeface="Malgun Gothic" panose="020B0503020000020004" pitchFamily="34" charset="-127"/>
-                <a:cs typeface="Calibri" panose="020F0502020204030204" pitchFamily="34" charset="0"/>
-              </a:rPr>
-              <a:t>Product Owner: </a:t>
-            </a:r>
-            <a:r>
-              <a:rPr lang="fr-FR" sz="1050" dirty="0">
-                <a:solidFill>
-                  <a:srgbClr val="595959"/>
-                </a:solidFill>
-                <a:effectLst/>
-                <a:latin typeface="Malgun Gothic" panose="020B0503020000020004" pitchFamily="34" charset="-127"/>
-                <a:ea typeface="Malgun Gothic" panose="020B0503020000020004" pitchFamily="34" charset="-127"/>
-                <a:cs typeface="Calibri" panose="020F0502020204030204" pitchFamily="34" charset="0"/>
-              </a:rPr>
-              <a:t>Migration du logiciel </a:t>
-            </a:r>
-            <a:r>
-              <a:rPr lang="fr-FR" sz="1050" dirty="0" err="1">
-                <a:solidFill>
-                  <a:srgbClr val="595959"/>
-                </a:solidFill>
-                <a:effectLst/>
-                <a:latin typeface="Malgun Gothic" panose="020B0503020000020004" pitchFamily="34" charset="-127"/>
-                <a:ea typeface="Malgun Gothic" panose="020B0503020000020004" pitchFamily="34" charset="-127"/>
-                <a:cs typeface="Calibri" panose="020F0502020204030204" pitchFamily="34" charset="0"/>
-              </a:rPr>
-              <a:t>Graphtalk</a:t>
-            </a:r>
-            <a:r>
-              <a:rPr lang="fr-FR" sz="1050" dirty="0">
-                <a:solidFill>
-                  <a:srgbClr val="595959"/>
-                </a:solidFill>
-                <a:effectLst/>
-                <a:latin typeface="Malgun Gothic" panose="020B0503020000020004" pitchFamily="34" charset="-127"/>
-                <a:ea typeface="Malgun Gothic" panose="020B0503020000020004" pitchFamily="34" charset="-127"/>
-                <a:cs typeface="Calibri" panose="020F0502020204030204" pitchFamily="34" charset="0"/>
-              </a:rPr>
-              <a:t> AIA dans le Cloud AWS </a:t>
-            </a:r>
+            <a:endParaRPr lang="fr-FR" sz="1050" b="1" i="1" dirty="0">
+              <a:solidFill>
+                <a:srgbClr val="0070C0"/>
+              </a:solidFill>
+              <a:effectLst/>
+              <a:latin typeface="Malgun Gothic" panose="020B0503020000020004" pitchFamily="34" charset="-127"/>
+              <a:ea typeface="Malgun Gothic" panose="020B0503020000020004" pitchFamily="34" charset="-127"/>
+              <a:cs typeface="Calibri" panose="020F0502020204030204" pitchFamily="34" charset="0"/>
+            </a:endParaRPr>
           </a:p>
           <a:p>
             <a:pPr lvl="0" algn="just">
@@ -6487,7 +6582,7 @@
                 <a:ea typeface="Malgun Gothic" panose="020B0503020000020004" pitchFamily="34" charset="-127"/>
                 <a:cs typeface="Calibri" panose="020F0502020204030204" pitchFamily="34" charset="0"/>
               </a:rPr>
-              <a:t>PROJETS JOB MANAGER et IPE SOUS GRAPHTALK AIA pour la gestion de production 2003-2007</a:t>
+              <a:t>INDUSTRIALISATION DE L’INSTALLATION DU LOGICIEL GRAPHTALK </a:t>
             </a:r>
           </a:p>
           <a:p>
@@ -6505,6 +6600,187 @@
                 <a:effectLst/>
                 <a:latin typeface="Malgun Gothic" panose="020B0503020000020004" pitchFamily="34" charset="-127"/>
                 <a:ea typeface="Malgun Gothic" panose="020B0503020000020004" pitchFamily="34" charset="-127"/>
+                <a:cs typeface="Calibri" panose="020F0502020204030204" pitchFamily="34" charset="0"/>
+              </a:rPr>
+              <a:t>Responsable du projet Delivery Manager 2007-2014 : équipe de 5 personnes : </a:t>
+            </a:r>
+            <a:r>
+              <a:rPr lang="fr-FR" sz="1050" dirty="0">
+                <a:solidFill>
+                  <a:srgbClr val="595959"/>
+                </a:solidFill>
+                <a:effectLst/>
+                <a:latin typeface="Malgun Gothic" panose="020B0503020000020004" pitchFamily="34" charset="-127"/>
+                <a:ea typeface="Malgun Gothic" panose="020B0503020000020004" pitchFamily="34" charset="-127"/>
+                <a:cs typeface="Calibri" panose="020F0502020204030204" pitchFamily="34" charset="0"/>
+              </a:rPr>
+              <a:t>Outil d’automatisation de l’installation de </a:t>
+            </a:r>
+            <a:r>
+              <a:rPr lang="fr-FR" sz="1050" dirty="0" err="1">
+                <a:solidFill>
+                  <a:srgbClr val="595959"/>
+                </a:solidFill>
+                <a:effectLst/>
+                <a:latin typeface="Malgun Gothic" panose="020B0503020000020004" pitchFamily="34" charset="-127"/>
+                <a:ea typeface="Malgun Gothic" panose="020B0503020000020004" pitchFamily="34" charset="-127"/>
+                <a:cs typeface="Calibri" panose="020F0502020204030204" pitchFamily="34" charset="0"/>
+              </a:rPr>
+              <a:t>Graphtalk</a:t>
+            </a:r>
+            <a:r>
+              <a:rPr lang="fr-FR" sz="1050" dirty="0">
+                <a:solidFill>
+                  <a:srgbClr val="595959"/>
+                </a:solidFill>
+                <a:effectLst/>
+                <a:latin typeface="Malgun Gothic" panose="020B0503020000020004" pitchFamily="34" charset="-127"/>
+                <a:ea typeface="Malgun Gothic" panose="020B0503020000020004" pitchFamily="34" charset="-127"/>
+                <a:cs typeface="Calibri" panose="020F0502020204030204" pitchFamily="34" charset="0"/>
+              </a:rPr>
+              <a:t> AIA sur sites de production ; </a:t>
+            </a:r>
+            <a:r>
+              <a:rPr lang="fr-FR" sz="1050" b="1" i="1" dirty="0">
+                <a:solidFill>
+                  <a:srgbClr val="595959"/>
+                </a:solidFill>
+                <a:effectLst/>
+                <a:latin typeface="Malgun Gothic" panose="020B0503020000020004" pitchFamily="34" charset="-127"/>
+                <a:ea typeface="Malgun Gothic" panose="020B0503020000020004" pitchFamily="34" charset="-127"/>
+                <a:cs typeface="Calibri" panose="020F0502020204030204" pitchFamily="34" charset="0"/>
+              </a:rPr>
+              <a:t>Product </a:t>
+            </a:r>
+            <a:r>
+              <a:rPr lang="fr-FR" sz="1050" b="1" i="1" dirty="0" err="1">
+                <a:solidFill>
+                  <a:srgbClr val="595959"/>
+                </a:solidFill>
+                <a:effectLst/>
+                <a:latin typeface="Malgun Gothic" panose="020B0503020000020004" pitchFamily="34" charset="-127"/>
+                <a:ea typeface="Malgun Gothic" panose="020B0503020000020004" pitchFamily="34" charset="-127"/>
+                <a:cs typeface="Calibri" panose="020F0502020204030204" pitchFamily="34" charset="0"/>
+              </a:rPr>
+              <a:t>Owner</a:t>
+            </a:r>
+            <a:r>
+              <a:rPr lang="fr-FR" sz="1050" b="1" i="1" dirty="0">
+                <a:solidFill>
+                  <a:srgbClr val="595959"/>
+                </a:solidFill>
+                <a:effectLst/>
+                <a:latin typeface="Malgun Gothic" panose="020B0503020000020004" pitchFamily="34" charset="-127"/>
+                <a:ea typeface="Malgun Gothic" panose="020B0503020000020004" pitchFamily="34" charset="-127"/>
+                <a:cs typeface="Calibri" panose="020F0502020204030204" pitchFamily="34" charset="0"/>
+              </a:rPr>
+              <a:t>: </a:t>
+            </a:r>
+            <a:r>
+              <a:rPr lang="fr-FR" sz="1050" dirty="0">
+                <a:solidFill>
+                  <a:srgbClr val="595959"/>
+                </a:solidFill>
+                <a:effectLst/>
+                <a:latin typeface="Malgun Gothic" panose="020B0503020000020004" pitchFamily="34" charset="-127"/>
+                <a:ea typeface="Malgun Gothic" panose="020B0503020000020004" pitchFamily="34" charset="-127"/>
+                <a:cs typeface="Calibri" panose="020F0502020204030204" pitchFamily="34" charset="0"/>
+              </a:rPr>
+              <a:t>Migration du logiciel </a:t>
+            </a:r>
+            <a:r>
+              <a:rPr lang="fr-FR" sz="1050" dirty="0" err="1">
+                <a:solidFill>
+                  <a:srgbClr val="595959"/>
+                </a:solidFill>
+                <a:effectLst/>
+                <a:latin typeface="Malgun Gothic" panose="020B0503020000020004" pitchFamily="34" charset="-127"/>
+                <a:ea typeface="Malgun Gothic" panose="020B0503020000020004" pitchFamily="34" charset="-127"/>
+                <a:cs typeface="Calibri" panose="020F0502020204030204" pitchFamily="34" charset="0"/>
+              </a:rPr>
+              <a:t>Graphtalk</a:t>
+            </a:r>
+            <a:r>
+              <a:rPr lang="fr-FR" sz="1050" dirty="0">
+                <a:solidFill>
+                  <a:srgbClr val="595959"/>
+                </a:solidFill>
+                <a:effectLst/>
+                <a:latin typeface="Malgun Gothic" panose="020B0503020000020004" pitchFamily="34" charset="-127"/>
+                <a:ea typeface="Malgun Gothic" panose="020B0503020000020004" pitchFamily="34" charset="-127"/>
+                <a:cs typeface="Calibri" panose="020F0502020204030204" pitchFamily="34" charset="0"/>
+              </a:rPr>
+              <a:t> AIA dans le Cloud AWS </a:t>
+            </a:r>
+          </a:p>
+          <a:p>
+            <a:pPr lvl="0" algn="just">
+              <a:buSzPts val="1050"/>
+              <a:tabLst>
+                <a:tab pos="323850" algn="l"/>
+              </a:tabLst>
+            </a:pPr>
+            <a:endParaRPr lang="fr-FR" sz="1050" b="1" i="1" dirty="0">
+              <a:solidFill>
+                <a:srgbClr val="0070C0"/>
+              </a:solidFill>
+              <a:effectLst/>
+              <a:latin typeface="Malgun Gothic" panose="020B0503020000020004" pitchFamily="34" charset="-127"/>
+              <a:ea typeface="Malgun Gothic" panose="020B0503020000020004" pitchFamily="34" charset="-127"/>
+              <a:cs typeface="Calibri" panose="020F0502020204030204" pitchFamily="34" charset="0"/>
+            </a:endParaRPr>
+          </a:p>
+          <a:p>
+            <a:pPr lvl="0" algn="just">
+              <a:buSzPts val="1050"/>
+              <a:tabLst>
+                <a:tab pos="323850" algn="l"/>
+              </a:tabLst>
+            </a:pPr>
+            <a:endParaRPr lang="fr-FR" sz="1050" b="1" i="1" dirty="0">
+              <a:solidFill>
+                <a:srgbClr val="0070C0"/>
+              </a:solidFill>
+              <a:latin typeface="Malgun Gothic" panose="020B0503020000020004" pitchFamily="34" charset="-127"/>
+              <a:ea typeface="Malgun Gothic" panose="020B0503020000020004" pitchFamily="34" charset="-127"/>
+              <a:cs typeface="Calibri" panose="020F0502020204030204" pitchFamily="34" charset="0"/>
+            </a:endParaRPr>
+          </a:p>
+          <a:p>
+            <a:pPr lvl="0" algn="just">
+              <a:buSzPts val="1050"/>
+              <a:tabLst>
+                <a:tab pos="323850" algn="l"/>
+              </a:tabLst>
+            </a:pPr>
+            <a:r>
+              <a:rPr lang="fr-FR" sz="1050" b="1" i="1" dirty="0">
+                <a:solidFill>
+                  <a:srgbClr val="0070C0"/>
+                </a:solidFill>
+                <a:effectLst/>
+                <a:latin typeface="Malgun Gothic" panose="020B0503020000020004" pitchFamily="34" charset="-127"/>
+                <a:ea typeface="Malgun Gothic" panose="020B0503020000020004" pitchFamily="34" charset="-127"/>
+                <a:cs typeface="Calibri" panose="020F0502020204030204" pitchFamily="34" charset="0"/>
+              </a:rPr>
+              <a:t>PROJETS JOB MANAGER et IPE SOUS GRAPHTALK AIA pour la gestion de production 2003-2007</a:t>
+            </a:r>
+          </a:p>
+          <a:p>
+            <a:pPr lvl="0" algn="just">
+              <a:buSzPts val="1050"/>
+              <a:tabLst>
+                <a:tab pos="323850" algn="l"/>
+              </a:tabLst>
+            </a:pPr>
+            <a:r>
+              <a:rPr lang="fr-FR" sz="1050" b="1" i="1" dirty="0">
+                <a:solidFill>
+                  <a:srgbClr val="595959"/>
+                </a:solidFill>
+                <a:effectLst/>
+                <a:latin typeface="Malgun Gothic" panose="020B0503020000020004" pitchFamily="34" charset="-127"/>
+                <a:ea typeface="Malgun Gothic" panose="020B0503020000020004" pitchFamily="34" charset="-127"/>
                 <a:cs typeface="Angsana New" panose="02020603050405020304" pitchFamily="18" charset="-34"/>
               </a:rPr>
               <a:t>Responsable des projets : équipe de 8 personnes en France et Bulgarie : </a:t>
@@ -6544,6 +6820,40 @@
               </a:rPr>
               <a:t>IPE : logiciel de gestion des environnements de production </a:t>
             </a:r>
+          </a:p>
+          <a:p>
+            <a:pPr lvl="0" algn="just">
+              <a:buSzPts val="1050"/>
+              <a:tabLst>
+                <a:tab pos="323850" algn="l"/>
+              </a:tabLst>
+            </a:pPr>
+            <a:endParaRPr lang="fr-FR" sz="1050" b="1" i="1" dirty="0">
+              <a:solidFill>
+                <a:srgbClr val="0070C0"/>
+              </a:solidFill>
+              <a:effectLst/>
+              <a:latin typeface="Malgun Gothic" panose="020B0503020000020004" pitchFamily="34" charset="-127"/>
+              <a:ea typeface="Malgun Gothic" panose="020B0503020000020004" pitchFamily="34" charset="-127"/>
+              <a:cs typeface="Calibri" panose="020F0502020204030204" pitchFamily="34" charset="0"/>
+            </a:endParaRPr>
+          </a:p>
+          <a:p>
+            <a:pPr lvl="0" algn="just">
+              <a:buSzPts val="1050"/>
+              <a:tabLst>
+                <a:tab pos="323850" algn="l"/>
+              </a:tabLst>
+            </a:pPr>
+            <a:endParaRPr lang="fr-FR" sz="1050" b="1" i="1" dirty="0">
+              <a:solidFill>
+                <a:srgbClr val="0070C0"/>
+              </a:solidFill>
+              <a:effectLst/>
+              <a:latin typeface="Malgun Gothic" panose="020B0503020000020004" pitchFamily="34" charset="-127"/>
+              <a:ea typeface="Malgun Gothic" panose="020B0503020000020004" pitchFamily="34" charset="-127"/>
+              <a:cs typeface="Calibri" panose="020F0502020204030204" pitchFamily="34" charset="0"/>
+            </a:endParaRPr>
           </a:p>
           <a:p>
             <a:pPr lvl="0" algn="just">
@@ -6629,248 +6939,31 @@
               <a:solidFill>
                 <a:srgbClr val="595959"/>
               </a:solidFill>
+              <a:effectLst/>
               <a:latin typeface="Malgun Gothic" panose="020B0503020000020004" pitchFamily="34" charset="-127"/>
               <a:ea typeface="Malgun Gothic" panose="020B0503020000020004" pitchFamily="34" charset="-127"/>
               <a:cs typeface="Calibri" panose="020F0502020204030204" pitchFamily="34" charset="0"/>
             </a:endParaRPr>
           </a:p>
           <a:p>
-            <a:pPr algn="just"/>
-            <a:r>
-              <a:rPr lang="fr-FR" sz="1050" b="1" cap="all" dirty="0">
-                <a:solidFill>
-                  <a:srgbClr val="00000A"/>
-                </a:solidFill>
-                <a:effectLst/>
-                <a:latin typeface="Malgun Gothic" panose="020B0503020000020004" pitchFamily="34" charset="-127"/>
-                <a:ea typeface="Malgun Gothic" panose="020B0503020000020004" pitchFamily="34" charset="-127"/>
-                <a:cs typeface="Cordia New" panose="020B0304020202020204" pitchFamily="34" charset="-34"/>
-              </a:rPr>
-              <a:t>TAGG informatique – </a:t>
-            </a:r>
-            <a:r>
-              <a:rPr lang="fr-FR" sz="1050" b="0" cap="all" dirty="0">
-                <a:solidFill>
-                  <a:srgbClr val="404040"/>
-                </a:solidFill>
-                <a:effectLst/>
-                <a:latin typeface="Malgun Gothic" panose="020B0503020000020004" pitchFamily="34" charset="-127"/>
-                <a:ea typeface="Malgun Gothic" panose="020B0503020000020004" pitchFamily="34" charset="-127"/>
-                <a:cs typeface="Cordia New" panose="020B0304020202020204" pitchFamily="34" charset="-34"/>
-              </a:rPr>
-              <a:t>secteur d’activité : TRAITEMENTS DE DONNEES, IMPRESSIONS PERSONNALISEES DE DOCUMENTS, SOLUTION DE VOTE</a:t>
-            </a:r>
-          </a:p>
-          <a:p>
-            <a:pPr algn="just"/>
-            <a:r>
-              <a:rPr lang="fr-FR" sz="1050" b="1" cap="small" dirty="0">
-                <a:solidFill>
-                  <a:srgbClr val="00000A"/>
-                </a:solidFill>
-                <a:latin typeface="Malgun Gothic" panose="020B0503020000020004" pitchFamily="34" charset="-127"/>
-                <a:ea typeface="Malgun Gothic" panose="020B0503020000020004" pitchFamily="34" charset="-127"/>
-                <a:cs typeface="Cordia New" panose="020B0304020202020204" pitchFamily="34" charset="-34"/>
-              </a:rPr>
-              <a:t>Postes occupés </a:t>
-            </a:r>
-            <a:r>
-              <a:rPr lang="fr-FR" sz="1050" dirty="0">
-                <a:solidFill>
-                  <a:srgbClr val="595959"/>
-                </a:solidFill>
-                <a:effectLst/>
-                <a:latin typeface="Malgun Gothic" panose="020B0503020000020004" pitchFamily="34" charset="-127"/>
-                <a:ea typeface="Malgun Gothic" panose="020B0503020000020004" pitchFamily="34" charset="-127"/>
-                <a:cs typeface="Angsana New" panose="02020603050405020304" pitchFamily="18" charset="-34"/>
-              </a:rPr>
-              <a:t>: </a:t>
-            </a:r>
-            <a:r>
-              <a:rPr lang="fr-FR" sz="1050" b="1" cap="small" dirty="0">
-                <a:solidFill>
-                  <a:srgbClr val="4F81BD"/>
-                </a:solidFill>
-                <a:effectLst/>
-                <a:latin typeface="Malgun Gothic" panose="020B0503020000020004" pitchFamily="34" charset="-127"/>
-                <a:ea typeface="Malgun Gothic" panose="020B0503020000020004" pitchFamily="34" charset="-127"/>
-                <a:cs typeface="Angsana New" panose="02020603050405020304" pitchFamily="18" charset="-34"/>
-              </a:rPr>
-              <a:t>Développeur à Chef de projets</a:t>
-            </a:r>
-          </a:p>
-          <a:p>
-            <a:pPr algn="just"/>
             <a:endParaRPr lang="fr-FR" sz="1050" dirty="0">
               <a:solidFill>
-                <a:srgbClr val="595959"/>
-              </a:solidFill>
-              <a:effectLst/>
-              <a:latin typeface="Malgun Gothic" panose="020B0503020000020004" pitchFamily="34" charset="-127"/>
-              <a:ea typeface="Malgun Gothic" panose="020B0503020000020004" pitchFamily="34" charset="-127"/>
-              <a:cs typeface="Angsana New" panose="02020603050405020304" pitchFamily="18" charset="-34"/>
-            </a:endParaRPr>
-          </a:p>
-          <a:p>
-            <a:pPr algn="just"/>
-            <a:r>
-              <a:rPr lang="fr-FR" sz="1050" dirty="0">
-                <a:solidFill>
-                  <a:srgbClr val="0070C0"/>
-                </a:solidFill>
-                <a:effectLst/>
-                <a:latin typeface="Malgun Gothic" panose="020B0503020000020004" pitchFamily="34" charset="-127"/>
-                <a:ea typeface="Malgun Gothic" panose="020B0503020000020004" pitchFamily="34" charset="-127"/>
-                <a:cs typeface="Calibri" panose="020F0502020204030204" pitchFamily="34" charset="0"/>
-              </a:rPr>
-              <a:t>Responsable de l'équipe de développement</a:t>
-            </a:r>
-            <a:r>
-              <a:rPr lang="fr-FR" sz="1050" dirty="0">
-                <a:solidFill>
-                  <a:srgbClr val="595959"/>
-                </a:solidFill>
-                <a:effectLst/>
-                <a:latin typeface="Malgun Gothic" panose="020B0503020000020004" pitchFamily="34" charset="-127"/>
-                <a:ea typeface="Malgun Gothic" panose="020B0503020000020004" pitchFamily="34" charset="-127"/>
-                <a:cs typeface="Calibri" panose="020F0502020204030204" pitchFamily="34" charset="0"/>
-              </a:rPr>
-              <a:t> : animation d’une équipe de 7 personnes.</a:t>
-            </a:r>
-          </a:p>
-          <a:p>
-            <a:pPr lvl="0" algn="just">
-              <a:buSzPts val="1050"/>
-              <a:tabLst>
-                <a:tab pos="323850" algn="l"/>
-              </a:tabLst>
-            </a:pPr>
-            <a:r>
-              <a:rPr lang="fr-FR" sz="1050" dirty="0">
-                <a:solidFill>
-                  <a:srgbClr val="0070C0"/>
-                </a:solidFill>
-                <a:effectLst/>
-                <a:latin typeface="Malgun Gothic" panose="020B0503020000020004" pitchFamily="34" charset="-127"/>
-                <a:ea typeface="Malgun Gothic" panose="020B0503020000020004" pitchFamily="34" charset="-127"/>
-                <a:cs typeface="Calibri" panose="020F0502020204030204" pitchFamily="34" charset="0"/>
-              </a:rPr>
-              <a:t>Responsable du projet </a:t>
-            </a:r>
-            <a:r>
-              <a:rPr lang="fr-FR" sz="1050" dirty="0" err="1">
-                <a:solidFill>
-                  <a:srgbClr val="0070C0"/>
-                </a:solidFill>
-                <a:effectLst/>
-                <a:latin typeface="Malgun Gothic" panose="020B0503020000020004" pitchFamily="34" charset="-127"/>
-                <a:ea typeface="Malgun Gothic" panose="020B0503020000020004" pitchFamily="34" charset="-127"/>
-                <a:cs typeface="Calibri" panose="020F0502020204030204" pitchFamily="34" charset="0"/>
-              </a:rPr>
-              <a:t>TaggImage</a:t>
-            </a:r>
-            <a:r>
-              <a:rPr lang="fr-FR" sz="1050" dirty="0">
-                <a:solidFill>
-                  <a:srgbClr val="595959"/>
-                </a:solidFill>
-                <a:effectLst/>
-                <a:latin typeface="Malgun Gothic" panose="020B0503020000020004" pitchFamily="34" charset="-127"/>
-                <a:ea typeface="Malgun Gothic" panose="020B0503020000020004" pitchFamily="34" charset="-127"/>
-                <a:cs typeface="Calibri" panose="020F0502020204030204" pitchFamily="34" charset="0"/>
-              </a:rPr>
-              <a:t> : Informatisation d'un contrôle caméra de documents imprimés par comparaison de modèles. Contrôle qualité sur des impressions en très grosses quantités (plusieurs dizaines de milliers) à très grande vitesse. </a:t>
-            </a:r>
-          </a:p>
-          <a:p>
-            <a:pPr lvl="0" algn="just">
-              <a:buSzPts val="1050"/>
-              <a:tabLst>
-                <a:tab pos="323850" algn="l"/>
-              </a:tabLst>
-            </a:pPr>
-            <a:r>
-              <a:rPr lang="fr-FR" sz="1050" dirty="0">
-                <a:solidFill>
-                  <a:srgbClr val="0070C0"/>
-                </a:solidFill>
-                <a:effectLst/>
-                <a:latin typeface="Malgun Gothic" panose="020B0503020000020004" pitchFamily="34" charset="-127"/>
-                <a:ea typeface="Malgun Gothic" panose="020B0503020000020004" pitchFamily="34" charset="-127"/>
-                <a:cs typeface="Calibri" panose="020F0502020204030204" pitchFamily="34" charset="0"/>
-              </a:rPr>
-              <a:t>Développement et Exploitation</a:t>
-            </a:r>
-            <a:r>
-              <a:rPr lang="fr-FR" sz="1050" dirty="0">
-                <a:solidFill>
-                  <a:srgbClr val="595959"/>
-                </a:solidFill>
-                <a:effectLst/>
-                <a:latin typeface="Malgun Gothic" panose="020B0503020000020004" pitchFamily="34" charset="-127"/>
-                <a:ea typeface="Malgun Gothic" panose="020B0503020000020004" pitchFamily="34" charset="-127"/>
-                <a:cs typeface="Calibri" panose="020F0502020204030204" pitchFamily="34" charset="0"/>
-              </a:rPr>
-              <a:t> du logiciel </a:t>
-            </a:r>
-            <a:r>
-              <a:rPr lang="fr-FR" sz="1050" dirty="0" err="1">
-                <a:solidFill>
-                  <a:srgbClr val="595959"/>
-                </a:solidFill>
-                <a:effectLst/>
-                <a:latin typeface="Malgun Gothic" panose="020B0503020000020004" pitchFamily="34" charset="-127"/>
-                <a:ea typeface="Malgun Gothic" panose="020B0503020000020004" pitchFamily="34" charset="-127"/>
-                <a:cs typeface="Calibri" panose="020F0502020204030204" pitchFamily="34" charset="0"/>
-              </a:rPr>
-              <a:t>VotExpress</a:t>
-            </a:r>
-            <a:r>
-              <a:rPr lang="fr-FR" sz="1050" dirty="0">
-                <a:solidFill>
-                  <a:srgbClr val="595959"/>
-                </a:solidFill>
-                <a:effectLst/>
-                <a:latin typeface="Malgun Gothic" panose="020B0503020000020004" pitchFamily="34" charset="-127"/>
-                <a:ea typeface="Malgun Gothic" panose="020B0503020000020004" pitchFamily="34" charset="-127"/>
-                <a:cs typeface="Calibri" panose="020F0502020204030204" pitchFamily="34" charset="0"/>
-              </a:rPr>
-              <a:t>, solution d’organisation d’élections professionnelles par traitement électronique des votes par correspondance. Ma mission a porté sur la conception, réalisation et mise en exploitation sur sites des premières versions du logiciel.</a:t>
-            </a:r>
-            <a:endParaRPr lang="fr-FR" sz="1050" dirty="0">
-              <a:solidFill>
-                <a:srgbClr val="595959"/>
-              </a:solidFill>
-              <a:effectLst/>
-              <a:latin typeface="Malgun Gothic" panose="020B0503020000020004" pitchFamily="34" charset="-127"/>
-              <a:ea typeface="Malgun Gothic" panose="020B0503020000020004" pitchFamily="34" charset="-127"/>
-              <a:cs typeface="Wingdings" panose="05000000000000000000" pitchFamily="2" charset="2"/>
-            </a:endParaRPr>
-          </a:p>
-          <a:p>
-            <a:pPr lvl="0" algn="just">
-              <a:buSzPts val="1050"/>
-              <a:tabLst>
-                <a:tab pos="323850" algn="l"/>
-              </a:tabLst>
-            </a:pPr>
-            <a:endParaRPr lang="fr-FR" sz="1050" dirty="0">
-              <a:solidFill>
-                <a:srgbClr val="595959"/>
+                <a:schemeClr val="bg2">
+                  <a:lumMod val="25000"/>
+                </a:schemeClr>
               </a:solidFill>
               <a:latin typeface="Malgun Gothic" panose="020B0503020000020004" pitchFamily="34" charset="-127"/>
               <a:ea typeface="Malgun Gothic" panose="020B0503020000020004" pitchFamily="34" charset="-127"/>
-              <a:cs typeface="Calibri" panose="020F0502020204030204" pitchFamily="34" charset="0"/>
             </a:endParaRPr>
           </a:p>
         </p:txBody>
       </p:sp>
       <p:sp>
         <p:nvSpPr>
-          <p:cNvPr id="7" name="ZoneTexte 6">
+          <p:cNvPr id="16" name="ZoneTexte 15">
             <a:extLst>
               <a:ext uri="{FF2B5EF4-FFF2-40B4-BE49-F238E27FC236}">
-                <a16:creationId xmlns:a16="http://schemas.microsoft.com/office/drawing/2014/main" id="{7A017932-BA80-72D0-FD9B-4E78B0E98286}"/>
+                <a16:creationId xmlns:a16="http://schemas.microsoft.com/office/drawing/2014/main" id="{54B96A11-22FF-4A27-7D00-2D65E573412F}"/>
               </a:ext>
             </a:extLst>
           </p:cNvPr>
@@ -6879,8 +6972,8 @@
         </p:nvSpPr>
         <p:spPr>
           <a:xfrm>
-            <a:off x="1014852" y="5511814"/>
-            <a:ext cx="734496" cy="400110"/>
+            <a:off x="1067177" y="2832142"/>
+            <a:ext cx="734496" cy="553998"/>
           </a:xfrm>
           <a:prstGeom prst="rect">
             <a:avLst/>
@@ -6898,7 +6991,7 @@
                 <a:latin typeface="Malgun Gothic" panose="020B0503020000020004" pitchFamily="34" charset="-127"/>
                 <a:ea typeface="Malgun Gothic" panose="020B0503020000020004" pitchFamily="34" charset="-127"/>
               </a:rPr>
-              <a:t>1996.10 -</a:t>
+              <a:t>2000.04 -</a:t>
             </a:r>
           </a:p>
           <a:p>
@@ -6907,48 +7000,17 @@
                 <a:latin typeface="Malgun Gothic" panose="020B0503020000020004" pitchFamily="34" charset="-127"/>
                 <a:ea typeface="Malgun Gothic" panose="020B0503020000020004" pitchFamily="34" charset="-127"/>
               </a:rPr>
-              <a:t>2000.04</a:t>
-            </a:r>
-          </a:p>
-        </p:txBody>
-      </p:sp>
-      <p:cxnSp>
-        <p:nvCxnSpPr>
-          <p:cNvPr id="14" name="Connecteur droit 13"/>
-          <p:cNvCxnSpPr/>
-          <p:nvPr/>
-        </p:nvCxnSpPr>
-        <p:spPr>
-          <a:xfrm flipV="1">
-            <a:off x="1377717" y="8007272"/>
-            <a:ext cx="5322021" cy="9802"/>
-          </a:xfrm>
-          <a:prstGeom prst="line">
-            <a:avLst/>
-          </a:prstGeom>
-          <a:ln w="3175">
-            <a:solidFill>
-              <a:schemeClr val="bg2">
-                <a:lumMod val="75000"/>
-              </a:schemeClr>
-            </a:solidFill>
-          </a:ln>
-        </p:spPr>
-        <p:style>
-          <a:lnRef idx="1">
-            <a:schemeClr val="accent1"/>
-          </a:lnRef>
-          <a:fillRef idx="0">
-            <a:schemeClr val="accent1"/>
-          </a:fillRef>
-          <a:effectRef idx="0">
-            <a:schemeClr val="accent1"/>
-          </a:effectRef>
-          <a:fontRef idx="minor">
-            <a:schemeClr val="tx1"/>
-          </a:fontRef>
-        </p:style>
-      </p:cxnSp>
+              <a:t>2018.04</a:t>
+            </a:r>
+          </a:p>
+          <a:p>
+            <a:endParaRPr lang="fr-FR" sz="1000" dirty="0">
+              <a:latin typeface="Malgun Gothic" panose="020B0503020000020004" pitchFamily="34" charset="-127"/>
+              <a:ea typeface="Malgun Gothic" panose="020B0503020000020004" pitchFamily="34" charset="-127"/>
+            </a:endParaRPr>
+          </a:p>
+        </p:txBody>
+      </p:sp>
     </p:spTree>
     <p:extLst>
       <p:ext uri="{BB962C8B-B14F-4D97-AF65-F5344CB8AC3E}">
@@ -6995,7 +7057,7 @@
         </p:nvCxnSpPr>
         <p:spPr>
           <a:xfrm flipH="1">
-            <a:off x="1050770" y="266700"/>
+            <a:off x="1017397" y="372548"/>
             <a:ext cx="40596" cy="8705850"/>
           </a:xfrm>
           <a:prstGeom prst="line">
@@ -7026,6 +7088,379 @@
       </p:cxnSp>
       <p:sp>
         <p:nvSpPr>
+          <p:cNvPr id="5" name="ZoneTexte 4">
+            <a:extLst>
+              <a:ext uri="{FF2B5EF4-FFF2-40B4-BE49-F238E27FC236}">
+                <a16:creationId xmlns:a16="http://schemas.microsoft.com/office/drawing/2014/main" id="{2DF5A6D0-3A65-7D22-69FE-28CCF1EBCD1E}"/>
+              </a:ext>
+            </a:extLst>
+          </p:cNvPr>
+          <p:cNvSpPr txBox="1"/>
+          <p:nvPr/>
+        </p:nvSpPr>
+        <p:spPr>
+          <a:xfrm flipH="1">
+            <a:off x="1591663" y="66514"/>
+            <a:ext cx="5266335" cy="3162404"/>
+          </a:xfrm>
+          <a:prstGeom prst="rect">
+            <a:avLst/>
+          </a:prstGeom>
+          <a:noFill/>
+        </p:spPr>
+        <p:txBody>
+          <a:bodyPr wrap="square" rtlCol="0">
+            <a:spAutoFit/>
+          </a:bodyPr>
+          <a:lstStyle/>
+          <a:p>
+            <a:pPr algn="just"/>
+            <a:endParaRPr lang="fr-FR" sz="1050" b="1" cap="all" dirty="0">
+              <a:solidFill>
+                <a:srgbClr val="00000A"/>
+              </a:solidFill>
+              <a:latin typeface="Malgun Gothic" panose="020B0503020000020004" pitchFamily="34" charset="-127"/>
+              <a:ea typeface="Malgun Gothic" panose="020B0503020000020004" pitchFamily="34" charset="-127"/>
+              <a:cs typeface="Cordia New" panose="020B0304020202020204" pitchFamily="34" charset="-34"/>
+            </a:endParaRPr>
+          </a:p>
+          <a:p>
+            <a:pPr algn="just"/>
+            <a:r>
+              <a:rPr lang="fr-FR" sz="1050" b="1" cap="all" dirty="0">
+                <a:solidFill>
+                  <a:srgbClr val="00000A"/>
+                </a:solidFill>
+                <a:effectLst/>
+                <a:latin typeface="Malgun Gothic" panose="020B0503020000020004" pitchFamily="34" charset="-127"/>
+                <a:ea typeface="Malgun Gothic" panose="020B0503020000020004" pitchFamily="34" charset="-127"/>
+                <a:cs typeface="Cordia New" panose="020B0304020202020204" pitchFamily="34" charset="-34"/>
+              </a:rPr>
+              <a:t> </a:t>
+            </a:r>
+            <a:endParaRPr lang="fr-FR" sz="1050" dirty="0">
+              <a:solidFill>
+                <a:srgbClr val="595959"/>
+              </a:solidFill>
+              <a:latin typeface="Malgun Gothic" panose="020B0503020000020004" pitchFamily="34" charset="-127"/>
+              <a:ea typeface="Malgun Gothic" panose="020B0503020000020004" pitchFamily="34" charset="-127"/>
+              <a:cs typeface="Calibri" panose="020F0502020204030204" pitchFamily="34" charset="0"/>
+            </a:endParaRPr>
+          </a:p>
+          <a:p>
+            <a:pPr algn="just"/>
+            <a:r>
+              <a:rPr lang="fr-FR" sz="1050" b="1" cap="all" dirty="0">
+                <a:solidFill>
+                  <a:srgbClr val="00000A"/>
+                </a:solidFill>
+                <a:effectLst/>
+                <a:latin typeface="Malgun Gothic" panose="020B0503020000020004" pitchFamily="34" charset="-127"/>
+                <a:ea typeface="Malgun Gothic" panose="020B0503020000020004" pitchFamily="34" charset="-127"/>
+                <a:cs typeface="Cordia New" panose="020B0304020202020204" pitchFamily="34" charset="-34"/>
+              </a:rPr>
+              <a:t>TAGG informatique – </a:t>
+            </a:r>
+            <a:r>
+              <a:rPr lang="fr-FR" sz="1050" b="0" cap="all" dirty="0">
+                <a:solidFill>
+                  <a:srgbClr val="404040"/>
+                </a:solidFill>
+                <a:effectLst/>
+                <a:latin typeface="Malgun Gothic" panose="020B0503020000020004" pitchFamily="34" charset="-127"/>
+                <a:ea typeface="Malgun Gothic" panose="020B0503020000020004" pitchFamily="34" charset="-127"/>
+                <a:cs typeface="Cordia New" panose="020B0304020202020204" pitchFamily="34" charset="-34"/>
+              </a:rPr>
+              <a:t>secteur d’activité : TRAITEMENTS DE DONNEES, IMPRESSIONS PERSONNALISEES DE DOCUMENTS, SOLUTION DE VOTE</a:t>
+            </a:r>
+          </a:p>
+          <a:p>
+            <a:pPr algn="just"/>
+            <a:r>
+              <a:rPr lang="fr-FR" sz="1050" b="1" cap="small" dirty="0">
+                <a:solidFill>
+                  <a:srgbClr val="00000A"/>
+                </a:solidFill>
+                <a:latin typeface="Malgun Gothic" panose="020B0503020000020004" pitchFamily="34" charset="-127"/>
+                <a:ea typeface="Malgun Gothic" panose="020B0503020000020004" pitchFamily="34" charset="-127"/>
+                <a:cs typeface="Cordia New" panose="020B0304020202020204" pitchFamily="34" charset="-34"/>
+              </a:rPr>
+              <a:t>Postes occupés </a:t>
+            </a:r>
+            <a:r>
+              <a:rPr lang="fr-FR" sz="1050" dirty="0">
+                <a:solidFill>
+                  <a:srgbClr val="595959"/>
+                </a:solidFill>
+                <a:effectLst/>
+                <a:latin typeface="Malgun Gothic" panose="020B0503020000020004" pitchFamily="34" charset="-127"/>
+                <a:ea typeface="Malgun Gothic" panose="020B0503020000020004" pitchFamily="34" charset="-127"/>
+                <a:cs typeface="Angsana New" panose="02020603050405020304" pitchFamily="18" charset="-34"/>
+              </a:rPr>
+              <a:t>: </a:t>
+            </a:r>
+            <a:r>
+              <a:rPr lang="fr-FR" sz="1050" b="1" cap="small" dirty="0">
+                <a:solidFill>
+                  <a:srgbClr val="4F81BD"/>
+                </a:solidFill>
+                <a:effectLst/>
+                <a:latin typeface="Malgun Gothic" panose="020B0503020000020004" pitchFamily="34" charset="-127"/>
+                <a:ea typeface="Malgun Gothic" panose="020B0503020000020004" pitchFamily="34" charset="-127"/>
+                <a:cs typeface="Angsana New" panose="02020603050405020304" pitchFamily="18" charset="-34"/>
+              </a:rPr>
+              <a:t>Développeur à Chef de projets</a:t>
+            </a:r>
+          </a:p>
+          <a:p>
+            <a:pPr algn="just"/>
+            <a:endParaRPr lang="fr-FR" sz="1050" dirty="0">
+              <a:solidFill>
+                <a:srgbClr val="595959"/>
+              </a:solidFill>
+              <a:effectLst/>
+              <a:latin typeface="Malgun Gothic" panose="020B0503020000020004" pitchFamily="34" charset="-127"/>
+              <a:ea typeface="Malgun Gothic" panose="020B0503020000020004" pitchFamily="34" charset="-127"/>
+              <a:cs typeface="Angsana New" panose="02020603050405020304" pitchFamily="18" charset="-34"/>
+            </a:endParaRPr>
+          </a:p>
+          <a:p>
+            <a:pPr algn="just"/>
+            <a:r>
+              <a:rPr lang="fr-FR" sz="1050" dirty="0">
+                <a:solidFill>
+                  <a:srgbClr val="0070C0"/>
+                </a:solidFill>
+                <a:effectLst/>
+                <a:latin typeface="Malgun Gothic" panose="020B0503020000020004" pitchFamily="34" charset="-127"/>
+                <a:ea typeface="Malgun Gothic" panose="020B0503020000020004" pitchFamily="34" charset="-127"/>
+                <a:cs typeface="Calibri" panose="020F0502020204030204" pitchFamily="34" charset="0"/>
+              </a:rPr>
+              <a:t>Responsable de l'équipe de développement</a:t>
+            </a:r>
+            <a:r>
+              <a:rPr lang="fr-FR" sz="1050" dirty="0">
+                <a:solidFill>
+                  <a:srgbClr val="595959"/>
+                </a:solidFill>
+                <a:effectLst/>
+                <a:latin typeface="Malgun Gothic" panose="020B0503020000020004" pitchFamily="34" charset="-127"/>
+                <a:ea typeface="Malgun Gothic" panose="020B0503020000020004" pitchFamily="34" charset="-127"/>
+                <a:cs typeface="Calibri" panose="020F0502020204030204" pitchFamily="34" charset="0"/>
+              </a:rPr>
+              <a:t> : animation d’une équipe de 7 personnes.</a:t>
+            </a:r>
+          </a:p>
+          <a:p>
+            <a:pPr lvl="0" algn="just">
+              <a:buSzPts val="1050"/>
+              <a:tabLst>
+                <a:tab pos="323850" algn="l"/>
+              </a:tabLst>
+            </a:pPr>
+            <a:endParaRPr lang="fr-FR" sz="1050" dirty="0">
+              <a:solidFill>
+                <a:srgbClr val="0070C0"/>
+              </a:solidFill>
+              <a:effectLst/>
+              <a:latin typeface="Malgun Gothic" panose="020B0503020000020004" pitchFamily="34" charset="-127"/>
+              <a:ea typeface="Malgun Gothic" panose="020B0503020000020004" pitchFamily="34" charset="-127"/>
+              <a:cs typeface="Calibri" panose="020F0502020204030204" pitchFamily="34" charset="0"/>
+            </a:endParaRPr>
+          </a:p>
+          <a:p>
+            <a:pPr lvl="0" algn="just">
+              <a:buSzPts val="1050"/>
+              <a:tabLst>
+                <a:tab pos="323850" algn="l"/>
+              </a:tabLst>
+            </a:pPr>
+            <a:r>
+              <a:rPr lang="fr-FR" sz="1050" dirty="0">
+                <a:solidFill>
+                  <a:srgbClr val="0070C0"/>
+                </a:solidFill>
+                <a:effectLst/>
+                <a:latin typeface="Malgun Gothic" panose="020B0503020000020004" pitchFamily="34" charset="-127"/>
+                <a:ea typeface="Malgun Gothic" panose="020B0503020000020004" pitchFamily="34" charset="-127"/>
+                <a:cs typeface="Calibri" panose="020F0502020204030204" pitchFamily="34" charset="0"/>
+              </a:rPr>
+              <a:t>Responsable du projet </a:t>
+            </a:r>
+            <a:r>
+              <a:rPr lang="fr-FR" sz="1050" dirty="0" err="1">
+                <a:solidFill>
+                  <a:srgbClr val="0070C0"/>
+                </a:solidFill>
+                <a:effectLst/>
+                <a:latin typeface="Malgun Gothic" panose="020B0503020000020004" pitchFamily="34" charset="-127"/>
+                <a:ea typeface="Malgun Gothic" panose="020B0503020000020004" pitchFamily="34" charset="-127"/>
+                <a:cs typeface="Calibri" panose="020F0502020204030204" pitchFamily="34" charset="0"/>
+              </a:rPr>
+              <a:t>TaggImage</a:t>
+            </a:r>
+            <a:r>
+              <a:rPr lang="fr-FR" sz="1050" dirty="0">
+                <a:solidFill>
+                  <a:srgbClr val="595959"/>
+                </a:solidFill>
+                <a:effectLst/>
+                <a:latin typeface="Malgun Gothic" panose="020B0503020000020004" pitchFamily="34" charset="-127"/>
+                <a:ea typeface="Malgun Gothic" panose="020B0503020000020004" pitchFamily="34" charset="-127"/>
+                <a:cs typeface="Calibri" panose="020F0502020204030204" pitchFamily="34" charset="0"/>
+              </a:rPr>
+              <a:t> : Informatisation d'un contrôle caméra de documents imprimés par comparaison de modèles. Contrôle qualité sur des impressions en très grosses quantités (plusieurs dizaines de milliers) à très grande vitesse. </a:t>
+            </a:r>
+          </a:p>
+          <a:p>
+            <a:pPr lvl="0" algn="just">
+              <a:buSzPts val="1050"/>
+              <a:tabLst>
+                <a:tab pos="323850" algn="l"/>
+              </a:tabLst>
+            </a:pPr>
+            <a:endParaRPr lang="fr-FR" sz="1050" dirty="0">
+              <a:solidFill>
+                <a:srgbClr val="0070C0"/>
+              </a:solidFill>
+              <a:effectLst/>
+              <a:latin typeface="Malgun Gothic" panose="020B0503020000020004" pitchFamily="34" charset="-127"/>
+              <a:ea typeface="Malgun Gothic" panose="020B0503020000020004" pitchFamily="34" charset="-127"/>
+              <a:cs typeface="Calibri" panose="020F0502020204030204" pitchFamily="34" charset="0"/>
+            </a:endParaRPr>
+          </a:p>
+          <a:p>
+            <a:pPr lvl="0" algn="just">
+              <a:buSzPts val="1050"/>
+              <a:tabLst>
+                <a:tab pos="323850" algn="l"/>
+              </a:tabLst>
+            </a:pPr>
+            <a:r>
+              <a:rPr lang="fr-FR" sz="1050" dirty="0">
+                <a:solidFill>
+                  <a:srgbClr val="0070C0"/>
+                </a:solidFill>
+                <a:effectLst/>
+                <a:latin typeface="Malgun Gothic" panose="020B0503020000020004" pitchFamily="34" charset="-127"/>
+                <a:ea typeface="Malgun Gothic" panose="020B0503020000020004" pitchFamily="34" charset="-127"/>
+                <a:cs typeface="Calibri" panose="020F0502020204030204" pitchFamily="34" charset="0"/>
+              </a:rPr>
+              <a:t>Développement et Exploitation</a:t>
+            </a:r>
+            <a:r>
+              <a:rPr lang="fr-FR" sz="1050" dirty="0">
+                <a:solidFill>
+                  <a:srgbClr val="595959"/>
+                </a:solidFill>
+                <a:effectLst/>
+                <a:latin typeface="Malgun Gothic" panose="020B0503020000020004" pitchFamily="34" charset="-127"/>
+                <a:ea typeface="Malgun Gothic" panose="020B0503020000020004" pitchFamily="34" charset="-127"/>
+                <a:cs typeface="Calibri" panose="020F0502020204030204" pitchFamily="34" charset="0"/>
+              </a:rPr>
+              <a:t> du logiciel </a:t>
+            </a:r>
+            <a:r>
+              <a:rPr lang="fr-FR" sz="1050" dirty="0" err="1">
+                <a:solidFill>
+                  <a:srgbClr val="595959"/>
+                </a:solidFill>
+                <a:effectLst/>
+                <a:latin typeface="Malgun Gothic" panose="020B0503020000020004" pitchFamily="34" charset="-127"/>
+                <a:ea typeface="Malgun Gothic" panose="020B0503020000020004" pitchFamily="34" charset="-127"/>
+                <a:cs typeface="Calibri" panose="020F0502020204030204" pitchFamily="34" charset="0"/>
+              </a:rPr>
+              <a:t>VotExpress</a:t>
+            </a:r>
+            <a:r>
+              <a:rPr lang="fr-FR" sz="1050" dirty="0">
+                <a:solidFill>
+                  <a:srgbClr val="595959"/>
+                </a:solidFill>
+                <a:effectLst/>
+                <a:latin typeface="Malgun Gothic" panose="020B0503020000020004" pitchFamily="34" charset="-127"/>
+                <a:ea typeface="Malgun Gothic" panose="020B0503020000020004" pitchFamily="34" charset="-127"/>
+                <a:cs typeface="Calibri" panose="020F0502020204030204" pitchFamily="34" charset="0"/>
+              </a:rPr>
+              <a:t>, solution d’organisation d’élections professionnelles par traitement électronique des votes par correspondance. Ma mission a porté sur la conception, réalisation et mise en exploitation sur sites des premières versions du logiciel.</a:t>
+            </a:r>
+            <a:endParaRPr lang="fr-FR" sz="1050" dirty="0">
+              <a:solidFill>
+                <a:srgbClr val="595959"/>
+              </a:solidFill>
+              <a:effectLst/>
+              <a:latin typeface="Malgun Gothic" panose="020B0503020000020004" pitchFamily="34" charset="-127"/>
+              <a:ea typeface="Malgun Gothic" panose="020B0503020000020004" pitchFamily="34" charset="-127"/>
+              <a:cs typeface="Wingdings" panose="05000000000000000000" pitchFamily="2" charset="2"/>
+            </a:endParaRPr>
+          </a:p>
+          <a:p>
+            <a:pPr lvl="0" algn="just">
+              <a:buSzPts val="1050"/>
+              <a:tabLst>
+                <a:tab pos="323850" algn="l"/>
+              </a:tabLst>
+            </a:pPr>
+            <a:endParaRPr lang="fr-FR" sz="1050" dirty="0">
+              <a:solidFill>
+                <a:srgbClr val="595959"/>
+              </a:solidFill>
+              <a:latin typeface="Malgun Gothic" panose="020B0503020000020004" pitchFamily="34" charset="-127"/>
+              <a:ea typeface="Malgun Gothic" panose="020B0503020000020004" pitchFamily="34" charset="-127"/>
+              <a:cs typeface="Calibri" panose="020F0502020204030204" pitchFamily="34" charset="0"/>
+            </a:endParaRPr>
+          </a:p>
+        </p:txBody>
+      </p:sp>
+      <p:sp>
+        <p:nvSpPr>
+          <p:cNvPr id="7" name="ZoneTexte 6">
+            <a:extLst>
+              <a:ext uri="{FF2B5EF4-FFF2-40B4-BE49-F238E27FC236}">
+                <a16:creationId xmlns:a16="http://schemas.microsoft.com/office/drawing/2014/main" id="{7A017932-BA80-72D0-FD9B-4E78B0E98286}"/>
+              </a:ext>
+            </a:extLst>
+          </p:cNvPr>
+          <p:cNvSpPr txBox="1"/>
+          <p:nvPr/>
+        </p:nvSpPr>
+        <p:spPr>
+          <a:xfrm>
+            <a:off x="1010469" y="372548"/>
+            <a:ext cx="734496" cy="400110"/>
+          </a:xfrm>
+          <a:prstGeom prst="rect">
+            <a:avLst/>
+          </a:prstGeom>
+          <a:noFill/>
+        </p:spPr>
+        <p:txBody>
+          <a:bodyPr wrap="none" rtlCol="0">
+            <a:spAutoFit/>
+          </a:bodyPr>
+          <a:lstStyle/>
+          <a:p>
+            <a:r>
+              <a:rPr lang="fr-FR" sz="1000" dirty="0">
+                <a:latin typeface="Malgun Gothic" panose="020B0503020000020004" pitchFamily="34" charset="-127"/>
+                <a:ea typeface="Malgun Gothic" panose="020B0503020000020004" pitchFamily="34" charset="-127"/>
+              </a:rPr>
+              <a:t>1997,05 -</a:t>
+            </a:r>
+          </a:p>
+          <a:p>
+            <a:r>
+              <a:rPr lang="fr-FR" sz="1000" dirty="0">
+                <a:latin typeface="Malgun Gothic" panose="020B0503020000020004" pitchFamily="34" charset="-127"/>
+                <a:ea typeface="Malgun Gothic" panose="020B0503020000020004" pitchFamily="34" charset="-127"/>
+              </a:rPr>
+              <a:t>2000,04</a:t>
+            </a:r>
+          </a:p>
+        </p:txBody>
+      </p:sp>
+      <p:sp>
+        <p:nvSpPr>
           <p:cNvPr id="6" name="ZoneTexte 5">
             <a:extLst>
               <a:ext uri="{FF2B5EF4-FFF2-40B4-BE49-F238E27FC236}">
@@ -7038,7 +7473,7 @@
         </p:nvSpPr>
         <p:spPr>
           <a:xfrm>
-            <a:off x="1278621" y="181551"/>
+            <a:off x="1244754" y="3211787"/>
             <a:ext cx="1971419" cy="307777"/>
           </a:xfrm>
           <a:prstGeom prst="rect">
@@ -7082,7 +7517,7 @@
         </p:blipFill>
         <p:spPr>
           <a:xfrm>
-            <a:off x="814312" y="105052"/>
+            <a:off x="789620" y="3109888"/>
             <a:ext cx="498315" cy="419477"/>
           </a:xfrm>
           <a:prstGeom prst="rect">
@@ -7098,7 +7533,7 @@
         </p:nvCxnSpPr>
         <p:spPr>
           <a:xfrm flipV="1">
-            <a:off x="1377717" y="468983"/>
+            <a:off x="1343850" y="3499219"/>
             <a:ext cx="5322021" cy="30147"/>
           </a:xfrm>
           <a:prstGeom prst="line">
@@ -7141,8 +7576,8 @@
         </p:nvSpPr>
         <p:spPr>
           <a:xfrm>
-            <a:off x="990796" y="489328"/>
-            <a:ext cx="5884760" cy="738664"/>
+            <a:off x="956929" y="3519564"/>
+            <a:ext cx="5884760" cy="900246"/>
           </a:xfrm>
           <a:prstGeom prst="rect">
             <a:avLst/>
@@ -7288,6 +7723,9 @@
               </a:rPr>
               <a:t>. 1996</a:t>
             </a:r>
+          </a:p>
+          <a:p>
+            <a:pPr algn="just"/>
             <a:endParaRPr lang="fr-FR" sz="1050" b="1" cap="all" dirty="0">
               <a:solidFill>
                 <a:srgbClr val="404040"/>
@@ -7374,7 +7812,7 @@
         </p:nvSpPr>
         <p:spPr>
           <a:xfrm>
-            <a:off x="1263968" y="1230763"/>
+            <a:off x="1230101" y="4667403"/>
             <a:ext cx="1971419" cy="307777"/>
           </a:xfrm>
           <a:prstGeom prst="rect">
@@ -7418,7 +7856,7 @@
         </p:blipFill>
         <p:spPr>
           <a:xfrm>
-            <a:off x="808836" y="1155245"/>
+            <a:off x="774969" y="4591885"/>
             <a:ext cx="498315" cy="419477"/>
           </a:xfrm>
           <a:prstGeom prst="rect">
@@ -7434,7 +7872,7 @@
         </p:nvCxnSpPr>
         <p:spPr>
           <a:xfrm flipV="1">
-            <a:off x="1377717" y="1574722"/>
+            <a:off x="1343850" y="5000073"/>
             <a:ext cx="5322021" cy="9802"/>
           </a:xfrm>
           <a:prstGeom prst="line">
@@ -7471,8 +7909,8 @@
         </p:nvSpPr>
         <p:spPr>
           <a:xfrm>
-            <a:off x="990796" y="1650922"/>
-            <a:ext cx="6025467" cy="738664"/>
+            <a:off x="956929" y="5033939"/>
+            <a:ext cx="6025467" cy="900246"/>
           </a:xfrm>
           <a:prstGeom prst="rect">
             <a:avLst/>
@@ -7494,6 +7932,12 @@
             </a:r>
           </a:p>
           <a:p>
+            <a:endParaRPr lang="fr-FR" sz="1050" dirty="0">
+              <a:latin typeface="Malgun Gothic" panose="020B0503020000020004" pitchFamily="34" charset="-127"/>
+              <a:ea typeface="Malgun Gothic" panose="020B0503020000020004" pitchFamily="34" charset="-127"/>
+            </a:endParaRPr>
+          </a:p>
+          <a:p>
             <a:r>
               <a:rPr lang="fr-FR" sz="1050" dirty="0">
                 <a:latin typeface="Malgun Gothic" panose="020B0503020000020004" pitchFamily="34" charset="-127"/>
@@ -7516,7 +7960,7 @@
     </p:spTree>
     <p:extLst>
       <p:ext uri="{BB962C8B-B14F-4D97-AF65-F5344CB8AC3E}">
-        <p14:creationId xmlns:p14="http://schemas.microsoft.com/office/powerpoint/2010/main" val="1172046370"/>
+        <p14:creationId xmlns:p14="http://schemas.microsoft.com/office/powerpoint/2010/main" val="625013758"/>
       </p:ext>
     </p:extLst>
   </p:cSld>

</xml_diff>

<commit_message>
ajout de TechLead dans le titre
</commit_message>
<xml_diff>
--- a/CV_FFROMAGER.pptx
+++ b/CV_FFROMAGER.pptx
@@ -198,7 +198,7 @@
           <a:p>
             <a:fld id="{0B931C3E-6BFC-4638-BB9C-51D3F831E5AB}" type="datetimeFigureOut">
               <a:rPr lang="fr-FR" smtClean="0"/>
-              <a:t>18/09/2024</a:t>
+              <a:t>01/10/2024</a:t>
             </a:fld>
             <a:endParaRPr lang="fr-FR"/>
           </a:p>
@@ -596,7 +596,7 @@
           <a:p>
             <a:fld id="{599F6D61-D8C0-4321-8F41-5FC8A4129D8A}" type="datetimeFigureOut">
               <a:rPr lang="fr-FR" smtClean="0"/>
-              <a:t>18/09/2024</a:t>
+              <a:t>01/10/2024</a:t>
             </a:fld>
             <a:endParaRPr lang="fr-FR"/>
           </a:p>
@@ -766,7 +766,7 @@
           <a:p>
             <a:fld id="{599F6D61-D8C0-4321-8F41-5FC8A4129D8A}" type="datetimeFigureOut">
               <a:rPr lang="fr-FR" smtClean="0"/>
-              <a:t>18/09/2024</a:t>
+              <a:t>01/10/2024</a:t>
             </a:fld>
             <a:endParaRPr lang="fr-FR"/>
           </a:p>
@@ -946,7 +946,7 @@
           <a:p>
             <a:fld id="{599F6D61-D8C0-4321-8F41-5FC8A4129D8A}" type="datetimeFigureOut">
               <a:rPr lang="fr-FR" smtClean="0"/>
-              <a:t>18/09/2024</a:t>
+              <a:t>01/10/2024</a:t>
             </a:fld>
             <a:endParaRPr lang="fr-FR"/>
           </a:p>
@@ -1116,7 +1116,7 @@
           <a:p>
             <a:fld id="{599F6D61-D8C0-4321-8F41-5FC8A4129D8A}" type="datetimeFigureOut">
               <a:rPr lang="fr-FR" smtClean="0"/>
-              <a:t>18/09/2024</a:t>
+              <a:t>01/10/2024</a:t>
             </a:fld>
             <a:endParaRPr lang="fr-FR"/>
           </a:p>
@@ -1360,7 +1360,7 @@
           <a:p>
             <a:fld id="{599F6D61-D8C0-4321-8F41-5FC8A4129D8A}" type="datetimeFigureOut">
               <a:rPr lang="fr-FR" smtClean="0"/>
-              <a:t>18/09/2024</a:t>
+              <a:t>01/10/2024</a:t>
             </a:fld>
             <a:endParaRPr lang="fr-FR"/>
           </a:p>
@@ -1592,7 +1592,7 @@
           <a:p>
             <a:fld id="{599F6D61-D8C0-4321-8F41-5FC8A4129D8A}" type="datetimeFigureOut">
               <a:rPr lang="fr-FR" smtClean="0"/>
-              <a:t>18/09/2024</a:t>
+              <a:t>01/10/2024</a:t>
             </a:fld>
             <a:endParaRPr lang="fr-FR"/>
           </a:p>
@@ -1959,7 +1959,7 @@
           <a:p>
             <a:fld id="{599F6D61-D8C0-4321-8F41-5FC8A4129D8A}" type="datetimeFigureOut">
               <a:rPr lang="fr-FR" smtClean="0"/>
-              <a:t>18/09/2024</a:t>
+              <a:t>01/10/2024</a:t>
             </a:fld>
             <a:endParaRPr lang="fr-FR"/>
           </a:p>
@@ -2077,7 +2077,7 @@
           <a:p>
             <a:fld id="{599F6D61-D8C0-4321-8F41-5FC8A4129D8A}" type="datetimeFigureOut">
               <a:rPr lang="fr-FR" smtClean="0"/>
-              <a:t>18/09/2024</a:t>
+              <a:t>01/10/2024</a:t>
             </a:fld>
             <a:endParaRPr lang="fr-FR"/>
           </a:p>
@@ -2172,7 +2172,7 @@
           <a:p>
             <a:fld id="{599F6D61-D8C0-4321-8F41-5FC8A4129D8A}" type="datetimeFigureOut">
               <a:rPr lang="fr-FR" smtClean="0"/>
-              <a:t>18/09/2024</a:t>
+              <a:t>01/10/2024</a:t>
             </a:fld>
             <a:endParaRPr lang="fr-FR"/>
           </a:p>
@@ -2449,7 +2449,7 @@
           <a:p>
             <a:fld id="{599F6D61-D8C0-4321-8F41-5FC8A4129D8A}" type="datetimeFigureOut">
               <a:rPr lang="fr-FR" smtClean="0"/>
-              <a:t>18/09/2024</a:t>
+              <a:t>01/10/2024</a:t>
             </a:fld>
             <a:endParaRPr lang="fr-FR"/>
           </a:p>
@@ -2706,7 +2706,7 @@
           <a:p>
             <a:fld id="{599F6D61-D8C0-4321-8F41-5FC8A4129D8A}" type="datetimeFigureOut">
               <a:rPr lang="fr-FR" smtClean="0"/>
-              <a:t>18/09/2024</a:t>
+              <a:t>01/10/2024</a:t>
             </a:fld>
             <a:endParaRPr lang="fr-FR"/>
           </a:p>
@@ -2919,7 +2919,7 @@
           <a:p>
             <a:fld id="{599F6D61-D8C0-4321-8F41-5FC8A4129D8A}" type="datetimeFigureOut">
               <a:rPr lang="fr-FR" smtClean="0"/>
-              <a:t>18/09/2024</a:t>
+              <a:t>01/10/2024</a:t>
             </a:fld>
             <a:endParaRPr lang="fr-FR"/>
           </a:p>
@@ -5049,7 +5049,43 @@
                 <a:ea typeface="Malgun Gothic" panose="020B0503020000020004" pitchFamily="34" charset="-127"/>
                 <a:cs typeface="Calibri" panose="020F0502020204030204" pitchFamily="34" charset="0"/>
               </a:rPr>
-              <a:t>Python, Java/JEE, C/C++ depuis 30 ans, Django, Prolog, GDL </a:t>
+              <a:t>Python, Java/JEE, </a:t>
+            </a:r>
+            <a:r>
+              <a:rPr lang="fr-FR" sz="1050" dirty="0" err="1">
+                <a:solidFill>
+                  <a:srgbClr val="595959"/>
+                </a:solidFill>
+                <a:effectLst/>
+                <a:latin typeface="Malgun Gothic" panose="020B0503020000020004" pitchFamily="34" charset="-127"/>
+                <a:ea typeface="Malgun Gothic" panose="020B0503020000020004" pitchFamily="34" charset="-127"/>
+                <a:cs typeface="Calibri" panose="020F0502020204030204" pitchFamily="34" charset="0"/>
+              </a:rPr>
+              <a:t>Kotlin</a:t>
+            </a:r>
+            <a:r>
+              <a:rPr lang="fr-FR" sz="1050">
+                <a:solidFill>
+                  <a:srgbClr val="595959"/>
+                </a:solidFill>
+                <a:effectLst/>
+                <a:latin typeface="Malgun Gothic" panose="020B0503020000020004" pitchFamily="34" charset="-127"/>
+                <a:ea typeface="Malgun Gothic" panose="020B0503020000020004" pitchFamily="34" charset="-127"/>
+                <a:cs typeface="Calibri" panose="020F0502020204030204" pitchFamily="34" charset="0"/>
+              </a:rPr>
+              <a:t>, C</a:t>
+            </a:r>
+            <a:r>
+              <a:rPr lang="fr-FR" sz="1050" dirty="0">
+                <a:solidFill>
+                  <a:srgbClr val="595959"/>
+                </a:solidFill>
+                <a:effectLst/>
+                <a:latin typeface="Malgun Gothic" panose="020B0503020000020004" pitchFamily="34" charset="-127"/>
+                <a:ea typeface="Malgun Gothic" panose="020B0503020000020004" pitchFamily="34" charset="-127"/>
+                <a:cs typeface="Calibri" panose="020F0502020204030204" pitchFamily="34" charset="0"/>
+              </a:rPr>
+              <a:t>/C++ depuis 30 ans, Django, Prolog, GDL </a:t>
             </a:r>
           </a:p>
           <a:p>
@@ -5192,7 +5228,7 @@
         <p:spPr>
           <a:xfrm>
             <a:off x="201513" y="105024"/>
-            <a:ext cx="2806057" cy="1215717"/>
+            <a:ext cx="2806057" cy="1238801"/>
           </a:xfrm>
           <a:prstGeom prst="rect">
             <a:avLst/>
@@ -5248,6 +5284,31 @@
             </a:r>
           </a:p>
           <a:p>
+            <a:pPr marR="1905"/>
+            <a:r>
+              <a:rPr lang="fr-FR" sz="1200" b="1" dirty="0" err="1">
+                <a:solidFill>
+                  <a:schemeClr val="accent5">
+                    <a:lumMod val="50000"/>
+                  </a:schemeClr>
+                </a:solidFill>
+                <a:latin typeface="Malgun Gothic" panose="020B0503020000020004" pitchFamily="34" charset="-127"/>
+                <a:ea typeface="Malgun Gothic" panose="020B0503020000020004" pitchFamily="34" charset="-127"/>
+              </a:rPr>
+              <a:t>TechLead</a:t>
+            </a:r>
+            <a:r>
+              <a:rPr lang="fr-FR" sz="1200" b="1" dirty="0">
+                <a:solidFill>
+                  <a:schemeClr val="accent5">
+                    <a:lumMod val="50000"/>
+                  </a:schemeClr>
+                </a:solidFill>
+                <a:latin typeface="Malgun Gothic" panose="020B0503020000020004" pitchFamily="34" charset="-127"/>
+                <a:ea typeface="Malgun Gothic" panose="020B0503020000020004" pitchFamily="34" charset="-127"/>
+              </a:rPr>
+              <a:t>, </a:t>
+            </a:r>
             <a:r>
               <a:rPr lang="fr-FR" sz="1050" b="1" dirty="0">
                 <a:solidFill>

</xml_diff>

<commit_message>
Candidature CGI : modification CV à partir des informations de la branche developpeur
</commit_message>
<xml_diff>
--- a/CV_FFROMAGER.pptx
+++ b/CV_FFROMAGER.pptx
@@ -5,12 +5,11 @@
     <p:sldMasterId id="2147483672" r:id="rId1"/>
   </p:sldMasterIdLst>
   <p:notesMasterIdLst>
-    <p:notesMasterId r:id="rId5"/>
+    <p:notesMasterId r:id="rId4"/>
   </p:notesMasterIdLst>
   <p:sldIdLst>
     <p:sldId id="256" r:id="rId2"/>
     <p:sldId id="257" r:id="rId3"/>
-    <p:sldId id="258" r:id="rId4"/>
   </p:sldIdLst>
   <p:sldSz cx="6858000" cy="9144000" type="screen4x3"/>
   <p:notesSz cx="6797675" cy="9926638"/>
@@ -199,7 +198,7 @@
           <a:p>
             <a:fld id="{0B931C3E-6BFC-4638-BB9C-51D3F831E5AB}" type="datetimeFigureOut">
               <a:rPr lang="fr-FR" smtClean="0"/>
-              <a:t>13/09/2024</a:t>
+              <a:t>16/10/2024</a:t>
             </a:fld>
             <a:endParaRPr lang="fr-FR"/>
           </a:p>
@@ -597,7 +596,7 @@
           <a:p>
             <a:fld id="{599F6D61-D8C0-4321-8F41-5FC8A4129D8A}" type="datetimeFigureOut">
               <a:rPr lang="fr-FR" smtClean="0"/>
-              <a:t>13/09/2024</a:t>
+              <a:t>16/10/2024</a:t>
             </a:fld>
             <a:endParaRPr lang="fr-FR"/>
           </a:p>
@@ -767,7 +766,7 @@
           <a:p>
             <a:fld id="{599F6D61-D8C0-4321-8F41-5FC8A4129D8A}" type="datetimeFigureOut">
               <a:rPr lang="fr-FR" smtClean="0"/>
-              <a:t>13/09/2024</a:t>
+              <a:t>16/10/2024</a:t>
             </a:fld>
             <a:endParaRPr lang="fr-FR"/>
           </a:p>
@@ -947,7 +946,7 @@
           <a:p>
             <a:fld id="{599F6D61-D8C0-4321-8F41-5FC8A4129D8A}" type="datetimeFigureOut">
               <a:rPr lang="fr-FR" smtClean="0"/>
-              <a:t>13/09/2024</a:t>
+              <a:t>16/10/2024</a:t>
             </a:fld>
             <a:endParaRPr lang="fr-FR"/>
           </a:p>
@@ -1117,7 +1116,7 @@
           <a:p>
             <a:fld id="{599F6D61-D8C0-4321-8F41-5FC8A4129D8A}" type="datetimeFigureOut">
               <a:rPr lang="fr-FR" smtClean="0"/>
-              <a:t>13/09/2024</a:t>
+              <a:t>16/10/2024</a:t>
             </a:fld>
             <a:endParaRPr lang="fr-FR"/>
           </a:p>
@@ -1361,7 +1360,7 @@
           <a:p>
             <a:fld id="{599F6D61-D8C0-4321-8F41-5FC8A4129D8A}" type="datetimeFigureOut">
               <a:rPr lang="fr-FR" smtClean="0"/>
-              <a:t>13/09/2024</a:t>
+              <a:t>16/10/2024</a:t>
             </a:fld>
             <a:endParaRPr lang="fr-FR"/>
           </a:p>
@@ -1593,7 +1592,7 @@
           <a:p>
             <a:fld id="{599F6D61-D8C0-4321-8F41-5FC8A4129D8A}" type="datetimeFigureOut">
               <a:rPr lang="fr-FR" smtClean="0"/>
-              <a:t>13/09/2024</a:t>
+              <a:t>16/10/2024</a:t>
             </a:fld>
             <a:endParaRPr lang="fr-FR"/>
           </a:p>
@@ -1960,7 +1959,7 @@
           <a:p>
             <a:fld id="{599F6D61-D8C0-4321-8F41-5FC8A4129D8A}" type="datetimeFigureOut">
               <a:rPr lang="fr-FR" smtClean="0"/>
-              <a:t>13/09/2024</a:t>
+              <a:t>16/10/2024</a:t>
             </a:fld>
             <a:endParaRPr lang="fr-FR"/>
           </a:p>
@@ -2078,7 +2077,7 @@
           <a:p>
             <a:fld id="{599F6D61-D8C0-4321-8F41-5FC8A4129D8A}" type="datetimeFigureOut">
               <a:rPr lang="fr-FR" smtClean="0"/>
-              <a:t>13/09/2024</a:t>
+              <a:t>16/10/2024</a:t>
             </a:fld>
             <a:endParaRPr lang="fr-FR"/>
           </a:p>
@@ -2173,7 +2172,7 @@
           <a:p>
             <a:fld id="{599F6D61-D8C0-4321-8F41-5FC8A4129D8A}" type="datetimeFigureOut">
               <a:rPr lang="fr-FR" smtClean="0"/>
-              <a:t>13/09/2024</a:t>
+              <a:t>16/10/2024</a:t>
             </a:fld>
             <a:endParaRPr lang="fr-FR"/>
           </a:p>
@@ -2450,7 +2449,7 @@
           <a:p>
             <a:fld id="{599F6D61-D8C0-4321-8F41-5FC8A4129D8A}" type="datetimeFigureOut">
               <a:rPr lang="fr-FR" smtClean="0"/>
-              <a:t>13/09/2024</a:t>
+              <a:t>16/10/2024</a:t>
             </a:fld>
             <a:endParaRPr lang="fr-FR"/>
           </a:p>
@@ -2707,7 +2706,7 @@
           <a:p>
             <a:fld id="{599F6D61-D8C0-4321-8F41-5FC8A4129D8A}" type="datetimeFigureOut">
               <a:rPr lang="fr-FR" smtClean="0"/>
-              <a:t>13/09/2024</a:t>
+              <a:t>16/10/2024</a:t>
             </a:fld>
             <a:endParaRPr lang="fr-FR"/>
           </a:p>
@@ -2920,7 +2919,7 @@
           <a:p>
             <a:fld id="{599F6D61-D8C0-4321-8F41-5FC8A4129D8A}" type="datetimeFigureOut">
               <a:rPr lang="fr-FR" smtClean="0"/>
-              <a:t>13/09/2024</a:t>
+              <a:t>16/10/2024</a:t>
             </a:fld>
             <a:endParaRPr lang="fr-FR"/>
           </a:p>
@@ -3382,7 +3381,7 @@
         <p:spPr>
           <a:xfrm>
             <a:off x="2937584" y="146405"/>
-            <a:ext cx="3986213" cy="1169551"/>
+            <a:ext cx="3986213" cy="738664"/>
           </a:xfrm>
           <a:prstGeom prst="rect">
             <a:avLst/>
@@ -3405,8 +3404,29 @@
                 <a:latin typeface="Malgun Gothic" panose="020B0503020000020004" pitchFamily="34" charset="-127"/>
                 <a:ea typeface="Malgun Gothic" panose="020B0503020000020004" pitchFamily="34" charset="-127"/>
               </a:rPr>
-              <a:t>Passionné de nouvelles technologies, je propose de partager mon expertise de plus de 25 ans dans le développement informatique et le management de projets techniques</a:t>
-            </a:r>
+              <a:t>Passionné de nouvelles technologies, je propose de partager mon expertise de 30 ans dans le </a:t>
+            </a:r>
+            <a:r>
+              <a:rPr lang="fr-FR" sz="1400">
+                <a:solidFill>
+                  <a:schemeClr val="bg2">
+                    <a:lumMod val="50000"/>
+                  </a:schemeClr>
+                </a:solidFill>
+                <a:latin typeface="Malgun Gothic" panose="020B0503020000020004" pitchFamily="34" charset="-127"/>
+                <a:ea typeface="Malgun Gothic" panose="020B0503020000020004" pitchFamily="34" charset="-127"/>
+              </a:rPr>
+              <a:t>développement informatique</a:t>
+            </a:r>
+            <a:endParaRPr lang="fr-FR" sz="1400" dirty="0">
+              <a:solidFill>
+                <a:schemeClr val="bg2">
+                  <a:lumMod val="50000"/>
+                </a:schemeClr>
+              </a:solidFill>
+              <a:latin typeface="Malgun Gothic" panose="020B0503020000020004" pitchFamily="34" charset="-127"/>
+              <a:ea typeface="Malgun Gothic" panose="020B0503020000020004" pitchFamily="34" charset="-127"/>
+            </a:endParaRPr>
           </a:p>
         </p:txBody>
       </p:sp>
@@ -3425,7 +3445,7 @@
         </p:blipFill>
         <p:spPr>
           <a:xfrm>
-            <a:off x="1817012" y="1323266"/>
+            <a:off x="1817012" y="1031166"/>
             <a:ext cx="498315" cy="419477"/>
           </a:xfrm>
           <a:prstGeom prst="rect">
@@ -3441,7 +3461,7 @@
         </p:nvSpPr>
         <p:spPr>
           <a:xfrm>
-            <a:off x="2276175" y="1426449"/>
+            <a:off x="2276175" y="1134349"/>
             <a:ext cx="3525715" cy="307777"/>
           </a:xfrm>
           <a:prstGeom prst="rect">
@@ -3478,7 +3498,7 @@
         </p:nvCxnSpPr>
         <p:spPr>
           <a:xfrm flipV="1">
-            <a:off x="2380034" y="1733951"/>
+            <a:off x="2380034" y="1441851"/>
             <a:ext cx="4158761" cy="8792"/>
           </a:xfrm>
           <a:prstGeom prst="line">
@@ -3518,7 +3538,7 @@
         </p:nvCxnSpPr>
         <p:spPr>
           <a:xfrm flipH="1">
-            <a:off x="2048586" y="1742743"/>
+            <a:off x="2048586" y="1450643"/>
             <a:ext cx="17584" cy="7532288"/>
           </a:xfrm>
           <a:prstGeom prst="line">
@@ -3555,8 +3575,8 @@
         </p:nvSpPr>
         <p:spPr>
           <a:xfrm>
-            <a:off x="201513" y="3610873"/>
-            <a:ext cx="1971419" cy="307777"/>
+            <a:off x="193893" y="2993653"/>
+            <a:ext cx="1971419" cy="276999"/>
           </a:xfrm>
           <a:prstGeom prst="rect">
             <a:avLst/>
@@ -3570,7 +3590,7 @@
           <a:lstStyle/>
           <a:p>
             <a:r>
-              <a:rPr lang="fr-FR" sz="1400" b="1" dirty="0">
+              <a:rPr lang="fr-FR" sz="1200" b="1" dirty="0">
                 <a:solidFill>
                   <a:schemeClr val="accent1">
                     <a:lumMod val="50000"/>
@@ -3592,7 +3612,7 @@
         </p:nvCxnSpPr>
         <p:spPr>
           <a:xfrm flipV="1">
-            <a:off x="265220" y="3881253"/>
+            <a:off x="265220" y="3218313"/>
             <a:ext cx="1426844" cy="8792"/>
           </a:xfrm>
           <a:prstGeom prst="line">
@@ -3629,8 +3649,8 @@
         </p:nvSpPr>
         <p:spPr>
           <a:xfrm>
-            <a:off x="201513" y="5349583"/>
-            <a:ext cx="1971419" cy="307777"/>
+            <a:off x="201513" y="6424003"/>
+            <a:ext cx="1971419" cy="276999"/>
           </a:xfrm>
           <a:prstGeom prst="rect">
             <a:avLst/>
@@ -3644,7 +3664,7 @@
           <a:lstStyle/>
           <a:p>
             <a:r>
-              <a:rPr lang="fr-FR" sz="1400" b="1" dirty="0">
+              <a:rPr lang="fr-FR" sz="1200" b="1" dirty="0">
                 <a:solidFill>
                   <a:schemeClr val="accent1">
                     <a:lumMod val="50000"/>
@@ -3666,7 +3686,7 @@
         </p:nvCxnSpPr>
         <p:spPr>
           <a:xfrm flipV="1">
-            <a:off x="265220" y="5616533"/>
+            <a:off x="265220" y="6690953"/>
             <a:ext cx="1426844" cy="8792"/>
           </a:xfrm>
           <a:prstGeom prst="line">
@@ -3703,8 +3723,8 @@
         </p:nvSpPr>
         <p:spPr>
           <a:xfrm>
-            <a:off x="-85655" y="5632401"/>
-            <a:ext cx="2151825" cy="1446550"/>
+            <a:off x="-85655" y="6706821"/>
+            <a:ext cx="2151825" cy="1200329"/>
           </a:xfrm>
           <a:prstGeom prst="rect">
             <a:avLst/>
@@ -3722,7 +3742,7 @@
               <a:buChar char="-"/>
             </a:pPr>
             <a:r>
-              <a:rPr lang="fr-FR" sz="1100" b="0" dirty="0">
+              <a:rPr lang="fr-FR" sz="900" b="0" dirty="0">
                 <a:solidFill>
                   <a:srgbClr val="404040"/>
                 </a:solidFill>
@@ -3740,7 +3760,7 @@
               <a:buChar char="-"/>
             </a:pPr>
             <a:r>
-              <a:rPr lang="fr-FR" sz="1100" b="0" dirty="0">
+              <a:rPr lang="fr-FR" sz="900" b="0" dirty="0">
                 <a:solidFill>
                   <a:srgbClr val="404040"/>
                 </a:solidFill>
@@ -3751,7 +3771,7 @@
               </a:rPr>
               <a:t>Ténacité, Rigueur</a:t>
             </a:r>
-            <a:endParaRPr lang="fr-FR" sz="1100" b="1" dirty="0">
+            <a:endParaRPr lang="fr-FR" sz="900" b="1" dirty="0">
               <a:solidFill>
                 <a:srgbClr val="404040"/>
               </a:solidFill>
@@ -3767,7 +3787,7 @@
               <a:buChar char="-"/>
             </a:pPr>
             <a:r>
-              <a:rPr lang="fr-FR" sz="1100" b="0" dirty="0">
+              <a:rPr lang="fr-FR" sz="900" b="0" dirty="0">
                 <a:solidFill>
                   <a:srgbClr val="404040"/>
                 </a:solidFill>
@@ -3779,7 +3799,7 @@
               <a:t>Capacité relationnelle : travail d’équipe, y </a:t>
             </a:r>
             <a:r>
-              <a:rPr lang="fr-FR" sz="1100" dirty="0">
+              <a:rPr lang="fr-FR" sz="900" dirty="0">
                 <a:solidFill>
                   <a:srgbClr val="404040"/>
                 </a:solidFill>
@@ -3796,7 +3816,7 @@
               <a:buChar char="-"/>
             </a:pPr>
             <a:r>
-              <a:rPr lang="fr-FR" sz="1100" dirty="0">
+              <a:rPr lang="fr-FR" sz="900" dirty="0">
                 <a:solidFill>
                   <a:srgbClr val="404040"/>
                 </a:solidFill>
@@ -3817,8 +3837,8 @@
         </p:nvSpPr>
         <p:spPr>
           <a:xfrm>
-            <a:off x="2080347" y="4591598"/>
-            <a:ext cx="4843450" cy="4801314"/>
+            <a:off x="2080347" y="3867698"/>
+            <a:ext cx="4843450" cy="5640006"/>
           </a:xfrm>
           <a:prstGeom prst="rect">
             <a:avLst/>
@@ -3874,17 +3894,6 @@
             </a:r>
           </a:p>
           <a:p>
-            <a:endParaRPr lang="fr-FR" sz="1050" b="1" cap="small" dirty="0">
-              <a:solidFill>
-                <a:srgbClr val="4F81BD"/>
-              </a:solidFill>
-              <a:effectLst/>
-              <a:latin typeface="Malgun Gothic" panose="020B0503020000020004" pitchFamily="34" charset="-127"/>
-              <a:ea typeface="Malgun Gothic" panose="020B0503020000020004" pitchFamily="34" charset="-127"/>
-              <a:cs typeface="Angsana New" panose="02020603050405020304" pitchFamily="18" charset="-34"/>
-            </a:endParaRPr>
-          </a:p>
-          <a:p>
             <a:r>
               <a:rPr kumimoji="0" lang="fr-FR" sz="1100" b="1" i="0" u="none" strike="noStrike" kern="1200" cap="small" spc="0" normalizeH="0" baseline="0" noProof="0" dirty="0">
                 <a:ln>
@@ -3909,7 +3918,7 @@
               <a:buChar char="•"/>
             </a:pPr>
             <a:r>
-              <a:rPr lang="fr-FR" sz="1100" dirty="0">
+              <a:rPr lang="fr-FR" sz="1050" dirty="0">
                 <a:solidFill>
                   <a:srgbClr val="595959"/>
                 </a:solidFill>
@@ -3926,7 +3935,7 @@
               <a:buChar char="•"/>
             </a:pPr>
             <a:r>
-              <a:rPr lang="fr-FR" sz="1100" dirty="0">
+              <a:rPr lang="fr-FR" sz="1050" dirty="0">
                 <a:solidFill>
                   <a:srgbClr val="595959"/>
                 </a:solidFill>
@@ -3943,7 +3952,7 @@
               <a:buChar char="•"/>
             </a:pPr>
             <a:r>
-              <a:rPr lang="fr-FR" sz="1100" dirty="0">
+              <a:rPr lang="fr-FR" sz="1050" dirty="0">
                 <a:solidFill>
                   <a:srgbClr val="595959"/>
                 </a:solidFill>
@@ -3960,7 +3969,7 @@
               <a:buChar char="•"/>
             </a:pPr>
             <a:r>
-              <a:rPr lang="fr-FR" sz="1100" dirty="0">
+              <a:rPr lang="fr-FR" sz="1050" dirty="0">
                 <a:solidFill>
                   <a:srgbClr val="595959"/>
                 </a:solidFill>
@@ -3968,7 +3977,7 @@
                 <a:ea typeface="Malgun Gothic" panose="020B0503020000020004" pitchFamily="34" charset="-127"/>
                 <a:cs typeface="Calibri" panose="020F0502020204030204" pitchFamily="34" charset="0"/>
               </a:rPr>
-              <a:t>Mise en place de l’infrastructure de développement</a:t>
+              <a:t>Mise en place de l’infrastructure de développement en C++/Qt</a:t>
             </a:r>
           </a:p>
           <a:p>
@@ -3976,7 +3985,7 @@
               <a:buFont typeface="Arial" panose="020B0604020202020204" pitchFamily="34" charset="0"/>
               <a:buChar char="•"/>
             </a:pPr>
-            <a:endParaRPr kumimoji="0" lang="fr-FR" sz="1100" i="0" u="none" strike="noStrike" kern="1200" cap="small" spc="0" normalizeH="0" baseline="0" noProof="0" dirty="0">
+            <a:endParaRPr kumimoji="0" lang="fr-FR" sz="900" i="0" u="none" strike="noStrike" kern="1200" cap="small" spc="0" normalizeH="0" baseline="0" noProof="0" dirty="0">
               <a:ln>
                 <a:noFill/>
               </a:ln>
@@ -4001,17 +4010,6 @@
             </a:r>
           </a:p>
           <a:p>
-            <a:endParaRPr lang="fr-FR" sz="1100" b="1" cap="small" dirty="0">
-              <a:solidFill>
-                <a:srgbClr val="4F81BD"/>
-              </a:solidFill>
-              <a:effectLst/>
-              <a:latin typeface="Malgun Gothic" panose="020B0503020000020004" pitchFamily="34" charset="-127"/>
-              <a:ea typeface="Malgun Gothic" panose="020B0503020000020004" pitchFamily="34" charset="-127"/>
-              <a:cs typeface="Angsana New" panose="02020603050405020304" pitchFamily="18" charset="-34"/>
-            </a:endParaRPr>
-          </a:p>
-          <a:p>
             <a:r>
               <a:rPr lang="fr-FR" sz="1100" b="1" cap="small" dirty="0">
                 <a:solidFill>
@@ -4099,7 +4097,7 @@
               <a:buSzPts val="1050"/>
             </a:pPr>
             <a:r>
-              <a:rPr lang="fr-FR" sz="1100" dirty="0">
+              <a:rPr lang="fr-FR" sz="1050" dirty="0">
                 <a:solidFill>
                   <a:srgbClr val="595959"/>
                 </a:solidFill>
@@ -4111,7 +4109,7 @@
               <a:t>Encadrement et Mise en place du </a:t>
             </a:r>
             <a:r>
-              <a:rPr lang="fr-FR" sz="1100" dirty="0" err="1">
+              <a:rPr lang="fr-FR" sz="1050" dirty="0" err="1">
                 <a:solidFill>
                   <a:srgbClr val="595959"/>
                 </a:solidFill>
@@ -4123,7 +4121,7 @@
               <a:t>framework</a:t>
             </a:r>
             <a:r>
-              <a:rPr lang="fr-FR" sz="1100" dirty="0">
+              <a:rPr lang="fr-FR" sz="1050" dirty="0">
                 <a:solidFill>
                   <a:srgbClr val="595959"/>
                 </a:solidFill>
@@ -4135,7 +4133,7 @@
               <a:t> Scrum dans une équipe pluridisciplinaire en </a:t>
             </a:r>
             <a:r>
-              <a:rPr lang="fr-FR" sz="1100" dirty="0">
+              <a:rPr lang="fr-FR" sz="1050" dirty="0">
                 <a:solidFill>
                   <a:srgbClr val="595959"/>
                 </a:solidFill>
@@ -4146,7 +4144,7 @@
               <a:t>é</a:t>
             </a:r>
             <a:r>
-              <a:rPr lang="fr-FR" sz="1100" dirty="0">
+              <a:rPr lang="fr-FR" sz="1050" dirty="0">
                 <a:solidFill>
                   <a:srgbClr val="595959"/>
                 </a:solidFill>
@@ -4155,14 +4153,14 @@
                 <a:ea typeface="Malgun Gothic" panose="020B0503020000020004" pitchFamily="34" charset="-127"/>
                 <a:cs typeface="Angsana New" panose="02020603050405020304" pitchFamily="18" charset="-34"/>
               </a:rPr>
-              <a:t>lectricité</a:t>
+              <a:t>lectricité. Langage utilisé : Ruby</a:t>
             </a:r>
           </a:p>
           <a:p>
             <a:pPr lvl="0" algn="just">
               <a:buSzPts val="1050"/>
             </a:pPr>
-            <a:endParaRPr lang="fr-FR" sz="1050" dirty="0">
+            <a:endParaRPr lang="fr-FR" sz="500" dirty="0">
               <a:solidFill>
                 <a:srgbClr val="595959"/>
               </a:solidFill>
@@ -4279,7 +4277,7 @@
               <a:buSzPts val="1050"/>
             </a:pPr>
             <a:r>
-              <a:rPr lang="fr-FR" sz="1100" dirty="0">
+              <a:rPr lang="fr-FR" sz="1050" dirty="0">
                 <a:solidFill>
                   <a:srgbClr val="595959"/>
                 </a:solidFill>
@@ -4287,14 +4285,30 @@
                 <a:ea typeface="Malgun Gothic" panose="020B0503020000020004" pitchFamily="34" charset="-127"/>
                 <a:cs typeface="Angsana New" panose="02020603050405020304" pitchFamily="18" charset="-34"/>
               </a:rPr>
-              <a:t>Mise en place du nouvel SI basé sur les micro-services /Management de l’équipe DevOps en soutient des équipes de Dev des micro-services</a:t>
+              <a:t>Mise en place du nouvel SI basé sur les micro-services /Management de l’équipe DevOps en soutient des équipes de Dev des micro-services.</a:t>
             </a:r>
           </a:p>
           <a:p>
             <a:pPr algn="just">
               <a:buSzPts val="1050"/>
             </a:pPr>
-            <a:endParaRPr lang="fr-FR" sz="1100" dirty="0">
+            <a:r>
+              <a:rPr lang="fr-FR" sz="1050" dirty="0">
+                <a:solidFill>
+                  <a:srgbClr val="595959"/>
+                </a:solidFill>
+                <a:latin typeface="Malgun Gothic" panose="020B0503020000020004" pitchFamily="34" charset="-127"/>
+                <a:ea typeface="Malgun Gothic" panose="020B0503020000020004" pitchFamily="34" charset="-127"/>
+                <a:cs typeface="Angsana New" panose="02020603050405020304" pitchFamily="18" charset="-34"/>
+              </a:rPr>
+              <a:t>Langages utilisés : Java et C++</a:t>
+            </a:r>
+          </a:p>
+          <a:p>
+            <a:pPr algn="just">
+              <a:buSzPts val="1050"/>
+            </a:pPr>
+            <a:endParaRPr lang="fr-FR" sz="500" dirty="0">
               <a:solidFill>
                 <a:srgbClr val="595959"/>
               </a:solidFill>
@@ -4354,7 +4368,7 @@
               <a:buSzPts val="1050"/>
             </a:pPr>
             <a:r>
-              <a:rPr lang="fr-FR" sz="1100" dirty="0">
+              <a:rPr lang="fr-FR" sz="1050" dirty="0">
                 <a:solidFill>
                   <a:srgbClr val="595959"/>
                 </a:solidFill>
@@ -4371,7 +4385,7 @@
               <a:buSzPts val="1050"/>
             </a:pPr>
             <a:r>
-              <a:rPr lang="fr-FR" sz="1100" dirty="0">
+              <a:rPr lang="fr-FR" sz="1050" dirty="0">
                 <a:solidFill>
                   <a:srgbClr val="595959"/>
                 </a:solidFill>
@@ -4384,16 +4398,13 @@
             </a:r>
           </a:p>
           <a:p>
-            <a:endParaRPr kumimoji="0" lang="fr-FR" sz="1100" i="0" u="none" strike="noStrike" kern="1200" cap="small" spc="0" normalizeH="0" baseline="0" noProof="0" dirty="0">
-              <a:ln>
-                <a:noFill/>
-              </a:ln>
+            <a:pPr lvl="0" algn="just">
+              <a:buSzPts val="1050"/>
+            </a:pPr>
+            <a:endParaRPr lang="fr-FR" sz="500" dirty="0">
               <a:solidFill>
-                <a:srgbClr val="4F81BD"/>
+                <a:srgbClr val="595959"/>
               </a:solidFill>
-              <a:effectLst/>
-              <a:uLnTx/>
-              <a:uFillTx/>
               <a:latin typeface="Malgun Gothic" panose="020B0503020000020004" pitchFamily="34" charset="-127"/>
               <a:ea typeface="Malgun Gothic" panose="020B0503020000020004" pitchFamily="34" charset="-127"/>
               <a:cs typeface="Angsana New" panose="02020603050405020304" pitchFamily="18" charset="-34"/>
@@ -4401,22 +4412,168 @@
           </a:p>
           <a:p>
             <a:r>
-              <a:rPr kumimoji="0" lang="fr-FR" sz="1100" b="0" i="0" u="none" strike="noStrike" kern="1200" cap="none" spc="0" normalizeH="0" baseline="0" noProof="0" dirty="0">
-                <a:ln>
-                  <a:noFill/>
-                </a:ln>
+              <a:rPr lang="fr-FR" sz="1100" b="1" cap="small" dirty="0">
                 <a:solidFill>
                   <a:srgbClr val="4F81BD"/>
                 </a:solidFill>
-                <a:effectLst/>
-                <a:uLnTx/>
-                <a:uFillTx/>
                 <a:latin typeface="Malgun Gothic" panose="020B0503020000020004" pitchFamily="34" charset="-127"/>
                 <a:ea typeface="Malgun Gothic" panose="020B0503020000020004" pitchFamily="34" charset="-127"/>
                 <a:cs typeface="Angsana New" panose="02020603050405020304" pitchFamily="18" charset="-34"/>
               </a:rPr>
-              <a:t> </a:t>
-            </a:r>
+              <a:t>Consultant Architecte DevOps, Docker </a:t>
+            </a:r>
+            <a:r>
+              <a:rPr lang="fr-FR" sz="1100" cap="small" dirty="0">
+                <a:solidFill>
+                  <a:srgbClr val="4F81BD"/>
+                </a:solidFill>
+                <a:latin typeface="Malgun Gothic" panose="020B0503020000020004" pitchFamily="34" charset="-127"/>
+                <a:ea typeface="Malgun Gothic" panose="020B0503020000020004" pitchFamily="34" charset="-127"/>
+                <a:cs typeface="Angsana New" panose="02020603050405020304" pitchFamily="18" charset="-34"/>
+              </a:rPr>
+              <a:t>HARDIS</a:t>
+            </a:r>
+            <a:r>
+              <a:rPr lang="fr-FR" sz="1100" b="1" cap="small" dirty="0">
+                <a:solidFill>
+                  <a:srgbClr val="4F81BD"/>
+                </a:solidFill>
+                <a:latin typeface="Malgun Gothic" panose="020B0503020000020004" pitchFamily="34" charset="-127"/>
+                <a:ea typeface="Malgun Gothic" panose="020B0503020000020004" pitchFamily="34" charset="-127"/>
+                <a:cs typeface="Angsana New" panose="02020603050405020304" pitchFamily="18" charset="-34"/>
+              </a:rPr>
+              <a:t> </a:t>
+            </a:r>
+            <a:r>
+              <a:rPr lang="fr-FR" sz="1100" cap="small" dirty="0">
+                <a:solidFill>
+                  <a:srgbClr val="4F81BD"/>
+                </a:solidFill>
+                <a:latin typeface="Malgun Gothic" panose="020B0503020000020004" pitchFamily="34" charset="-127"/>
+                <a:ea typeface="Malgun Gothic" panose="020B0503020000020004" pitchFamily="34" charset="-127"/>
+                <a:cs typeface="Angsana New" panose="02020603050405020304" pitchFamily="18" charset="-34"/>
+              </a:rPr>
+              <a:t>– 2018-2019</a:t>
+            </a:r>
+            <a:endParaRPr lang="fr-FR" sz="1100" dirty="0">
+              <a:solidFill>
+                <a:schemeClr val="bg2">
+                  <a:lumMod val="25000"/>
+                </a:schemeClr>
+              </a:solidFill>
+              <a:latin typeface="Malgun Gothic" panose="020B0503020000020004" pitchFamily="34" charset="-127"/>
+              <a:ea typeface="Malgun Gothic" panose="020B0503020000020004" pitchFamily="34" charset="-127"/>
+            </a:endParaRPr>
+          </a:p>
+          <a:p>
+            <a:pPr lvl="0" algn="just">
+              <a:buSzPts val="1050"/>
+              <a:tabLst>
+                <a:tab pos="323850" algn="l"/>
+              </a:tabLst>
+            </a:pPr>
+            <a:r>
+              <a:rPr lang="fr-FR" sz="1050" b="1" i="1" dirty="0">
+                <a:solidFill>
+                  <a:srgbClr val="595959"/>
+                </a:solidFill>
+                <a:effectLst/>
+                <a:latin typeface="Malgun Gothic" panose="020B0503020000020004" pitchFamily="34" charset="-127"/>
+                <a:ea typeface="Malgun Gothic" panose="020B0503020000020004" pitchFamily="34" charset="-127"/>
+                <a:cs typeface="Calibri" panose="020F0502020204030204" pitchFamily="34" charset="0"/>
+              </a:rPr>
+              <a:t>DOCKERISATION ADELIA/REFLEX </a:t>
+            </a:r>
+            <a:r>
+              <a:rPr lang="fr-FR" sz="1050" dirty="0">
+                <a:solidFill>
+                  <a:srgbClr val="595959"/>
+                </a:solidFill>
+                <a:effectLst/>
+                <a:latin typeface="Malgun Gothic" panose="020B0503020000020004" pitchFamily="34" charset="-127"/>
+                <a:ea typeface="Malgun Gothic" panose="020B0503020000020004" pitchFamily="34" charset="-127"/>
+                <a:cs typeface="Calibri" panose="020F0502020204030204" pitchFamily="34" charset="0"/>
+              </a:rPr>
+              <a:t>Participation à la transformation de l’application REFLEX sous forme de conteneurs Docker. Le but est d’utiliser l’application sur le Cloud Public et/ou privé.</a:t>
+            </a:r>
+          </a:p>
+          <a:p>
+            <a:pPr lvl="0" algn="just">
+              <a:buSzPts val="1050"/>
+              <a:tabLst>
+                <a:tab pos="323850" algn="l"/>
+              </a:tabLst>
+            </a:pPr>
+            <a:r>
+              <a:rPr lang="fr-FR" sz="1050" b="1" i="1" dirty="0">
+                <a:solidFill>
+                  <a:srgbClr val="595959"/>
+                </a:solidFill>
+                <a:effectLst/>
+                <a:latin typeface="Malgun Gothic" panose="020B0503020000020004" pitchFamily="34" charset="-127"/>
+                <a:ea typeface="Malgun Gothic" panose="020B0503020000020004" pitchFamily="34" charset="-127"/>
+                <a:cs typeface="Calibri" panose="020F0502020204030204" pitchFamily="34" charset="0"/>
+              </a:rPr>
+              <a:t>CONSULTANT CLOUD PUBLIC POUR PLUSIEURS CLIENTS </a:t>
+            </a:r>
+            <a:r>
+              <a:rPr lang="fr-FR" sz="1050" dirty="0">
+                <a:solidFill>
+                  <a:srgbClr val="595959"/>
+                </a:solidFill>
+                <a:effectLst/>
+                <a:latin typeface="Malgun Gothic" panose="020B0503020000020004" pitchFamily="34" charset="-127"/>
+                <a:ea typeface="Malgun Gothic" panose="020B0503020000020004" pitchFamily="34" charset="-127"/>
+                <a:cs typeface="Calibri" panose="020F0502020204030204" pitchFamily="34" charset="0"/>
+              </a:rPr>
+              <a:t>Participation à plusieurs projets clients autour du Cloud Public AWS et Azure.</a:t>
+            </a:r>
+            <a:endParaRPr lang="fr-FR" sz="1050" b="1" i="1" dirty="0">
+              <a:solidFill>
+                <a:srgbClr val="595959"/>
+              </a:solidFill>
+              <a:effectLst/>
+              <a:latin typeface="Malgun Gothic" panose="020B0503020000020004" pitchFamily="34" charset="-127"/>
+              <a:ea typeface="Malgun Gothic" panose="020B0503020000020004" pitchFamily="34" charset="-127"/>
+              <a:cs typeface="Calibri" panose="020F0502020204030204" pitchFamily="34" charset="0"/>
+            </a:endParaRPr>
+          </a:p>
+          <a:p>
+            <a:pPr lvl="0" algn="just">
+              <a:buSzPts val="1050"/>
+              <a:tabLst>
+                <a:tab pos="323850" algn="l"/>
+              </a:tabLst>
+            </a:pPr>
+            <a:r>
+              <a:rPr lang="fr-FR" sz="1050" b="1" i="1" dirty="0">
+                <a:solidFill>
+                  <a:srgbClr val="595959"/>
+                </a:solidFill>
+                <a:effectLst/>
+                <a:latin typeface="Malgun Gothic" panose="020B0503020000020004" pitchFamily="34" charset="-127"/>
+                <a:ea typeface="Malgun Gothic" panose="020B0503020000020004" pitchFamily="34" charset="-127"/>
+                <a:cs typeface="Calibri" panose="020F0502020204030204" pitchFamily="34" charset="0"/>
+              </a:rPr>
+              <a:t>DEVELOPPEMENT SCRIPTS PYTHON </a:t>
+            </a:r>
+            <a:r>
+              <a:rPr lang="fr-FR" sz="1050" dirty="0">
+                <a:solidFill>
+                  <a:srgbClr val="595959"/>
+                </a:solidFill>
+                <a:effectLst/>
+                <a:latin typeface="Malgun Gothic" panose="020B0503020000020004" pitchFamily="34" charset="-127"/>
+                <a:ea typeface="Malgun Gothic" panose="020B0503020000020004" pitchFamily="34" charset="-127"/>
+                <a:cs typeface="Calibri" panose="020F0502020204030204" pitchFamily="34" charset="0"/>
+              </a:rPr>
+              <a:t>Développement de scripts pour la supervision de serveurs et pour la gestion de tickets sous ITOP.</a:t>
+            </a:r>
+          </a:p>
+          <a:p>
+            <a:pPr lvl="0" algn="just">
+              <a:buSzPts val="1050"/>
+            </a:pPr>
             <a:endParaRPr lang="fr-FR" sz="1050" dirty="0">
               <a:solidFill>
                 <a:schemeClr val="bg2">
@@ -4450,37 +4607,8 @@
         </p:blipFill>
         <p:spPr>
           <a:xfrm>
-            <a:off x="391550" y="1587904"/>
+            <a:off x="391550" y="1283104"/>
             <a:ext cx="1288706" cy="1655491"/>
-          </a:xfrm>
-          <a:prstGeom prst="rect">
-            <a:avLst/>
-          </a:prstGeom>
-        </p:spPr>
-      </p:pic>
-      <p:pic>
-        <p:nvPicPr>
-          <p:cNvPr id="16" name="Image 15">
-            <a:extLst>
-              <a:ext uri="{FF2B5EF4-FFF2-40B4-BE49-F238E27FC236}">
-                <a16:creationId xmlns:a16="http://schemas.microsoft.com/office/drawing/2014/main" id="{D9AC954A-A92E-6AFB-813A-A8CF5734646F}"/>
-              </a:ext>
-            </a:extLst>
-          </p:cNvPr>
-          <p:cNvPicPr>
-            <a:picLocks noChangeAspect="1"/>
-          </p:cNvPicPr>
-          <p:nvPr/>
-        </p:nvPicPr>
-        <p:blipFill rotWithShape="1">
-          <a:blip r:embed="rId2"/>
-          <a:srcRect l="16838" t="30706" r="82036" b="65923"/>
-          <a:stretch/>
-        </p:blipFill>
-        <p:spPr>
-          <a:xfrm>
-            <a:off x="1829886" y="4169714"/>
-            <a:ext cx="498315" cy="419477"/>
           </a:xfrm>
           <a:prstGeom prst="rect">
             <a:avLst/>
@@ -4501,7 +4629,7 @@
         </p:nvSpPr>
         <p:spPr>
           <a:xfrm>
-            <a:off x="2382187" y="4209843"/>
+            <a:off x="2382187" y="3524043"/>
             <a:ext cx="3525715" cy="307777"/>
           </a:xfrm>
           <a:prstGeom prst="rect">
@@ -4544,7 +4672,7 @@
         </p:nvCxnSpPr>
         <p:spPr>
           <a:xfrm flipV="1">
-            <a:off x="2422692" y="4531034"/>
+            <a:off x="2422692" y="3845234"/>
             <a:ext cx="4158761" cy="8792"/>
           </a:xfrm>
           <a:prstGeom prst="line">
@@ -4587,8 +4715,8 @@
         </p:nvSpPr>
         <p:spPr>
           <a:xfrm>
-            <a:off x="2064776" y="1723408"/>
-            <a:ext cx="4793224" cy="2408352"/>
+            <a:off x="2064776" y="1431308"/>
+            <a:ext cx="4793224" cy="2123658"/>
           </a:xfrm>
           <a:prstGeom prst="rect">
             <a:avLst/>
@@ -4662,7 +4790,7 @@
           </a:p>
           <a:p>
             <a:pPr algn="just"/>
-            <a:endParaRPr lang="fr-FR" sz="1050" b="1" cap="small" dirty="0">
+            <a:endParaRPr lang="fr-FR" sz="400" b="1" cap="small" dirty="0">
               <a:solidFill>
                 <a:srgbClr val="4F81BD"/>
               </a:solidFill>
@@ -4675,7 +4803,7 @@
           <a:p>
             <a:pPr algn="just"/>
             <a:r>
-              <a:rPr lang="fr-FR" sz="1050" b="1" cap="small" dirty="0">
+              <a:rPr lang="fr-FR" sz="1100" b="1" cap="small" dirty="0">
                 <a:solidFill>
                   <a:srgbClr val="4F81BD"/>
                 </a:solidFill>
@@ -4710,7 +4838,7 @@
           </a:p>
           <a:p>
             <a:pPr algn="just"/>
-            <a:endParaRPr lang="fr-FR" sz="1100" b="1" cap="small" dirty="0">
+            <a:endParaRPr lang="fr-FR" sz="400" b="1" cap="small" dirty="0">
               <a:solidFill>
                 <a:srgbClr val="4F81BD"/>
               </a:solidFill>
@@ -4735,16 +4863,15 @@
               <a:t>Management Technique</a:t>
             </a:r>
             <a:r>
-              <a:rPr lang="fr-FR" sz="1100" dirty="0">
+              <a:rPr lang="fr-FR" sz="1100" b="1" cap="small" dirty="0">
                 <a:solidFill>
                   <a:srgbClr val="4F81BD"/>
                 </a:solidFill>
-                <a:effectLst/>
                 <a:latin typeface="Malgun Gothic" panose="020B0503020000020004" pitchFamily="34" charset="-127"/>
                 <a:ea typeface="Malgun Gothic" panose="020B0503020000020004" pitchFamily="34" charset="-127"/>
                 <a:cs typeface="Angsana New" panose="02020603050405020304" pitchFamily="18" charset="-34"/>
               </a:rPr>
-              <a:t> </a:t>
+              <a:t> </a:t>
             </a:r>
             <a:r>
               <a:rPr lang="fr-FR" sz="1050" dirty="0">
@@ -4756,7 +4883,7 @@
                 <a:ea typeface="Malgun Gothic" panose="020B0503020000020004" pitchFamily="34" charset="-127"/>
                 <a:cs typeface="Angsana New" panose="02020603050405020304" pitchFamily="18" charset="-34"/>
               </a:rPr>
-              <a:t>:   </a:t>
+              <a:t>: </a:t>
             </a:r>
             <a:r>
               <a:rPr lang="fr-FR" sz="1050" dirty="0">
@@ -4768,7 +4895,7 @@
                 <a:ea typeface="Malgun Gothic" panose="020B0503020000020004" pitchFamily="34" charset="-127"/>
                 <a:cs typeface="Calibri" panose="020F0502020204030204" pitchFamily="34" charset="0"/>
               </a:rPr>
-              <a:t>Chef de projets R&amp;D</a:t>
+              <a:t>SCRUM MASTER</a:t>
             </a:r>
             <a:r>
               <a:rPr lang="fr-FR" sz="1050" dirty="0">
@@ -4792,19 +4919,30 @@
                 <a:ea typeface="Malgun Gothic" panose="020B0503020000020004" pitchFamily="34" charset="-127"/>
                 <a:cs typeface="Angsana New" panose="02020603050405020304" pitchFamily="18" charset="-34"/>
               </a:rPr>
-              <a:t>organisation, gestion des moyens et suivi des développements informatiques, optimisation du résultat</a:t>
+              <a:t>organisation, gestion des moyens et suivi des développements informatiques</a:t>
             </a:r>
             <a:r>
               <a:rPr lang="fr-FR" sz="1050" dirty="0">
                 <a:solidFill>
                   <a:srgbClr val="595959"/>
                 </a:solidFill>
+                <a:latin typeface="Malgun Gothic" panose="020B0503020000020004" pitchFamily="34" charset="-127"/>
+                <a:ea typeface="Malgun Gothic" panose="020B0503020000020004" pitchFamily="34" charset="-127"/>
+                <a:cs typeface="Angsana New" panose="02020603050405020304" pitchFamily="18" charset="-34"/>
+              </a:rPr>
+              <a:t> </a:t>
+            </a:r>
+            <a:r>
+              <a:rPr lang="fr-FR" sz="1050" dirty="0">
+                <a:solidFill>
+                  <a:srgbClr val="595959"/>
+                </a:solidFill>
                 <a:effectLst/>
                 <a:latin typeface="Malgun Gothic" panose="020B0503020000020004" pitchFamily="34" charset="-127"/>
                 <a:ea typeface="Malgun Gothic" panose="020B0503020000020004" pitchFamily="34" charset="-127"/>
                 <a:cs typeface="Calibri" panose="020F0502020204030204" pitchFamily="34" charset="0"/>
               </a:rPr>
-              <a:t> ; </a:t>
+              <a:t>; </a:t>
             </a:r>
             <a:r>
               <a:rPr lang="fr-FR" sz="1050" dirty="0">
@@ -4828,7 +4966,7 @@
           </a:p>
           <a:p>
             <a:pPr algn="just"/>
-            <a:endParaRPr lang="fr-FR" sz="1100" b="1" cap="small" dirty="0">
+            <a:endParaRPr lang="fr-FR" sz="400" b="1" cap="small" dirty="0">
               <a:solidFill>
                 <a:srgbClr val="4F81BD"/>
               </a:solidFill>
@@ -4866,7 +5004,7 @@
           </a:p>
           <a:p>
             <a:pPr algn="just"/>
-            <a:endParaRPr lang="fr-FR" sz="1050" dirty="0">
+            <a:endParaRPr lang="fr-FR" sz="400" dirty="0">
               <a:solidFill>
                 <a:srgbClr val="595959"/>
               </a:solidFill>
@@ -4911,9 +5049,48 @@
                 <a:ea typeface="Malgun Gothic" panose="020B0503020000020004" pitchFamily="34" charset="-127"/>
                 <a:cs typeface="Calibri" panose="020F0502020204030204" pitchFamily="34" charset="0"/>
               </a:rPr>
-              <a:t>Python, Java/JEE, C/C++, Django </a:t>
-            </a:r>
-            <a:endParaRPr lang="fr-FR" sz="1050" dirty="0">
+              <a:t>Python, Java/JEE, </a:t>
+            </a:r>
+            <a:r>
+              <a:rPr lang="fr-FR" sz="1050" dirty="0" err="1">
+                <a:solidFill>
+                  <a:srgbClr val="595959"/>
+                </a:solidFill>
+                <a:effectLst/>
+                <a:latin typeface="Malgun Gothic" panose="020B0503020000020004" pitchFamily="34" charset="-127"/>
+                <a:ea typeface="Malgun Gothic" panose="020B0503020000020004" pitchFamily="34" charset="-127"/>
+                <a:cs typeface="Calibri" panose="020F0502020204030204" pitchFamily="34" charset="0"/>
+              </a:rPr>
+              <a:t>Kotlin</a:t>
+            </a:r>
+            <a:r>
+              <a:rPr lang="fr-FR" sz="1050">
+                <a:solidFill>
+                  <a:srgbClr val="595959"/>
+                </a:solidFill>
+                <a:effectLst/>
+                <a:latin typeface="Malgun Gothic" panose="020B0503020000020004" pitchFamily="34" charset="-127"/>
+                <a:ea typeface="Malgun Gothic" panose="020B0503020000020004" pitchFamily="34" charset="-127"/>
+                <a:cs typeface="Calibri" panose="020F0502020204030204" pitchFamily="34" charset="0"/>
+              </a:rPr>
+              <a:t>, C</a:t>
+            </a:r>
+            <a:r>
+              <a:rPr lang="fr-FR" sz="1050" dirty="0">
+                <a:solidFill>
+                  <a:srgbClr val="595959"/>
+                </a:solidFill>
+                <a:effectLst/>
+                <a:latin typeface="Malgun Gothic" panose="020B0503020000020004" pitchFamily="34" charset="-127"/>
+                <a:ea typeface="Malgun Gothic" panose="020B0503020000020004" pitchFamily="34" charset="-127"/>
+                <a:cs typeface="Calibri" panose="020F0502020204030204" pitchFamily="34" charset="0"/>
+              </a:rPr>
+              <a:t>/C++ depuis 30 ans, Django, Prolog, GDL </a:t>
+            </a:r>
+          </a:p>
+          <a:p>
+            <a:pPr algn="just"/>
+            <a:endParaRPr lang="fr-FR" sz="400" dirty="0">
               <a:solidFill>
                 <a:srgbClr val="595959"/>
               </a:solidFill>
@@ -5009,7 +5186,7 @@
                 <a:ea typeface="Malgun Gothic" panose="020B0503020000020004" pitchFamily="34" charset="-127"/>
                 <a:cs typeface="Calibri" panose="020F0502020204030204" pitchFamily="34" charset="0"/>
               </a:rPr>
-              <a:t>, </a:t>
+              <a:t>, Kubernetes,  VirtualBox, Jenkins, Cucumber, Ansible, Terraform, Jira, Git, </a:t>
             </a:r>
             <a:r>
               <a:rPr lang="fr-FR" sz="1050" dirty="0" err="1">
@@ -5020,7 +5197,7 @@
                 <a:ea typeface="Malgun Gothic" panose="020B0503020000020004" pitchFamily="34" charset="-127"/>
                 <a:cs typeface="Calibri" panose="020F0502020204030204" pitchFamily="34" charset="0"/>
               </a:rPr>
-              <a:t>Kubernetes</a:t>
+              <a:t>wsl</a:t>
             </a:r>
             <a:r>
               <a:rPr lang="fr-FR" sz="1050" dirty="0">
@@ -5031,29 +5208,7 @@
                 <a:ea typeface="Malgun Gothic" panose="020B0503020000020004" pitchFamily="34" charset="-127"/>
                 <a:cs typeface="Calibri" panose="020F0502020204030204" pitchFamily="34" charset="0"/>
               </a:rPr>
-              <a:t>,  VirtualBox, Jenkins, Cucumber, Ansible, </a:t>
-            </a:r>
-            <a:r>
-              <a:rPr lang="fr-FR" sz="1050" dirty="0" err="1">
-                <a:solidFill>
-                  <a:srgbClr val="595959"/>
-                </a:solidFill>
-                <a:latin typeface="Malgun Gothic" panose="020B0503020000020004" pitchFamily="34" charset="-127"/>
-                <a:ea typeface="Malgun Gothic" panose="020B0503020000020004" pitchFamily="34" charset="-127"/>
-                <a:cs typeface="Calibri" panose="020F0502020204030204" pitchFamily="34" charset="0"/>
-              </a:rPr>
-              <a:t>Terraform</a:t>
-            </a:r>
-            <a:r>
-              <a:rPr lang="fr-FR" sz="1050" dirty="0">
-                <a:solidFill>
-                  <a:srgbClr val="595959"/>
-                </a:solidFill>
-                <a:latin typeface="Malgun Gothic" panose="020B0503020000020004" pitchFamily="34" charset="-127"/>
-                <a:ea typeface="Malgun Gothic" panose="020B0503020000020004" pitchFamily="34" charset="-127"/>
-                <a:cs typeface="Calibri" panose="020F0502020204030204" pitchFamily="34" charset="0"/>
-              </a:rPr>
-              <a:t>, Jira.</a:t>
+              <a:t>.</a:t>
             </a:r>
           </a:p>
         </p:txBody>
@@ -5073,7 +5228,7 @@
         <p:spPr>
           <a:xfrm>
             <a:off x="201513" y="105024"/>
-            <a:ext cx="2806057" cy="1215717"/>
+            <a:ext cx="2806057" cy="1238801"/>
           </a:xfrm>
           <a:prstGeom prst="rect">
             <a:avLst/>
@@ -5116,7 +5271,7 @@
           <a:p>
             <a:pPr marR="1905"/>
             <a:r>
-              <a:rPr lang="fr-FR" sz="1200" b="1">
+              <a:rPr lang="fr-FR" sz="1200" b="1" dirty="0">
                 <a:solidFill>
                   <a:schemeClr val="accent5">
                     <a:lumMod val="50000"/>
@@ -5125,12 +5280,13 @@
                 <a:latin typeface="Malgun Gothic" panose="020B0503020000020004" pitchFamily="34" charset="-127"/>
                 <a:ea typeface="Malgun Gothic" panose="020B0503020000020004" pitchFamily="34" charset="-127"/>
               </a:rPr>
-              <a:t>SCRUM MASTER</a:t>
-            </a:r>
-          </a:p>
-          <a:p>
-            <a:r>
-              <a:rPr lang="fr-FR" sz="1050" b="1">
+              <a:t>INGENIEUR DEVELOPPEMENT</a:t>
+            </a:r>
+          </a:p>
+          <a:p>
+            <a:pPr marR="1905"/>
+            <a:r>
+              <a:rPr lang="fr-FR" sz="1200" b="1" dirty="0" err="1">
                 <a:solidFill>
                   <a:schemeClr val="accent5">
                     <a:lumMod val="50000"/>
@@ -5139,10 +5295,10 @@
                 <a:latin typeface="Malgun Gothic" panose="020B0503020000020004" pitchFamily="34" charset="-127"/>
                 <a:ea typeface="Malgun Gothic" panose="020B0503020000020004" pitchFamily="34" charset="-127"/>
               </a:rPr>
-              <a:t>Conduite </a:t>
-            </a:r>
-            <a:r>
-              <a:rPr lang="fr-FR" sz="1050" b="1" dirty="0">
+              <a:t>TechLead</a:t>
+            </a:r>
+            <a:r>
+              <a:rPr lang="fr-FR" sz="1200" b="1" dirty="0">
                 <a:solidFill>
                   <a:schemeClr val="accent5">
                     <a:lumMod val="50000"/>
@@ -5151,10 +5307,8 @@
                 <a:latin typeface="Malgun Gothic" panose="020B0503020000020004" pitchFamily="34" charset="-127"/>
                 <a:ea typeface="Malgun Gothic" panose="020B0503020000020004" pitchFamily="34" charset="-127"/>
               </a:rPr>
-              <a:t>de projets R&amp;D,</a:t>
-            </a:r>
-          </a:p>
-          <a:p>
+              <a:t>, </a:t>
+            </a:r>
             <a:r>
               <a:rPr lang="fr-FR" sz="1050" b="1" dirty="0">
                 <a:solidFill>
@@ -5165,6 +5319,20 @@
                 <a:latin typeface="Malgun Gothic" panose="020B0503020000020004" pitchFamily="34" charset="-127"/>
                 <a:ea typeface="Malgun Gothic" panose="020B0503020000020004" pitchFamily="34" charset="-127"/>
               </a:rPr>
+              <a:t>Conduite de projets R&amp;D,</a:t>
+            </a:r>
+          </a:p>
+          <a:p>
+            <a:r>
+              <a:rPr lang="fr-FR" sz="1050" b="1" dirty="0">
+                <a:solidFill>
+                  <a:schemeClr val="accent5">
+                    <a:lumMod val="50000"/>
+                  </a:schemeClr>
+                </a:solidFill>
+                <a:latin typeface="Malgun Gothic" panose="020B0503020000020004" pitchFamily="34" charset="-127"/>
+                <a:ea typeface="Malgun Gothic" panose="020B0503020000020004" pitchFamily="34" charset="-127"/>
+              </a:rPr>
               <a:t>DevOps</a:t>
             </a:r>
           </a:p>
@@ -5178,8 +5346,8 @@
         </p:nvSpPr>
         <p:spPr>
           <a:xfrm>
-            <a:off x="0" y="3907990"/>
-            <a:ext cx="2298733" cy="1338828"/>
+            <a:off x="0" y="3245050"/>
+            <a:ext cx="2043693" cy="1154162"/>
           </a:xfrm>
           <a:prstGeom prst="rect">
             <a:avLst/>
@@ -5193,31 +5361,24 @@
           <a:lstStyle/>
           <a:p>
             <a:r>
-              <a:rPr lang="fr-FR" sz="1050" b="1" dirty="0">
-                <a:latin typeface="Malgun Gothic" panose="020B0503020000020004" pitchFamily="34" charset="-127"/>
-                <a:ea typeface="Malgun Gothic" panose="020B0503020000020004" pitchFamily="34" charset="-127"/>
-              </a:rPr>
-              <a:t>Secteurs géographiques : Annecy ou Grenoble</a:t>
-            </a:r>
-            <a:endParaRPr lang="fr-FR" sz="1000" dirty="0">
+              <a:rPr lang="fr-FR" sz="900" b="1" dirty="0">
+                <a:latin typeface="Malgun Gothic" panose="020B0503020000020004" pitchFamily="34" charset="-127"/>
+                <a:ea typeface="Malgun Gothic" panose="020B0503020000020004" pitchFamily="34" charset="-127"/>
+              </a:rPr>
+              <a:t>Secteur géographique : Grenoble</a:t>
+            </a:r>
+            <a:endParaRPr lang="fr-FR" sz="900" dirty="0">
               <a:latin typeface="Malgun Gothic" panose="020B0503020000020004" pitchFamily="34" charset="-127"/>
               <a:ea typeface="Malgun Gothic" panose="020B0503020000020004" pitchFamily="34" charset="-127"/>
             </a:endParaRPr>
           </a:p>
           <a:p>
             <a:r>
-              <a:rPr lang="fr-FR" sz="1000">
-                <a:latin typeface="Malgun Gothic" panose="020B0503020000020004" pitchFamily="34" charset="-127"/>
-                <a:ea typeface="Malgun Gothic" panose="020B0503020000020004" pitchFamily="34" charset="-127"/>
-              </a:rPr>
-              <a:t>55 </a:t>
-            </a:r>
-            <a:r>
               <a:rPr lang="fr-FR" sz="1000" dirty="0">
                 <a:latin typeface="Malgun Gothic" panose="020B0503020000020004" pitchFamily="34" charset="-127"/>
                 <a:ea typeface="Malgun Gothic" panose="020B0503020000020004" pitchFamily="34" charset="-127"/>
               </a:rPr>
-              <a:t>ans 1 enfant</a:t>
+              <a:t>55 ans 1 enfant</a:t>
             </a:r>
           </a:p>
           <a:p>
@@ -5261,13 +5422,13 @@
           <p:nvPr>
             <p:extLst>
               <p:ext uri="{D42A27DB-BD31-4B8C-83A1-F6EECF244321}">
-                <p14:modId xmlns:p14="http://schemas.microsoft.com/office/powerpoint/2010/main" val="3687166725"/>
+                <p14:modId xmlns:p14="http://schemas.microsoft.com/office/powerpoint/2010/main" val="653631609"/>
               </p:ext>
             </p:extLst>
           </p:nvPr>
         </p:nvGraphicFramePr>
         <p:xfrm>
-          <a:off x="72202" y="4448847"/>
+          <a:off x="72202" y="3625887"/>
           <a:ext cx="2061277" cy="805607"/>
         </p:xfrm>
         <a:graphic>
@@ -5526,7 +5687,7 @@
         </p:blipFill>
         <p:spPr bwMode="auto">
           <a:xfrm>
-            <a:off x="94262" y="4681755"/>
+            <a:off x="94262" y="3858795"/>
             <a:ext cx="242546" cy="181712"/>
           </a:xfrm>
           <a:prstGeom prst="rect">
@@ -5567,7 +5728,7 @@
         </p:blipFill>
         <p:spPr bwMode="auto">
           <a:xfrm>
-            <a:off x="121372" y="4889328"/>
+            <a:off x="121372" y="4066368"/>
             <a:ext cx="166265" cy="166265"/>
           </a:xfrm>
           <a:prstGeom prst="rect">
@@ -5608,7 +5769,7 @@
         </p:blipFill>
         <p:spPr bwMode="auto">
           <a:xfrm>
-            <a:off x="72202" y="4430902"/>
+            <a:off x="72202" y="3607942"/>
             <a:ext cx="264606" cy="250852"/>
           </a:xfrm>
           <a:prstGeom prst="rect">
@@ -5640,8 +5801,8 @@
         </p:nvSpPr>
         <p:spPr>
           <a:xfrm>
-            <a:off x="202274" y="7253310"/>
-            <a:ext cx="1971419" cy="307777"/>
+            <a:off x="202274" y="8190570"/>
+            <a:ext cx="1971419" cy="276999"/>
           </a:xfrm>
           <a:prstGeom prst="rect">
             <a:avLst/>
@@ -5655,7 +5816,7 @@
           <a:lstStyle/>
           <a:p>
             <a:r>
-              <a:rPr lang="fr-FR" sz="1400" b="1" dirty="0">
+              <a:rPr lang="fr-FR" sz="1200" b="1" dirty="0">
                 <a:solidFill>
                   <a:schemeClr val="accent1">
                     <a:lumMod val="50000"/>
@@ -5683,7 +5844,7 @@
         </p:nvCxnSpPr>
         <p:spPr>
           <a:xfrm flipV="1">
-            <a:off x="274500" y="7518214"/>
+            <a:off x="274500" y="8455474"/>
             <a:ext cx="1426844" cy="8792"/>
           </a:xfrm>
           <a:prstGeom prst="line">
@@ -5726,8 +5887,8 @@
         </p:nvSpPr>
         <p:spPr>
           <a:xfrm>
-            <a:off x="-84326" y="7534082"/>
-            <a:ext cx="2151825" cy="600164"/>
+            <a:off x="-84326" y="8471342"/>
+            <a:ext cx="2151825" cy="507831"/>
           </a:xfrm>
           <a:prstGeom prst="rect">
             <a:avLst/>
@@ -5745,7 +5906,7 @@
               <a:buChar char="-"/>
             </a:pPr>
             <a:r>
-              <a:rPr lang="fr-FR" sz="1100" b="0" dirty="0">
+              <a:rPr lang="fr-FR" sz="900" b="0" dirty="0">
                 <a:solidFill>
                   <a:srgbClr val="404040"/>
                 </a:solidFill>
@@ -5763,7 +5924,7 @@
               <a:buChar char="-"/>
             </a:pPr>
             <a:r>
-              <a:rPr lang="fr-FR" sz="1100" dirty="0">
+              <a:rPr lang="fr-FR" sz="900" dirty="0">
                 <a:solidFill>
                   <a:srgbClr val="404040"/>
                 </a:solidFill>
@@ -5780,7 +5941,7 @@
               <a:buChar char="-"/>
             </a:pPr>
             <a:r>
-              <a:rPr lang="fr-FR" sz="1100" dirty="0">
+              <a:rPr lang="fr-FR" sz="900" dirty="0">
                 <a:solidFill>
                   <a:srgbClr val="404040"/>
                 </a:solidFill>
@@ -5793,12 +5954,41 @@
           </a:p>
         </p:txBody>
       </p:sp>
-      <p:sp>
-        <p:nvSpPr>
-          <p:cNvPr id="12" name="ZoneTexte 11">
+      <p:pic>
+        <p:nvPicPr>
+          <p:cNvPr id="2" name="Image 1">
             <a:extLst>
               <a:ext uri="{FF2B5EF4-FFF2-40B4-BE49-F238E27FC236}">
-                <a16:creationId xmlns:a16="http://schemas.microsoft.com/office/drawing/2014/main" id="{D84A9E6E-6040-86AE-70C5-9931C4894AFF}"/>
+                <a16:creationId xmlns:a16="http://schemas.microsoft.com/office/drawing/2014/main" id="{D9AC954A-A92E-6AFB-813A-A8CF5734646F}"/>
+              </a:ext>
+            </a:extLst>
+          </p:cNvPr>
+          <p:cNvPicPr>
+            <a:picLocks noChangeAspect="1"/>
+          </p:cNvPicPr>
+          <p:nvPr/>
+        </p:nvPicPr>
+        <p:blipFill rotWithShape="1">
+          <a:blip r:embed="rId2"/>
+          <a:srcRect l="16838" t="30706" r="82036" b="65923"/>
+          <a:stretch/>
+        </p:blipFill>
+        <p:spPr>
+          <a:xfrm>
+            <a:off x="1829886" y="3483914"/>
+            <a:ext cx="498315" cy="419477"/>
+          </a:xfrm>
+          <a:prstGeom prst="rect">
+            <a:avLst/>
+          </a:prstGeom>
+        </p:spPr>
+      </p:pic>
+      <p:sp>
+        <p:nvSpPr>
+          <p:cNvPr id="3" name="ZoneTexte 2">
+            <a:extLst>
+              <a:ext uri="{FF2B5EF4-FFF2-40B4-BE49-F238E27FC236}">
+                <a16:creationId xmlns:a16="http://schemas.microsoft.com/office/drawing/2014/main" id="{1E1F073A-1C61-224F-6757-04E6AB2F35E9}"/>
               </a:ext>
             </a:extLst>
           </p:cNvPr>
@@ -5807,8 +5997,8 @@
         </p:nvSpPr>
         <p:spPr>
           <a:xfrm>
-            <a:off x="202274" y="3613398"/>
-            <a:ext cx="1971419" cy="307777"/>
+            <a:off x="0" y="4843909"/>
+            <a:ext cx="2080347" cy="1200329"/>
           </a:xfrm>
           <a:prstGeom prst="rect">
             <a:avLst/>
@@ -5821,27 +6011,220 @@
           </a:bodyPr>
           <a:lstStyle/>
           <a:p>
-            <a:r>
-              <a:rPr lang="fr-FR" sz="1400" b="1" dirty="0">
-                <a:solidFill>
-                  <a:schemeClr val="accent1">
-                    <a:lumMod val="50000"/>
-                  </a:schemeClr>
-                </a:solidFill>
-                <a:latin typeface="Malgun Gothic" panose="020B0503020000020004" pitchFamily="34" charset="-127"/>
-                <a:ea typeface="Malgun Gothic" panose="020B0503020000020004" pitchFamily="34" charset="-127"/>
-              </a:rPr>
-              <a:t>Coordonnées</a:t>
-            </a:r>
-          </a:p>
-        </p:txBody>
-      </p:sp>
-      <p:sp>
-        <p:nvSpPr>
-          <p:cNvPr id="14" name="ZoneTexte 13">
+            <a:pPr algn="just"/>
+            <a:r>
+              <a:rPr lang="fr-FR" sz="800" b="1" cap="all" dirty="0">
+                <a:solidFill>
+                  <a:srgbClr val="404040"/>
+                </a:solidFill>
+                <a:effectLst/>
+                <a:latin typeface="Malgun Gothic" panose="020B0503020000020004" pitchFamily="34" charset="-127"/>
+                <a:ea typeface="Malgun Gothic" panose="020B0503020000020004" pitchFamily="34" charset="-127"/>
+                <a:cs typeface="Cordia New" panose="020B0304020202020204" pitchFamily="34" charset="-34"/>
+              </a:rPr>
+              <a:t>DESS </a:t>
+            </a:r>
+            <a:r>
+              <a:rPr lang="fr-FR" sz="800" b="1" cap="all" dirty="0" err="1">
+                <a:solidFill>
+                  <a:srgbClr val="404040"/>
+                </a:solidFill>
+                <a:effectLst/>
+                <a:latin typeface="Malgun Gothic" panose="020B0503020000020004" pitchFamily="34" charset="-127"/>
+                <a:ea typeface="Malgun Gothic" panose="020B0503020000020004" pitchFamily="34" charset="-127"/>
+                <a:cs typeface="Cordia New" panose="020B0304020202020204" pitchFamily="34" charset="-34"/>
+              </a:rPr>
+              <a:t>ing</a:t>
+            </a:r>
+            <a:r>
+              <a:rPr lang="fr-FR" sz="800" b="1" cap="all" dirty="0">
+                <a:solidFill>
+                  <a:srgbClr val="404040"/>
+                </a:solidFill>
+                <a:effectLst/>
+                <a:latin typeface="Malgun Gothic" panose="020B0503020000020004" pitchFamily="34" charset="-127"/>
+                <a:ea typeface="Malgun Gothic" panose="020B0503020000020004" pitchFamily="34" charset="-127"/>
+                <a:cs typeface="Cordia New" panose="020B0304020202020204" pitchFamily="34" charset="-34"/>
+              </a:rPr>
+              <a:t>. </a:t>
+            </a:r>
+            <a:r>
+              <a:rPr lang="fr-FR" sz="800" b="1" cap="all" dirty="0" err="1">
+                <a:solidFill>
+                  <a:srgbClr val="404040"/>
+                </a:solidFill>
+                <a:effectLst/>
+                <a:latin typeface="Malgun Gothic" panose="020B0503020000020004" pitchFamily="34" charset="-127"/>
+                <a:ea typeface="Malgun Gothic" panose="020B0503020000020004" pitchFamily="34" charset="-127"/>
+                <a:cs typeface="Cordia New" panose="020B0304020202020204" pitchFamily="34" charset="-34"/>
+              </a:rPr>
+              <a:t>mathematique</a:t>
+            </a:r>
+            <a:r>
+              <a:rPr lang="fr-FR" sz="800" b="1" cap="all" dirty="0">
+                <a:solidFill>
+                  <a:srgbClr val="404040"/>
+                </a:solidFill>
+                <a:effectLst/>
+                <a:latin typeface="Malgun Gothic" panose="020B0503020000020004" pitchFamily="34" charset="-127"/>
+                <a:ea typeface="Malgun Gothic" panose="020B0503020000020004" pitchFamily="34" charset="-127"/>
+                <a:cs typeface="Cordia New" panose="020B0304020202020204" pitchFamily="34" charset="-34"/>
+              </a:rPr>
+              <a:t> (Master 2), </a:t>
+            </a:r>
+            <a:r>
+              <a:rPr lang="fr-FR" sz="800" b="1" cap="all" dirty="0" err="1">
+                <a:solidFill>
+                  <a:srgbClr val="404040"/>
+                </a:solidFill>
+                <a:effectLst/>
+                <a:latin typeface="Malgun Gothic" panose="020B0503020000020004" pitchFamily="34" charset="-127"/>
+                <a:ea typeface="Malgun Gothic" panose="020B0503020000020004" pitchFamily="34" charset="-127"/>
+                <a:cs typeface="Cordia New" panose="020B0304020202020204" pitchFamily="34" charset="-34"/>
+              </a:rPr>
+              <a:t>opt</a:t>
+            </a:r>
+            <a:r>
+              <a:rPr lang="fr-FR" sz="800" b="1" cap="all" dirty="0">
+                <a:solidFill>
+                  <a:srgbClr val="404040"/>
+                </a:solidFill>
+                <a:effectLst/>
+                <a:latin typeface="Malgun Gothic" panose="020B0503020000020004" pitchFamily="34" charset="-127"/>
+                <a:ea typeface="Malgun Gothic" panose="020B0503020000020004" pitchFamily="34" charset="-127"/>
+                <a:cs typeface="Cordia New" panose="020B0304020202020204" pitchFamily="34" charset="-34"/>
+              </a:rPr>
+              <a:t>. courbes surfaces &amp; images</a:t>
+            </a:r>
+            <a:r>
+              <a:rPr lang="fr-FR" sz="800" b="0" cap="all" dirty="0">
+                <a:solidFill>
+                  <a:srgbClr val="404040"/>
+                </a:solidFill>
+                <a:effectLst/>
+                <a:latin typeface="Malgun Gothic" panose="020B0503020000020004" pitchFamily="34" charset="-127"/>
+                <a:ea typeface="Malgun Gothic" panose="020B0503020000020004" pitchFamily="34" charset="-127"/>
+                <a:cs typeface="Cordia New" panose="020B0304020202020204" pitchFamily="34" charset="-34"/>
+              </a:rPr>
+              <a:t>, </a:t>
+            </a:r>
+            <a:r>
+              <a:rPr lang="fr-FR" sz="800" b="0" cap="small" dirty="0">
+                <a:solidFill>
+                  <a:srgbClr val="404040"/>
+                </a:solidFill>
+                <a:effectLst/>
+                <a:latin typeface="Malgun Gothic" panose="020B0503020000020004" pitchFamily="34" charset="-127"/>
+                <a:ea typeface="Malgun Gothic" panose="020B0503020000020004" pitchFamily="34" charset="-127"/>
+                <a:cs typeface="Cordia New" panose="020B0304020202020204" pitchFamily="34" charset="-34"/>
+              </a:rPr>
+              <a:t>UNIV.  J. FOURIER, Grenoble – </a:t>
+            </a:r>
+            <a:r>
+              <a:rPr lang="fr-FR" sz="800" b="0" cap="small" dirty="0" err="1">
+                <a:solidFill>
+                  <a:srgbClr val="404040"/>
+                </a:solidFill>
+                <a:effectLst/>
+                <a:latin typeface="Malgun Gothic" panose="020B0503020000020004" pitchFamily="34" charset="-127"/>
+                <a:ea typeface="Malgun Gothic" panose="020B0503020000020004" pitchFamily="34" charset="-127"/>
+                <a:cs typeface="Cordia New" panose="020B0304020202020204" pitchFamily="34" charset="-34"/>
+              </a:rPr>
+              <a:t>Obt</a:t>
+            </a:r>
+            <a:r>
+              <a:rPr lang="fr-FR" sz="800" b="0" cap="small" dirty="0">
+                <a:solidFill>
+                  <a:srgbClr val="404040"/>
+                </a:solidFill>
+                <a:effectLst/>
+                <a:latin typeface="Malgun Gothic" panose="020B0503020000020004" pitchFamily="34" charset="-127"/>
+                <a:ea typeface="Malgun Gothic" panose="020B0503020000020004" pitchFamily="34" charset="-127"/>
+                <a:cs typeface="Cordia New" panose="020B0304020202020204" pitchFamily="34" charset="-34"/>
+              </a:rPr>
+              <a:t>. 1996</a:t>
+            </a:r>
+          </a:p>
+          <a:p>
+            <a:pPr algn="just"/>
+            <a:endParaRPr lang="fr-FR" sz="800" b="1" cap="all" dirty="0">
+              <a:solidFill>
+                <a:srgbClr val="404040"/>
+              </a:solidFill>
+              <a:effectLst/>
+              <a:latin typeface="Malgun Gothic" panose="020B0503020000020004" pitchFamily="34" charset="-127"/>
+              <a:ea typeface="Malgun Gothic" panose="020B0503020000020004" pitchFamily="34" charset="-127"/>
+              <a:cs typeface="Cordia New" panose="020B0304020202020204" pitchFamily="34" charset="-34"/>
+            </a:endParaRPr>
+          </a:p>
+          <a:p>
+            <a:pPr algn="just"/>
+            <a:r>
+              <a:rPr lang="fr-FR" sz="800" b="1" cap="all" dirty="0">
+                <a:solidFill>
+                  <a:srgbClr val="404040"/>
+                </a:solidFill>
+                <a:effectLst/>
+                <a:latin typeface="Malgun Gothic" panose="020B0503020000020004" pitchFamily="34" charset="-127"/>
+                <a:ea typeface="Malgun Gothic" panose="020B0503020000020004" pitchFamily="34" charset="-127"/>
+                <a:cs typeface="Cordia New" panose="020B0304020202020204" pitchFamily="34" charset="-34"/>
+              </a:rPr>
+              <a:t>maîtrise GENIE MATH. &amp; INFORMATIQUE, / Ingénieur maître en MATH. APPLIQ. &amp; INFORMATIQUE</a:t>
+            </a:r>
+            <a:r>
+              <a:rPr lang="fr-FR" sz="800" b="0" cap="small" dirty="0">
+                <a:solidFill>
+                  <a:srgbClr val="404040"/>
+                </a:solidFill>
+                <a:effectLst/>
+                <a:latin typeface="Malgun Gothic" panose="020B0503020000020004" pitchFamily="34" charset="-127"/>
+                <a:ea typeface="Malgun Gothic" panose="020B0503020000020004" pitchFamily="34" charset="-127"/>
+                <a:cs typeface="Cordia New" panose="020B0304020202020204" pitchFamily="34" charset="-34"/>
+              </a:rPr>
+              <a:t>, UNIV. J. FOURIER, Grenoble – </a:t>
+            </a:r>
+            <a:r>
+              <a:rPr lang="fr-FR" sz="800" b="0" cap="small" dirty="0" err="1">
+                <a:solidFill>
+                  <a:srgbClr val="404040"/>
+                </a:solidFill>
+                <a:effectLst/>
+                <a:latin typeface="Malgun Gothic" panose="020B0503020000020004" pitchFamily="34" charset="-127"/>
+                <a:ea typeface="Malgun Gothic" panose="020B0503020000020004" pitchFamily="34" charset="-127"/>
+                <a:cs typeface="Cordia New" panose="020B0304020202020204" pitchFamily="34" charset="-34"/>
+              </a:rPr>
+              <a:t>Obt</a:t>
+            </a:r>
+            <a:r>
+              <a:rPr lang="fr-FR" sz="800" b="0" cap="small" dirty="0">
+                <a:solidFill>
+                  <a:srgbClr val="404040"/>
+                </a:solidFill>
+                <a:effectLst/>
+                <a:latin typeface="Malgun Gothic" panose="020B0503020000020004" pitchFamily="34" charset="-127"/>
+                <a:ea typeface="Malgun Gothic" panose="020B0503020000020004" pitchFamily="34" charset="-127"/>
+                <a:cs typeface="Cordia New" panose="020B0304020202020204" pitchFamily="34" charset="-34"/>
+              </a:rPr>
+              <a:t>. 1995</a:t>
+            </a:r>
+            <a:endParaRPr lang="fr-FR" sz="800" b="1" cap="all" dirty="0">
+              <a:solidFill>
+                <a:srgbClr val="404040"/>
+              </a:solidFill>
+              <a:effectLst/>
+              <a:latin typeface="Malgun Gothic" panose="020B0503020000020004" pitchFamily="34" charset="-127"/>
+              <a:ea typeface="Malgun Gothic" panose="020B0503020000020004" pitchFamily="34" charset="-127"/>
+              <a:cs typeface="Cordia New" panose="020B0304020202020204" pitchFamily="34" charset="-34"/>
+            </a:endParaRPr>
+          </a:p>
+        </p:txBody>
+      </p:sp>
+      <p:sp>
+        <p:nvSpPr>
+          <p:cNvPr id="15" name="ZoneTexte 14">
             <a:extLst>
               <a:ext uri="{FF2B5EF4-FFF2-40B4-BE49-F238E27FC236}">
-                <a16:creationId xmlns:a16="http://schemas.microsoft.com/office/drawing/2014/main" id="{E4CA72CE-E809-7B4D-F863-743F497711A8}"/>
+                <a16:creationId xmlns:a16="http://schemas.microsoft.com/office/drawing/2014/main" id="{42F2CAB9-DF65-D1F3-CD65-6DE800DCB63D}"/>
               </a:ext>
             </a:extLst>
           </p:cNvPr>
@@ -5850,8 +6233,8 @@
         </p:nvSpPr>
         <p:spPr>
           <a:xfrm>
-            <a:off x="202274" y="5352108"/>
-            <a:ext cx="1971419" cy="307777"/>
+            <a:off x="186273" y="4609093"/>
+            <a:ext cx="1971419" cy="276999"/>
           </a:xfrm>
           <a:prstGeom prst="rect">
             <a:avLst/>
@@ -5865,7 +6248,7 @@
           <a:lstStyle/>
           <a:p>
             <a:r>
-              <a:rPr lang="fr-FR" sz="1400" b="1" dirty="0">
+              <a:rPr lang="fr-FR" sz="1200" b="1" dirty="0">
                 <a:solidFill>
                   <a:schemeClr val="accent1">
                     <a:lumMod val="50000"/>
@@ -5874,11 +6257,54 @@
                 <a:latin typeface="Malgun Gothic" panose="020B0503020000020004" pitchFamily="34" charset="-127"/>
                 <a:ea typeface="Malgun Gothic" panose="020B0503020000020004" pitchFamily="34" charset="-127"/>
               </a:rPr>
-              <a:t>Savoir-être</a:t>
-            </a:r>
-          </a:p>
-        </p:txBody>
-      </p:sp>
+              <a:t>Formation</a:t>
+            </a:r>
+          </a:p>
+        </p:txBody>
+      </p:sp>
+      <p:cxnSp>
+        <p:nvCxnSpPr>
+          <p:cNvPr id="20" name="Connecteur droit 19">
+            <a:extLst>
+              <a:ext uri="{FF2B5EF4-FFF2-40B4-BE49-F238E27FC236}">
+                <a16:creationId xmlns:a16="http://schemas.microsoft.com/office/drawing/2014/main" id="{D9E271F7-83A1-5EBE-7F63-44C08587767B}"/>
+              </a:ext>
+            </a:extLst>
+          </p:cNvPr>
+          <p:cNvCxnSpPr/>
+          <p:nvPr/>
+        </p:nvCxnSpPr>
+        <p:spPr>
+          <a:xfrm flipV="1">
+            <a:off x="257600" y="4833753"/>
+            <a:ext cx="1426844" cy="8792"/>
+          </a:xfrm>
+          <a:prstGeom prst="line">
+            <a:avLst/>
+          </a:prstGeom>
+          <a:ln w="3175">
+            <a:solidFill>
+              <a:schemeClr val="bg2">
+                <a:lumMod val="75000"/>
+              </a:schemeClr>
+            </a:solidFill>
+          </a:ln>
+        </p:spPr>
+        <p:style>
+          <a:lnRef idx="1">
+            <a:schemeClr val="accent1"/>
+          </a:lnRef>
+          <a:fillRef idx="0">
+            <a:schemeClr val="accent1"/>
+          </a:fillRef>
+          <a:effectRef idx="0">
+            <a:schemeClr val="accent1"/>
+          </a:effectRef>
+          <a:fontRef idx="minor">
+            <a:schemeClr val="tx1"/>
+          </a:fontRef>
+        </p:style>
+      </p:cxnSp>
     </p:spTree>
     <p:extLst>
       <p:ext uri="{BB962C8B-B14F-4D97-AF65-F5344CB8AC3E}">
@@ -5925,7 +6351,7 @@
         </p:nvCxnSpPr>
         <p:spPr>
           <a:xfrm flipH="1">
-            <a:off x="1095925" y="266700"/>
+            <a:off x="905425" y="266700"/>
             <a:ext cx="40596" cy="8705850"/>
           </a:xfrm>
           <a:prstGeom prst="line">
@@ -5968,8 +6394,8 @@
         </p:nvSpPr>
         <p:spPr>
           <a:xfrm>
-            <a:off x="1619439" y="266700"/>
-            <a:ext cx="4843450" cy="8656216"/>
+            <a:off x="1460500" y="266700"/>
+            <a:ext cx="5356903" cy="5086008"/>
           </a:xfrm>
           <a:prstGeom prst="rect">
             <a:avLst/>
@@ -5982,79 +6408,207 @@
           </a:bodyPr>
           <a:lstStyle/>
           <a:p>
-            <a:endParaRPr lang="fr-FR" sz="1050" dirty="0">
+            <a:pPr algn="just"/>
+            <a:r>
+              <a:rPr lang="fr-FR" sz="1000" b="1" cap="all" dirty="0">
+                <a:solidFill>
+                  <a:srgbClr val="00000A"/>
+                </a:solidFill>
+                <a:effectLst/>
+                <a:latin typeface="Malgun Gothic" panose="020B0503020000020004" pitchFamily="34" charset="-127"/>
+                <a:ea typeface="Malgun Gothic" panose="020B0503020000020004" pitchFamily="34" charset="-127"/>
+                <a:cs typeface="Cordia New" panose="020B0304020202020204" pitchFamily="34" charset="-34"/>
+              </a:rPr>
+              <a:t>dxc </a:t>
+            </a:r>
+            <a:r>
+              <a:rPr lang="fr-FR" sz="1000" b="1" cap="all" dirty="0" err="1">
+                <a:solidFill>
+                  <a:srgbClr val="00000A"/>
+                </a:solidFill>
+                <a:effectLst/>
+                <a:latin typeface="Malgun Gothic" panose="020B0503020000020004" pitchFamily="34" charset="-127"/>
+                <a:ea typeface="Malgun Gothic" panose="020B0503020000020004" pitchFamily="34" charset="-127"/>
+                <a:cs typeface="Cordia New" panose="020B0304020202020204" pitchFamily="34" charset="-34"/>
+              </a:rPr>
+              <a:t>technology</a:t>
+            </a:r>
+            <a:r>
+              <a:rPr lang="fr-FR" sz="1000" b="1" cap="all" dirty="0">
+                <a:solidFill>
+                  <a:srgbClr val="00000A"/>
+                </a:solidFill>
+                <a:effectLst/>
+                <a:latin typeface="Malgun Gothic" panose="020B0503020000020004" pitchFamily="34" charset="-127"/>
+                <a:ea typeface="Malgun Gothic" panose="020B0503020000020004" pitchFamily="34" charset="-127"/>
+                <a:cs typeface="Cordia New" panose="020B0304020202020204" pitchFamily="34" charset="-34"/>
+              </a:rPr>
+              <a:t> FINANCIAL SERVICES (anciennement CSC Financial Services) </a:t>
+            </a:r>
+            <a:r>
+              <a:rPr lang="fr-FR" sz="1000" cap="all" dirty="0">
+                <a:solidFill>
+                  <a:srgbClr val="404040"/>
+                </a:solidFill>
+                <a:latin typeface="Malgun Gothic" panose="020B0503020000020004" pitchFamily="34" charset="-127"/>
+                <a:ea typeface="Malgun Gothic" panose="020B0503020000020004" pitchFamily="34" charset="-127"/>
+                <a:cs typeface="Cordia New" panose="020B0304020202020204" pitchFamily="34" charset="-34"/>
+              </a:rPr>
+              <a:t>- </a:t>
+            </a:r>
+            <a:r>
+              <a:rPr lang="fr-FR" sz="1000" b="0" cap="all" dirty="0">
+                <a:solidFill>
+                  <a:srgbClr val="404040"/>
+                </a:solidFill>
+                <a:effectLst/>
+                <a:latin typeface="Malgun Gothic" panose="020B0503020000020004" pitchFamily="34" charset="-127"/>
+                <a:ea typeface="Malgun Gothic" panose="020B0503020000020004" pitchFamily="34" charset="-127"/>
+                <a:cs typeface="Cordia New" panose="020B0304020202020204" pitchFamily="34" charset="-34"/>
+              </a:rPr>
+              <a:t>secteur d’activité : DEVELOPPEMENT DE PRODUITS INFORMATIQUES DESTINES AUX ASSURANCES</a:t>
+            </a:r>
+          </a:p>
+          <a:p>
+            <a:pPr algn="just"/>
+            <a:endParaRPr lang="fr-FR" sz="500" b="0" cap="all" dirty="0">
               <a:solidFill>
-                <a:schemeClr val="bg2">
-                  <a:lumMod val="25000"/>
-                </a:schemeClr>
+                <a:srgbClr val="404040"/>
               </a:solidFill>
+              <a:effectLst/>
               <a:latin typeface="Malgun Gothic" panose="020B0503020000020004" pitchFamily="34" charset="-127"/>
               <a:ea typeface="Malgun Gothic" panose="020B0503020000020004" pitchFamily="34" charset="-127"/>
+              <a:cs typeface="Cordia New" panose="020B0304020202020204" pitchFamily="34" charset="-34"/>
             </a:endParaRPr>
           </a:p>
           <a:p>
-            <a:r>
-              <a:rPr lang="fr-FR" sz="1050" b="1" cap="small" dirty="0">
+            <a:pPr algn="just"/>
+            <a:r>
+              <a:rPr lang="fr-FR" sz="1000" b="1" cap="small" dirty="0">
+                <a:solidFill>
+                  <a:srgbClr val="00000A"/>
+                </a:solidFill>
+                <a:latin typeface="Malgun Gothic" panose="020B0503020000020004" pitchFamily="34" charset="-127"/>
+                <a:ea typeface="Malgun Gothic" panose="020B0503020000020004" pitchFamily="34" charset="-127"/>
+                <a:cs typeface="Cordia New" panose="020B0304020202020204" pitchFamily="34" charset="-34"/>
+              </a:rPr>
+              <a:t>Dernier Poste occupé </a:t>
+            </a:r>
+            <a:r>
+              <a:rPr lang="fr-FR" sz="1000" dirty="0">
+                <a:solidFill>
+                  <a:srgbClr val="595959"/>
+                </a:solidFill>
+                <a:effectLst/>
+                <a:latin typeface="Malgun Gothic" panose="020B0503020000020004" pitchFamily="34" charset="-127"/>
+                <a:ea typeface="Malgun Gothic" panose="020B0503020000020004" pitchFamily="34" charset="-127"/>
+                <a:cs typeface="Angsana New" panose="02020603050405020304" pitchFamily="18" charset="-34"/>
+              </a:rPr>
+              <a:t>: </a:t>
+            </a:r>
+            <a:r>
+              <a:rPr lang="fr-FR" sz="1000" b="1" cap="small" dirty="0">
                 <a:solidFill>
                   <a:srgbClr val="4F81BD"/>
                 </a:solidFill>
+                <a:effectLst/>
                 <a:latin typeface="Malgun Gothic" panose="020B0503020000020004" pitchFamily="34" charset="-127"/>
                 <a:ea typeface="Malgun Gothic" panose="020B0503020000020004" pitchFamily="34" charset="-127"/>
                 <a:cs typeface="Angsana New" panose="02020603050405020304" pitchFamily="18" charset="-34"/>
               </a:rPr>
-              <a:t>Consultant Architecte DevOps, Docker </a:t>
-            </a:r>
-            <a:r>
-              <a:rPr lang="fr-FR" sz="1050" cap="small" dirty="0">
-                <a:solidFill>
-                  <a:srgbClr val="4F81BD"/>
-                </a:solidFill>
-                <a:latin typeface="Malgun Gothic" panose="020B0503020000020004" pitchFamily="34" charset="-127"/>
-                <a:ea typeface="Malgun Gothic" panose="020B0503020000020004" pitchFamily="34" charset="-127"/>
-                <a:cs typeface="Angsana New" panose="02020603050405020304" pitchFamily="18" charset="-34"/>
-              </a:rPr>
-              <a:t>HARDIS</a:t>
-            </a:r>
-            <a:r>
-              <a:rPr lang="fr-FR" sz="1050" b="1" cap="small" dirty="0">
-                <a:solidFill>
-                  <a:srgbClr val="4F81BD"/>
-                </a:solidFill>
-                <a:latin typeface="Malgun Gothic" panose="020B0503020000020004" pitchFamily="34" charset="-127"/>
-                <a:ea typeface="Malgun Gothic" panose="020B0503020000020004" pitchFamily="34" charset="-127"/>
-                <a:cs typeface="Angsana New" panose="02020603050405020304" pitchFamily="18" charset="-34"/>
-              </a:rPr>
-              <a:t> </a:t>
-            </a:r>
-            <a:r>
-              <a:rPr lang="fr-FR" sz="1050" cap="small" dirty="0">
-                <a:solidFill>
-                  <a:srgbClr val="4F81BD"/>
-                </a:solidFill>
-                <a:latin typeface="Malgun Gothic" panose="020B0503020000020004" pitchFamily="34" charset="-127"/>
-                <a:ea typeface="Malgun Gothic" panose="020B0503020000020004" pitchFamily="34" charset="-127"/>
-                <a:cs typeface="Angsana New" panose="02020603050405020304" pitchFamily="18" charset="-34"/>
-              </a:rPr>
-              <a:t>– 2018-2019</a:t>
-            </a:r>
-            <a:endParaRPr lang="fr-FR" sz="1050" dirty="0">
+              <a:t>Architecte DevOps, docker 2014-2018</a:t>
+            </a:r>
+          </a:p>
+          <a:p>
+            <a:pPr algn="just"/>
+            <a:endParaRPr lang="fr-FR" sz="500" dirty="0">
               <a:solidFill>
-                <a:schemeClr val="bg2">
-                  <a:lumMod val="25000"/>
-                </a:schemeClr>
+                <a:srgbClr val="595959"/>
               </a:solidFill>
+              <a:effectLst/>
               <a:latin typeface="Malgun Gothic" panose="020B0503020000020004" pitchFamily="34" charset="-127"/>
               <a:ea typeface="Malgun Gothic" panose="020B0503020000020004" pitchFamily="34" charset="-127"/>
+              <a:cs typeface="Angsana New" panose="02020603050405020304" pitchFamily="18" charset="-34"/>
             </a:endParaRPr>
           </a:p>
           <a:p>
-            <a:pPr lvl="0" algn="just">
-              <a:buSzPts val="1050"/>
+            <a:pPr algn="just"/>
+            <a:r>
+              <a:rPr lang="fr-FR" sz="1000" b="1" cap="small" dirty="0">
+                <a:solidFill>
+                  <a:srgbClr val="00000A"/>
+                </a:solidFill>
+                <a:latin typeface="Malgun Gothic" panose="020B0503020000020004" pitchFamily="34" charset="-127"/>
+                <a:ea typeface="Malgun Gothic" panose="020B0503020000020004" pitchFamily="34" charset="-127"/>
+                <a:cs typeface="Cordia New" panose="020B0304020202020204" pitchFamily="34" charset="-34"/>
+              </a:rPr>
+              <a:t>Postes précédents </a:t>
+            </a:r>
+            <a:r>
+              <a:rPr lang="fr-FR" sz="1000" dirty="0">
+                <a:solidFill>
+                  <a:srgbClr val="595959"/>
+                </a:solidFill>
+                <a:effectLst/>
+                <a:latin typeface="Malgun Gothic" panose="020B0503020000020004" pitchFamily="34" charset="-127"/>
+                <a:ea typeface="Malgun Gothic" panose="020B0503020000020004" pitchFamily="34" charset="-127"/>
+                <a:cs typeface="Angsana New" panose="02020603050405020304" pitchFamily="18" charset="-34"/>
+              </a:rPr>
+              <a:t>: </a:t>
+            </a:r>
+            <a:r>
+              <a:rPr lang="fr-FR" sz="1000" b="1" cap="small" dirty="0">
+                <a:solidFill>
+                  <a:srgbClr val="4F81BD"/>
+                </a:solidFill>
+                <a:effectLst/>
+                <a:latin typeface="Malgun Gothic" panose="020B0503020000020004" pitchFamily="34" charset="-127"/>
+                <a:ea typeface="Malgun Gothic" panose="020B0503020000020004" pitchFamily="34" charset="-127"/>
+                <a:cs typeface="Angsana New" panose="02020603050405020304" pitchFamily="18" charset="-34"/>
+              </a:rPr>
+              <a:t>Chef de projets R&amp;D</a:t>
+            </a:r>
+            <a:r>
+              <a:rPr lang="fr-FR" sz="1000" dirty="0">
+                <a:solidFill>
+                  <a:srgbClr val="595959"/>
+                </a:solidFill>
+                <a:effectLst/>
+                <a:latin typeface="Malgun Gothic" panose="020B0503020000020004" pitchFamily="34" charset="-127"/>
+                <a:ea typeface="Malgun Gothic" panose="020B0503020000020004" pitchFamily="34" charset="-127"/>
+                <a:cs typeface="Angsana New" panose="02020603050405020304" pitchFamily="18" charset="-34"/>
+              </a:rPr>
+              <a:t> autour de GRAPHTALK AIA, m</a:t>
+            </a:r>
+            <a:r>
+              <a:rPr lang="fr-FR" sz="1000" dirty="0">
+                <a:solidFill>
+                  <a:srgbClr val="595959"/>
+                </a:solidFill>
+                <a:effectLst/>
+                <a:latin typeface="Malgun Gothic" panose="020B0503020000020004" pitchFamily="34" charset="-127"/>
+                <a:ea typeface="Malgun Gothic" panose="020B0503020000020004" pitchFamily="34" charset="-127"/>
+                <a:cs typeface="Calibri" panose="020F0502020204030204" pitchFamily="34" charset="0"/>
+              </a:rPr>
+              <a:t>anagement de plusieurs équipes R&amp;D en France et en Bulgarie jusqu’à 8 personnes. Développements en Java, Ruby, Chef, C++</a:t>
+            </a:r>
+            <a:endParaRPr lang="fr-FR" sz="1000" dirty="0">
+              <a:solidFill>
+                <a:srgbClr val="595959"/>
+              </a:solidFill>
+              <a:effectLst/>
+              <a:latin typeface="Malgun Gothic" panose="020B0503020000020004" pitchFamily="34" charset="-127"/>
+              <a:ea typeface="Malgun Gothic" panose="020B0503020000020004" pitchFamily="34" charset="-127"/>
+              <a:cs typeface="Angsana New" panose="02020603050405020304" pitchFamily="18" charset="-34"/>
+            </a:endParaRPr>
+          </a:p>
+          <a:p>
+            <a:pPr algn="just">
               <a:tabLst>
                 <a:tab pos="323850" algn="l"/>
               </a:tabLst>
             </a:pPr>
-            <a:endParaRPr lang="fr-FR" sz="1050" b="1" i="1" dirty="0">
+            <a:endParaRPr lang="fr-FR" sz="1000" b="1" i="1" dirty="0">
               <a:solidFill>
                 <a:srgbClr val="595959"/>
               </a:solidFill>
@@ -6065,6 +6619,34 @@
             </a:endParaRPr>
           </a:p>
           <a:p>
+            <a:pPr algn="just">
+              <a:tabLst>
+                <a:tab pos="323850" algn="l"/>
+              </a:tabLst>
+            </a:pPr>
+            <a:r>
+              <a:rPr lang="fr-FR" sz="1000" b="1" i="1" dirty="0">
+                <a:solidFill>
+                  <a:srgbClr val="595959"/>
+                </a:solidFill>
+                <a:effectLst/>
+                <a:latin typeface="Malgun Gothic" panose="020B0503020000020004" pitchFamily="34" charset="-127"/>
+                <a:ea typeface="Malgun Gothic" panose="020B0503020000020004" pitchFamily="34" charset="-127"/>
+                <a:cs typeface="Calibri" panose="020F0502020204030204" pitchFamily="34" charset="0"/>
+              </a:rPr>
+              <a:t>Exemples de projets réalisés :</a:t>
+            </a:r>
+            <a:endParaRPr lang="fr-FR" sz="1000" dirty="0">
+              <a:solidFill>
+                <a:srgbClr val="595959"/>
+              </a:solidFill>
+              <a:effectLst/>
+              <a:latin typeface="Malgun Gothic" panose="020B0503020000020004" pitchFamily="34" charset="-127"/>
+              <a:ea typeface="Malgun Gothic" panose="020B0503020000020004" pitchFamily="34" charset="-127"/>
+              <a:cs typeface="Angsana New" panose="02020603050405020304" pitchFamily="18" charset="-34"/>
+            </a:endParaRPr>
+          </a:p>
+          <a:p>
             <a:pPr lvl="0" algn="just">
               <a:buSzPts val="1050"/>
               <a:tabLst>
@@ -6072,7 +6654,19 @@
               </a:tabLst>
             </a:pPr>
             <a:r>
-              <a:rPr lang="fr-FR" sz="1050" b="1" i="1" dirty="0">
+              <a:rPr lang="fr-FR" sz="1000" b="1" i="1" dirty="0">
+                <a:solidFill>
+                  <a:srgbClr val="0070C0"/>
+                </a:solidFill>
+                <a:effectLst/>
+                <a:latin typeface="Malgun Gothic" panose="020B0503020000020004" pitchFamily="34" charset="-127"/>
+                <a:ea typeface="Malgun Gothic" panose="020B0503020000020004" pitchFamily="34" charset="-127"/>
+                <a:cs typeface="Calibri" panose="020F0502020204030204" pitchFamily="34" charset="0"/>
+              </a:rPr>
+              <a:t>DEVOPS SUR GRAPHTALK AIA </a:t>
+            </a:r>
+            <a:r>
+              <a:rPr lang="fr-FR" sz="1000" dirty="0">
                 <a:solidFill>
                   <a:srgbClr val="595959"/>
                 </a:solidFill>
@@ -6081,29 +6675,9 @@
                 <a:ea typeface="Malgun Gothic" panose="020B0503020000020004" pitchFamily="34" charset="-127"/>
                 <a:cs typeface="Calibri" panose="020F0502020204030204" pitchFamily="34" charset="0"/>
               </a:rPr>
-              <a:t>DOCKERISATION ADELIA/REFLEX </a:t>
-            </a:r>
-            <a:r>
-              <a:rPr lang="fr-FR" sz="1050" dirty="0">
-                <a:solidFill>
-                  <a:srgbClr val="595959"/>
-                </a:solidFill>
-                <a:effectLst/>
-                <a:latin typeface="Malgun Gothic" panose="020B0503020000020004" pitchFamily="34" charset="-127"/>
-                <a:ea typeface="Malgun Gothic" panose="020B0503020000020004" pitchFamily="34" charset="-127"/>
-                <a:cs typeface="Calibri" panose="020F0502020204030204" pitchFamily="34" charset="0"/>
-              </a:rPr>
-              <a:t>Participation à la transformation de l’application REFLEX sous forme de conteneurs Docker. Le but est d’utiliser l’application sur le Cloud Public et/ou privé.</a:t>
-            </a:r>
-          </a:p>
-          <a:p>
-            <a:pPr lvl="0" algn="just">
-              <a:buSzPts val="1050"/>
-              <a:tabLst>
-                <a:tab pos="323850" algn="l"/>
-              </a:tabLst>
-            </a:pPr>
-            <a:endParaRPr lang="fr-FR" sz="1050" dirty="0">
+              <a:t>Développement d’une chaine d’intégration et de livraison continue sous Jenkins. Création d’une chaîne de validation continue du logiciel avec tests et lancement d’alertes. Développement en Groovy</a:t>
+            </a:r>
+            <a:endParaRPr lang="fr-FR" sz="1000" dirty="0">
               <a:solidFill>
                 <a:srgbClr val="595959"/>
               </a:solidFill>
@@ -6120,7 +6694,225 @@
                 <a:tab pos="323850" algn="l"/>
               </a:tabLst>
             </a:pPr>
-            <a:endParaRPr lang="fr-FR" sz="1050" b="1" i="1" dirty="0">
+            <a:endParaRPr lang="fr-FR" sz="400" b="1" i="1" dirty="0">
+              <a:solidFill>
+                <a:srgbClr val="0070C0"/>
+              </a:solidFill>
+              <a:effectLst/>
+              <a:latin typeface="Malgun Gothic" panose="020B0503020000020004" pitchFamily="34" charset="-127"/>
+              <a:ea typeface="Malgun Gothic" panose="020B0503020000020004" pitchFamily="34" charset="-127"/>
+              <a:cs typeface="Calibri" panose="020F0502020204030204" pitchFamily="34" charset="0"/>
+            </a:endParaRPr>
+          </a:p>
+          <a:p>
+            <a:pPr lvl="0" algn="just">
+              <a:buSzPts val="1050"/>
+              <a:tabLst>
+                <a:tab pos="323850" algn="l"/>
+              </a:tabLst>
+            </a:pPr>
+            <a:r>
+              <a:rPr lang="fr-FR" sz="1000" b="1" i="1" dirty="0">
+                <a:solidFill>
+                  <a:srgbClr val="0070C0"/>
+                </a:solidFill>
+                <a:effectLst/>
+                <a:latin typeface="Malgun Gothic" panose="020B0503020000020004" pitchFamily="34" charset="-127"/>
+                <a:ea typeface="Malgun Gothic" panose="020B0503020000020004" pitchFamily="34" charset="-127"/>
+                <a:cs typeface="Calibri" panose="020F0502020204030204" pitchFamily="34" charset="0"/>
+              </a:rPr>
+              <a:t>INDUSTRIALISATION DE L’INSTALLATION DU LOGICIEL GRAPHTALK </a:t>
+            </a:r>
+          </a:p>
+          <a:p>
+            <a:pPr lvl="0" algn="just">
+              <a:buSzPts val="1050"/>
+              <a:tabLst>
+                <a:tab pos="323850" algn="l"/>
+              </a:tabLst>
+            </a:pPr>
+            <a:r>
+              <a:rPr lang="fr-FR" sz="1000" b="1" i="1" dirty="0">
+                <a:solidFill>
+                  <a:srgbClr val="595959"/>
+                </a:solidFill>
+                <a:effectLst/>
+                <a:latin typeface="Malgun Gothic" panose="020B0503020000020004" pitchFamily="34" charset="-127"/>
+                <a:ea typeface="Malgun Gothic" panose="020B0503020000020004" pitchFamily="34" charset="-127"/>
+                <a:cs typeface="Calibri" panose="020F0502020204030204" pitchFamily="34" charset="0"/>
+              </a:rPr>
+              <a:t>Responsable du projet Delivery Manager 2007-2014 : équipe de 5 personnes : </a:t>
+            </a:r>
+            <a:r>
+              <a:rPr lang="fr-FR" sz="1000" dirty="0">
+                <a:solidFill>
+                  <a:srgbClr val="595959"/>
+                </a:solidFill>
+                <a:effectLst/>
+                <a:latin typeface="Malgun Gothic" panose="020B0503020000020004" pitchFamily="34" charset="-127"/>
+                <a:ea typeface="Malgun Gothic" panose="020B0503020000020004" pitchFamily="34" charset="-127"/>
+                <a:cs typeface="Calibri" panose="020F0502020204030204" pitchFamily="34" charset="0"/>
+              </a:rPr>
+              <a:t>Outil d’automatisation de l’installation de Graphtalk AIA sur sites de production ; Développements en GDL, C++, Scripts Ruby, </a:t>
+            </a:r>
+            <a:r>
+              <a:rPr lang="fr-FR" sz="1000" dirty="0" err="1">
+                <a:solidFill>
+                  <a:srgbClr val="595959"/>
+                </a:solidFill>
+                <a:effectLst/>
+                <a:latin typeface="Malgun Gothic" panose="020B0503020000020004" pitchFamily="34" charset="-127"/>
+                <a:ea typeface="Malgun Gothic" panose="020B0503020000020004" pitchFamily="34" charset="-127"/>
+                <a:cs typeface="Calibri" panose="020F0502020204030204" pitchFamily="34" charset="0"/>
+              </a:rPr>
+              <a:t>Cucumber</a:t>
+            </a:r>
+            <a:r>
+              <a:rPr lang="fr-FR" sz="1000" dirty="0">
+                <a:solidFill>
+                  <a:srgbClr val="595959"/>
+                </a:solidFill>
+                <a:effectLst/>
+                <a:latin typeface="Malgun Gothic" panose="020B0503020000020004" pitchFamily="34" charset="-127"/>
+                <a:ea typeface="Malgun Gothic" panose="020B0503020000020004" pitchFamily="34" charset="-127"/>
+                <a:cs typeface="Calibri" panose="020F0502020204030204" pitchFamily="34" charset="0"/>
+              </a:rPr>
+              <a:t>, Script Shell  </a:t>
+            </a:r>
+          </a:p>
+          <a:p>
+            <a:pPr lvl="0" algn="just">
+              <a:buSzPts val="1050"/>
+              <a:tabLst>
+                <a:tab pos="323850" algn="l"/>
+              </a:tabLst>
+            </a:pPr>
+            <a:endParaRPr lang="fr-FR" sz="400" b="1" i="1" dirty="0">
+              <a:solidFill>
+                <a:srgbClr val="0070C0"/>
+              </a:solidFill>
+              <a:effectLst/>
+              <a:latin typeface="Malgun Gothic" panose="020B0503020000020004" pitchFamily="34" charset="-127"/>
+              <a:ea typeface="Malgun Gothic" panose="020B0503020000020004" pitchFamily="34" charset="-127"/>
+              <a:cs typeface="Calibri" panose="020F0502020204030204" pitchFamily="34" charset="0"/>
+            </a:endParaRPr>
+          </a:p>
+          <a:p>
+            <a:pPr lvl="0" algn="just">
+              <a:buSzPts val="1050"/>
+              <a:tabLst>
+                <a:tab pos="323850" algn="l"/>
+              </a:tabLst>
+            </a:pPr>
+            <a:r>
+              <a:rPr lang="fr-FR" sz="1000" b="1" i="1" dirty="0">
+                <a:solidFill>
+                  <a:srgbClr val="0070C0"/>
+                </a:solidFill>
+                <a:effectLst/>
+                <a:latin typeface="Malgun Gothic" panose="020B0503020000020004" pitchFamily="34" charset="-127"/>
+                <a:ea typeface="Malgun Gothic" panose="020B0503020000020004" pitchFamily="34" charset="-127"/>
+                <a:cs typeface="Calibri" panose="020F0502020204030204" pitchFamily="34" charset="0"/>
+              </a:rPr>
+              <a:t>PROJETS JOB MANAGER et IPE SOUS GRAPHTALK AIA pour la gestion de production 2003-2007</a:t>
+            </a:r>
+          </a:p>
+          <a:p>
+            <a:pPr lvl="0" algn="just">
+              <a:buSzPts val="1050"/>
+              <a:tabLst>
+                <a:tab pos="323850" algn="l"/>
+              </a:tabLst>
+            </a:pPr>
+            <a:r>
+              <a:rPr lang="fr-FR" sz="1000" b="1" i="1" dirty="0">
+                <a:solidFill>
+                  <a:srgbClr val="595959"/>
+                </a:solidFill>
+                <a:effectLst/>
+                <a:latin typeface="Malgun Gothic" panose="020B0503020000020004" pitchFamily="34" charset="-127"/>
+                <a:ea typeface="Malgun Gothic" panose="020B0503020000020004" pitchFamily="34" charset="-127"/>
+                <a:cs typeface="Angsana New" panose="02020603050405020304" pitchFamily="18" charset="-34"/>
+              </a:rPr>
+              <a:t>Responsable des projets : équipe de 8 personnes en France et Bulgarie : </a:t>
+            </a:r>
+            <a:r>
+              <a:rPr lang="fr-FR" sz="1000" dirty="0">
+                <a:solidFill>
+                  <a:srgbClr val="595959"/>
+                </a:solidFill>
+                <a:effectLst/>
+                <a:latin typeface="Malgun Gothic" panose="020B0503020000020004" pitchFamily="34" charset="-127"/>
+                <a:ea typeface="Malgun Gothic" panose="020B0503020000020004" pitchFamily="34" charset="-127"/>
+                <a:cs typeface="Calibri" panose="020F0502020204030204" pitchFamily="34" charset="0"/>
+              </a:rPr>
+              <a:t>Job Manager : Logiciel de Lancement et d’organisation de processus asynchrones lors du traitement de contrats d’assurances </a:t>
+            </a:r>
+            <a:r>
+              <a:rPr lang="fr-FR" sz="1000" dirty="0">
+                <a:solidFill>
+                  <a:srgbClr val="595959"/>
+                </a:solidFill>
+                <a:latin typeface="Malgun Gothic" panose="020B0503020000020004" pitchFamily="34" charset="-127"/>
+                <a:ea typeface="Malgun Gothic" panose="020B0503020000020004" pitchFamily="34" charset="-127"/>
+                <a:cs typeface="Angsana New" panose="02020603050405020304" pitchFamily="18" charset="-34"/>
+              </a:rPr>
+              <a:t>/ </a:t>
+            </a:r>
+            <a:r>
+              <a:rPr lang="fr-FR" sz="1000" dirty="0">
+                <a:solidFill>
+                  <a:srgbClr val="595959"/>
+                </a:solidFill>
+                <a:effectLst/>
+                <a:latin typeface="Malgun Gothic" panose="020B0503020000020004" pitchFamily="34" charset="-127"/>
+                <a:ea typeface="Malgun Gothic" panose="020B0503020000020004" pitchFamily="34" charset="-127"/>
+                <a:cs typeface="Calibri" panose="020F0502020204030204" pitchFamily="34" charset="0"/>
+              </a:rPr>
+              <a:t>IPE : logiciel de gestion des environnements de production. </a:t>
+            </a:r>
+          </a:p>
+          <a:p>
+            <a:pPr lvl="0" algn="just">
+              <a:buSzPts val="1050"/>
+              <a:tabLst>
+                <a:tab pos="323850" algn="l"/>
+              </a:tabLst>
+            </a:pPr>
+            <a:r>
+              <a:rPr lang="fr-FR" sz="1000" dirty="0">
+                <a:solidFill>
+                  <a:srgbClr val="595959"/>
+                </a:solidFill>
+                <a:latin typeface="Malgun Gothic" panose="020B0503020000020004" pitchFamily="34" charset="-127"/>
+                <a:ea typeface="Malgun Gothic" panose="020B0503020000020004" pitchFamily="34" charset="-127"/>
+                <a:cs typeface="Calibri" panose="020F0502020204030204" pitchFamily="34" charset="0"/>
+              </a:rPr>
+              <a:t>Collaboration active au développement en Java, C++, Prolog, </a:t>
+            </a:r>
+            <a:r>
+              <a:rPr lang="fr-FR" sz="1000" dirty="0" err="1">
+                <a:solidFill>
+                  <a:srgbClr val="595959"/>
+                </a:solidFill>
+                <a:latin typeface="Malgun Gothic" panose="020B0503020000020004" pitchFamily="34" charset="-127"/>
+                <a:ea typeface="Malgun Gothic" panose="020B0503020000020004" pitchFamily="34" charset="-127"/>
+                <a:cs typeface="Calibri" panose="020F0502020204030204" pitchFamily="34" charset="0"/>
+              </a:rPr>
+              <a:t>Gdl</a:t>
+            </a:r>
+            <a:r>
+              <a:rPr lang="fr-FR" sz="1000" dirty="0">
+                <a:solidFill>
+                  <a:srgbClr val="595959"/>
+                </a:solidFill>
+                <a:latin typeface="Malgun Gothic" panose="020B0503020000020004" pitchFamily="34" charset="-127"/>
+                <a:ea typeface="Malgun Gothic" panose="020B0503020000020004" pitchFamily="34" charset="-127"/>
+                <a:cs typeface="Calibri" panose="020F0502020204030204" pitchFamily="34" charset="0"/>
+              </a:rPr>
+              <a:t>.</a:t>
+            </a:r>
+            <a:endParaRPr lang="fr-FR" sz="1000" dirty="0">
               <a:solidFill>
                 <a:srgbClr val="595959"/>
               </a:solidFill>
@@ -6137,30 +6929,15 @@
                 <a:tab pos="323850" algn="l"/>
               </a:tabLst>
             </a:pPr>
-            <a:r>
-              <a:rPr lang="fr-FR" sz="1050" b="1" i="1" dirty="0">
-                <a:solidFill>
-                  <a:srgbClr val="595959"/>
-                </a:solidFill>
-                <a:effectLst/>
-                <a:latin typeface="Malgun Gothic" panose="020B0503020000020004" pitchFamily="34" charset="-127"/>
-                <a:ea typeface="Malgun Gothic" panose="020B0503020000020004" pitchFamily="34" charset="-127"/>
-                <a:cs typeface="Calibri" panose="020F0502020204030204" pitchFamily="34" charset="0"/>
-              </a:rPr>
-              <a:t>CONSULTANT CLOUD PUBLIC POUR PLUSIEURS CLIENTS </a:t>
-            </a:r>
-            <a:r>
-              <a:rPr lang="fr-FR" sz="1050" dirty="0">
-                <a:solidFill>
-                  <a:srgbClr val="595959"/>
-                </a:solidFill>
-                <a:effectLst/>
-                <a:latin typeface="Malgun Gothic" panose="020B0503020000020004" pitchFamily="34" charset="-127"/>
-                <a:ea typeface="Malgun Gothic" panose="020B0503020000020004" pitchFamily="34" charset="-127"/>
-                <a:cs typeface="Calibri" panose="020F0502020204030204" pitchFamily="34" charset="0"/>
-              </a:rPr>
-              <a:t>Participation à plusieurs projets clients autour du Cloud Public AWS et Azure.</a:t>
-            </a:r>
+            <a:endParaRPr lang="fr-FR" sz="400" b="1" i="1" dirty="0">
+              <a:solidFill>
+                <a:srgbClr val="0070C0"/>
+              </a:solidFill>
+              <a:effectLst/>
+              <a:latin typeface="Malgun Gothic" panose="020B0503020000020004" pitchFamily="34" charset="-127"/>
+              <a:ea typeface="Malgun Gothic" panose="020B0503020000020004" pitchFamily="34" charset="-127"/>
+              <a:cs typeface="Calibri" panose="020F0502020204030204" pitchFamily="34" charset="0"/>
+            </a:endParaRPr>
           </a:p>
           <a:p>
             <a:pPr lvl="0" algn="just">
@@ -6169,14 +6946,89 @@
                 <a:tab pos="323850" algn="l"/>
               </a:tabLst>
             </a:pPr>
-            <a:endParaRPr lang="fr-FR" sz="1050" dirty="0">
+            <a:r>
+              <a:rPr lang="fr-FR" sz="1000" b="1" i="1" dirty="0">
+                <a:solidFill>
+                  <a:srgbClr val="0070C0"/>
+                </a:solidFill>
+                <a:effectLst/>
+                <a:latin typeface="Malgun Gothic" panose="020B0503020000020004" pitchFamily="34" charset="-127"/>
+                <a:ea typeface="Malgun Gothic" panose="020B0503020000020004" pitchFamily="34" charset="-127"/>
+                <a:cs typeface="Calibri" panose="020F0502020204030204" pitchFamily="34" charset="0"/>
+              </a:rPr>
+              <a:t>PROJET INTERFACE GRAPHIQUE (GUI) DE GRAPHTALK AIA 2000-2003</a:t>
+            </a:r>
+          </a:p>
+          <a:p>
+            <a:pPr lvl="0" algn="just">
+              <a:buSzPts val="1050"/>
+              <a:tabLst>
+                <a:tab pos="323850" algn="l"/>
+              </a:tabLst>
+            </a:pPr>
+            <a:r>
+              <a:rPr lang="fr-FR" sz="1000" b="1" i="1" dirty="0">
+                <a:solidFill>
+                  <a:srgbClr val="595959"/>
+                </a:solidFill>
+                <a:effectLst/>
+                <a:latin typeface="Malgun Gothic" panose="020B0503020000020004" pitchFamily="34" charset="-127"/>
+                <a:ea typeface="Malgun Gothic" panose="020B0503020000020004" pitchFamily="34" charset="-127"/>
+                <a:cs typeface="Angsana New" panose="02020603050405020304" pitchFamily="18" charset="-34"/>
+              </a:rPr>
+              <a:t>Responsable du projet : équipe de 5 personnes en France : </a:t>
+            </a:r>
+            <a:r>
+              <a:rPr lang="fr-FR" sz="1000" dirty="0">
+                <a:solidFill>
+                  <a:srgbClr val="595959"/>
+                </a:solidFill>
+                <a:effectLst/>
+                <a:latin typeface="Malgun Gothic" panose="020B0503020000020004" pitchFamily="34" charset="-127"/>
+                <a:ea typeface="Malgun Gothic" panose="020B0503020000020004" pitchFamily="34" charset="-127"/>
+                <a:cs typeface="Angsana New" panose="02020603050405020304" pitchFamily="18" charset="-34"/>
+              </a:rPr>
+              <a:t>Organisation et participation au développement de l’interface Graphique (Windows et Web) du logiciel GRAPHTALK AIA</a:t>
+            </a:r>
+            <a:r>
+              <a:rPr lang="fr-FR" sz="1000" dirty="0">
+                <a:solidFill>
+                  <a:srgbClr val="595959"/>
+                </a:solidFill>
+                <a:effectLst/>
+                <a:latin typeface="Malgun Gothic" panose="020B0503020000020004" pitchFamily="34" charset="-127"/>
+                <a:ea typeface="Malgun Gothic" panose="020B0503020000020004" pitchFamily="34" charset="-127"/>
+                <a:cs typeface="Calibri" panose="020F0502020204030204" pitchFamily="34" charset="0"/>
+              </a:rPr>
+              <a:t>.</a:t>
+            </a:r>
+          </a:p>
+          <a:p>
+            <a:pPr lvl="0" algn="just">
+              <a:buSzPts val="1050"/>
+              <a:tabLst>
+                <a:tab pos="323850" algn="l"/>
+              </a:tabLst>
+            </a:pPr>
+            <a:r>
+              <a:rPr lang="fr-FR" sz="1000" dirty="0">
+                <a:solidFill>
+                  <a:srgbClr val="595959"/>
+                </a:solidFill>
+                <a:latin typeface="Malgun Gothic" panose="020B0503020000020004" pitchFamily="34" charset="-127"/>
+                <a:ea typeface="Malgun Gothic" panose="020B0503020000020004" pitchFamily="34" charset="-127"/>
+                <a:cs typeface="Calibri" panose="020F0502020204030204" pitchFamily="34" charset="0"/>
+              </a:rPr>
+              <a:t>Participation au développement actif en C++, GDL, HTML, Javascript.</a:t>
+            </a:r>
+            <a:endParaRPr lang="fr-FR" sz="1000" dirty="0">
               <a:solidFill>
                 <a:srgbClr val="595959"/>
               </a:solidFill>
               <a:effectLst/>
               <a:latin typeface="Malgun Gothic" panose="020B0503020000020004" pitchFamily="34" charset="-127"/>
               <a:ea typeface="Malgun Gothic" panose="020B0503020000020004" pitchFamily="34" charset="-127"/>
-              <a:cs typeface="Wingdings" panose="05000000000000000000" pitchFamily="2" charset="2"/>
+              <a:cs typeface="Angsana New" panose="02020603050405020304" pitchFamily="18" charset="-34"/>
             </a:endParaRPr>
           </a:p>
           <a:p>
@@ -6186,7 +7038,7 @@
                 <a:tab pos="323850" algn="l"/>
               </a:tabLst>
             </a:pPr>
-            <a:endParaRPr lang="fr-FR" sz="1050" b="1" i="1" dirty="0">
+            <a:endParaRPr lang="fr-FR" sz="1000" dirty="0">
               <a:solidFill>
                 <a:srgbClr val="595959"/>
               </a:solidFill>
@@ -6197,758 +7049,7 @@
             </a:endParaRPr>
           </a:p>
           <a:p>
-            <a:pPr lvl="0" algn="just">
-              <a:buSzPts val="1050"/>
-              <a:tabLst>
-                <a:tab pos="323850" algn="l"/>
-              </a:tabLst>
-            </a:pPr>
-            <a:r>
-              <a:rPr lang="fr-FR" sz="1050" b="1" i="1" dirty="0">
-                <a:solidFill>
-                  <a:srgbClr val="595959"/>
-                </a:solidFill>
-                <a:effectLst/>
-                <a:latin typeface="Malgun Gothic" panose="020B0503020000020004" pitchFamily="34" charset="-127"/>
-                <a:ea typeface="Malgun Gothic" panose="020B0503020000020004" pitchFamily="34" charset="-127"/>
-                <a:cs typeface="Calibri" panose="020F0502020204030204" pitchFamily="34" charset="0"/>
-              </a:rPr>
-              <a:t>DEVELOPPEMENT SCRIPTS PYTHON </a:t>
-            </a:r>
-            <a:r>
-              <a:rPr lang="fr-FR" sz="1050" dirty="0">
-                <a:solidFill>
-                  <a:srgbClr val="595959"/>
-                </a:solidFill>
-                <a:effectLst/>
-                <a:latin typeface="Malgun Gothic" panose="020B0503020000020004" pitchFamily="34" charset="-127"/>
-                <a:ea typeface="Malgun Gothic" panose="020B0503020000020004" pitchFamily="34" charset="-127"/>
-                <a:cs typeface="Calibri" panose="020F0502020204030204" pitchFamily="34" charset="0"/>
-              </a:rPr>
-              <a:t>Développement de scripts pour la supervision de serveurs et pour la gestion de tickets sous ITOP.</a:t>
-            </a:r>
-          </a:p>
-          <a:p>
-            <a:pPr lvl="0" algn="just">
-              <a:buSzPts val="1050"/>
-              <a:tabLst>
-                <a:tab pos="323850" algn="l"/>
-              </a:tabLst>
-            </a:pPr>
-            <a:endParaRPr lang="fr-FR" sz="1050" dirty="0">
-              <a:solidFill>
-                <a:srgbClr val="595959"/>
-              </a:solidFill>
-              <a:latin typeface="Malgun Gothic" panose="020B0503020000020004" pitchFamily="34" charset="-127"/>
-              <a:ea typeface="Malgun Gothic" panose="020B0503020000020004" pitchFamily="34" charset="-127"/>
-              <a:cs typeface="Calibri" panose="020F0502020204030204" pitchFamily="34" charset="0"/>
-            </a:endParaRPr>
-          </a:p>
-          <a:p>
-            <a:pPr algn="just"/>
-            <a:endParaRPr lang="fr-FR" sz="1050" b="1" cap="all" dirty="0">
-              <a:solidFill>
-                <a:srgbClr val="00000A"/>
-              </a:solidFill>
-              <a:effectLst/>
-              <a:latin typeface="Malgun Gothic" panose="020B0503020000020004" pitchFamily="34" charset="-127"/>
-              <a:ea typeface="Malgun Gothic" panose="020B0503020000020004" pitchFamily="34" charset="-127"/>
-              <a:cs typeface="Cordia New" panose="020B0304020202020204" pitchFamily="34" charset="-34"/>
-            </a:endParaRPr>
-          </a:p>
-          <a:p>
-            <a:pPr algn="just"/>
-            <a:r>
-              <a:rPr lang="fr-FR" sz="1050" b="1" cap="all" dirty="0">
-                <a:solidFill>
-                  <a:srgbClr val="00000A"/>
-                </a:solidFill>
-                <a:effectLst/>
-                <a:latin typeface="Malgun Gothic" panose="020B0503020000020004" pitchFamily="34" charset="-127"/>
-                <a:ea typeface="Malgun Gothic" panose="020B0503020000020004" pitchFamily="34" charset="-127"/>
-                <a:cs typeface="Cordia New" panose="020B0304020202020204" pitchFamily="34" charset="-34"/>
-              </a:rPr>
-              <a:t>dxc </a:t>
-            </a:r>
-            <a:r>
-              <a:rPr lang="fr-FR" sz="1050" b="1" cap="all" dirty="0" err="1">
-                <a:solidFill>
-                  <a:srgbClr val="00000A"/>
-                </a:solidFill>
-                <a:effectLst/>
-                <a:latin typeface="Malgun Gothic" panose="020B0503020000020004" pitchFamily="34" charset="-127"/>
-                <a:ea typeface="Malgun Gothic" panose="020B0503020000020004" pitchFamily="34" charset="-127"/>
-                <a:cs typeface="Cordia New" panose="020B0304020202020204" pitchFamily="34" charset="-34"/>
-              </a:rPr>
-              <a:t>technology</a:t>
-            </a:r>
-            <a:r>
-              <a:rPr lang="fr-FR" sz="1050" b="1" cap="all" dirty="0">
-                <a:solidFill>
-                  <a:srgbClr val="00000A"/>
-                </a:solidFill>
-                <a:effectLst/>
-                <a:latin typeface="Malgun Gothic" panose="020B0503020000020004" pitchFamily="34" charset="-127"/>
-                <a:ea typeface="Malgun Gothic" panose="020B0503020000020004" pitchFamily="34" charset="-127"/>
-                <a:cs typeface="Cordia New" panose="020B0304020202020204" pitchFamily="34" charset="-34"/>
-              </a:rPr>
-              <a:t> FINANCIAL SERVICES (anciennement CSC Financial Services) </a:t>
-            </a:r>
-            <a:r>
-              <a:rPr lang="fr-FR" sz="1050" cap="all" dirty="0">
-                <a:solidFill>
-                  <a:srgbClr val="404040"/>
-                </a:solidFill>
-                <a:latin typeface="Malgun Gothic" panose="020B0503020000020004" pitchFamily="34" charset="-127"/>
-                <a:ea typeface="Malgun Gothic" panose="020B0503020000020004" pitchFamily="34" charset="-127"/>
-                <a:cs typeface="Cordia New" panose="020B0304020202020204" pitchFamily="34" charset="-34"/>
-              </a:rPr>
-              <a:t>- </a:t>
-            </a:r>
-            <a:r>
-              <a:rPr lang="fr-FR" sz="1050" b="0" cap="all" dirty="0">
-                <a:solidFill>
-                  <a:srgbClr val="404040"/>
-                </a:solidFill>
-                <a:effectLst/>
-                <a:latin typeface="Malgun Gothic" panose="020B0503020000020004" pitchFamily="34" charset="-127"/>
-                <a:ea typeface="Malgun Gothic" panose="020B0503020000020004" pitchFamily="34" charset="-127"/>
-                <a:cs typeface="Cordia New" panose="020B0304020202020204" pitchFamily="34" charset="-34"/>
-              </a:rPr>
-              <a:t>secteur d’activité : DEVELOPPEMENT DE PRODUITS INFORMATIQUES DESTINES AUX ASSURANCES</a:t>
-            </a:r>
-          </a:p>
-          <a:p>
-            <a:pPr algn="just"/>
-            <a:endParaRPr lang="fr-FR" sz="1050" b="0" cap="all" dirty="0">
-              <a:solidFill>
-                <a:srgbClr val="404040"/>
-              </a:solidFill>
-              <a:effectLst/>
-              <a:latin typeface="Malgun Gothic" panose="020B0503020000020004" pitchFamily="34" charset="-127"/>
-              <a:ea typeface="Malgun Gothic" panose="020B0503020000020004" pitchFamily="34" charset="-127"/>
-              <a:cs typeface="Cordia New" panose="020B0304020202020204" pitchFamily="34" charset="-34"/>
-            </a:endParaRPr>
-          </a:p>
-          <a:p>
-            <a:pPr algn="just"/>
-            <a:r>
-              <a:rPr lang="fr-FR" sz="1050" b="1" cap="small" dirty="0">
-                <a:solidFill>
-                  <a:srgbClr val="00000A"/>
-                </a:solidFill>
-                <a:latin typeface="Malgun Gothic" panose="020B0503020000020004" pitchFamily="34" charset="-127"/>
-                <a:ea typeface="Malgun Gothic" panose="020B0503020000020004" pitchFamily="34" charset="-127"/>
-                <a:cs typeface="Cordia New" panose="020B0304020202020204" pitchFamily="34" charset="-34"/>
-              </a:rPr>
-              <a:t>Dernier Poste occupé </a:t>
-            </a:r>
-            <a:r>
-              <a:rPr lang="fr-FR" sz="1050" dirty="0">
-                <a:solidFill>
-                  <a:srgbClr val="595959"/>
-                </a:solidFill>
-                <a:effectLst/>
-                <a:latin typeface="Malgun Gothic" panose="020B0503020000020004" pitchFamily="34" charset="-127"/>
-                <a:ea typeface="Malgun Gothic" panose="020B0503020000020004" pitchFamily="34" charset="-127"/>
-                <a:cs typeface="Angsana New" panose="02020603050405020304" pitchFamily="18" charset="-34"/>
-              </a:rPr>
-              <a:t>: </a:t>
-            </a:r>
-            <a:r>
-              <a:rPr lang="fr-FR" sz="1050" b="1" cap="small" dirty="0">
-                <a:solidFill>
-                  <a:srgbClr val="4F81BD"/>
-                </a:solidFill>
-                <a:effectLst/>
-                <a:latin typeface="Malgun Gothic" panose="020B0503020000020004" pitchFamily="34" charset="-127"/>
-                <a:ea typeface="Malgun Gothic" panose="020B0503020000020004" pitchFamily="34" charset="-127"/>
-                <a:cs typeface="Angsana New" panose="02020603050405020304" pitchFamily="18" charset="-34"/>
-              </a:rPr>
-              <a:t>Architecte DevOps, docker 2014-2018</a:t>
-            </a:r>
-            <a:endParaRPr lang="fr-FR" sz="1050" dirty="0">
-              <a:solidFill>
-                <a:srgbClr val="595959"/>
-              </a:solidFill>
-              <a:effectLst/>
-              <a:latin typeface="Malgun Gothic" panose="020B0503020000020004" pitchFamily="34" charset="-127"/>
-              <a:ea typeface="Malgun Gothic" panose="020B0503020000020004" pitchFamily="34" charset="-127"/>
-              <a:cs typeface="Angsana New" panose="02020603050405020304" pitchFamily="18" charset="-34"/>
-            </a:endParaRPr>
-          </a:p>
-          <a:p>
-            <a:pPr algn="just"/>
-            <a:r>
-              <a:rPr lang="fr-FR" sz="1050" b="1" cap="small" dirty="0">
-                <a:solidFill>
-                  <a:srgbClr val="00000A"/>
-                </a:solidFill>
-                <a:latin typeface="Malgun Gothic" panose="020B0503020000020004" pitchFamily="34" charset="-127"/>
-                <a:ea typeface="Malgun Gothic" panose="020B0503020000020004" pitchFamily="34" charset="-127"/>
-                <a:cs typeface="Cordia New" panose="020B0304020202020204" pitchFamily="34" charset="-34"/>
-              </a:rPr>
-              <a:t>Postes précédents </a:t>
-            </a:r>
-            <a:r>
-              <a:rPr lang="fr-FR" sz="1050" dirty="0">
-                <a:solidFill>
-                  <a:srgbClr val="595959"/>
-                </a:solidFill>
-                <a:effectLst/>
-                <a:latin typeface="Malgun Gothic" panose="020B0503020000020004" pitchFamily="34" charset="-127"/>
-                <a:ea typeface="Malgun Gothic" panose="020B0503020000020004" pitchFamily="34" charset="-127"/>
-                <a:cs typeface="Angsana New" panose="02020603050405020304" pitchFamily="18" charset="-34"/>
-              </a:rPr>
-              <a:t>: </a:t>
-            </a:r>
-            <a:r>
-              <a:rPr lang="fr-FR" sz="1050" b="1" cap="small" dirty="0">
-                <a:solidFill>
-                  <a:srgbClr val="4F81BD"/>
-                </a:solidFill>
-                <a:effectLst/>
-                <a:latin typeface="Malgun Gothic" panose="020B0503020000020004" pitchFamily="34" charset="-127"/>
-                <a:ea typeface="Malgun Gothic" panose="020B0503020000020004" pitchFamily="34" charset="-127"/>
-                <a:cs typeface="Angsana New" panose="02020603050405020304" pitchFamily="18" charset="-34"/>
-              </a:rPr>
-              <a:t>Chef de projets R&amp;D</a:t>
-            </a:r>
-            <a:r>
-              <a:rPr lang="fr-FR" sz="1050" dirty="0">
-                <a:solidFill>
-                  <a:srgbClr val="595959"/>
-                </a:solidFill>
-                <a:effectLst/>
-                <a:latin typeface="Malgun Gothic" panose="020B0503020000020004" pitchFamily="34" charset="-127"/>
-                <a:ea typeface="Malgun Gothic" panose="020B0503020000020004" pitchFamily="34" charset="-127"/>
-                <a:cs typeface="Angsana New" panose="02020603050405020304" pitchFamily="18" charset="-34"/>
-              </a:rPr>
-              <a:t> autour de GRAPHTALK AIA, m</a:t>
-            </a:r>
-            <a:r>
-              <a:rPr lang="fr-FR" sz="1050" dirty="0">
-                <a:solidFill>
-                  <a:srgbClr val="595959"/>
-                </a:solidFill>
-                <a:effectLst/>
-                <a:latin typeface="Malgun Gothic" panose="020B0503020000020004" pitchFamily="34" charset="-127"/>
-                <a:ea typeface="Malgun Gothic" panose="020B0503020000020004" pitchFamily="34" charset="-127"/>
-                <a:cs typeface="Calibri" panose="020F0502020204030204" pitchFamily="34" charset="0"/>
-              </a:rPr>
-              <a:t>anagement de plusieurs équipes R&amp;D en France et en Bulgarie jusqu’à 8 personnes.</a:t>
-            </a:r>
-            <a:endParaRPr lang="fr-FR" sz="1050" dirty="0">
-              <a:solidFill>
-                <a:srgbClr val="595959"/>
-              </a:solidFill>
-              <a:effectLst/>
-              <a:latin typeface="Malgun Gothic" panose="020B0503020000020004" pitchFamily="34" charset="-127"/>
-              <a:ea typeface="Malgun Gothic" panose="020B0503020000020004" pitchFamily="34" charset="-127"/>
-              <a:cs typeface="Angsana New" panose="02020603050405020304" pitchFamily="18" charset="-34"/>
-            </a:endParaRPr>
-          </a:p>
-          <a:p>
-            <a:pPr algn="just">
-              <a:tabLst>
-                <a:tab pos="323850" algn="l"/>
-              </a:tabLst>
-            </a:pPr>
-            <a:endParaRPr lang="fr-FR" sz="1050" b="1" i="1" dirty="0">
-              <a:solidFill>
-                <a:srgbClr val="595959"/>
-              </a:solidFill>
-              <a:effectLst/>
-              <a:latin typeface="Malgun Gothic" panose="020B0503020000020004" pitchFamily="34" charset="-127"/>
-              <a:ea typeface="Malgun Gothic" panose="020B0503020000020004" pitchFamily="34" charset="-127"/>
-              <a:cs typeface="Calibri" panose="020F0502020204030204" pitchFamily="34" charset="0"/>
-            </a:endParaRPr>
-          </a:p>
-          <a:p>
-            <a:pPr algn="just">
-              <a:tabLst>
-                <a:tab pos="323850" algn="l"/>
-              </a:tabLst>
-            </a:pPr>
-            <a:r>
-              <a:rPr lang="fr-FR" sz="1050" b="1" i="1" dirty="0">
-                <a:solidFill>
-                  <a:srgbClr val="595959"/>
-                </a:solidFill>
-                <a:effectLst/>
-                <a:latin typeface="Malgun Gothic" panose="020B0503020000020004" pitchFamily="34" charset="-127"/>
-                <a:ea typeface="Malgun Gothic" panose="020B0503020000020004" pitchFamily="34" charset="-127"/>
-                <a:cs typeface="Calibri" panose="020F0502020204030204" pitchFamily="34" charset="0"/>
-              </a:rPr>
-              <a:t>Exemples de projets réalisés :</a:t>
-            </a:r>
-            <a:endParaRPr lang="fr-FR" sz="1050" dirty="0">
-              <a:solidFill>
-                <a:srgbClr val="595959"/>
-              </a:solidFill>
-              <a:effectLst/>
-              <a:latin typeface="Malgun Gothic" panose="020B0503020000020004" pitchFamily="34" charset="-127"/>
-              <a:ea typeface="Malgun Gothic" panose="020B0503020000020004" pitchFamily="34" charset="-127"/>
-              <a:cs typeface="Angsana New" panose="02020603050405020304" pitchFamily="18" charset="-34"/>
-            </a:endParaRPr>
-          </a:p>
-          <a:p>
-            <a:pPr lvl="0" algn="just">
-              <a:buSzPts val="1050"/>
-              <a:tabLst>
-                <a:tab pos="323850" algn="l"/>
-              </a:tabLst>
-            </a:pPr>
-            <a:r>
-              <a:rPr lang="fr-FR" sz="1050" b="1" i="1" dirty="0">
-                <a:solidFill>
-                  <a:srgbClr val="0070C0"/>
-                </a:solidFill>
-                <a:effectLst/>
-                <a:latin typeface="Malgun Gothic" panose="020B0503020000020004" pitchFamily="34" charset="-127"/>
-                <a:ea typeface="Malgun Gothic" panose="020B0503020000020004" pitchFamily="34" charset="-127"/>
-                <a:cs typeface="Calibri" panose="020F0502020204030204" pitchFamily="34" charset="0"/>
-              </a:rPr>
-              <a:t>DEVOPS SUR GRAPHTALK AIA </a:t>
-            </a:r>
-            <a:r>
-              <a:rPr lang="fr-FR" sz="1050" dirty="0">
-                <a:solidFill>
-                  <a:srgbClr val="595959"/>
-                </a:solidFill>
-                <a:effectLst/>
-                <a:latin typeface="Malgun Gothic" panose="020B0503020000020004" pitchFamily="34" charset="-127"/>
-                <a:ea typeface="Malgun Gothic" panose="020B0503020000020004" pitchFamily="34" charset="-127"/>
-                <a:cs typeface="Calibri" panose="020F0502020204030204" pitchFamily="34" charset="0"/>
-              </a:rPr>
-              <a:t>Développement d’une chaine d’intégration et de livraison continue sous Jenkins. Création d’une chaîne de validation continue du logiciel avec tests et lancement d’alertes.</a:t>
-            </a:r>
-            <a:endParaRPr lang="fr-FR" sz="1050" dirty="0">
-              <a:solidFill>
-                <a:srgbClr val="595959"/>
-              </a:solidFill>
-              <a:effectLst/>
-              <a:latin typeface="Malgun Gothic" panose="020B0503020000020004" pitchFamily="34" charset="-127"/>
-              <a:ea typeface="Malgun Gothic" panose="020B0503020000020004" pitchFamily="34" charset="-127"/>
-              <a:cs typeface="Wingdings" panose="05000000000000000000" pitchFamily="2" charset="2"/>
-            </a:endParaRPr>
-          </a:p>
-          <a:p>
-            <a:pPr lvl="0" algn="just">
-              <a:buSzPts val="1050"/>
-              <a:tabLst>
-                <a:tab pos="323850" algn="l"/>
-              </a:tabLst>
-            </a:pPr>
-            <a:endParaRPr lang="fr-FR" sz="1050" b="1" i="1" dirty="0">
-              <a:solidFill>
-                <a:srgbClr val="0070C0"/>
-              </a:solidFill>
-              <a:effectLst/>
-              <a:latin typeface="Malgun Gothic" panose="020B0503020000020004" pitchFamily="34" charset="-127"/>
-              <a:ea typeface="Malgun Gothic" panose="020B0503020000020004" pitchFamily="34" charset="-127"/>
-              <a:cs typeface="Calibri" panose="020F0502020204030204" pitchFamily="34" charset="0"/>
-            </a:endParaRPr>
-          </a:p>
-          <a:p>
-            <a:pPr lvl="0" algn="just">
-              <a:buSzPts val="1050"/>
-              <a:tabLst>
-                <a:tab pos="323850" algn="l"/>
-              </a:tabLst>
-            </a:pPr>
-            <a:endParaRPr lang="fr-FR" sz="1050" b="1" i="1" dirty="0">
-              <a:solidFill>
-                <a:srgbClr val="0070C0"/>
-              </a:solidFill>
-              <a:effectLst/>
-              <a:latin typeface="Malgun Gothic" panose="020B0503020000020004" pitchFamily="34" charset="-127"/>
-              <a:ea typeface="Malgun Gothic" panose="020B0503020000020004" pitchFamily="34" charset="-127"/>
-              <a:cs typeface="Calibri" panose="020F0502020204030204" pitchFamily="34" charset="0"/>
-            </a:endParaRPr>
-          </a:p>
-          <a:p>
-            <a:pPr lvl="0" algn="just">
-              <a:buSzPts val="1050"/>
-              <a:tabLst>
-                <a:tab pos="323850" algn="l"/>
-              </a:tabLst>
-            </a:pPr>
-            <a:r>
-              <a:rPr lang="fr-FR" sz="1050" b="1" i="1" dirty="0">
-                <a:solidFill>
-                  <a:srgbClr val="0070C0"/>
-                </a:solidFill>
-                <a:effectLst/>
-                <a:latin typeface="Malgun Gothic" panose="020B0503020000020004" pitchFamily="34" charset="-127"/>
-                <a:ea typeface="Malgun Gothic" panose="020B0503020000020004" pitchFamily="34" charset="-127"/>
-                <a:cs typeface="Calibri" panose="020F0502020204030204" pitchFamily="34" charset="0"/>
-              </a:rPr>
-              <a:t>INDUSTRIALISATION DE L’INSTALLATION DU LOGICIEL GRAPHTALK </a:t>
-            </a:r>
-          </a:p>
-          <a:p>
-            <a:pPr lvl="0" algn="just">
-              <a:buSzPts val="1050"/>
-              <a:tabLst>
-                <a:tab pos="323850" algn="l"/>
-              </a:tabLst>
-            </a:pPr>
-            <a:r>
-              <a:rPr lang="fr-FR" sz="1050" b="1" i="1" dirty="0">
-                <a:solidFill>
-                  <a:srgbClr val="595959"/>
-                </a:solidFill>
-                <a:effectLst/>
-                <a:latin typeface="Malgun Gothic" panose="020B0503020000020004" pitchFamily="34" charset="-127"/>
-                <a:ea typeface="Malgun Gothic" panose="020B0503020000020004" pitchFamily="34" charset="-127"/>
-                <a:cs typeface="Calibri" panose="020F0502020204030204" pitchFamily="34" charset="0"/>
-              </a:rPr>
-              <a:t>Responsable du projet Delivery Manager 2007-2014 : équipe de 5 personnes : </a:t>
-            </a:r>
-            <a:r>
-              <a:rPr lang="fr-FR" sz="1050" dirty="0">
-                <a:solidFill>
-                  <a:srgbClr val="595959"/>
-                </a:solidFill>
-                <a:effectLst/>
-                <a:latin typeface="Malgun Gothic" panose="020B0503020000020004" pitchFamily="34" charset="-127"/>
-                <a:ea typeface="Malgun Gothic" panose="020B0503020000020004" pitchFamily="34" charset="-127"/>
-                <a:cs typeface="Calibri" panose="020F0502020204030204" pitchFamily="34" charset="0"/>
-              </a:rPr>
-              <a:t>Outil d’automatisation de l’installation de </a:t>
-            </a:r>
-            <a:r>
-              <a:rPr lang="fr-FR" sz="1050" dirty="0" err="1">
-                <a:solidFill>
-                  <a:srgbClr val="595959"/>
-                </a:solidFill>
-                <a:effectLst/>
-                <a:latin typeface="Malgun Gothic" panose="020B0503020000020004" pitchFamily="34" charset="-127"/>
-                <a:ea typeface="Malgun Gothic" panose="020B0503020000020004" pitchFamily="34" charset="-127"/>
-                <a:cs typeface="Calibri" panose="020F0502020204030204" pitchFamily="34" charset="0"/>
-              </a:rPr>
-              <a:t>Graphtalk</a:t>
-            </a:r>
-            <a:r>
-              <a:rPr lang="fr-FR" sz="1050" dirty="0">
-                <a:solidFill>
-                  <a:srgbClr val="595959"/>
-                </a:solidFill>
-                <a:effectLst/>
-                <a:latin typeface="Malgun Gothic" panose="020B0503020000020004" pitchFamily="34" charset="-127"/>
-                <a:ea typeface="Malgun Gothic" panose="020B0503020000020004" pitchFamily="34" charset="-127"/>
-                <a:cs typeface="Calibri" panose="020F0502020204030204" pitchFamily="34" charset="0"/>
-              </a:rPr>
-              <a:t> AIA sur sites de production ; </a:t>
-            </a:r>
-            <a:r>
-              <a:rPr lang="fr-FR" sz="1050" b="1" i="1" dirty="0">
-                <a:solidFill>
-                  <a:srgbClr val="595959"/>
-                </a:solidFill>
-                <a:effectLst/>
-                <a:latin typeface="Malgun Gothic" panose="020B0503020000020004" pitchFamily="34" charset="-127"/>
-                <a:ea typeface="Malgun Gothic" panose="020B0503020000020004" pitchFamily="34" charset="-127"/>
-                <a:cs typeface="Calibri" panose="020F0502020204030204" pitchFamily="34" charset="0"/>
-              </a:rPr>
-              <a:t>Product </a:t>
-            </a:r>
-            <a:r>
-              <a:rPr lang="fr-FR" sz="1050" b="1" i="1" dirty="0" err="1">
-                <a:solidFill>
-                  <a:srgbClr val="595959"/>
-                </a:solidFill>
-                <a:effectLst/>
-                <a:latin typeface="Malgun Gothic" panose="020B0503020000020004" pitchFamily="34" charset="-127"/>
-                <a:ea typeface="Malgun Gothic" panose="020B0503020000020004" pitchFamily="34" charset="-127"/>
-                <a:cs typeface="Calibri" panose="020F0502020204030204" pitchFamily="34" charset="0"/>
-              </a:rPr>
-              <a:t>Owner</a:t>
-            </a:r>
-            <a:r>
-              <a:rPr lang="fr-FR" sz="1050" b="1" i="1" dirty="0">
-                <a:solidFill>
-                  <a:srgbClr val="595959"/>
-                </a:solidFill>
-                <a:effectLst/>
-                <a:latin typeface="Malgun Gothic" panose="020B0503020000020004" pitchFamily="34" charset="-127"/>
-                <a:ea typeface="Malgun Gothic" panose="020B0503020000020004" pitchFamily="34" charset="-127"/>
-                <a:cs typeface="Calibri" panose="020F0502020204030204" pitchFamily="34" charset="0"/>
-              </a:rPr>
-              <a:t>: </a:t>
-            </a:r>
-            <a:r>
-              <a:rPr lang="fr-FR" sz="1050" dirty="0">
-                <a:solidFill>
-                  <a:srgbClr val="595959"/>
-                </a:solidFill>
-                <a:effectLst/>
-                <a:latin typeface="Malgun Gothic" panose="020B0503020000020004" pitchFamily="34" charset="-127"/>
-                <a:ea typeface="Malgun Gothic" panose="020B0503020000020004" pitchFamily="34" charset="-127"/>
-                <a:cs typeface="Calibri" panose="020F0502020204030204" pitchFamily="34" charset="0"/>
-              </a:rPr>
-              <a:t>Migration du logiciel </a:t>
-            </a:r>
-            <a:r>
-              <a:rPr lang="fr-FR" sz="1050" dirty="0" err="1">
-                <a:solidFill>
-                  <a:srgbClr val="595959"/>
-                </a:solidFill>
-                <a:effectLst/>
-                <a:latin typeface="Malgun Gothic" panose="020B0503020000020004" pitchFamily="34" charset="-127"/>
-                <a:ea typeface="Malgun Gothic" panose="020B0503020000020004" pitchFamily="34" charset="-127"/>
-                <a:cs typeface="Calibri" panose="020F0502020204030204" pitchFamily="34" charset="0"/>
-              </a:rPr>
-              <a:t>Graphtalk</a:t>
-            </a:r>
-            <a:r>
-              <a:rPr lang="fr-FR" sz="1050" dirty="0">
-                <a:solidFill>
-                  <a:srgbClr val="595959"/>
-                </a:solidFill>
-                <a:effectLst/>
-                <a:latin typeface="Malgun Gothic" panose="020B0503020000020004" pitchFamily="34" charset="-127"/>
-                <a:ea typeface="Malgun Gothic" panose="020B0503020000020004" pitchFamily="34" charset="-127"/>
-                <a:cs typeface="Calibri" panose="020F0502020204030204" pitchFamily="34" charset="0"/>
-              </a:rPr>
-              <a:t> AIA dans le Cloud AWS </a:t>
-            </a:r>
-          </a:p>
-          <a:p>
-            <a:pPr lvl="0" algn="just">
-              <a:buSzPts val="1050"/>
-              <a:tabLst>
-                <a:tab pos="323850" algn="l"/>
-              </a:tabLst>
-            </a:pPr>
-            <a:endParaRPr lang="fr-FR" sz="1050" b="1" i="1" dirty="0">
-              <a:solidFill>
-                <a:srgbClr val="0070C0"/>
-              </a:solidFill>
-              <a:effectLst/>
-              <a:latin typeface="Malgun Gothic" panose="020B0503020000020004" pitchFamily="34" charset="-127"/>
-              <a:ea typeface="Malgun Gothic" panose="020B0503020000020004" pitchFamily="34" charset="-127"/>
-              <a:cs typeface="Calibri" panose="020F0502020204030204" pitchFamily="34" charset="0"/>
-            </a:endParaRPr>
-          </a:p>
-          <a:p>
-            <a:pPr lvl="0" algn="just">
-              <a:buSzPts val="1050"/>
-              <a:tabLst>
-                <a:tab pos="323850" algn="l"/>
-              </a:tabLst>
-            </a:pPr>
-            <a:endParaRPr lang="fr-FR" sz="1050" b="1" i="1" dirty="0">
-              <a:solidFill>
-                <a:srgbClr val="0070C0"/>
-              </a:solidFill>
-              <a:latin typeface="Malgun Gothic" panose="020B0503020000020004" pitchFamily="34" charset="-127"/>
-              <a:ea typeface="Malgun Gothic" panose="020B0503020000020004" pitchFamily="34" charset="-127"/>
-              <a:cs typeface="Calibri" panose="020F0502020204030204" pitchFamily="34" charset="0"/>
-            </a:endParaRPr>
-          </a:p>
-          <a:p>
-            <a:pPr lvl="0" algn="just">
-              <a:buSzPts val="1050"/>
-              <a:tabLst>
-                <a:tab pos="323850" algn="l"/>
-              </a:tabLst>
-            </a:pPr>
-            <a:r>
-              <a:rPr lang="fr-FR" sz="1050" b="1" i="1" dirty="0">
-                <a:solidFill>
-                  <a:srgbClr val="0070C0"/>
-                </a:solidFill>
-                <a:effectLst/>
-                <a:latin typeface="Malgun Gothic" panose="020B0503020000020004" pitchFamily="34" charset="-127"/>
-                <a:ea typeface="Malgun Gothic" panose="020B0503020000020004" pitchFamily="34" charset="-127"/>
-                <a:cs typeface="Calibri" panose="020F0502020204030204" pitchFamily="34" charset="0"/>
-              </a:rPr>
-              <a:t>PROJETS JOB MANAGER et IPE SOUS GRAPHTALK AIA pour la gestion de production 2003-2007</a:t>
-            </a:r>
-          </a:p>
-          <a:p>
-            <a:pPr lvl="0" algn="just">
-              <a:buSzPts val="1050"/>
-              <a:tabLst>
-                <a:tab pos="323850" algn="l"/>
-              </a:tabLst>
-            </a:pPr>
-            <a:r>
-              <a:rPr lang="fr-FR" sz="1050" b="1" i="1" dirty="0">
-                <a:solidFill>
-                  <a:srgbClr val="595959"/>
-                </a:solidFill>
-                <a:effectLst/>
-                <a:latin typeface="Malgun Gothic" panose="020B0503020000020004" pitchFamily="34" charset="-127"/>
-                <a:ea typeface="Malgun Gothic" panose="020B0503020000020004" pitchFamily="34" charset="-127"/>
-                <a:cs typeface="Angsana New" panose="02020603050405020304" pitchFamily="18" charset="-34"/>
-              </a:rPr>
-              <a:t>Responsable des projets : équipe de 8 personnes en France et Bulgarie : </a:t>
-            </a:r>
-            <a:r>
-              <a:rPr lang="fr-FR" sz="1050" dirty="0">
-                <a:solidFill>
-                  <a:srgbClr val="595959"/>
-                </a:solidFill>
-                <a:effectLst/>
-                <a:latin typeface="Malgun Gothic" panose="020B0503020000020004" pitchFamily="34" charset="-127"/>
-                <a:ea typeface="Malgun Gothic" panose="020B0503020000020004" pitchFamily="34" charset="-127"/>
-                <a:cs typeface="Calibri" panose="020F0502020204030204" pitchFamily="34" charset="0"/>
-              </a:rPr>
-              <a:t>Job Manager : Logiciel de Lancement et d’organisation de processus asynchrones lors du traitement de contrats d’assurances </a:t>
-            </a:r>
-            <a:r>
-              <a:rPr lang="fr-FR" sz="1050" dirty="0">
-                <a:solidFill>
-                  <a:srgbClr val="595959"/>
-                </a:solidFill>
-                <a:latin typeface="Malgun Gothic" panose="020B0503020000020004" pitchFamily="34" charset="-127"/>
-                <a:ea typeface="Malgun Gothic" panose="020B0503020000020004" pitchFamily="34" charset="-127"/>
-                <a:cs typeface="Angsana New" panose="02020603050405020304" pitchFamily="18" charset="-34"/>
-              </a:rPr>
-              <a:t>/ </a:t>
-            </a:r>
-            <a:r>
-              <a:rPr lang="fr-FR" sz="1050" dirty="0">
-                <a:solidFill>
-                  <a:srgbClr val="595959"/>
-                </a:solidFill>
-                <a:effectLst/>
-                <a:latin typeface="Malgun Gothic" panose="020B0503020000020004" pitchFamily="34" charset="-127"/>
-                <a:ea typeface="Malgun Gothic" panose="020B0503020000020004" pitchFamily="34" charset="-127"/>
-                <a:cs typeface="Calibri" panose="020F0502020204030204" pitchFamily="34" charset="0"/>
-              </a:rPr>
-              <a:t>IPE : logiciel de gestion des environnements de production </a:t>
-            </a:r>
-          </a:p>
-          <a:p>
-            <a:pPr lvl="0" algn="just">
-              <a:buSzPts val="1050"/>
-              <a:tabLst>
-                <a:tab pos="323850" algn="l"/>
-              </a:tabLst>
-            </a:pPr>
-            <a:endParaRPr lang="fr-FR" sz="1050" b="1" i="1" dirty="0">
-              <a:solidFill>
-                <a:srgbClr val="0070C0"/>
-              </a:solidFill>
-              <a:effectLst/>
-              <a:latin typeface="Malgun Gothic" panose="020B0503020000020004" pitchFamily="34" charset="-127"/>
-              <a:ea typeface="Malgun Gothic" panose="020B0503020000020004" pitchFamily="34" charset="-127"/>
-              <a:cs typeface="Calibri" panose="020F0502020204030204" pitchFamily="34" charset="0"/>
-            </a:endParaRPr>
-          </a:p>
-          <a:p>
-            <a:pPr lvl="0" algn="just">
-              <a:buSzPts val="1050"/>
-              <a:tabLst>
-                <a:tab pos="323850" algn="l"/>
-              </a:tabLst>
-            </a:pPr>
-            <a:endParaRPr lang="fr-FR" sz="1050" b="1" i="1" dirty="0">
-              <a:solidFill>
-                <a:srgbClr val="0070C0"/>
-              </a:solidFill>
-              <a:effectLst/>
-              <a:latin typeface="Malgun Gothic" panose="020B0503020000020004" pitchFamily="34" charset="-127"/>
-              <a:ea typeface="Malgun Gothic" panose="020B0503020000020004" pitchFamily="34" charset="-127"/>
-              <a:cs typeface="Calibri" panose="020F0502020204030204" pitchFamily="34" charset="0"/>
-            </a:endParaRPr>
-          </a:p>
-          <a:p>
-            <a:pPr lvl="0" algn="just">
-              <a:buSzPts val="1050"/>
-              <a:tabLst>
-                <a:tab pos="323850" algn="l"/>
-              </a:tabLst>
-            </a:pPr>
-            <a:r>
-              <a:rPr lang="fr-FR" sz="1050" b="1" i="1" dirty="0">
-                <a:solidFill>
-                  <a:srgbClr val="0070C0"/>
-                </a:solidFill>
-                <a:effectLst/>
-                <a:latin typeface="Malgun Gothic" panose="020B0503020000020004" pitchFamily="34" charset="-127"/>
-                <a:ea typeface="Malgun Gothic" panose="020B0503020000020004" pitchFamily="34" charset="-127"/>
-                <a:cs typeface="Calibri" panose="020F0502020204030204" pitchFamily="34" charset="0"/>
-              </a:rPr>
-              <a:t>PROJET INTERFACE GRAPHIQUE (GUI) DE GRAPHTALK AIA 2000-2003</a:t>
-            </a:r>
-          </a:p>
-          <a:p>
-            <a:pPr lvl="0" algn="just">
-              <a:buSzPts val="1050"/>
-              <a:tabLst>
-                <a:tab pos="323850" algn="l"/>
-              </a:tabLst>
-            </a:pPr>
-            <a:r>
-              <a:rPr lang="fr-FR" sz="1050" b="1" i="1" dirty="0">
-                <a:solidFill>
-                  <a:srgbClr val="595959"/>
-                </a:solidFill>
-                <a:effectLst/>
-                <a:latin typeface="Malgun Gothic" panose="020B0503020000020004" pitchFamily="34" charset="-127"/>
-                <a:ea typeface="Malgun Gothic" panose="020B0503020000020004" pitchFamily="34" charset="-127"/>
-                <a:cs typeface="Angsana New" panose="02020603050405020304" pitchFamily="18" charset="-34"/>
-              </a:rPr>
-              <a:t>Responsable du projet : équipe de 5 personnes en France : </a:t>
-            </a:r>
-            <a:r>
-              <a:rPr lang="fr-FR" sz="1050" dirty="0">
-                <a:solidFill>
-                  <a:srgbClr val="595959"/>
-                </a:solidFill>
-                <a:effectLst/>
-                <a:latin typeface="Malgun Gothic" panose="020B0503020000020004" pitchFamily="34" charset="-127"/>
-                <a:ea typeface="Malgun Gothic" panose="020B0503020000020004" pitchFamily="34" charset="-127"/>
-                <a:cs typeface="Angsana New" panose="02020603050405020304" pitchFamily="18" charset="-34"/>
-              </a:rPr>
-              <a:t>Organisation et participation au développement de l’interface Graphique (Windows et Web) du logiciel GRAPHTALK AIA</a:t>
-            </a:r>
-            <a:r>
-              <a:rPr lang="fr-FR" sz="1050" dirty="0">
-                <a:solidFill>
-                  <a:srgbClr val="595959"/>
-                </a:solidFill>
-                <a:effectLst/>
-                <a:latin typeface="Malgun Gothic" panose="020B0503020000020004" pitchFamily="34" charset="-127"/>
-                <a:ea typeface="Malgun Gothic" panose="020B0503020000020004" pitchFamily="34" charset="-127"/>
-                <a:cs typeface="Calibri" panose="020F0502020204030204" pitchFamily="34" charset="0"/>
-              </a:rPr>
-              <a:t>.</a:t>
-            </a:r>
-            <a:endParaRPr lang="fr-FR" sz="1050" dirty="0">
-              <a:solidFill>
-                <a:srgbClr val="595959"/>
-              </a:solidFill>
-              <a:effectLst/>
-              <a:latin typeface="Malgun Gothic" panose="020B0503020000020004" pitchFamily="34" charset="-127"/>
-              <a:ea typeface="Malgun Gothic" panose="020B0503020000020004" pitchFamily="34" charset="-127"/>
-              <a:cs typeface="Angsana New" panose="02020603050405020304" pitchFamily="18" charset="-34"/>
-            </a:endParaRPr>
-          </a:p>
-          <a:p>
-            <a:pPr lvl="0" algn="just">
-              <a:buSzPts val="1050"/>
-              <a:tabLst>
-                <a:tab pos="323850" algn="l"/>
-              </a:tabLst>
-            </a:pPr>
-            <a:endParaRPr lang="fr-FR" sz="1050" dirty="0">
-              <a:solidFill>
-                <a:srgbClr val="595959"/>
-              </a:solidFill>
-              <a:effectLst/>
-              <a:latin typeface="Malgun Gothic" panose="020B0503020000020004" pitchFamily="34" charset="-127"/>
-              <a:ea typeface="Malgun Gothic" panose="020B0503020000020004" pitchFamily="34" charset="-127"/>
-              <a:cs typeface="Calibri" panose="020F0502020204030204" pitchFamily="34" charset="0"/>
-            </a:endParaRPr>
-          </a:p>
-          <a:p>
-            <a:endParaRPr lang="fr-FR" sz="1050" dirty="0">
+            <a:endParaRPr lang="fr-FR" sz="1000" dirty="0">
               <a:solidFill>
                 <a:schemeClr val="bg2">
                   <a:lumMod val="25000"/>
@@ -6974,8 +7075,8 @@
         </p:nvSpPr>
         <p:spPr>
           <a:xfrm>
-            <a:off x="1067177" y="2832142"/>
-            <a:ext cx="734496" cy="553998"/>
+            <a:off x="918125" y="266700"/>
+            <a:ext cx="683200" cy="507831"/>
           </a:xfrm>
           <a:prstGeom prst="rect">
             <a:avLst/>
@@ -6989,7 +7090,7 @@
           <a:lstStyle/>
           <a:p>
             <a:r>
-              <a:rPr lang="fr-FR" sz="1000" dirty="0">
+              <a:rPr lang="fr-FR" sz="900" dirty="0">
                 <a:latin typeface="Malgun Gothic" panose="020B0503020000020004" pitchFamily="34" charset="-127"/>
                 <a:ea typeface="Malgun Gothic" panose="020B0503020000020004" pitchFamily="34" charset="-127"/>
               </a:rPr>
@@ -6998,7 +7099,7 @@
           </a:p>
           <a:p>
             <a:r>
-              <a:rPr lang="fr-FR" sz="1000" dirty="0">
+              <a:rPr lang="fr-FR" sz="900" dirty="0">
                 <a:latin typeface="Malgun Gothic" panose="020B0503020000020004" pitchFamily="34" charset="-127"/>
                 <a:ea typeface="Malgun Gothic" panose="020B0503020000020004" pitchFamily="34" charset="-127"/>
               </a:rPr>
@@ -7006,94 +7107,19 @@
             </a:r>
           </a:p>
           <a:p>
-            <a:endParaRPr lang="fr-FR" sz="1000" dirty="0">
+            <a:endParaRPr lang="fr-FR" sz="900" dirty="0">
               <a:latin typeface="Malgun Gothic" panose="020B0503020000020004" pitchFamily="34" charset="-127"/>
               <a:ea typeface="Malgun Gothic" panose="020B0503020000020004" pitchFamily="34" charset="-127"/>
             </a:endParaRPr>
           </a:p>
         </p:txBody>
       </p:sp>
-    </p:spTree>
-    <p:extLst>
-      <p:ext uri="{BB962C8B-B14F-4D97-AF65-F5344CB8AC3E}">
-        <p14:creationId xmlns:p14="http://schemas.microsoft.com/office/powerpoint/2010/main" val="4062738183"/>
-      </p:ext>
-    </p:extLst>
-  </p:cSld>
-  <p:clrMapOvr>
-    <a:masterClrMapping/>
-  </p:clrMapOvr>
-</p:sld>
-</file>
-
-<file path=ppt/slides/slide3.xml><?xml version="1.0" encoding="utf-8"?>
-<p:sld xmlns:a="http://schemas.openxmlformats.org/drawingml/2006/main" xmlns:r="http://schemas.openxmlformats.org/officeDocument/2006/relationships" xmlns:p="http://schemas.openxmlformats.org/presentationml/2006/main">
-  <p:cSld>
-    <p:spTree>
-      <p:nvGrpSpPr>
-        <p:cNvPr id="1" name=""/>
-        <p:cNvGrpSpPr/>
-        <p:nvPr/>
-      </p:nvGrpSpPr>
-      <p:grpSpPr>
-        <a:xfrm>
-          <a:off x="0" y="0"/>
-          <a:ext cx="0" cy="0"/>
-          <a:chOff x="0" y="0"/>
-          <a:chExt cx="0" cy="0"/>
-        </a:xfrm>
-      </p:grpSpPr>
-      <p:cxnSp>
-        <p:nvCxnSpPr>
-          <p:cNvPr id="18" name="Connecteur droit 17">
+      <p:sp>
+        <p:nvSpPr>
+          <p:cNvPr id="2" name="ZoneTexte 1">
             <a:extLst>
               <a:ext uri="{FF2B5EF4-FFF2-40B4-BE49-F238E27FC236}">
-                <a16:creationId xmlns:a16="http://schemas.microsoft.com/office/drawing/2014/main" id="{AFE05CA6-D005-1F66-06EA-C8F89BAE137C}"/>
-              </a:ext>
-            </a:extLst>
-          </p:cNvPr>
-          <p:cNvCxnSpPr>
-            <a:cxnSpLocks/>
-          </p:cNvCxnSpPr>
-          <p:nvPr/>
-        </p:nvCxnSpPr>
-        <p:spPr>
-          <a:xfrm flipH="1">
-            <a:off x="1017397" y="372548"/>
-            <a:ext cx="40596" cy="8705850"/>
-          </a:xfrm>
-          <a:prstGeom prst="line">
-            <a:avLst/>
-          </a:prstGeom>
-          <a:ln w="3175">
-            <a:solidFill>
-              <a:schemeClr val="bg2">
-                <a:lumMod val="75000"/>
-              </a:schemeClr>
-            </a:solidFill>
-          </a:ln>
-        </p:spPr>
-        <p:style>
-          <a:lnRef idx="1">
-            <a:schemeClr val="accent1"/>
-          </a:lnRef>
-          <a:fillRef idx="0">
-            <a:schemeClr val="accent1"/>
-          </a:fillRef>
-          <a:effectRef idx="0">
-            <a:schemeClr val="accent1"/>
-          </a:effectRef>
-          <a:fontRef idx="minor">
-            <a:schemeClr val="tx1"/>
-          </a:fontRef>
-        </p:style>
-      </p:cxnSp>
-      <p:sp>
-        <p:nvSpPr>
-          <p:cNvPr id="5" name="ZoneTexte 4">
-            <a:extLst>
-              <a:ext uri="{FF2B5EF4-FFF2-40B4-BE49-F238E27FC236}">
-                <a16:creationId xmlns:a16="http://schemas.microsoft.com/office/drawing/2014/main" id="{2DF5A6D0-3A65-7D22-69FE-28CCF1EBCD1E}"/>
+                <a16:creationId xmlns:a16="http://schemas.microsoft.com/office/drawing/2014/main" id="{278D55D6-B256-0058-BF99-DFA142AB219D}"/>
               </a:ext>
             </a:extLst>
           </p:cNvPr>
@@ -7102,8 +7128,8 @@
         </p:nvSpPr>
         <p:spPr>
           <a:xfrm flipH="1">
-            <a:off x="1591663" y="66514"/>
-            <a:ext cx="5266335" cy="3162404"/>
+            <a:off x="1460500" y="4691854"/>
+            <a:ext cx="5397498" cy="3139321"/>
           </a:xfrm>
           <a:prstGeom prst="rect">
             <a:avLst/>
@@ -7117,7 +7143,7 @@
           <a:lstStyle/>
           <a:p>
             <a:pPr algn="just"/>
-            <a:endParaRPr lang="fr-FR" sz="1050" b="1" cap="all" dirty="0">
+            <a:endParaRPr lang="fr-FR" sz="1000" b="1" cap="all" dirty="0">
               <a:solidFill>
                 <a:srgbClr val="00000A"/>
               </a:solidFill>
@@ -7129,7 +7155,7 @@
           <a:p>
             <a:pPr algn="just"/>
             <a:r>
-              <a:rPr lang="fr-FR" sz="1050" b="1" cap="all" dirty="0">
+              <a:rPr lang="fr-FR" sz="1000" b="1" cap="all" dirty="0">
                 <a:solidFill>
                   <a:srgbClr val="00000A"/>
                 </a:solidFill>
@@ -7140,7 +7166,7 @@
               </a:rPr>
               <a:t> </a:t>
             </a:r>
-            <a:endParaRPr lang="fr-FR" sz="1050" dirty="0">
+            <a:endParaRPr lang="fr-FR" sz="1000" dirty="0">
               <a:solidFill>
                 <a:srgbClr val="595959"/>
               </a:solidFill>
@@ -7152,7 +7178,7 @@
           <a:p>
             <a:pPr algn="just"/>
             <a:r>
-              <a:rPr lang="fr-FR" sz="1050" b="1" cap="all" dirty="0">
+              <a:rPr lang="fr-FR" sz="1000" b="1" cap="all" dirty="0">
                 <a:solidFill>
                   <a:srgbClr val="00000A"/>
                 </a:solidFill>
@@ -7164,7 +7190,7 @@
               <a:t>TAGG informatique – </a:t>
             </a:r>
             <a:r>
-              <a:rPr lang="fr-FR" sz="1050" b="0" cap="all" dirty="0">
+              <a:rPr lang="fr-FR" sz="1000" b="0" cap="all" dirty="0">
                 <a:solidFill>
                   <a:srgbClr val="404040"/>
                 </a:solidFill>
@@ -7179,7 +7205,7 @@
           <a:p>
             <a:pPr algn="just"/>
             <a:r>
-              <a:rPr lang="fr-FR" sz="1050" b="1" cap="small" dirty="0">
+              <a:rPr lang="fr-FR" sz="1000" b="1" cap="small" dirty="0">
                 <a:solidFill>
                   <a:srgbClr val="00000A"/>
                 </a:solidFill>
@@ -7190,7 +7216,7 @@
               <a:t>Postes occupés </a:t>
             </a:r>
             <a:r>
-              <a:rPr lang="fr-FR" sz="1050" dirty="0">
+              <a:rPr lang="fr-FR" sz="1000" dirty="0">
                 <a:solidFill>
                   <a:srgbClr val="595959"/>
                 </a:solidFill>
@@ -7202,7 +7228,7 @@
               <a:t>: </a:t>
             </a:r>
             <a:r>
-              <a:rPr lang="fr-FR" sz="1050" b="1" cap="small" dirty="0">
+              <a:rPr lang="fr-FR" sz="1000" b="1" cap="small" dirty="0">
                 <a:solidFill>
                   <a:srgbClr val="4F81BD"/>
                 </a:solidFill>
@@ -7216,20 +7242,8 @@
           </a:p>
           <a:p>
             <a:pPr algn="just"/>
-            <a:endParaRPr lang="fr-FR" sz="1050" dirty="0">
-              <a:solidFill>
-                <a:srgbClr val="595959"/>
-              </a:solidFill>
-              <a:effectLst/>
-              <a:latin typeface="Malgun Gothic" panose="020B0503020000020004" pitchFamily="34" charset="-127"/>
-              <a:ea typeface="Malgun Gothic" panose="020B0503020000020004" pitchFamily="34" charset="-127"/>
-              <a:cs typeface="Angsana New" panose="02020603050405020304" pitchFamily="18" charset="-34"/>
-            </a:endParaRPr>
-          </a:p>
-          <a:p>
-            <a:pPr algn="just"/>
-            <a:r>
-              <a:rPr lang="fr-FR" sz="1050" dirty="0">
+            <a:r>
+              <a:rPr lang="fr-FR" sz="1000" dirty="0">
                 <a:solidFill>
                   <a:srgbClr val="0070C0"/>
                 </a:solidFill>
@@ -7241,7 +7255,7 @@
               <a:t>Responsable de l'équipe de développement</a:t>
             </a:r>
             <a:r>
-              <a:rPr lang="fr-FR" sz="1050" dirty="0">
+              <a:rPr lang="fr-FR" sz="1000" dirty="0">
                 <a:solidFill>
                   <a:srgbClr val="595959"/>
                 </a:solidFill>
@@ -7260,7 +7274,7 @@
                 <a:tab pos="323850" algn="l"/>
               </a:tabLst>
             </a:pPr>
-            <a:endParaRPr lang="fr-FR" sz="1050" dirty="0">
+            <a:endParaRPr lang="fr-FR" sz="400" dirty="0">
               <a:solidFill>
                 <a:srgbClr val="0070C0"/>
               </a:solidFill>
@@ -7278,7 +7292,7 @@
               </a:tabLst>
             </a:pPr>
             <a:r>
-              <a:rPr lang="fr-FR" sz="1050" dirty="0">
+              <a:rPr lang="fr-FR" sz="1000" dirty="0">
                 <a:solidFill>
                   <a:srgbClr val="0070C0"/>
                 </a:solidFill>
@@ -7290,7 +7304,7 @@
               <a:t>Responsable du projet </a:t>
             </a:r>
             <a:r>
-              <a:rPr lang="fr-FR" sz="1050" dirty="0" err="1">
+              <a:rPr lang="fr-FR" sz="1000" dirty="0" err="1">
                 <a:solidFill>
                   <a:srgbClr val="0070C0"/>
                 </a:solidFill>
@@ -7302,7 +7316,7 @@
               <a:t>TaggImage</a:t>
             </a:r>
             <a:r>
-              <a:rPr lang="fr-FR" sz="1050" dirty="0">
+              <a:rPr lang="fr-FR" sz="1000" dirty="0">
                 <a:solidFill>
                   <a:srgbClr val="595959"/>
                 </a:solidFill>
@@ -7311,7 +7325,7 @@
                 <a:ea typeface="Malgun Gothic" panose="020B0503020000020004" pitchFamily="34" charset="-127"/>
                 <a:cs typeface="Calibri" panose="020F0502020204030204" pitchFamily="34" charset="0"/>
               </a:rPr>
-              <a:t> : Informatisation d'un contrôle caméra de documents imprimés par comparaison de modèles. Contrôle qualité sur des impressions en très grosses quantités (plusieurs dizaines de milliers) à très grande vitesse. </a:t>
+              <a:t> : Informatisation d'un contrôle caméra de documents imprimés par comparaison de modèles. Contrôle qualité sur des impressions en très grosses quantités (plusieurs dizaines de milliers) à très grande vitesse. Développement en C++ par comparaison de model. Travail en équipe de 3 personnes (2 stagiaires).</a:t>
             </a:r>
           </a:p>
           <a:p>
@@ -7321,7 +7335,7 @@
                 <a:tab pos="323850" algn="l"/>
               </a:tabLst>
             </a:pPr>
-            <a:endParaRPr lang="fr-FR" sz="1050" dirty="0">
+            <a:endParaRPr lang="fr-FR" sz="400" dirty="0">
               <a:solidFill>
                 <a:srgbClr val="0070C0"/>
               </a:solidFill>
@@ -7339,7 +7353,7 @@
               </a:tabLst>
             </a:pPr>
             <a:r>
-              <a:rPr lang="fr-FR" sz="1050" dirty="0">
+              <a:rPr lang="fr-FR" sz="1000" dirty="0">
                 <a:solidFill>
                   <a:srgbClr val="0070C0"/>
                 </a:solidFill>
@@ -7351,7 +7365,7 @@
               <a:t>Développement et Exploitation</a:t>
             </a:r>
             <a:r>
-              <a:rPr lang="fr-FR" sz="1050" dirty="0">
+              <a:rPr lang="fr-FR" sz="1000" dirty="0">
                 <a:solidFill>
                   <a:srgbClr val="595959"/>
                 </a:solidFill>
@@ -7363,7 +7377,7 @@
               <a:t> du logiciel </a:t>
             </a:r>
             <a:r>
-              <a:rPr lang="fr-FR" sz="1050" dirty="0" err="1">
+              <a:rPr lang="fr-FR" sz="1000" dirty="0" err="1">
                 <a:solidFill>
                   <a:srgbClr val="595959"/>
                 </a:solidFill>
@@ -7375,7 +7389,7 @@
               <a:t>VotExpress</a:t>
             </a:r>
             <a:r>
-              <a:rPr lang="fr-FR" sz="1050" dirty="0">
+              <a:rPr lang="fr-FR" sz="1000" dirty="0">
                 <a:solidFill>
                   <a:srgbClr val="595959"/>
                 </a:solidFill>
@@ -7384,17 +7398,8 @@
                 <a:ea typeface="Malgun Gothic" panose="020B0503020000020004" pitchFamily="34" charset="-127"/>
                 <a:cs typeface="Calibri" panose="020F0502020204030204" pitchFamily="34" charset="0"/>
               </a:rPr>
-              <a:t>, solution d’organisation d’élections professionnelles par traitement électronique des votes par correspondance. Ma mission a porté sur la conception, réalisation et mise en exploitation sur sites des premières versions du logiciel.</a:t>
-            </a:r>
-            <a:endParaRPr lang="fr-FR" sz="1050" dirty="0">
-              <a:solidFill>
-                <a:srgbClr val="595959"/>
-              </a:solidFill>
-              <a:effectLst/>
-              <a:latin typeface="Malgun Gothic" panose="020B0503020000020004" pitchFamily="34" charset="-127"/>
-              <a:ea typeface="Malgun Gothic" panose="020B0503020000020004" pitchFamily="34" charset="-127"/>
-              <a:cs typeface="Wingdings" panose="05000000000000000000" pitchFamily="2" charset="2"/>
-            </a:endParaRPr>
+              <a:t>, solution d’organisation d’élections professionnelles par traitement électronique des votes par correspondance. Ma mission a porté sur la conception, réalisation et mise en exploitation sur sites des premières versions du logiciel. Développement en C++.</a:t>
+            </a:r>
           </a:p>
           <a:p>
             <a:pPr lvl="0" algn="just">
@@ -7403,7 +7408,7 @@
                 <a:tab pos="323850" algn="l"/>
               </a:tabLst>
             </a:pPr>
-            <a:endParaRPr lang="fr-FR" sz="1050" dirty="0">
+            <a:endParaRPr lang="fr-FR" sz="1000" dirty="0">
               <a:solidFill>
                 <a:srgbClr val="595959"/>
               </a:solidFill>
@@ -7412,14 +7417,65 @@
               <a:cs typeface="Calibri" panose="020F0502020204030204" pitchFamily="34" charset="0"/>
             </a:endParaRPr>
           </a:p>
-        </p:txBody>
-      </p:sp>
-      <p:sp>
-        <p:nvSpPr>
-          <p:cNvPr id="7" name="ZoneTexte 6">
+          <a:p>
+            <a:pPr algn="just">
+              <a:buSzPts val="1050"/>
+              <a:tabLst>
+                <a:tab pos="323850" algn="l"/>
+              </a:tabLst>
+            </a:pPr>
+            <a:r>
+              <a:rPr lang="fr-FR" sz="1000" dirty="0">
+                <a:latin typeface="Malgun Gothic" panose="020B0503020000020004" pitchFamily="34" charset="-127"/>
+                <a:ea typeface="Malgun Gothic" panose="020B0503020000020004" pitchFamily="34" charset="-127"/>
+              </a:rPr>
+              <a:t>Stage de fin d’étude à l’hôpital Michalon de Grenoble: Développement d’un programme de simulation de l’évolution de tumeurs cérébrales non opérables.</a:t>
+            </a:r>
+          </a:p>
+          <a:p>
+            <a:pPr lvl="0" algn="just">
+              <a:buSzPts val="1050"/>
+              <a:tabLst>
+                <a:tab pos="323850" algn="l"/>
+              </a:tabLst>
+            </a:pPr>
+            <a:r>
+              <a:rPr lang="fr-FR" sz="1000" dirty="0">
+                <a:solidFill>
+                  <a:srgbClr val="595959"/>
+                </a:solidFill>
+                <a:effectLst/>
+                <a:latin typeface="Malgun Gothic" panose="020B0503020000020004" pitchFamily="34" charset="-127"/>
+                <a:ea typeface="Malgun Gothic" panose="020B0503020000020004" pitchFamily="34" charset="-127"/>
+                <a:cs typeface="Wingdings" panose="05000000000000000000" pitchFamily="2" charset="2"/>
+              </a:rPr>
+              <a:t>Langage utilisé : Fortran 90</a:t>
+            </a:r>
+          </a:p>
+          <a:p>
+            <a:pPr lvl="0" algn="just">
+              <a:buSzPts val="1050"/>
+              <a:tabLst>
+                <a:tab pos="323850" algn="l"/>
+              </a:tabLst>
+            </a:pPr>
+            <a:endParaRPr lang="fr-FR" sz="1000" dirty="0">
+              <a:solidFill>
+                <a:srgbClr val="595959"/>
+              </a:solidFill>
+              <a:latin typeface="Malgun Gothic" panose="020B0503020000020004" pitchFamily="34" charset="-127"/>
+              <a:ea typeface="Malgun Gothic" panose="020B0503020000020004" pitchFamily="34" charset="-127"/>
+              <a:cs typeface="Calibri" panose="020F0502020204030204" pitchFamily="34" charset="0"/>
+            </a:endParaRPr>
+          </a:p>
+        </p:txBody>
+      </p:sp>
+      <p:sp>
+        <p:nvSpPr>
+          <p:cNvPr id="3" name="ZoneTexte 2">
             <a:extLst>
               <a:ext uri="{FF2B5EF4-FFF2-40B4-BE49-F238E27FC236}">
-                <a16:creationId xmlns:a16="http://schemas.microsoft.com/office/drawing/2014/main" id="{7A017932-BA80-72D0-FD9B-4E78B0E98286}"/>
+                <a16:creationId xmlns:a16="http://schemas.microsoft.com/office/drawing/2014/main" id="{768AD4DF-DC17-DC2A-D3EA-CD842DDAE894}"/>
               </a:ext>
             </a:extLst>
           </p:cNvPr>
@@ -7428,8 +7484,8 @@
         </p:nvSpPr>
         <p:spPr>
           <a:xfrm>
-            <a:off x="1010469" y="372548"/>
-            <a:ext cx="734496" cy="400110"/>
+            <a:off x="832669" y="4997888"/>
+            <a:ext cx="683200" cy="369332"/>
           </a:xfrm>
           <a:prstGeom prst="rect">
             <a:avLst/>
@@ -7443,7 +7499,7 @@
           <a:lstStyle/>
           <a:p>
             <a:r>
-              <a:rPr lang="fr-FR" sz="1000" dirty="0">
+              <a:rPr lang="fr-FR" sz="900" dirty="0">
                 <a:latin typeface="Malgun Gothic" panose="020B0503020000020004" pitchFamily="34" charset="-127"/>
                 <a:ea typeface="Malgun Gothic" panose="020B0503020000020004" pitchFamily="34" charset="-127"/>
               </a:rPr>
@@ -7452,7 +7508,7 @@
           </a:p>
           <a:p>
             <a:r>
-              <a:rPr lang="fr-FR" sz="1000" dirty="0">
+              <a:rPr lang="fr-FR" sz="900" dirty="0">
                 <a:latin typeface="Malgun Gothic" panose="020B0503020000020004" pitchFamily="34" charset="-127"/>
                 <a:ea typeface="Malgun Gothic" panose="020B0503020000020004" pitchFamily="34" charset="-127"/>
               </a:rPr>
@@ -7463,10 +7519,10 @@
       </p:sp>
       <p:sp>
         <p:nvSpPr>
-          <p:cNvPr id="6" name="ZoneTexte 5">
+          <p:cNvPr id="4" name="ZoneTexte 3">
             <a:extLst>
               <a:ext uri="{FF2B5EF4-FFF2-40B4-BE49-F238E27FC236}">
-                <a16:creationId xmlns:a16="http://schemas.microsoft.com/office/drawing/2014/main" id="{D8710F0F-9B55-7017-D4B5-49C890CCEA7D}"/>
+                <a16:creationId xmlns:a16="http://schemas.microsoft.com/office/drawing/2014/main" id="{4DF18222-A70B-DA32-C173-33A51B651245}"/>
               </a:ext>
             </a:extLst>
           </p:cNvPr>
@@ -7475,8 +7531,8 @@
         </p:nvSpPr>
         <p:spPr>
           <a:xfrm>
-            <a:off x="1244754" y="3211787"/>
-            <a:ext cx="1971419" cy="307777"/>
+            <a:off x="837781" y="7150495"/>
+            <a:ext cx="441146" cy="230832"/>
           </a:xfrm>
           <a:prstGeom prst="rect">
             <a:avLst/>
@@ -7484,319 +7540,18 @@
           <a:noFill/>
         </p:spPr>
         <p:txBody>
-          <a:bodyPr wrap="square" rtlCol="0">
+          <a:bodyPr wrap="none" rtlCol="0">
             <a:spAutoFit/>
           </a:bodyPr>
           <a:lstStyle/>
           <a:p>
             <a:r>
-              <a:rPr lang="fr-FR" sz="1400" b="1" dirty="0">
-                <a:solidFill>
-                  <a:schemeClr val="accent1">
-                    <a:lumMod val="50000"/>
-                  </a:schemeClr>
-                </a:solidFill>
-                <a:latin typeface="Malgun Gothic" panose="020B0503020000020004" pitchFamily="34" charset="-127"/>
-                <a:ea typeface="Malgun Gothic" panose="020B0503020000020004" pitchFamily="34" charset="-127"/>
-              </a:rPr>
-              <a:t>Formation</a:t>
-            </a:r>
-          </a:p>
-        </p:txBody>
-      </p:sp>
-      <p:pic>
-        <p:nvPicPr>
-          <p:cNvPr id="8" name="Image 7"/>
-          <p:cNvPicPr>
-            <a:picLocks noChangeAspect="1"/>
-          </p:cNvPicPr>
-          <p:nvPr/>
-        </p:nvPicPr>
-        <p:blipFill rotWithShape="1">
-          <a:blip r:embed="rId2"/>
-          <a:srcRect l="16838" t="30706" r="82036" b="65923"/>
-          <a:stretch/>
-        </p:blipFill>
-        <p:spPr>
-          <a:xfrm>
-            <a:off x="789620" y="3109888"/>
-            <a:ext cx="498315" cy="419477"/>
-          </a:xfrm>
-          <a:prstGeom prst="rect">
-            <a:avLst/>
-          </a:prstGeom>
-        </p:spPr>
-      </p:pic>
-      <p:cxnSp>
-        <p:nvCxnSpPr>
-          <p:cNvPr id="10" name="Connecteur droit 9"/>
-          <p:cNvCxnSpPr/>
-          <p:nvPr/>
-        </p:nvCxnSpPr>
-        <p:spPr>
-          <a:xfrm flipV="1">
-            <a:off x="1343850" y="3499219"/>
-            <a:ext cx="5322021" cy="30147"/>
-          </a:xfrm>
-          <a:prstGeom prst="line">
-            <a:avLst/>
-          </a:prstGeom>
-          <a:ln w="3175">
-            <a:solidFill>
-              <a:schemeClr val="bg2">
-                <a:lumMod val="75000"/>
-              </a:schemeClr>
-            </a:solidFill>
-          </a:ln>
-        </p:spPr>
-        <p:style>
-          <a:lnRef idx="1">
-            <a:schemeClr val="accent1"/>
-          </a:lnRef>
-          <a:fillRef idx="0">
-            <a:schemeClr val="accent1"/>
-          </a:fillRef>
-          <a:effectRef idx="0">
-            <a:schemeClr val="accent1"/>
-          </a:effectRef>
-          <a:fontRef idx="minor">
-            <a:schemeClr val="tx1"/>
-          </a:fontRef>
-        </p:style>
-      </p:cxnSp>
-      <p:sp>
-        <p:nvSpPr>
-          <p:cNvPr id="11" name="ZoneTexte 10">
-            <a:extLst>
-              <a:ext uri="{FF2B5EF4-FFF2-40B4-BE49-F238E27FC236}">
-                <a16:creationId xmlns:a16="http://schemas.microsoft.com/office/drawing/2014/main" id="{32413335-D863-053C-259A-33B3FD8692F3}"/>
-              </a:ext>
-            </a:extLst>
-          </p:cNvPr>
-          <p:cNvSpPr txBox="1"/>
-          <p:nvPr/>
-        </p:nvSpPr>
-        <p:spPr>
-          <a:xfrm>
-            <a:off x="956929" y="3519564"/>
-            <a:ext cx="5884760" cy="900246"/>
-          </a:xfrm>
-          <a:prstGeom prst="rect">
-            <a:avLst/>
-          </a:prstGeom>
-          <a:noFill/>
-        </p:spPr>
-        <p:txBody>
-          <a:bodyPr wrap="square" rtlCol="0">
-            <a:spAutoFit/>
-          </a:bodyPr>
-          <a:lstStyle/>
-          <a:p>
-            <a:pPr algn="just"/>
-            <a:r>
-              <a:rPr lang="fr-FR" sz="1050" b="1" cap="all" dirty="0">
-                <a:solidFill>
-                  <a:srgbClr val="404040"/>
-                </a:solidFill>
-                <a:effectLst/>
-                <a:latin typeface="Malgun Gothic" panose="020B0503020000020004" pitchFamily="34" charset="-127"/>
-                <a:ea typeface="Malgun Gothic" panose="020B0503020000020004" pitchFamily="34" charset="-127"/>
-                <a:cs typeface="Cordia New" panose="020B0304020202020204" pitchFamily="34" charset="-34"/>
-              </a:rPr>
-              <a:t>DESS </a:t>
-            </a:r>
-            <a:r>
-              <a:rPr lang="fr-FR" sz="1050" b="1" cap="all" dirty="0" err="1">
-                <a:solidFill>
-                  <a:srgbClr val="404040"/>
-                </a:solidFill>
-                <a:effectLst/>
-                <a:latin typeface="Malgun Gothic" panose="020B0503020000020004" pitchFamily="34" charset="-127"/>
-                <a:ea typeface="Malgun Gothic" panose="020B0503020000020004" pitchFamily="34" charset="-127"/>
-                <a:cs typeface="Cordia New" panose="020B0304020202020204" pitchFamily="34" charset="-34"/>
-              </a:rPr>
-              <a:t>ing</a:t>
-            </a:r>
-            <a:r>
-              <a:rPr lang="fr-FR" sz="1050" b="1" cap="all" dirty="0">
-                <a:solidFill>
-                  <a:srgbClr val="404040"/>
-                </a:solidFill>
-                <a:effectLst/>
-                <a:latin typeface="Malgun Gothic" panose="020B0503020000020004" pitchFamily="34" charset="-127"/>
-                <a:ea typeface="Malgun Gothic" panose="020B0503020000020004" pitchFamily="34" charset="-127"/>
-                <a:cs typeface="Cordia New" panose="020B0304020202020204" pitchFamily="34" charset="-34"/>
-              </a:rPr>
-              <a:t>. </a:t>
-            </a:r>
-            <a:r>
-              <a:rPr lang="fr-FR" sz="1050" b="1" cap="all" dirty="0" err="1">
-                <a:solidFill>
-                  <a:srgbClr val="404040"/>
-                </a:solidFill>
-                <a:effectLst/>
-                <a:latin typeface="Malgun Gothic" panose="020B0503020000020004" pitchFamily="34" charset="-127"/>
-                <a:ea typeface="Malgun Gothic" panose="020B0503020000020004" pitchFamily="34" charset="-127"/>
-                <a:cs typeface="Cordia New" panose="020B0304020202020204" pitchFamily="34" charset="-34"/>
-              </a:rPr>
-              <a:t>mathematique</a:t>
-            </a:r>
-            <a:r>
-              <a:rPr lang="fr-FR" sz="1050" b="1" cap="all" dirty="0">
-                <a:solidFill>
-                  <a:srgbClr val="404040"/>
-                </a:solidFill>
-                <a:effectLst/>
-                <a:latin typeface="Malgun Gothic" panose="020B0503020000020004" pitchFamily="34" charset="-127"/>
-                <a:ea typeface="Malgun Gothic" panose="020B0503020000020004" pitchFamily="34" charset="-127"/>
-                <a:cs typeface="Cordia New" panose="020B0304020202020204" pitchFamily="34" charset="-34"/>
-              </a:rPr>
-              <a:t> (Master 2), </a:t>
-            </a:r>
-            <a:r>
-              <a:rPr lang="fr-FR" sz="1050" b="1" cap="all" dirty="0" err="1">
-                <a:solidFill>
-                  <a:srgbClr val="404040"/>
-                </a:solidFill>
-                <a:effectLst/>
-                <a:latin typeface="Malgun Gothic" panose="020B0503020000020004" pitchFamily="34" charset="-127"/>
-                <a:ea typeface="Malgun Gothic" panose="020B0503020000020004" pitchFamily="34" charset="-127"/>
-                <a:cs typeface="Cordia New" panose="020B0304020202020204" pitchFamily="34" charset="-34"/>
-              </a:rPr>
-              <a:t>opt</a:t>
-            </a:r>
-            <a:r>
-              <a:rPr lang="fr-FR" sz="1050" b="1" cap="all" dirty="0">
-                <a:solidFill>
-                  <a:srgbClr val="404040"/>
-                </a:solidFill>
-                <a:effectLst/>
-                <a:latin typeface="Malgun Gothic" panose="020B0503020000020004" pitchFamily="34" charset="-127"/>
-                <a:ea typeface="Malgun Gothic" panose="020B0503020000020004" pitchFamily="34" charset="-127"/>
-                <a:cs typeface="Cordia New" panose="020B0304020202020204" pitchFamily="34" charset="-34"/>
-              </a:rPr>
-              <a:t>. courbes surfaces &amp; images</a:t>
-            </a:r>
-            <a:r>
-              <a:rPr lang="fr-FR" sz="1050" b="0" cap="all" dirty="0">
-                <a:solidFill>
-                  <a:srgbClr val="404040"/>
-                </a:solidFill>
-                <a:effectLst/>
-                <a:latin typeface="Malgun Gothic" panose="020B0503020000020004" pitchFamily="34" charset="-127"/>
-                <a:ea typeface="Malgun Gothic" panose="020B0503020000020004" pitchFamily="34" charset="-127"/>
-                <a:cs typeface="Cordia New" panose="020B0304020202020204" pitchFamily="34" charset="-34"/>
-              </a:rPr>
-              <a:t>, </a:t>
-            </a:r>
-            <a:r>
-              <a:rPr lang="fr-FR" sz="1050" b="0" cap="small" dirty="0">
-                <a:solidFill>
-                  <a:srgbClr val="404040"/>
-                </a:solidFill>
-                <a:effectLst/>
-                <a:latin typeface="Malgun Gothic" panose="020B0503020000020004" pitchFamily="34" charset="-127"/>
-                <a:ea typeface="Malgun Gothic" panose="020B0503020000020004" pitchFamily="34" charset="-127"/>
-                <a:cs typeface="Cordia New" panose="020B0304020202020204" pitchFamily="34" charset="-34"/>
-              </a:rPr>
-              <a:t>UNIV.  J. FOURIER, Grenoble – </a:t>
-            </a:r>
-            <a:r>
-              <a:rPr lang="fr-FR" sz="1050" b="0" cap="small" dirty="0" err="1">
-                <a:solidFill>
-                  <a:srgbClr val="404040"/>
-                </a:solidFill>
-                <a:effectLst/>
-                <a:latin typeface="Malgun Gothic" panose="020B0503020000020004" pitchFamily="34" charset="-127"/>
-                <a:ea typeface="Malgun Gothic" panose="020B0503020000020004" pitchFamily="34" charset="-127"/>
-                <a:cs typeface="Cordia New" panose="020B0304020202020204" pitchFamily="34" charset="-34"/>
-              </a:rPr>
-              <a:t>Obt</a:t>
-            </a:r>
-            <a:r>
-              <a:rPr lang="fr-FR" sz="1050" b="0" cap="small" dirty="0">
-                <a:solidFill>
-                  <a:srgbClr val="404040"/>
-                </a:solidFill>
-                <a:effectLst/>
-                <a:latin typeface="Malgun Gothic" panose="020B0503020000020004" pitchFamily="34" charset="-127"/>
-                <a:ea typeface="Malgun Gothic" panose="020B0503020000020004" pitchFamily="34" charset="-127"/>
-                <a:cs typeface="Cordia New" panose="020B0304020202020204" pitchFamily="34" charset="-34"/>
-              </a:rPr>
-              <a:t>. 1996</a:t>
-            </a:r>
-          </a:p>
-          <a:p>
-            <a:pPr algn="just"/>
-            <a:endParaRPr lang="fr-FR" sz="1050" b="1" cap="all" dirty="0">
-              <a:solidFill>
-                <a:srgbClr val="404040"/>
-              </a:solidFill>
-              <a:effectLst/>
-              <a:latin typeface="Malgun Gothic" panose="020B0503020000020004" pitchFamily="34" charset="-127"/>
-              <a:ea typeface="Malgun Gothic" panose="020B0503020000020004" pitchFamily="34" charset="-127"/>
-              <a:cs typeface="Cordia New" panose="020B0304020202020204" pitchFamily="34" charset="-34"/>
-            </a:endParaRPr>
-          </a:p>
-          <a:p>
-            <a:pPr algn="just"/>
-            <a:r>
-              <a:rPr lang="fr-FR" sz="1050" b="1" cap="all" dirty="0">
-                <a:solidFill>
-                  <a:srgbClr val="404040"/>
-                </a:solidFill>
-                <a:effectLst/>
-                <a:latin typeface="Malgun Gothic" panose="020B0503020000020004" pitchFamily="34" charset="-127"/>
-                <a:ea typeface="Malgun Gothic" panose="020B0503020000020004" pitchFamily="34" charset="-127"/>
-                <a:cs typeface="Cordia New" panose="020B0304020202020204" pitchFamily="34" charset="-34"/>
-              </a:rPr>
-              <a:t>maîtrise GENIE MATH. &amp; INFORMATIQUE, / Ingénieur maître en MATH. APPLIQ. &amp; INFORMATIQUE</a:t>
-            </a:r>
-            <a:r>
-              <a:rPr lang="fr-FR" sz="1050" b="0" cap="small" dirty="0">
-                <a:solidFill>
-                  <a:srgbClr val="404040"/>
-                </a:solidFill>
-                <a:effectLst/>
-                <a:latin typeface="Malgun Gothic" panose="020B0503020000020004" pitchFamily="34" charset="-127"/>
-                <a:ea typeface="Malgun Gothic" panose="020B0503020000020004" pitchFamily="34" charset="-127"/>
-                <a:cs typeface="Cordia New" panose="020B0304020202020204" pitchFamily="34" charset="-34"/>
-              </a:rPr>
-              <a:t>, UNIV. J. FOURIER, Grenoble – </a:t>
-            </a:r>
-            <a:r>
-              <a:rPr lang="fr-FR" sz="1050" b="0" cap="small" dirty="0" err="1">
-                <a:solidFill>
-                  <a:srgbClr val="404040"/>
-                </a:solidFill>
-                <a:effectLst/>
-                <a:latin typeface="Malgun Gothic" panose="020B0503020000020004" pitchFamily="34" charset="-127"/>
-                <a:ea typeface="Malgun Gothic" panose="020B0503020000020004" pitchFamily="34" charset="-127"/>
-                <a:cs typeface="Cordia New" panose="020B0304020202020204" pitchFamily="34" charset="-34"/>
-              </a:rPr>
-              <a:t>Obt</a:t>
-            </a:r>
-            <a:r>
-              <a:rPr lang="fr-FR" sz="1050" b="0" cap="small" dirty="0">
-                <a:solidFill>
-                  <a:srgbClr val="404040"/>
-                </a:solidFill>
-                <a:effectLst/>
-                <a:latin typeface="Malgun Gothic" panose="020B0503020000020004" pitchFamily="34" charset="-127"/>
-                <a:ea typeface="Malgun Gothic" panose="020B0503020000020004" pitchFamily="34" charset="-127"/>
-                <a:cs typeface="Cordia New" panose="020B0304020202020204" pitchFamily="34" charset="-34"/>
-              </a:rPr>
-              <a:t>. 1995</a:t>
-            </a:r>
-            <a:endParaRPr lang="fr-FR" sz="1050" b="1" cap="all" dirty="0">
-              <a:solidFill>
-                <a:srgbClr val="404040"/>
-              </a:solidFill>
-              <a:effectLst/>
-              <a:latin typeface="Malgun Gothic" panose="020B0503020000020004" pitchFamily="34" charset="-127"/>
-              <a:ea typeface="Malgun Gothic" panose="020B0503020000020004" pitchFamily="34" charset="-127"/>
-              <a:cs typeface="Cordia New" panose="020B0304020202020204" pitchFamily="34" charset="-34"/>
-            </a:endParaRPr>
+              <a:rPr lang="fr-FR" sz="900" dirty="0">
+                <a:latin typeface="Malgun Gothic" panose="020B0503020000020004" pitchFamily="34" charset="-127"/>
+                <a:ea typeface="Malgun Gothic" panose="020B0503020000020004" pitchFamily="34" charset="-127"/>
+              </a:rPr>
+              <a:t>1996</a:t>
+            </a:r>
           </a:p>
         </p:txBody>
       </p:sp>
@@ -7814,7 +7569,7 @@
         </p:nvSpPr>
         <p:spPr>
           <a:xfrm>
-            <a:off x="1230101" y="4667403"/>
+            <a:off x="1191413" y="7582336"/>
             <a:ext cx="1971419" cy="307777"/>
           </a:xfrm>
           <a:prstGeom prst="rect">
@@ -7858,7 +7613,7 @@
         </p:blipFill>
         <p:spPr>
           <a:xfrm>
-            <a:off x="774969" y="4591885"/>
+            <a:off x="714899" y="7521635"/>
             <a:ext cx="498315" cy="419477"/>
           </a:xfrm>
           <a:prstGeom prst="rect">
@@ -7874,7 +7629,7 @@
         </p:nvCxnSpPr>
         <p:spPr>
           <a:xfrm flipV="1">
-            <a:off x="1343850" y="5000073"/>
+            <a:off x="1290510" y="7880311"/>
             <a:ext cx="5322021" cy="9802"/>
           </a:xfrm>
           <a:prstGeom prst="line">
@@ -7905,14 +7660,14 @@
       </p:cxnSp>
       <p:sp>
         <p:nvSpPr>
-          <p:cNvPr id="3" name="ZoneTexte 2"/>
+          <p:cNvPr id="5" name="ZoneTexte 4"/>
           <p:cNvSpPr txBox="1"/>
           <p:nvPr/>
         </p:nvSpPr>
         <p:spPr>
           <a:xfrm>
-            <a:off x="956929" y="5033939"/>
-            <a:ext cx="6025467" cy="900246"/>
+            <a:off x="937388" y="7903613"/>
+            <a:ext cx="6025467" cy="1169551"/>
           </a:xfrm>
           <a:prstGeom prst="rect">
             <a:avLst/>
@@ -7926,7 +7681,7 @@
           <a:lstStyle/>
           <a:p>
             <a:r>
-              <a:rPr lang="fr-FR" sz="1050" dirty="0">
+              <a:rPr lang="fr-FR" sz="1000" dirty="0">
                 <a:latin typeface="Malgun Gothic" panose="020B0503020000020004" pitchFamily="34" charset="-127"/>
                 <a:ea typeface="Malgun Gothic" panose="020B0503020000020004" pitchFamily="34" charset="-127"/>
               </a:rPr>
@@ -7934,35 +7689,55 @@
             </a:r>
           </a:p>
           <a:p>
-            <a:endParaRPr lang="fr-FR" sz="1050" dirty="0">
+            <a:r>
+              <a:rPr lang="fr-FR" sz="1000" dirty="0">
+                <a:latin typeface="Malgun Gothic" panose="020B0503020000020004" pitchFamily="34" charset="-127"/>
+                <a:ea typeface="Malgun Gothic" panose="020B0503020000020004" pitchFamily="34" charset="-127"/>
+              </a:rPr>
+              <a:t>Musique : pratique la guitare </a:t>
+            </a:r>
+            <a:r>
+              <a:rPr lang="fr-FR" sz="1000">
+                <a:latin typeface="Malgun Gothic" panose="020B0503020000020004" pitchFamily="34" charset="-127"/>
+                <a:ea typeface="Malgun Gothic" panose="020B0503020000020004" pitchFamily="34" charset="-127"/>
+              </a:rPr>
+              <a:t>et le ukulélé </a:t>
+            </a:r>
+            <a:r>
+              <a:rPr lang="fr-FR" sz="1000" dirty="0">
+                <a:latin typeface="Malgun Gothic" panose="020B0503020000020004" pitchFamily="34" charset="-127"/>
+                <a:ea typeface="Malgun Gothic" panose="020B0503020000020004" pitchFamily="34" charset="-127"/>
+              </a:rPr>
+              <a:t>en amateur</a:t>
+            </a:r>
+          </a:p>
+          <a:p>
+            <a:endParaRPr lang="fr-FR" sz="1000" dirty="0">
               <a:latin typeface="Malgun Gothic" panose="020B0503020000020004" pitchFamily="34" charset="-127"/>
               <a:ea typeface="Malgun Gothic" panose="020B0503020000020004" pitchFamily="34" charset="-127"/>
             </a:endParaRPr>
           </a:p>
           <a:p>
             <a:r>
-              <a:rPr lang="fr-FR" sz="1050" dirty="0">
-                <a:latin typeface="Malgun Gothic" panose="020B0503020000020004" pitchFamily="34" charset="-127"/>
-                <a:ea typeface="Malgun Gothic" panose="020B0503020000020004" pitchFamily="34" charset="-127"/>
-              </a:rPr>
-              <a:t>Titulaire d’une RQTH (Reconnaissance de Qualité de Travailleur Handicapé) ne nécessitant pas</a:t>
-            </a:r>
-          </a:p>
-          <a:p>
-            <a:r>
-              <a:rPr lang="fr-FR" sz="1050" dirty="0">
-                <a:latin typeface="Malgun Gothic" panose="020B0503020000020004" pitchFamily="34" charset="-127"/>
-                <a:ea typeface="Malgun Gothic" panose="020B0503020000020004" pitchFamily="34" charset="-127"/>
-              </a:rPr>
-              <a:t>d’aménagement.</a:t>
-            </a:r>
+              <a:rPr lang="fr-FR" sz="1000" dirty="0">
+                <a:latin typeface="Malgun Gothic" panose="020B0503020000020004" pitchFamily="34" charset="-127"/>
+                <a:ea typeface="Malgun Gothic" panose="020B0503020000020004" pitchFamily="34" charset="-127"/>
+              </a:rPr>
+              <a:t>Titulaire d’une RQTH (Reconnaissance de Qualité de Travailleur Handicapé) limitant mes déplacements professionnels (autour de Grenoble).</a:t>
+            </a:r>
+          </a:p>
+          <a:p>
+            <a:endParaRPr lang="fr-FR" sz="1000" dirty="0">
+              <a:latin typeface="Malgun Gothic" panose="020B0503020000020004" pitchFamily="34" charset="-127"/>
+              <a:ea typeface="Malgun Gothic" panose="020B0503020000020004" pitchFamily="34" charset="-127"/>
+            </a:endParaRPr>
           </a:p>
         </p:txBody>
       </p:sp>
     </p:spTree>
     <p:extLst>
       <p:ext uri="{BB962C8B-B14F-4D97-AF65-F5344CB8AC3E}">
-        <p14:creationId xmlns:p14="http://schemas.microsoft.com/office/powerpoint/2010/main" val="625013758"/>
+        <p14:creationId xmlns:p14="http://schemas.microsoft.com/office/powerpoint/2010/main" val="4062738183"/>
       </p:ext>
     </p:extLst>
   </p:cSld>

</xml_diff>